<commit_message>
nusmv tutorial: enhanced documentation with state-machines and tables
</commit_message>
<xml_diff>
--- a/code/tutorial/solutions/com.mbeddr.formal.nusmv.users_guide/figures/figures.pptx
+++ b/code/tutorial/solutions/com.mbeddr.formal.nusmv.users_guide/figures/figures.pptx
@@ -5,11 +5,16 @@
     <p:sldMasterId id="2147483648" r:id="rId1"/>
   </p:sldMasterIdLst>
   <p:notesMasterIdLst>
-    <p:notesMasterId r:id="rId4"/>
+    <p:notesMasterId r:id="rId9"/>
   </p:notesMasterIdLst>
   <p:sldIdLst>
     <p:sldId id="256" r:id="rId2"/>
     <p:sldId id="257" r:id="rId3"/>
+    <p:sldId id="259" r:id="rId4"/>
+    <p:sldId id="258" r:id="rId5"/>
+    <p:sldId id="260" r:id="rId6"/>
+    <p:sldId id="261" r:id="rId7"/>
+    <p:sldId id="262" r:id="rId8"/>
   </p:sldIdLst>
   <p:sldSz cx="9144000" cy="6858000" type="screen4x3"/>
   <p:notesSz cx="6858000" cy="9144000"/>
@@ -193,7 +198,8 @@
           <a:p>
             <a:fld id="{11812C92-0668-408F-AE44-47ECD1C69BA6}" type="datetimeFigureOut">
               <a:rPr lang="en-US" smtClean="0"/>
-              <a:t>1/10/2018</a:t>
+              <a:pPr/>
+              <a:t>1/11/2018</a:t>
             </a:fld>
             <a:endParaRPr lang="en-US"/>
           </a:p>
@@ -354,6 +360,7 @@
           <a:p>
             <a:fld id="{31158DAA-EA8D-4A3C-B004-D53448C5190F}" type="slidenum">
               <a:rPr lang="en-US" smtClean="0"/>
+              <a:pPr/>
               <a:t>‹Nr.›</a:t>
             </a:fld>
             <a:endParaRPr lang="en-US"/>
@@ -525,6 +532,7 @@
           <a:p>
             <a:fld id="{31158DAA-EA8D-4A3C-B004-D53448C5190F}" type="slidenum">
               <a:rPr lang="en-US" smtClean="0"/>
+              <a:pPr/>
               <a:t>1</a:t>
             </a:fld>
             <a:endParaRPr lang="en-US"/>
@@ -721,7 +729,7 @@
             <a:fld id="{1BA50D42-C9CD-4801-B293-61D1F53EC57E}" type="datetimeFigureOut">
               <a:rPr lang="de-DE" smtClean="0"/>
               <a:pPr/>
-              <a:t>10.01.2018</a:t>
+              <a:t>11.01.2018</a:t>
             </a:fld>
             <a:endParaRPr lang="de-DE"/>
           </a:p>
@@ -888,7 +896,7 @@
             <a:fld id="{1BA50D42-C9CD-4801-B293-61D1F53EC57E}" type="datetimeFigureOut">
               <a:rPr lang="de-DE" smtClean="0"/>
               <a:pPr/>
-              <a:t>10.01.2018</a:t>
+              <a:t>11.01.2018</a:t>
             </a:fld>
             <a:endParaRPr lang="de-DE"/>
           </a:p>
@@ -1065,7 +1073,7 @@
             <a:fld id="{1BA50D42-C9CD-4801-B293-61D1F53EC57E}" type="datetimeFigureOut">
               <a:rPr lang="de-DE" smtClean="0"/>
               <a:pPr/>
-              <a:t>10.01.2018</a:t>
+              <a:t>11.01.2018</a:t>
             </a:fld>
             <a:endParaRPr lang="de-DE"/>
           </a:p>
@@ -1232,7 +1240,7 @@
             <a:fld id="{1BA50D42-C9CD-4801-B293-61D1F53EC57E}" type="datetimeFigureOut">
               <a:rPr lang="de-DE" smtClean="0"/>
               <a:pPr/>
-              <a:t>10.01.2018</a:t>
+              <a:t>11.01.2018</a:t>
             </a:fld>
             <a:endParaRPr lang="de-DE"/>
           </a:p>
@@ -1475,7 +1483,7 @@
             <a:fld id="{1BA50D42-C9CD-4801-B293-61D1F53EC57E}" type="datetimeFigureOut">
               <a:rPr lang="de-DE" smtClean="0"/>
               <a:pPr/>
-              <a:t>10.01.2018</a:t>
+              <a:t>11.01.2018</a:t>
             </a:fld>
             <a:endParaRPr lang="de-DE"/>
           </a:p>
@@ -1760,7 +1768,7 @@
             <a:fld id="{1BA50D42-C9CD-4801-B293-61D1F53EC57E}" type="datetimeFigureOut">
               <a:rPr lang="de-DE" smtClean="0"/>
               <a:pPr/>
-              <a:t>10.01.2018</a:t>
+              <a:t>11.01.2018</a:t>
             </a:fld>
             <a:endParaRPr lang="de-DE"/>
           </a:p>
@@ -2179,7 +2187,7 @@
             <a:fld id="{1BA50D42-C9CD-4801-B293-61D1F53EC57E}" type="datetimeFigureOut">
               <a:rPr lang="de-DE" smtClean="0"/>
               <a:pPr/>
-              <a:t>10.01.2018</a:t>
+              <a:t>11.01.2018</a:t>
             </a:fld>
             <a:endParaRPr lang="de-DE"/>
           </a:p>
@@ -2294,7 +2302,7 @@
             <a:fld id="{1BA50D42-C9CD-4801-B293-61D1F53EC57E}" type="datetimeFigureOut">
               <a:rPr lang="de-DE" smtClean="0"/>
               <a:pPr/>
-              <a:t>10.01.2018</a:t>
+              <a:t>11.01.2018</a:t>
             </a:fld>
             <a:endParaRPr lang="de-DE"/>
           </a:p>
@@ -2386,7 +2394,7 @@
             <a:fld id="{1BA50D42-C9CD-4801-B293-61D1F53EC57E}" type="datetimeFigureOut">
               <a:rPr lang="de-DE" smtClean="0"/>
               <a:pPr/>
-              <a:t>10.01.2018</a:t>
+              <a:t>11.01.2018</a:t>
             </a:fld>
             <a:endParaRPr lang="de-DE"/>
           </a:p>
@@ -2660,7 +2668,7 @@
             <a:fld id="{1BA50D42-C9CD-4801-B293-61D1F53EC57E}" type="datetimeFigureOut">
               <a:rPr lang="de-DE" smtClean="0"/>
               <a:pPr/>
-              <a:t>10.01.2018</a:t>
+              <a:t>11.01.2018</a:t>
             </a:fld>
             <a:endParaRPr lang="de-DE"/>
           </a:p>
@@ -2910,7 +2918,7 @@
             <a:fld id="{1BA50D42-C9CD-4801-B293-61D1F53EC57E}" type="datetimeFigureOut">
               <a:rPr lang="de-DE" smtClean="0"/>
               <a:pPr/>
-              <a:t>10.01.2018</a:t>
+              <a:t>11.01.2018</a:t>
             </a:fld>
             <a:endParaRPr lang="de-DE"/>
           </a:p>
@@ -3120,7 +3128,7 @@
             <a:fld id="{1BA50D42-C9CD-4801-B293-61D1F53EC57E}" type="datetimeFigureOut">
               <a:rPr lang="de-DE" smtClean="0"/>
               <a:pPr/>
-              <a:t>10.01.2018</a:t>
+              <a:t>11.01.2018</a:t>
             </a:fld>
             <a:endParaRPr lang="de-DE"/>
           </a:p>
@@ -4060,11 +4068,6 @@
               </a:rPr>
               <a:t>in step 3</a:t>
             </a:r>
-            <a:endParaRPr lang="en-US" sz="1050" b="1" dirty="0" smtClean="0">
-              <a:solidFill>
-                <a:srgbClr val="C00000"/>
-              </a:solidFill>
-            </a:endParaRPr>
           </a:p>
         </p:txBody>
       </p:sp>
@@ -4259,6 +4262,13 @@
   <p:clrMapOvr>
     <a:masterClrMapping/>
   </p:clrMapOvr>
+  <p:timing>
+    <p:tnLst>
+      <p:par>
+        <p:cTn id="1" dur="indefinite" restart="never" nodeType="tmRoot"/>
+      </p:par>
+    </p:tnLst>
+  </p:timing>
 </p:sld>
 </file>
 
@@ -4298,6 +4308,998 @@
           <a:xfrm>
             <a:off x="2411760" y="188640"/>
             <a:ext cx="4248472" cy="3744416"/>
+          </a:xfrm>
+          <a:prstGeom prst="rect">
+            <a:avLst/>
+          </a:prstGeom>
+          <a:noFill/>
+          <a:ln w="9525">
+            <a:noFill/>
+            <a:miter lim="800000"/>
+            <a:headEnd/>
+            <a:tailEnd/>
+          </a:ln>
+        </p:spPr>
+      </p:pic>
+    </p:spTree>
+  </p:cSld>
+  <p:clrMapOvr>
+    <a:masterClrMapping/>
+  </p:clrMapOvr>
+  <p:timing>
+    <p:tnLst>
+      <p:par>
+        <p:cTn id="1" dur="indefinite" restart="never" nodeType="tmRoot"/>
+      </p:par>
+    </p:tnLst>
+  </p:timing>
+</p:sld>
+</file>
+
+<file path=ppt/slides/slide3.xml><?xml version="1.0" encoding="utf-8"?>
+<p:sld xmlns:a="http://schemas.openxmlformats.org/drawingml/2006/main" xmlns:r="http://schemas.openxmlformats.org/officeDocument/2006/relationships" xmlns:p="http://schemas.openxmlformats.org/presentationml/2006/main">
+  <p:cSld>
+    <p:spTree>
+      <p:nvGrpSpPr>
+        <p:cNvPr id="1" name=""/>
+        <p:cNvGrpSpPr/>
+        <p:nvPr/>
+      </p:nvGrpSpPr>
+      <p:grpSpPr>
+        <a:xfrm>
+          <a:off x="0" y="0"/>
+          <a:ext cx="0" cy="0"/>
+          <a:chOff x="0" y="0"/>
+          <a:chExt cx="0" cy="0"/>
+        </a:xfrm>
+      </p:grpSpPr>
+      <p:pic>
+        <p:nvPicPr>
+          <p:cNvPr id="2050" name="Picture 2"/>
+          <p:cNvPicPr>
+            <a:picLocks noChangeAspect="1" noChangeArrowheads="1"/>
+          </p:cNvPicPr>
+          <p:nvPr/>
+        </p:nvPicPr>
+        <p:blipFill>
+          <a:blip r:embed="rId2" cstate="print"/>
+          <a:srcRect r="54822" b="52168"/>
+          <a:stretch>
+            <a:fillRect/>
+          </a:stretch>
+        </p:blipFill>
+        <p:spPr bwMode="auto">
+          <a:xfrm>
+            <a:off x="1187624" y="188640"/>
+            <a:ext cx="5508104" cy="3177034"/>
+          </a:xfrm>
+          <a:prstGeom prst="rect">
+            <a:avLst/>
+          </a:prstGeom>
+          <a:noFill/>
+          <a:ln w="9525">
+            <a:noFill/>
+            <a:miter lim="800000"/>
+            <a:headEnd/>
+            <a:tailEnd/>
+          </a:ln>
+        </p:spPr>
+      </p:pic>
+    </p:spTree>
+  </p:cSld>
+  <p:clrMapOvr>
+    <a:masterClrMapping/>
+  </p:clrMapOvr>
+  <p:timing>
+    <p:tnLst>
+      <p:par>
+        <p:cTn id="1" dur="indefinite" restart="never" nodeType="tmRoot"/>
+      </p:par>
+    </p:tnLst>
+  </p:timing>
+</p:sld>
+</file>
+
+<file path=ppt/slides/slide4.xml><?xml version="1.0" encoding="utf-8"?>
+<p:sld xmlns:a="http://schemas.openxmlformats.org/drawingml/2006/main" xmlns:r="http://schemas.openxmlformats.org/officeDocument/2006/relationships" xmlns:p="http://schemas.openxmlformats.org/presentationml/2006/main">
+  <p:cSld>
+    <p:spTree>
+      <p:nvGrpSpPr>
+        <p:cNvPr id="1" name=""/>
+        <p:cNvGrpSpPr/>
+        <p:nvPr/>
+      </p:nvGrpSpPr>
+      <p:grpSpPr>
+        <a:xfrm>
+          <a:off x="0" y="0"/>
+          <a:ext cx="0" cy="0"/>
+          <a:chOff x="0" y="0"/>
+          <a:chExt cx="0" cy="0"/>
+        </a:xfrm>
+      </p:grpSpPr>
+      <p:pic>
+        <p:nvPicPr>
+          <p:cNvPr id="1027" name="Picture 3"/>
+          <p:cNvPicPr>
+            <a:picLocks noChangeAspect="1" noChangeArrowheads="1"/>
+          </p:cNvPicPr>
+          <p:nvPr/>
+        </p:nvPicPr>
+        <p:blipFill>
+          <a:blip r:embed="rId2" cstate="print"/>
+          <a:srcRect/>
+          <a:stretch>
+            <a:fillRect/>
+          </a:stretch>
+        </p:blipFill>
+        <p:spPr bwMode="auto">
+          <a:xfrm>
+            <a:off x="1763688" y="404664"/>
+            <a:ext cx="6400800" cy="4006850"/>
+          </a:xfrm>
+          <a:prstGeom prst="rect">
+            <a:avLst/>
+          </a:prstGeom>
+          <a:noFill/>
+          <a:ln w="9525">
+            <a:noFill/>
+            <a:miter lim="800000"/>
+            <a:headEnd/>
+            <a:tailEnd/>
+          </a:ln>
+        </p:spPr>
+      </p:pic>
+    </p:spTree>
+  </p:cSld>
+  <p:clrMapOvr>
+    <a:masterClrMapping/>
+  </p:clrMapOvr>
+  <p:timing>
+    <p:tnLst>
+      <p:par>
+        <p:cTn id="1" dur="indefinite" restart="never" nodeType="tmRoot"/>
+      </p:par>
+    </p:tnLst>
+  </p:timing>
+</p:sld>
+</file>
+
+<file path=ppt/slides/slide5.xml><?xml version="1.0" encoding="utf-8"?>
+<p:sld xmlns:a="http://schemas.openxmlformats.org/drawingml/2006/main" xmlns:r="http://schemas.openxmlformats.org/officeDocument/2006/relationships" xmlns:p="http://schemas.openxmlformats.org/presentationml/2006/main">
+  <p:cSld>
+    <p:spTree>
+      <p:nvGrpSpPr>
+        <p:cNvPr id="1" name=""/>
+        <p:cNvGrpSpPr/>
+        <p:nvPr/>
+      </p:nvGrpSpPr>
+      <p:grpSpPr>
+        <a:xfrm>
+          <a:off x="0" y="0"/>
+          <a:ext cx="0" cy="0"/>
+          <a:chOff x="0" y="0"/>
+          <a:chExt cx="0" cy="0"/>
+        </a:xfrm>
+      </p:grpSpPr>
+      <p:pic>
+        <p:nvPicPr>
+          <p:cNvPr id="3074" name="Picture 2"/>
+          <p:cNvPicPr>
+            <a:picLocks noChangeAspect="1" noChangeArrowheads="1"/>
+          </p:cNvPicPr>
+          <p:nvPr/>
+        </p:nvPicPr>
+        <p:blipFill>
+          <a:blip r:embed="rId2" cstate="print"/>
+          <a:srcRect/>
+          <a:stretch>
+            <a:fillRect/>
+          </a:stretch>
+        </p:blipFill>
+        <p:spPr bwMode="auto">
+          <a:xfrm>
+            <a:off x="1100138" y="371475"/>
+            <a:ext cx="6943725" cy="6115050"/>
+          </a:xfrm>
+          <a:prstGeom prst="rect">
+            <a:avLst/>
+          </a:prstGeom>
+          <a:noFill/>
+          <a:ln w="9525">
+            <a:noFill/>
+            <a:miter lim="800000"/>
+            <a:headEnd/>
+            <a:tailEnd/>
+          </a:ln>
+        </p:spPr>
+      </p:pic>
+      <p:sp>
+        <p:nvSpPr>
+          <p:cNvPr id="5" name="Textfeld 4"/>
+          <p:cNvSpPr txBox="1"/>
+          <p:nvPr/>
+        </p:nvSpPr>
+        <p:spPr>
+          <a:xfrm>
+            <a:off x="4932040" y="692696"/>
+            <a:ext cx="1096775" cy="253916"/>
+          </a:xfrm>
+          <a:prstGeom prst="rect">
+            <a:avLst/>
+          </a:prstGeom>
+          <a:solidFill>
+            <a:schemeClr val="accent6">
+              <a:lumMod val="20000"/>
+              <a:lumOff val="80000"/>
+              <a:alpha val="76000"/>
+            </a:schemeClr>
+          </a:solidFill>
+        </p:spPr>
+        <p:txBody>
+          <a:bodyPr wrap="none" rtlCol="0">
+            <a:spAutoFit/>
+          </a:bodyPr>
+          <a:lstStyle/>
+          <a:p>
+            <a:r>
+              <a:rPr lang="en-US" sz="1050" b="1" dirty="0" smtClean="0">
+                <a:solidFill>
+                  <a:srgbClr val="C00000"/>
+                </a:solidFill>
+              </a:rPr>
+              <a:t>s</a:t>
+            </a:r>
+            <a:r>
+              <a:rPr lang="en-US" sz="1050" b="1" dirty="0" smtClean="0">
+                <a:solidFill>
+                  <a:srgbClr val="C00000"/>
+                </a:solidFill>
+              </a:rPr>
+              <a:t>tates definition</a:t>
+            </a:r>
+            <a:endParaRPr lang="en-US" sz="1050" b="1" dirty="0" smtClean="0">
+              <a:solidFill>
+                <a:srgbClr val="C00000"/>
+              </a:solidFill>
+            </a:endParaRPr>
+          </a:p>
+        </p:txBody>
+      </p:sp>
+      <p:cxnSp>
+        <p:nvCxnSpPr>
+          <p:cNvPr id="6" name="Gerade Verbindung mit Pfeil 5"/>
+          <p:cNvCxnSpPr/>
+          <p:nvPr/>
+        </p:nvCxnSpPr>
+        <p:spPr>
+          <a:xfrm flipH="1">
+            <a:off x="3995936" y="836712"/>
+            <a:ext cx="864096" cy="0"/>
+          </a:xfrm>
+          <a:prstGeom prst="straightConnector1">
+            <a:avLst/>
+          </a:prstGeom>
+          <a:ln w="19050">
+            <a:solidFill>
+              <a:srgbClr val="C00000"/>
+            </a:solidFill>
+            <a:tailEnd type="triangle"/>
+          </a:ln>
+        </p:spPr>
+        <p:style>
+          <a:lnRef idx="1">
+            <a:schemeClr val="accent1"/>
+          </a:lnRef>
+          <a:fillRef idx="0">
+            <a:schemeClr val="accent1"/>
+          </a:fillRef>
+          <a:effectRef idx="0">
+            <a:schemeClr val="accent1"/>
+          </a:effectRef>
+          <a:fontRef idx="minor">
+            <a:schemeClr val="tx1"/>
+          </a:fontRef>
+        </p:style>
+      </p:cxnSp>
+      <p:sp>
+        <p:nvSpPr>
+          <p:cNvPr id="8" name="Textfeld 7"/>
+          <p:cNvSpPr txBox="1"/>
+          <p:nvPr/>
+        </p:nvSpPr>
+        <p:spPr>
+          <a:xfrm>
+            <a:off x="3059832" y="1340768"/>
+            <a:ext cx="1008111" cy="253916"/>
+          </a:xfrm>
+          <a:prstGeom prst="rect">
+            <a:avLst/>
+          </a:prstGeom>
+          <a:solidFill>
+            <a:schemeClr val="accent6">
+              <a:lumMod val="20000"/>
+              <a:lumOff val="80000"/>
+              <a:alpha val="76000"/>
+            </a:schemeClr>
+          </a:solidFill>
+        </p:spPr>
+        <p:txBody>
+          <a:bodyPr wrap="square" rtlCol="0">
+            <a:spAutoFit/>
+          </a:bodyPr>
+          <a:lstStyle/>
+          <a:p>
+            <a:r>
+              <a:rPr lang="en-US" sz="1050" b="1" dirty="0" smtClean="0">
+                <a:solidFill>
+                  <a:srgbClr val="C00000"/>
+                </a:solidFill>
+              </a:rPr>
+              <a:t>state variable</a:t>
+            </a:r>
+            <a:endParaRPr lang="en-US" sz="1050" b="1" dirty="0" smtClean="0">
+              <a:solidFill>
+                <a:srgbClr val="C00000"/>
+              </a:solidFill>
+            </a:endParaRPr>
+          </a:p>
+        </p:txBody>
+      </p:sp>
+      <p:cxnSp>
+        <p:nvCxnSpPr>
+          <p:cNvPr id="9" name="Gerade Verbindung mit Pfeil 8"/>
+          <p:cNvCxnSpPr/>
+          <p:nvPr/>
+        </p:nvCxnSpPr>
+        <p:spPr>
+          <a:xfrm flipH="1" flipV="1">
+            <a:off x="2195736" y="908720"/>
+            <a:ext cx="792088" cy="576064"/>
+          </a:xfrm>
+          <a:prstGeom prst="straightConnector1">
+            <a:avLst/>
+          </a:prstGeom>
+          <a:ln w="19050">
+            <a:solidFill>
+              <a:srgbClr val="C00000"/>
+            </a:solidFill>
+            <a:tailEnd type="triangle"/>
+          </a:ln>
+        </p:spPr>
+        <p:style>
+          <a:lnRef idx="1">
+            <a:schemeClr val="accent1"/>
+          </a:lnRef>
+          <a:fillRef idx="0">
+            <a:schemeClr val="accent1"/>
+          </a:fillRef>
+          <a:effectRef idx="0">
+            <a:schemeClr val="accent1"/>
+          </a:effectRef>
+          <a:fontRef idx="minor">
+            <a:schemeClr val="tx1"/>
+          </a:fontRef>
+        </p:style>
+      </p:cxnSp>
+      <p:sp>
+        <p:nvSpPr>
+          <p:cNvPr id="12" name="Textfeld 11"/>
+          <p:cNvSpPr txBox="1"/>
+          <p:nvPr/>
+        </p:nvSpPr>
+        <p:spPr>
+          <a:xfrm>
+            <a:off x="4499992" y="980728"/>
+            <a:ext cx="1598515" cy="253916"/>
+          </a:xfrm>
+          <a:prstGeom prst="rect">
+            <a:avLst/>
+          </a:prstGeom>
+          <a:solidFill>
+            <a:schemeClr val="accent6">
+              <a:lumMod val="20000"/>
+              <a:lumOff val="80000"/>
+              <a:alpha val="39000"/>
+            </a:schemeClr>
+          </a:solidFill>
+        </p:spPr>
+        <p:txBody>
+          <a:bodyPr wrap="none" rtlCol="0">
+            <a:spAutoFit/>
+          </a:bodyPr>
+          <a:lstStyle/>
+          <a:p>
+            <a:r>
+              <a:rPr lang="en-US" sz="1050" b="1" dirty="0" smtClean="0">
+                <a:solidFill>
+                  <a:srgbClr val="C00000"/>
+                </a:solidFill>
+              </a:rPr>
+              <a:t>additional state variables</a:t>
+            </a:r>
+            <a:endParaRPr lang="en-US" sz="1050" b="1" dirty="0">
+              <a:solidFill>
+                <a:srgbClr val="C00000"/>
+              </a:solidFill>
+            </a:endParaRPr>
+          </a:p>
+        </p:txBody>
+      </p:sp>
+      <p:sp>
+        <p:nvSpPr>
+          <p:cNvPr id="13" name="Geschweifte Klammer rechts 12"/>
+          <p:cNvSpPr/>
+          <p:nvPr/>
+        </p:nvSpPr>
+        <p:spPr>
+          <a:xfrm>
+            <a:off x="4283968" y="908720"/>
+            <a:ext cx="144016" cy="360040"/>
+          </a:xfrm>
+          <a:prstGeom prst="rightBrace">
+            <a:avLst/>
+          </a:prstGeom>
+        </p:spPr>
+        <p:style>
+          <a:lnRef idx="1">
+            <a:schemeClr val="accent1"/>
+          </a:lnRef>
+          <a:fillRef idx="0">
+            <a:schemeClr val="accent1"/>
+          </a:fillRef>
+          <a:effectRef idx="0">
+            <a:schemeClr val="accent1"/>
+          </a:effectRef>
+          <a:fontRef idx="minor">
+            <a:schemeClr val="tx1"/>
+          </a:fontRef>
+        </p:style>
+        <p:txBody>
+          <a:bodyPr rtlCol="0" anchor="ctr"/>
+          <a:lstStyle/>
+          <a:p>
+            <a:pPr algn="ctr"/>
+            <a:endParaRPr lang="en-US"/>
+          </a:p>
+        </p:txBody>
+      </p:sp>
+      <p:sp>
+        <p:nvSpPr>
+          <p:cNvPr id="14" name="Textfeld 13"/>
+          <p:cNvSpPr txBox="1"/>
+          <p:nvPr/>
+        </p:nvSpPr>
+        <p:spPr>
+          <a:xfrm>
+            <a:off x="8028384" y="2708920"/>
+            <a:ext cx="784189" cy="415498"/>
+          </a:xfrm>
+          <a:prstGeom prst="rect">
+            <a:avLst/>
+          </a:prstGeom>
+          <a:solidFill>
+            <a:schemeClr val="accent6">
+              <a:lumMod val="20000"/>
+              <a:lumOff val="80000"/>
+              <a:alpha val="39000"/>
+            </a:schemeClr>
+          </a:solidFill>
+        </p:spPr>
+        <p:txBody>
+          <a:bodyPr wrap="none" rtlCol="0">
+            <a:spAutoFit/>
+          </a:bodyPr>
+          <a:lstStyle/>
+          <a:p>
+            <a:r>
+              <a:rPr lang="en-US" sz="1050" b="1" dirty="0" smtClean="0">
+                <a:solidFill>
+                  <a:srgbClr val="C00000"/>
+                </a:solidFill>
+              </a:rPr>
+              <a:t>transitions</a:t>
+            </a:r>
+          </a:p>
+          <a:p>
+            <a:r>
+              <a:rPr lang="en-US" sz="1050" b="1" dirty="0" smtClean="0">
+                <a:solidFill>
+                  <a:srgbClr val="C00000"/>
+                </a:solidFill>
+              </a:rPr>
+              <a:t>definitions</a:t>
+            </a:r>
+            <a:endParaRPr lang="en-US" sz="1050" b="1" dirty="0">
+              <a:solidFill>
+                <a:srgbClr val="C00000"/>
+              </a:solidFill>
+            </a:endParaRPr>
+          </a:p>
+        </p:txBody>
+      </p:sp>
+      <p:sp>
+        <p:nvSpPr>
+          <p:cNvPr id="15" name="Geschweifte Klammer rechts 14"/>
+          <p:cNvSpPr/>
+          <p:nvPr/>
+        </p:nvSpPr>
+        <p:spPr>
+          <a:xfrm>
+            <a:off x="7812360" y="2636912"/>
+            <a:ext cx="144016" cy="1080120"/>
+          </a:xfrm>
+          <a:prstGeom prst="rightBrace">
+            <a:avLst/>
+          </a:prstGeom>
+        </p:spPr>
+        <p:style>
+          <a:lnRef idx="1">
+            <a:schemeClr val="accent1"/>
+          </a:lnRef>
+          <a:fillRef idx="0">
+            <a:schemeClr val="accent1"/>
+          </a:fillRef>
+          <a:effectRef idx="0">
+            <a:schemeClr val="accent1"/>
+          </a:effectRef>
+          <a:fontRef idx="minor">
+            <a:schemeClr val="tx1"/>
+          </a:fontRef>
+        </p:style>
+        <p:txBody>
+          <a:bodyPr rtlCol="0" anchor="ctr"/>
+          <a:lstStyle/>
+          <a:p>
+            <a:pPr algn="ctr"/>
+            <a:endParaRPr lang="en-US"/>
+          </a:p>
+        </p:txBody>
+      </p:sp>
+      <p:sp>
+        <p:nvSpPr>
+          <p:cNvPr id="16" name="Textfeld 15"/>
+          <p:cNvSpPr txBox="1"/>
+          <p:nvPr/>
+        </p:nvSpPr>
+        <p:spPr>
+          <a:xfrm>
+            <a:off x="1403648" y="3068960"/>
+            <a:ext cx="1080119" cy="253916"/>
+          </a:xfrm>
+          <a:prstGeom prst="rect">
+            <a:avLst/>
+          </a:prstGeom>
+          <a:solidFill>
+            <a:schemeClr val="accent6">
+              <a:lumMod val="20000"/>
+              <a:lumOff val="80000"/>
+              <a:alpha val="76000"/>
+            </a:schemeClr>
+          </a:solidFill>
+        </p:spPr>
+        <p:txBody>
+          <a:bodyPr wrap="square" rtlCol="0">
+            <a:spAutoFit/>
+          </a:bodyPr>
+          <a:lstStyle/>
+          <a:p>
+            <a:r>
+              <a:rPr lang="en-US" sz="1050" b="1" dirty="0" smtClean="0">
+                <a:solidFill>
+                  <a:srgbClr val="C00000"/>
+                </a:solidFill>
+              </a:rPr>
+              <a:t>transition name</a:t>
+            </a:r>
+            <a:endParaRPr lang="en-US" sz="1050" b="1" dirty="0" smtClean="0">
+              <a:solidFill>
+                <a:srgbClr val="C00000"/>
+              </a:solidFill>
+            </a:endParaRPr>
+          </a:p>
+        </p:txBody>
+      </p:sp>
+      <p:cxnSp>
+        <p:nvCxnSpPr>
+          <p:cNvPr id="17" name="Gerade Verbindung mit Pfeil 16"/>
+          <p:cNvCxnSpPr/>
+          <p:nvPr/>
+        </p:nvCxnSpPr>
+        <p:spPr>
+          <a:xfrm flipV="1">
+            <a:off x="2555776" y="2996952"/>
+            <a:ext cx="288032" cy="144016"/>
+          </a:xfrm>
+          <a:prstGeom prst="straightConnector1">
+            <a:avLst/>
+          </a:prstGeom>
+          <a:ln w="19050">
+            <a:solidFill>
+              <a:srgbClr val="C00000"/>
+            </a:solidFill>
+            <a:tailEnd type="triangle"/>
+          </a:ln>
+        </p:spPr>
+        <p:style>
+          <a:lnRef idx="1">
+            <a:schemeClr val="accent1"/>
+          </a:lnRef>
+          <a:fillRef idx="0">
+            <a:schemeClr val="accent1"/>
+          </a:fillRef>
+          <a:effectRef idx="0">
+            <a:schemeClr val="accent1"/>
+          </a:effectRef>
+          <a:fontRef idx="minor">
+            <a:schemeClr val="tx1"/>
+          </a:fontRef>
+        </p:style>
+      </p:cxnSp>
+      <p:sp>
+        <p:nvSpPr>
+          <p:cNvPr id="19" name="Geschweifte Klammer rechts 18"/>
+          <p:cNvSpPr/>
+          <p:nvPr/>
+        </p:nvSpPr>
+        <p:spPr>
+          <a:xfrm rot="16200000">
+            <a:off x="5400092" y="1016732"/>
+            <a:ext cx="216023" cy="3024336"/>
+          </a:xfrm>
+          <a:prstGeom prst="rightBrace">
+            <a:avLst/>
+          </a:prstGeom>
+        </p:spPr>
+        <p:style>
+          <a:lnRef idx="1">
+            <a:schemeClr val="accent1"/>
+          </a:lnRef>
+          <a:fillRef idx="0">
+            <a:schemeClr val="accent1"/>
+          </a:fillRef>
+          <a:effectRef idx="0">
+            <a:schemeClr val="accent1"/>
+          </a:effectRef>
+          <a:fontRef idx="minor">
+            <a:schemeClr val="tx1"/>
+          </a:fontRef>
+        </p:style>
+        <p:txBody>
+          <a:bodyPr rtlCol="0" anchor="ctr"/>
+          <a:lstStyle/>
+          <a:p>
+            <a:pPr algn="ctr"/>
+            <a:endParaRPr lang="en-US"/>
+          </a:p>
+        </p:txBody>
+      </p:sp>
+      <p:sp>
+        <p:nvSpPr>
+          <p:cNvPr id="20" name="Textfeld 19"/>
+          <p:cNvSpPr txBox="1"/>
+          <p:nvPr/>
+        </p:nvSpPr>
+        <p:spPr>
+          <a:xfrm>
+            <a:off x="5220072" y="2132856"/>
+            <a:ext cx="506870" cy="253916"/>
+          </a:xfrm>
+          <a:prstGeom prst="rect">
+            <a:avLst/>
+          </a:prstGeom>
+          <a:solidFill>
+            <a:schemeClr val="accent6">
+              <a:lumMod val="20000"/>
+              <a:lumOff val="80000"/>
+              <a:alpha val="39000"/>
+            </a:schemeClr>
+          </a:solidFill>
+        </p:spPr>
+        <p:txBody>
+          <a:bodyPr wrap="none" rtlCol="0">
+            <a:spAutoFit/>
+          </a:bodyPr>
+          <a:lstStyle/>
+          <a:p>
+            <a:r>
+              <a:rPr lang="en-US" sz="1050" b="1" dirty="0" smtClean="0">
+                <a:solidFill>
+                  <a:srgbClr val="C00000"/>
+                </a:solidFill>
+              </a:rPr>
+              <a:t>guard</a:t>
+            </a:r>
+            <a:endParaRPr lang="en-US" sz="1050" b="1" dirty="0">
+              <a:solidFill>
+                <a:srgbClr val="C00000"/>
+              </a:solidFill>
+            </a:endParaRPr>
+          </a:p>
+        </p:txBody>
+      </p:sp>
+      <p:sp>
+        <p:nvSpPr>
+          <p:cNvPr id="22" name="Textfeld 21"/>
+          <p:cNvSpPr txBox="1"/>
+          <p:nvPr/>
+        </p:nvSpPr>
+        <p:spPr>
+          <a:xfrm>
+            <a:off x="1403648" y="4797152"/>
+            <a:ext cx="1296144" cy="253916"/>
+          </a:xfrm>
+          <a:prstGeom prst="rect">
+            <a:avLst/>
+          </a:prstGeom>
+          <a:solidFill>
+            <a:schemeClr val="accent6">
+              <a:lumMod val="20000"/>
+              <a:lumOff val="80000"/>
+              <a:alpha val="76000"/>
+            </a:schemeClr>
+          </a:solidFill>
+        </p:spPr>
+        <p:txBody>
+          <a:bodyPr wrap="square" rtlCol="0">
+            <a:spAutoFit/>
+          </a:bodyPr>
+          <a:lstStyle/>
+          <a:p>
+            <a:r>
+              <a:rPr lang="en-US" sz="1050" b="1" dirty="0" smtClean="0">
+                <a:solidFill>
+                  <a:srgbClr val="C00000"/>
+                </a:solidFill>
+              </a:rPr>
+              <a:t>transition reference</a:t>
+            </a:r>
+            <a:endParaRPr lang="en-US" sz="1050" b="1" dirty="0" smtClean="0">
+              <a:solidFill>
+                <a:srgbClr val="C00000"/>
+              </a:solidFill>
+            </a:endParaRPr>
+          </a:p>
+        </p:txBody>
+      </p:sp>
+      <p:cxnSp>
+        <p:nvCxnSpPr>
+          <p:cNvPr id="23" name="Gerade Verbindung mit Pfeil 22"/>
+          <p:cNvCxnSpPr/>
+          <p:nvPr/>
+        </p:nvCxnSpPr>
+        <p:spPr>
+          <a:xfrm flipV="1">
+            <a:off x="2555776" y="4615244"/>
+            <a:ext cx="288032" cy="144016"/>
+          </a:xfrm>
+          <a:prstGeom prst="straightConnector1">
+            <a:avLst/>
+          </a:prstGeom>
+          <a:ln w="19050">
+            <a:solidFill>
+              <a:srgbClr val="C00000"/>
+            </a:solidFill>
+            <a:tailEnd type="triangle"/>
+          </a:ln>
+        </p:spPr>
+        <p:style>
+          <a:lnRef idx="1">
+            <a:schemeClr val="accent1"/>
+          </a:lnRef>
+          <a:fillRef idx="0">
+            <a:schemeClr val="accent1"/>
+          </a:fillRef>
+          <a:effectRef idx="0">
+            <a:schemeClr val="accent1"/>
+          </a:effectRef>
+          <a:fontRef idx="minor">
+            <a:schemeClr val="tx1"/>
+          </a:fontRef>
+        </p:style>
+      </p:cxnSp>
+      <p:sp>
+        <p:nvSpPr>
+          <p:cNvPr id="24" name="Textfeld 23"/>
+          <p:cNvSpPr txBox="1"/>
+          <p:nvPr/>
+        </p:nvSpPr>
+        <p:spPr>
+          <a:xfrm>
+            <a:off x="3059832" y="2060848"/>
+            <a:ext cx="1440160" cy="253916"/>
+          </a:xfrm>
+          <a:prstGeom prst="rect">
+            <a:avLst/>
+          </a:prstGeom>
+          <a:solidFill>
+            <a:schemeClr val="accent6">
+              <a:lumMod val="20000"/>
+              <a:lumOff val="80000"/>
+              <a:alpha val="76000"/>
+            </a:schemeClr>
+          </a:solidFill>
+        </p:spPr>
+        <p:txBody>
+          <a:bodyPr wrap="square" rtlCol="0">
+            <a:spAutoFit/>
+          </a:bodyPr>
+          <a:lstStyle/>
+          <a:p>
+            <a:r>
+              <a:rPr lang="en-US" sz="1050" b="1" dirty="0" smtClean="0">
+                <a:solidFill>
+                  <a:srgbClr val="C00000"/>
+                </a:solidFill>
+              </a:rPr>
+              <a:t>s</a:t>
+            </a:r>
+            <a:r>
+              <a:rPr lang="en-US" sz="1050" b="1" dirty="0" smtClean="0">
+                <a:solidFill>
+                  <a:srgbClr val="C00000"/>
+                </a:solidFill>
+              </a:rPr>
+              <a:t>tate-machine section</a:t>
+            </a:r>
+            <a:endParaRPr lang="en-US" sz="1050" b="1" dirty="0" smtClean="0">
+              <a:solidFill>
+                <a:srgbClr val="C00000"/>
+              </a:solidFill>
+            </a:endParaRPr>
+          </a:p>
+        </p:txBody>
+      </p:sp>
+      <p:cxnSp>
+        <p:nvCxnSpPr>
+          <p:cNvPr id="25" name="Gerade Verbindung mit Pfeil 24"/>
+          <p:cNvCxnSpPr/>
+          <p:nvPr/>
+        </p:nvCxnSpPr>
+        <p:spPr>
+          <a:xfrm flipH="1">
+            <a:off x="2483768" y="2204864"/>
+            <a:ext cx="504056" cy="0"/>
+          </a:xfrm>
+          <a:prstGeom prst="straightConnector1">
+            <a:avLst/>
+          </a:prstGeom>
+          <a:ln w="19050">
+            <a:solidFill>
+              <a:srgbClr val="C00000"/>
+            </a:solidFill>
+            <a:tailEnd type="triangle"/>
+          </a:ln>
+        </p:spPr>
+        <p:style>
+          <a:lnRef idx="1">
+            <a:schemeClr val="accent1"/>
+          </a:lnRef>
+          <a:fillRef idx="0">
+            <a:schemeClr val="accent1"/>
+          </a:fillRef>
+          <a:effectRef idx="0">
+            <a:schemeClr val="accent1"/>
+          </a:effectRef>
+          <a:fontRef idx="minor">
+            <a:schemeClr val="tx1"/>
+          </a:fontRef>
+        </p:style>
+      </p:cxnSp>
+    </p:spTree>
+  </p:cSld>
+  <p:clrMapOvr>
+    <a:masterClrMapping/>
+  </p:clrMapOvr>
+  <p:timing>
+    <p:tnLst>
+      <p:par>
+        <p:cTn id="1" dur="indefinite" restart="never" nodeType="tmRoot"/>
+      </p:par>
+    </p:tnLst>
+  </p:timing>
+</p:sld>
+</file>
+
+<file path=ppt/slides/slide6.xml><?xml version="1.0" encoding="utf-8"?>
+<p:sld xmlns:a="http://schemas.openxmlformats.org/drawingml/2006/main" xmlns:r="http://schemas.openxmlformats.org/officeDocument/2006/relationships" xmlns:p="http://schemas.openxmlformats.org/presentationml/2006/main">
+  <p:cSld>
+    <p:spTree>
+      <p:nvGrpSpPr>
+        <p:cNvPr id="1" name=""/>
+        <p:cNvGrpSpPr/>
+        <p:nvPr/>
+      </p:nvGrpSpPr>
+      <p:grpSpPr>
+        <a:xfrm>
+          <a:off x="0" y="0"/>
+          <a:ext cx="0" cy="0"/>
+          <a:chOff x="0" y="0"/>
+          <a:chExt cx="0" cy="0"/>
+        </a:xfrm>
+      </p:grpSpPr>
+      <p:pic>
+        <p:nvPicPr>
+          <p:cNvPr id="4098" name="Picture 2"/>
+          <p:cNvPicPr>
+            <a:picLocks noChangeAspect="1" noChangeArrowheads="1"/>
+          </p:cNvPicPr>
+          <p:nvPr/>
+        </p:nvPicPr>
+        <p:blipFill>
+          <a:blip r:embed="rId2" cstate="print"/>
+          <a:srcRect/>
+          <a:stretch>
+            <a:fillRect/>
+          </a:stretch>
+        </p:blipFill>
+        <p:spPr bwMode="auto">
+          <a:xfrm>
+            <a:off x="683568" y="404664"/>
+            <a:ext cx="7920881" cy="5112568"/>
+          </a:xfrm>
+          <a:prstGeom prst="rect">
+            <a:avLst/>
+          </a:prstGeom>
+          <a:noFill/>
+          <a:ln w="9525">
+            <a:noFill/>
+            <a:miter lim="800000"/>
+            <a:headEnd/>
+            <a:tailEnd/>
+          </a:ln>
+        </p:spPr>
+      </p:pic>
+    </p:spTree>
+  </p:cSld>
+  <p:clrMapOvr>
+    <a:masterClrMapping/>
+  </p:clrMapOvr>
+  <p:timing>
+    <p:tnLst>
+      <p:par>
+        <p:cTn id="1" dur="indefinite" restart="never" nodeType="tmRoot"/>
+      </p:par>
+    </p:tnLst>
+  </p:timing>
+</p:sld>
+</file>
+
+<file path=ppt/slides/slide7.xml><?xml version="1.0" encoding="utf-8"?>
+<p:sld xmlns:a="http://schemas.openxmlformats.org/drawingml/2006/main" xmlns:r="http://schemas.openxmlformats.org/officeDocument/2006/relationships" xmlns:p="http://schemas.openxmlformats.org/presentationml/2006/main">
+  <p:cSld>
+    <p:spTree>
+      <p:nvGrpSpPr>
+        <p:cNvPr id="1" name=""/>
+        <p:cNvGrpSpPr/>
+        <p:nvPr/>
+      </p:nvGrpSpPr>
+      <p:grpSpPr>
+        <a:xfrm>
+          <a:off x="0" y="0"/>
+          <a:ext cx="0" cy="0"/>
+          <a:chOff x="0" y="0"/>
+          <a:chExt cx="0" cy="0"/>
+        </a:xfrm>
+      </p:grpSpPr>
+      <p:pic>
+        <p:nvPicPr>
+          <p:cNvPr id="5122" name="Picture 2"/>
+          <p:cNvPicPr>
+            <a:picLocks noChangeAspect="1" noChangeArrowheads="1"/>
+          </p:cNvPicPr>
+          <p:nvPr/>
+        </p:nvPicPr>
+        <p:blipFill>
+          <a:blip r:embed="rId2" cstate="print"/>
+          <a:srcRect/>
+          <a:stretch>
+            <a:fillRect/>
+          </a:stretch>
+        </p:blipFill>
+        <p:spPr bwMode="auto">
+          <a:xfrm>
+            <a:off x="2405063" y="2266950"/>
+            <a:ext cx="4333875" cy="2324100"/>
           </a:xfrm>
           <a:prstGeom prst="rect">
             <a:avLst/>

</xml_diff>

<commit_message>
nusmv test: improved lifting of results
</commit_message>
<xml_diff>
--- a/code/tutorial/solutions/com.mbeddr.formal.nusmv.users_guide/figures/figures.pptx
+++ b/code/tutorial/solutions/com.mbeddr.formal.nusmv.users_guide/figures/figures.pptx
@@ -5298,7 +5298,7 @@
         </p:blipFill>
         <p:spPr bwMode="auto">
           <a:xfrm>
-            <a:off x="2405063" y="2266950"/>
+            <a:off x="2267744" y="1124744"/>
             <a:ext cx="4333875" cy="2324100"/>
           </a:xfrm>
           <a:prstGeom prst="rect">
@@ -5313,11 +5313,182 @@
           </a:ln>
         </p:spPr>
       </p:pic>
+      <p:sp>
+        <p:nvSpPr>
+          <p:cNvPr id="5" name="Textfeld 4"/>
+          <p:cNvSpPr txBox="1"/>
+          <p:nvPr/>
+        </p:nvSpPr>
+        <p:spPr>
+          <a:xfrm>
+            <a:off x="5580112" y="980728"/>
+            <a:ext cx="785793" cy="253916"/>
+          </a:xfrm>
+          <a:prstGeom prst="rect">
+            <a:avLst/>
+          </a:prstGeom>
+          <a:solidFill>
+            <a:schemeClr val="accent6">
+              <a:lumMod val="20000"/>
+              <a:lumOff val="80000"/>
+              <a:alpha val="76000"/>
+            </a:schemeClr>
+          </a:solidFill>
+        </p:spPr>
+        <p:txBody>
+          <a:bodyPr wrap="none" rtlCol="0">
+            <a:spAutoFit/>
+          </a:bodyPr>
+          <a:lstStyle/>
+          <a:p>
+            <a:r>
+              <a:rPr lang="en-US" sz="1050" b="1" dirty="0" smtClean="0">
+                <a:solidFill>
+                  <a:srgbClr val="C00000"/>
+                </a:solidFill>
+              </a:rPr>
+              <a:t>definitions</a:t>
+            </a:r>
+            <a:endParaRPr lang="en-US" sz="1050" b="1" dirty="0" smtClean="0">
+              <a:solidFill>
+                <a:srgbClr val="C00000"/>
+              </a:solidFill>
+            </a:endParaRPr>
+          </a:p>
+        </p:txBody>
+      </p:sp>
+      <p:sp>
+        <p:nvSpPr>
+          <p:cNvPr id="8" name="Geschweifte Klammer rechts 7"/>
+          <p:cNvSpPr/>
+          <p:nvPr/>
+        </p:nvSpPr>
+        <p:spPr>
+          <a:xfrm rot="16200000">
+            <a:off x="5868146" y="764703"/>
+            <a:ext cx="144014" cy="1152130"/>
+          </a:xfrm>
+          <a:prstGeom prst="rightBrace">
+            <a:avLst/>
+          </a:prstGeom>
+        </p:spPr>
+        <p:style>
+          <a:lnRef idx="1">
+            <a:schemeClr val="accent1"/>
+          </a:lnRef>
+          <a:fillRef idx="0">
+            <a:schemeClr val="accent1"/>
+          </a:fillRef>
+          <a:effectRef idx="0">
+            <a:schemeClr val="accent1"/>
+          </a:effectRef>
+          <a:fontRef idx="minor">
+            <a:schemeClr val="tx1"/>
+          </a:fontRef>
+        </p:style>
+        <p:txBody>
+          <a:bodyPr rtlCol="0" anchor="ctr"/>
+          <a:lstStyle/>
+          <a:p>
+            <a:pPr algn="ctr"/>
+            <a:endParaRPr lang="en-US"/>
+          </a:p>
+        </p:txBody>
+      </p:sp>
+      <p:sp>
+        <p:nvSpPr>
+          <p:cNvPr id="9" name="Textfeld 8"/>
+          <p:cNvSpPr txBox="1"/>
+          <p:nvPr/>
+        </p:nvSpPr>
+        <p:spPr>
+          <a:xfrm>
+            <a:off x="3059832" y="3247092"/>
+            <a:ext cx="1813317" cy="253916"/>
+          </a:xfrm>
+          <a:prstGeom prst="rect">
+            <a:avLst/>
+          </a:prstGeom>
+          <a:solidFill>
+            <a:schemeClr val="accent6">
+              <a:lumMod val="20000"/>
+              <a:lumOff val="80000"/>
+              <a:alpha val="39000"/>
+            </a:schemeClr>
+          </a:solidFill>
+        </p:spPr>
+        <p:txBody>
+          <a:bodyPr wrap="none" rtlCol="0">
+            <a:spAutoFit/>
+          </a:bodyPr>
+          <a:lstStyle/>
+          <a:p>
+            <a:r>
+              <a:rPr lang="en-US" sz="1050" b="1" dirty="0" smtClean="0">
+                <a:solidFill>
+                  <a:srgbClr val="C00000"/>
+                </a:solidFill>
+              </a:rPr>
+              <a:t>complex cascaded conditions</a:t>
+            </a:r>
+            <a:endParaRPr lang="en-US" sz="1050" b="1" dirty="0">
+              <a:solidFill>
+                <a:srgbClr val="C00000"/>
+              </a:solidFill>
+            </a:endParaRPr>
+          </a:p>
+        </p:txBody>
+      </p:sp>
+      <p:sp>
+        <p:nvSpPr>
+          <p:cNvPr id="10" name="Geschweifte Klammer rechts 9"/>
+          <p:cNvSpPr/>
+          <p:nvPr/>
+        </p:nvSpPr>
+        <p:spPr>
+          <a:xfrm rot="5400000">
+            <a:off x="3887924" y="1952836"/>
+            <a:ext cx="144016" cy="2376264"/>
+          </a:xfrm>
+          <a:prstGeom prst="rightBrace">
+            <a:avLst/>
+          </a:prstGeom>
+        </p:spPr>
+        <p:style>
+          <a:lnRef idx="1">
+            <a:schemeClr val="accent1"/>
+          </a:lnRef>
+          <a:fillRef idx="0">
+            <a:schemeClr val="accent1"/>
+          </a:fillRef>
+          <a:effectRef idx="0">
+            <a:schemeClr val="accent1"/>
+          </a:effectRef>
+          <a:fontRef idx="minor">
+            <a:schemeClr val="tx1"/>
+          </a:fontRef>
+        </p:style>
+        <p:txBody>
+          <a:bodyPr rtlCol="0" anchor="ctr"/>
+          <a:lstStyle/>
+          <a:p>
+            <a:pPr algn="ctr"/>
+            <a:endParaRPr lang="en-US"/>
+          </a:p>
+        </p:txBody>
+      </p:sp>
     </p:spTree>
   </p:cSld>
   <p:clrMapOvr>
     <a:masterClrMapping/>
   </p:clrMapOvr>
+  <p:timing>
+    <p:tnLst>
+      <p:par>
+        <p:cTn id="1" dur="indefinite" restart="never" nodeType="tmRoot"/>
+      </p:par>
+    </p:tnLst>
+  </p:timing>
 </p:sld>
 </file>
 

</xml_diff>

<commit_message>
nusmv tutorial: update the users guide about generalized unit tests
</commit_message>
<xml_diff>
--- a/code/tutorial/solutions/com.mbeddr.formal.nusmv.users_guide/figures/figures.pptx
+++ b/code/tutorial/solutions/com.mbeddr.formal.nusmv.users_guide/figures/figures.pptx
@@ -5,16 +5,18 @@
     <p:sldMasterId id="2147483648" r:id="rId1"/>
   </p:sldMasterIdLst>
   <p:notesMasterIdLst>
-    <p:notesMasterId r:id="rId9"/>
+    <p:notesMasterId r:id="rId11"/>
   </p:notesMasterIdLst>
   <p:sldIdLst>
     <p:sldId id="256" r:id="rId2"/>
-    <p:sldId id="257" r:id="rId3"/>
-    <p:sldId id="259" r:id="rId4"/>
-    <p:sldId id="258" r:id="rId5"/>
-    <p:sldId id="260" r:id="rId6"/>
-    <p:sldId id="261" r:id="rId7"/>
-    <p:sldId id="262" r:id="rId8"/>
+    <p:sldId id="263" r:id="rId3"/>
+    <p:sldId id="257" r:id="rId4"/>
+    <p:sldId id="264" r:id="rId5"/>
+    <p:sldId id="259" r:id="rId6"/>
+    <p:sldId id="258" r:id="rId7"/>
+    <p:sldId id="260" r:id="rId8"/>
+    <p:sldId id="261" r:id="rId9"/>
+    <p:sldId id="262" r:id="rId10"/>
   </p:sldIdLst>
   <p:sldSz cx="9144000" cy="6858000" type="screen4x3"/>
   <p:notesSz cx="6858000" cy="9144000"/>
@@ -199,7 +201,7 @@
             <a:fld id="{11812C92-0668-408F-AE44-47ECD1C69BA6}" type="datetimeFigureOut">
               <a:rPr lang="en-US" smtClean="0"/>
               <a:pPr/>
-              <a:t>1/11/2018</a:t>
+              <a:t>3/16/2018</a:t>
             </a:fld>
             <a:endParaRPr lang="en-US"/>
           </a:p>
@@ -729,7 +731,7 @@
             <a:fld id="{1BA50D42-C9CD-4801-B293-61D1F53EC57E}" type="datetimeFigureOut">
               <a:rPr lang="de-DE" smtClean="0"/>
               <a:pPr/>
-              <a:t>11.01.2018</a:t>
+              <a:t>16.03.2018</a:t>
             </a:fld>
             <a:endParaRPr lang="de-DE"/>
           </a:p>
@@ -896,7 +898,7 @@
             <a:fld id="{1BA50D42-C9CD-4801-B293-61D1F53EC57E}" type="datetimeFigureOut">
               <a:rPr lang="de-DE" smtClean="0"/>
               <a:pPr/>
-              <a:t>11.01.2018</a:t>
+              <a:t>16.03.2018</a:t>
             </a:fld>
             <a:endParaRPr lang="de-DE"/>
           </a:p>
@@ -1073,7 +1075,7 @@
             <a:fld id="{1BA50D42-C9CD-4801-B293-61D1F53EC57E}" type="datetimeFigureOut">
               <a:rPr lang="de-DE" smtClean="0"/>
               <a:pPr/>
-              <a:t>11.01.2018</a:t>
+              <a:t>16.03.2018</a:t>
             </a:fld>
             <a:endParaRPr lang="de-DE"/>
           </a:p>
@@ -1240,7 +1242,7 @@
             <a:fld id="{1BA50D42-C9CD-4801-B293-61D1F53EC57E}" type="datetimeFigureOut">
               <a:rPr lang="de-DE" smtClean="0"/>
               <a:pPr/>
-              <a:t>11.01.2018</a:t>
+              <a:t>16.03.2018</a:t>
             </a:fld>
             <a:endParaRPr lang="de-DE"/>
           </a:p>
@@ -1483,7 +1485,7 @@
             <a:fld id="{1BA50D42-C9CD-4801-B293-61D1F53EC57E}" type="datetimeFigureOut">
               <a:rPr lang="de-DE" smtClean="0"/>
               <a:pPr/>
-              <a:t>11.01.2018</a:t>
+              <a:t>16.03.2018</a:t>
             </a:fld>
             <a:endParaRPr lang="de-DE"/>
           </a:p>
@@ -1768,7 +1770,7 @@
             <a:fld id="{1BA50D42-C9CD-4801-B293-61D1F53EC57E}" type="datetimeFigureOut">
               <a:rPr lang="de-DE" smtClean="0"/>
               <a:pPr/>
-              <a:t>11.01.2018</a:t>
+              <a:t>16.03.2018</a:t>
             </a:fld>
             <a:endParaRPr lang="de-DE"/>
           </a:p>
@@ -2187,7 +2189,7 @@
             <a:fld id="{1BA50D42-C9CD-4801-B293-61D1F53EC57E}" type="datetimeFigureOut">
               <a:rPr lang="de-DE" smtClean="0"/>
               <a:pPr/>
-              <a:t>11.01.2018</a:t>
+              <a:t>16.03.2018</a:t>
             </a:fld>
             <a:endParaRPr lang="de-DE"/>
           </a:p>
@@ -2302,7 +2304,7 @@
             <a:fld id="{1BA50D42-C9CD-4801-B293-61D1F53EC57E}" type="datetimeFigureOut">
               <a:rPr lang="de-DE" smtClean="0"/>
               <a:pPr/>
-              <a:t>11.01.2018</a:t>
+              <a:t>16.03.2018</a:t>
             </a:fld>
             <a:endParaRPr lang="de-DE"/>
           </a:p>
@@ -2394,7 +2396,7 @@
             <a:fld id="{1BA50D42-C9CD-4801-B293-61D1F53EC57E}" type="datetimeFigureOut">
               <a:rPr lang="de-DE" smtClean="0"/>
               <a:pPr/>
-              <a:t>11.01.2018</a:t>
+              <a:t>16.03.2018</a:t>
             </a:fld>
             <a:endParaRPr lang="de-DE"/>
           </a:p>
@@ -2668,7 +2670,7 @@
             <a:fld id="{1BA50D42-C9CD-4801-B293-61D1F53EC57E}" type="datetimeFigureOut">
               <a:rPr lang="de-DE" smtClean="0"/>
               <a:pPr/>
-              <a:t>11.01.2018</a:t>
+              <a:t>16.03.2018</a:t>
             </a:fld>
             <a:endParaRPr lang="de-DE"/>
           </a:p>
@@ -2918,7 +2920,7 @@
             <a:fld id="{1BA50D42-C9CD-4801-B293-61D1F53EC57E}" type="datetimeFigureOut">
               <a:rPr lang="de-DE" smtClean="0"/>
               <a:pPr/>
-              <a:t>11.01.2018</a:t>
+              <a:t>16.03.2018</a:t>
             </a:fld>
             <a:endParaRPr lang="de-DE"/>
           </a:p>
@@ -3128,7 +3130,7 @@
             <a:fld id="{1BA50D42-C9CD-4801-B293-61D1F53EC57E}" type="datetimeFigureOut">
               <a:rPr lang="de-DE" smtClean="0"/>
               <a:pPr/>
-              <a:t>11.01.2018</a:t>
+              <a:t>16.03.2018</a:t>
             </a:fld>
             <a:endParaRPr lang="de-DE"/>
           </a:p>
@@ -4291,6 +4293,592 @@
       </p:grpSpPr>
       <p:pic>
         <p:nvPicPr>
+          <p:cNvPr id="1026" name="Picture 2"/>
+          <p:cNvPicPr>
+            <a:picLocks noChangeAspect="1" noChangeArrowheads="1"/>
+          </p:cNvPicPr>
+          <p:nvPr/>
+        </p:nvPicPr>
+        <p:blipFill>
+          <a:blip r:embed="rId2" cstate="print"/>
+          <a:srcRect/>
+          <a:stretch>
+            <a:fillRect/>
+          </a:stretch>
+        </p:blipFill>
+        <p:spPr bwMode="auto">
+          <a:xfrm>
+            <a:off x="2339752" y="764704"/>
+            <a:ext cx="4483770" cy="5009699"/>
+          </a:xfrm>
+          <a:prstGeom prst="rect">
+            <a:avLst/>
+          </a:prstGeom>
+          <a:noFill/>
+          <a:ln w="9525">
+            <a:noFill/>
+            <a:miter lim="800000"/>
+            <a:headEnd/>
+            <a:tailEnd/>
+          </a:ln>
+        </p:spPr>
+      </p:pic>
+      <p:sp>
+        <p:nvSpPr>
+          <p:cNvPr id="5" name="Textfeld 4"/>
+          <p:cNvSpPr txBox="1"/>
+          <p:nvPr/>
+        </p:nvSpPr>
+        <p:spPr>
+          <a:xfrm>
+            <a:off x="233467" y="2852931"/>
+            <a:ext cx="1890261" cy="577081"/>
+          </a:xfrm>
+          <a:prstGeom prst="rect">
+            <a:avLst/>
+          </a:prstGeom>
+          <a:solidFill>
+            <a:schemeClr val="accent6">
+              <a:lumMod val="20000"/>
+              <a:lumOff val="80000"/>
+              <a:alpha val="65000"/>
+            </a:schemeClr>
+          </a:solidFill>
+        </p:spPr>
+        <p:txBody>
+          <a:bodyPr wrap="square" rtlCol="0">
+            <a:spAutoFit/>
+          </a:bodyPr>
+          <a:lstStyle/>
+          <a:p>
+            <a:pPr algn="ctr"/>
+            <a:r>
+              <a:rPr lang="en-US" sz="1050" b="1" dirty="0" smtClean="0">
+                <a:solidFill>
+                  <a:srgbClr val="C00000"/>
+                </a:solidFill>
+              </a:rPr>
+              <a:t>‘*’ represent the fact that </a:t>
+            </a:r>
+            <a:r>
+              <a:rPr lang="en-US" sz="1050" b="1" dirty="0" smtClean="0">
+                <a:solidFill>
+                  <a:srgbClr val="C00000"/>
+                </a:solidFill>
+              </a:rPr>
+              <a:t>the</a:t>
+            </a:r>
+          </a:p>
+          <a:p>
+            <a:pPr algn="ctr"/>
+            <a:r>
+              <a:rPr lang="en-US" sz="1050" b="1" dirty="0" smtClean="0">
+                <a:solidFill>
+                  <a:srgbClr val="C00000"/>
+                </a:solidFill>
+              </a:rPr>
+              <a:t> input can take any value with </a:t>
+            </a:r>
+          </a:p>
+          <a:p>
+            <a:pPr algn="ctr"/>
+            <a:r>
+              <a:rPr lang="en-US" sz="1050" b="1" dirty="0" smtClean="0">
+                <a:solidFill>
+                  <a:srgbClr val="C00000"/>
+                </a:solidFill>
+              </a:rPr>
+              <a:t>a specified type in inspector</a:t>
+            </a:r>
+          </a:p>
+        </p:txBody>
+      </p:sp>
+      <p:cxnSp>
+        <p:nvCxnSpPr>
+          <p:cNvPr id="6" name="Gerade Verbindung mit Pfeil 5"/>
+          <p:cNvCxnSpPr>
+            <a:stCxn id="5" idx="3"/>
+          </p:cNvCxnSpPr>
+          <p:nvPr/>
+        </p:nvCxnSpPr>
+        <p:spPr>
+          <a:xfrm flipV="1">
+            <a:off x="2123728" y="2852936"/>
+            <a:ext cx="2016224" cy="288536"/>
+          </a:xfrm>
+          <a:prstGeom prst="straightConnector1">
+            <a:avLst/>
+          </a:prstGeom>
+          <a:ln w="19050">
+            <a:solidFill>
+              <a:srgbClr val="C00000"/>
+            </a:solidFill>
+            <a:tailEnd type="triangle"/>
+          </a:ln>
+        </p:spPr>
+        <p:style>
+          <a:lnRef idx="1">
+            <a:schemeClr val="accent1"/>
+          </a:lnRef>
+          <a:fillRef idx="0">
+            <a:schemeClr val="accent1"/>
+          </a:fillRef>
+          <a:effectRef idx="0">
+            <a:schemeClr val="accent1"/>
+          </a:effectRef>
+          <a:fontRef idx="minor">
+            <a:schemeClr val="tx1"/>
+          </a:fontRef>
+        </p:style>
+      </p:cxnSp>
+      <p:cxnSp>
+        <p:nvCxnSpPr>
+          <p:cNvPr id="10" name="Gerade Verbindung mit Pfeil 9"/>
+          <p:cNvCxnSpPr>
+            <a:stCxn id="5" idx="3"/>
+          </p:cNvCxnSpPr>
+          <p:nvPr/>
+        </p:nvCxnSpPr>
+        <p:spPr>
+          <a:xfrm>
+            <a:off x="2123728" y="3141472"/>
+            <a:ext cx="1008112" cy="2231744"/>
+          </a:xfrm>
+          <a:prstGeom prst="straightConnector1">
+            <a:avLst/>
+          </a:prstGeom>
+          <a:ln w="19050">
+            <a:solidFill>
+              <a:srgbClr val="C00000"/>
+            </a:solidFill>
+            <a:tailEnd type="triangle"/>
+          </a:ln>
+        </p:spPr>
+        <p:style>
+          <a:lnRef idx="1">
+            <a:schemeClr val="accent1"/>
+          </a:lnRef>
+          <a:fillRef idx="0">
+            <a:schemeClr val="accent1"/>
+          </a:fillRef>
+          <a:effectRef idx="0">
+            <a:schemeClr val="accent1"/>
+          </a:effectRef>
+          <a:fontRef idx="minor">
+            <a:schemeClr val="tx1"/>
+          </a:fontRef>
+        </p:style>
+      </p:cxnSp>
+      <p:sp>
+        <p:nvSpPr>
+          <p:cNvPr id="13" name="Textfeld 12"/>
+          <p:cNvSpPr txBox="1"/>
+          <p:nvPr/>
+        </p:nvSpPr>
+        <p:spPr>
+          <a:xfrm>
+            <a:off x="6660232" y="2636912"/>
+            <a:ext cx="1890261" cy="577081"/>
+          </a:xfrm>
+          <a:prstGeom prst="rect">
+            <a:avLst/>
+          </a:prstGeom>
+          <a:solidFill>
+            <a:schemeClr val="accent6">
+              <a:lumMod val="20000"/>
+              <a:lumOff val="80000"/>
+              <a:alpha val="65000"/>
+            </a:schemeClr>
+          </a:solidFill>
+        </p:spPr>
+        <p:txBody>
+          <a:bodyPr wrap="square" rtlCol="0">
+            <a:spAutoFit/>
+          </a:bodyPr>
+          <a:lstStyle/>
+          <a:p>
+            <a:pPr algn="ctr"/>
+            <a:r>
+              <a:rPr lang="en-US" sz="1050" b="1" dirty="0" smtClean="0">
+                <a:solidFill>
+                  <a:srgbClr val="C00000"/>
+                </a:solidFill>
+              </a:rPr>
+              <a:t>‘#’ means that the value of an output in a certain step is not interesting (don’t care)</a:t>
+            </a:r>
+            <a:endParaRPr lang="en-US" sz="1050" b="1" dirty="0" smtClean="0">
+              <a:solidFill>
+                <a:srgbClr val="C00000"/>
+              </a:solidFill>
+            </a:endParaRPr>
+          </a:p>
+        </p:txBody>
+      </p:sp>
+      <p:cxnSp>
+        <p:nvCxnSpPr>
+          <p:cNvPr id="14" name="Gerade Verbindung mit Pfeil 13"/>
+          <p:cNvCxnSpPr/>
+          <p:nvPr/>
+        </p:nvCxnSpPr>
+        <p:spPr>
+          <a:xfrm flipH="1" flipV="1">
+            <a:off x="6156176" y="2852936"/>
+            <a:ext cx="504056" cy="72512"/>
+          </a:xfrm>
+          <a:prstGeom prst="straightConnector1">
+            <a:avLst/>
+          </a:prstGeom>
+          <a:ln w="19050">
+            <a:solidFill>
+              <a:srgbClr val="C00000"/>
+            </a:solidFill>
+            <a:tailEnd type="triangle"/>
+          </a:ln>
+        </p:spPr>
+        <p:style>
+          <a:lnRef idx="1">
+            <a:schemeClr val="accent1"/>
+          </a:lnRef>
+          <a:fillRef idx="0">
+            <a:schemeClr val="accent1"/>
+          </a:fillRef>
+          <a:effectRef idx="0">
+            <a:schemeClr val="accent1"/>
+          </a:effectRef>
+          <a:fontRef idx="minor">
+            <a:schemeClr val="tx1"/>
+          </a:fontRef>
+        </p:style>
+      </p:cxnSp>
+      <p:cxnSp>
+        <p:nvCxnSpPr>
+          <p:cNvPr id="16" name="Gerade Verbindung mit Pfeil 15"/>
+          <p:cNvCxnSpPr>
+            <a:stCxn id="13" idx="1"/>
+          </p:cNvCxnSpPr>
+          <p:nvPr/>
+        </p:nvCxnSpPr>
+        <p:spPr>
+          <a:xfrm flipH="1">
+            <a:off x="6084168" y="2925453"/>
+            <a:ext cx="576064" cy="1367643"/>
+          </a:xfrm>
+          <a:prstGeom prst="straightConnector1">
+            <a:avLst/>
+          </a:prstGeom>
+          <a:ln w="19050">
+            <a:solidFill>
+              <a:srgbClr val="C00000"/>
+            </a:solidFill>
+            <a:tailEnd type="triangle"/>
+          </a:ln>
+        </p:spPr>
+        <p:style>
+          <a:lnRef idx="1">
+            <a:schemeClr val="accent1"/>
+          </a:lnRef>
+          <a:fillRef idx="0">
+            <a:schemeClr val="accent1"/>
+          </a:fillRef>
+          <a:effectRef idx="0">
+            <a:schemeClr val="accent1"/>
+          </a:effectRef>
+          <a:fontRef idx="minor">
+            <a:schemeClr val="tx1"/>
+          </a:fontRef>
+        </p:style>
+      </p:cxnSp>
+    </p:spTree>
+  </p:cSld>
+  <p:clrMapOvr>
+    <a:masterClrMapping/>
+  </p:clrMapOvr>
+</p:sld>
+</file>
+
+<file path=ppt/slides/slide3.xml><?xml version="1.0" encoding="utf-8"?>
+<p:sld xmlns:a="http://schemas.openxmlformats.org/drawingml/2006/main" xmlns:r="http://schemas.openxmlformats.org/officeDocument/2006/relationships" xmlns:p="http://schemas.openxmlformats.org/presentationml/2006/main">
+  <p:cSld>
+    <p:spTree>
+      <p:nvGrpSpPr>
+        <p:cNvPr id="1" name=""/>
+        <p:cNvGrpSpPr/>
+        <p:nvPr/>
+      </p:nvGrpSpPr>
+      <p:grpSpPr>
+        <a:xfrm>
+          <a:off x="0" y="0"/>
+          <a:ext cx="0" cy="0"/>
+          <a:chOff x="0" y="0"/>
+          <a:chExt cx="0" cy="0"/>
+        </a:xfrm>
+      </p:grpSpPr>
+      <p:pic>
+        <p:nvPicPr>
+          <p:cNvPr id="3" name="Picture 3"/>
+          <p:cNvPicPr>
+            <a:picLocks noChangeAspect="1" noChangeArrowheads="1"/>
+          </p:cNvPicPr>
+          <p:nvPr/>
+        </p:nvPicPr>
+        <p:blipFill>
+          <a:blip r:embed="rId2" cstate="print"/>
+          <a:srcRect/>
+          <a:stretch>
+            <a:fillRect/>
+          </a:stretch>
+        </p:blipFill>
+        <p:spPr bwMode="auto">
+          <a:xfrm>
+            <a:off x="2721049" y="1090613"/>
+            <a:ext cx="5667375" cy="4676775"/>
+          </a:xfrm>
+          <a:prstGeom prst="rect">
+            <a:avLst/>
+          </a:prstGeom>
+          <a:noFill/>
+          <a:ln w="9525">
+            <a:noFill/>
+            <a:miter lim="800000"/>
+            <a:headEnd/>
+            <a:tailEnd/>
+          </a:ln>
+        </p:spPr>
+      </p:pic>
+      <p:sp>
+        <p:nvSpPr>
+          <p:cNvPr id="4" name="Textfeld 3"/>
+          <p:cNvSpPr txBox="1"/>
+          <p:nvPr/>
+        </p:nvSpPr>
+        <p:spPr>
+          <a:xfrm>
+            <a:off x="107505" y="2852931"/>
+            <a:ext cx="2592288" cy="1384995"/>
+          </a:xfrm>
+          <a:prstGeom prst="rect">
+            <a:avLst/>
+          </a:prstGeom>
+          <a:solidFill>
+            <a:schemeClr val="accent6">
+              <a:lumMod val="20000"/>
+              <a:lumOff val="80000"/>
+              <a:alpha val="65000"/>
+            </a:schemeClr>
+          </a:solidFill>
+        </p:spPr>
+        <p:txBody>
+          <a:bodyPr wrap="square" rtlCol="0">
+            <a:spAutoFit/>
+          </a:bodyPr>
+          <a:lstStyle/>
+          <a:p>
+            <a:pPr algn="ctr"/>
+            <a:r>
+              <a:rPr lang="en-US" sz="1050" b="1" dirty="0" smtClean="0">
+                <a:solidFill>
+                  <a:srgbClr val="C00000"/>
+                </a:solidFill>
+              </a:rPr>
+              <a:t>The test can be checked using</a:t>
+            </a:r>
+          </a:p>
+          <a:p>
+            <a:pPr algn="ctr"/>
+            <a:r>
+              <a:rPr lang="en-US" sz="1050" b="1" dirty="0" smtClean="0">
+                <a:solidFill>
+                  <a:srgbClr val="C00000"/>
+                </a:solidFill>
+              </a:rPr>
+              <a:t>BMC  or BDD-based model checking</a:t>
+            </a:r>
+          </a:p>
+          <a:p>
+            <a:pPr algn="ctr"/>
+            <a:endParaRPr lang="en-US" sz="1050" b="1" dirty="0" smtClean="0">
+              <a:solidFill>
+                <a:srgbClr val="C00000"/>
+              </a:solidFill>
+            </a:endParaRPr>
+          </a:p>
+          <a:p>
+            <a:pPr algn="ctr"/>
+            <a:r>
+              <a:rPr lang="en-US" sz="1050" b="1" dirty="0" smtClean="0">
+                <a:solidFill>
+                  <a:srgbClr val="C00000"/>
+                </a:solidFill>
+              </a:rPr>
+              <a:t>The property to check is expressed in LTL and has the form:</a:t>
+            </a:r>
+          </a:p>
+          <a:p>
+            <a:pPr algn="ctr"/>
+            <a:endParaRPr lang="en-US" sz="1050" b="1" dirty="0" smtClean="0">
+              <a:solidFill>
+                <a:srgbClr val="C00000"/>
+              </a:solidFill>
+            </a:endParaRPr>
+          </a:p>
+          <a:p>
+            <a:pPr algn="ctr"/>
+            <a:r>
+              <a:rPr lang="en-US" sz="1050" b="1" dirty="0" smtClean="0">
+                <a:solidFill>
+                  <a:srgbClr val="C00000"/>
+                </a:solidFill>
+              </a:rPr>
+              <a:t>LTLSPEC (act = exp) &amp; (X act = exp) &amp; </a:t>
+            </a:r>
+          </a:p>
+          <a:p>
+            <a:pPr algn="ctr"/>
+            <a:r>
+              <a:rPr lang="en-US" sz="1050" b="1" dirty="0" smtClean="0">
+                <a:solidFill>
+                  <a:srgbClr val="C00000"/>
+                </a:solidFill>
+              </a:rPr>
+              <a:t>(</a:t>
+            </a:r>
+            <a:r>
+              <a:rPr lang="en-US" sz="1050" b="1" dirty="0" smtClean="0">
+                <a:solidFill>
+                  <a:srgbClr val="C00000"/>
+                </a:solidFill>
+              </a:rPr>
+              <a:t>X (X act = exp)) &amp; (X (X </a:t>
+            </a:r>
+            <a:r>
+              <a:rPr lang="en-US" sz="1050" b="1" dirty="0" smtClean="0">
+                <a:solidFill>
+                  <a:srgbClr val="C00000"/>
+                </a:solidFill>
+              </a:rPr>
+              <a:t>(X act = exp</a:t>
+            </a:r>
+            <a:r>
+              <a:rPr lang="en-US" sz="1050" b="1" dirty="0" smtClean="0">
+                <a:solidFill>
+                  <a:srgbClr val="C00000"/>
+                </a:solidFill>
+              </a:rPr>
+              <a:t>))) &amp; …</a:t>
+            </a:r>
+          </a:p>
+        </p:txBody>
+      </p:sp>
+      <p:cxnSp>
+        <p:nvCxnSpPr>
+          <p:cNvPr id="5" name="Gerade Verbindung mit Pfeil 4"/>
+          <p:cNvCxnSpPr>
+            <a:stCxn id="4" idx="3"/>
+          </p:cNvCxnSpPr>
+          <p:nvPr/>
+        </p:nvCxnSpPr>
+        <p:spPr>
+          <a:xfrm flipV="1">
+            <a:off x="2699793" y="2204868"/>
+            <a:ext cx="1368151" cy="1340561"/>
+          </a:xfrm>
+          <a:prstGeom prst="straightConnector1">
+            <a:avLst/>
+          </a:prstGeom>
+          <a:ln w="19050">
+            <a:solidFill>
+              <a:srgbClr val="C00000"/>
+            </a:solidFill>
+            <a:tailEnd type="triangle"/>
+          </a:ln>
+        </p:spPr>
+        <p:style>
+          <a:lnRef idx="1">
+            <a:schemeClr val="accent1"/>
+          </a:lnRef>
+          <a:fillRef idx="0">
+            <a:schemeClr val="accent1"/>
+          </a:fillRef>
+          <a:effectRef idx="0">
+            <a:schemeClr val="accent1"/>
+          </a:effectRef>
+          <a:fontRef idx="minor">
+            <a:schemeClr val="tx1"/>
+          </a:fontRef>
+        </p:style>
+      </p:cxnSp>
+      <p:cxnSp>
+        <p:nvCxnSpPr>
+          <p:cNvPr id="6" name="Gerade Verbindung mit Pfeil 5"/>
+          <p:cNvCxnSpPr>
+            <a:stCxn id="4" idx="3"/>
+          </p:cNvCxnSpPr>
+          <p:nvPr/>
+        </p:nvCxnSpPr>
+        <p:spPr>
+          <a:xfrm>
+            <a:off x="2699793" y="3545429"/>
+            <a:ext cx="1584175" cy="1611763"/>
+          </a:xfrm>
+          <a:prstGeom prst="straightConnector1">
+            <a:avLst/>
+          </a:prstGeom>
+          <a:ln w="19050">
+            <a:solidFill>
+              <a:srgbClr val="C00000"/>
+            </a:solidFill>
+            <a:tailEnd type="triangle"/>
+          </a:ln>
+        </p:spPr>
+        <p:style>
+          <a:lnRef idx="1">
+            <a:schemeClr val="accent1"/>
+          </a:lnRef>
+          <a:fillRef idx="0">
+            <a:schemeClr val="accent1"/>
+          </a:fillRef>
+          <a:effectRef idx="0">
+            <a:schemeClr val="accent1"/>
+          </a:effectRef>
+          <a:fontRef idx="minor">
+            <a:schemeClr val="tx1"/>
+          </a:fontRef>
+        </p:style>
+      </p:cxnSp>
+    </p:spTree>
+  </p:cSld>
+  <p:clrMapOvr>
+    <a:masterClrMapping/>
+  </p:clrMapOvr>
+  <p:timing>
+    <p:tnLst>
+      <p:par>
+        <p:cTn id="1" dur="indefinite" restart="never" nodeType="tmRoot"/>
+      </p:par>
+    </p:tnLst>
+  </p:timing>
+</p:sld>
+</file>
+
+<file path=ppt/slides/slide4.xml><?xml version="1.0" encoding="utf-8"?>
+<p:sld xmlns:a="http://schemas.openxmlformats.org/drawingml/2006/main" xmlns:r="http://schemas.openxmlformats.org/officeDocument/2006/relationships" xmlns:p="http://schemas.openxmlformats.org/presentationml/2006/main">
+  <p:cSld>
+    <p:spTree>
+      <p:nvGrpSpPr>
+        <p:cNvPr id="1" name=""/>
+        <p:cNvGrpSpPr/>
+        <p:nvPr/>
+      </p:nvGrpSpPr>
+      <p:grpSpPr>
+        <a:xfrm>
+          <a:off x="0" y="0"/>
+          <a:ext cx="0" cy="0"/>
+          <a:chOff x="0" y="0"/>
+          <a:chExt cx="0" cy="0"/>
+        </a:xfrm>
+      </p:grpSpPr>
+      <p:pic>
+        <p:nvPicPr>
           <p:cNvPr id="2051" name="Picture 3"/>
           <p:cNvPicPr>
             <a:picLocks noChangeAspect="1" noChangeArrowheads="1"/>
@@ -4336,7 +4924,7 @@
 </p:sld>
 </file>
 
-<file path=ppt/slides/slide3.xml><?xml version="1.0" encoding="utf-8"?>
+<file path=ppt/slides/slide5.xml><?xml version="1.0" encoding="utf-8"?>
 <p:sld xmlns:a="http://schemas.openxmlformats.org/drawingml/2006/main" xmlns:r="http://schemas.openxmlformats.org/officeDocument/2006/relationships" xmlns:p="http://schemas.openxmlformats.org/presentationml/2006/main">
   <p:cSld>
     <p:spTree>
@@ -4400,7 +4988,7 @@
 </p:sld>
 </file>
 
-<file path=ppt/slides/slide4.xml><?xml version="1.0" encoding="utf-8"?>
+<file path=ppt/slides/slide6.xml><?xml version="1.0" encoding="utf-8"?>
 <p:sld xmlns:a="http://schemas.openxmlformats.org/drawingml/2006/main" xmlns:r="http://schemas.openxmlformats.org/officeDocument/2006/relationships" xmlns:p="http://schemas.openxmlformats.org/presentationml/2006/main">
   <p:cSld>
     <p:spTree>
@@ -4464,7 +5052,7 @@
 </p:sld>
 </file>
 
-<file path=ppt/slides/slide5.xml><?xml version="1.0" encoding="utf-8"?>
+<file path=ppt/slides/slide7.xml><?xml version="1.0" encoding="utf-8"?>
 <p:sld xmlns:a="http://schemas.openxmlformats.org/drawingml/2006/main" xmlns:r="http://schemas.openxmlformats.org/officeDocument/2006/relationships" xmlns:p="http://schemas.openxmlformats.org/presentationml/2006/main">
   <p:cSld>
     <p:spTree>
@@ -4547,21 +5135,8 @@
                   <a:srgbClr val="C00000"/>
                 </a:solidFill>
               </a:rPr>
-              <a:t>s</a:t>
-            </a:r>
-            <a:r>
-              <a:rPr lang="en-US" sz="1050" b="1" dirty="0" smtClean="0">
-                <a:solidFill>
-                  <a:srgbClr val="C00000"/>
-                </a:solidFill>
-              </a:rPr>
-              <a:t>tates definition</a:t>
-            </a:r>
-            <a:endParaRPr lang="en-US" sz="1050" b="1" dirty="0" smtClean="0">
-              <a:solidFill>
-                <a:srgbClr val="C00000"/>
-              </a:solidFill>
-            </a:endParaRPr>
+              <a:t>states definition</a:t>
+            </a:r>
           </a:p>
         </p:txBody>
       </p:sp>
@@ -4637,11 +5212,6 @@
               </a:rPr>
               <a:t>state variable</a:t>
             </a:r>
-            <a:endParaRPr lang="en-US" sz="1050" b="1" dirty="0" smtClean="0">
-              <a:solidFill>
-                <a:srgbClr val="C00000"/>
-              </a:solidFill>
-            </a:endParaRPr>
           </a:p>
         </p:txBody>
       </p:sp>
@@ -4891,11 +5461,6 @@
               </a:rPr>
               <a:t>transition name</a:t>
             </a:r>
-            <a:endParaRPr lang="en-US" sz="1050" b="1" dirty="0" smtClean="0">
-              <a:solidFill>
-                <a:srgbClr val="C00000"/>
-              </a:solidFill>
-            </a:endParaRPr>
           </a:p>
         </p:txBody>
       </p:sp>
@@ -5053,11 +5618,6 @@
               </a:rPr>
               <a:t>transition reference</a:t>
             </a:r>
-            <a:endParaRPr lang="en-US" sz="1050" b="1" dirty="0" smtClean="0">
-              <a:solidFill>
-                <a:srgbClr val="C00000"/>
-              </a:solidFill>
-            </a:endParaRPr>
           </a:p>
         </p:txBody>
       </p:sp>
@@ -5131,21 +5691,8 @@
                   <a:srgbClr val="C00000"/>
                 </a:solidFill>
               </a:rPr>
-              <a:t>s</a:t>
-            </a:r>
-            <a:r>
-              <a:rPr lang="en-US" sz="1050" b="1" dirty="0" smtClean="0">
-                <a:solidFill>
-                  <a:srgbClr val="C00000"/>
-                </a:solidFill>
-              </a:rPr>
-              <a:t>tate-machine section</a:t>
-            </a:r>
-            <a:endParaRPr lang="en-US" sz="1050" b="1" dirty="0" smtClean="0">
-              <a:solidFill>
-                <a:srgbClr val="C00000"/>
-              </a:solidFill>
-            </a:endParaRPr>
+              <a:t>state-machine section</a:t>
+            </a:r>
           </a:p>
         </p:txBody>
       </p:sp>
@@ -5200,7 +5747,7 @@
 </p:sld>
 </file>
 
-<file path=ppt/slides/slide6.xml><?xml version="1.0" encoding="utf-8"?>
+<file path=ppt/slides/slide8.xml><?xml version="1.0" encoding="utf-8"?>
 <p:sld xmlns:a="http://schemas.openxmlformats.org/drawingml/2006/main" xmlns:r="http://schemas.openxmlformats.org/officeDocument/2006/relationships" xmlns:p="http://schemas.openxmlformats.org/presentationml/2006/main">
   <p:cSld>
     <p:spTree>
@@ -5264,7 +5811,7 @@
 </p:sld>
 </file>
 
-<file path=ppt/slides/slide7.xml><?xml version="1.0" encoding="utf-8"?>
+<file path=ppt/slides/slide9.xml><?xml version="1.0" encoding="utf-8"?>
 <p:sld xmlns:a="http://schemas.openxmlformats.org/drawingml/2006/main" xmlns:r="http://schemas.openxmlformats.org/officeDocument/2006/relationships" xmlns:p="http://schemas.openxmlformats.org/presentationml/2006/main">
   <p:cSld>
     <p:spTree>
@@ -5349,11 +5896,6 @@
               </a:rPr>
               <a:t>definitions</a:t>
             </a:r>
-            <a:endParaRPr lang="en-US" sz="1050" b="1" dirty="0" smtClean="0">
-              <a:solidFill>
-                <a:srgbClr val="C00000"/>
-              </a:solidFill>
-            </a:endParaRPr>
           </a:p>
         </p:txBody>
       </p:sp>

</xml_diff>

<commit_message>
nusmv tutorial: figure sources for verification case
</commit_message>
<xml_diff>
--- a/code/tutorial/solutions/com.mbeddr.formal.nusmv.users_guide/figures/figures.pptx
+++ b/code/tutorial/solutions/com.mbeddr.formal.nusmv.users_guide/figures/figures.pptx
@@ -5,18 +5,19 @@
     <p:sldMasterId id="2147483648" r:id="rId1"/>
   </p:sldMasterIdLst>
   <p:notesMasterIdLst>
-    <p:notesMasterId r:id="rId11"/>
+    <p:notesMasterId r:id="rId12"/>
   </p:notesMasterIdLst>
   <p:sldIdLst>
     <p:sldId id="256" r:id="rId2"/>
     <p:sldId id="263" r:id="rId3"/>
     <p:sldId id="257" r:id="rId4"/>
-    <p:sldId id="264" r:id="rId5"/>
-    <p:sldId id="259" r:id="rId6"/>
-    <p:sldId id="258" r:id="rId7"/>
-    <p:sldId id="260" r:id="rId8"/>
-    <p:sldId id="261" r:id="rId9"/>
-    <p:sldId id="262" r:id="rId10"/>
+    <p:sldId id="265" r:id="rId5"/>
+    <p:sldId id="264" r:id="rId6"/>
+    <p:sldId id="259" r:id="rId7"/>
+    <p:sldId id="258" r:id="rId8"/>
+    <p:sldId id="260" r:id="rId9"/>
+    <p:sldId id="261" r:id="rId10"/>
+    <p:sldId id="262" r:id="rId11"/>
   </p:sldIdLst>
   <p:sldSz cx="9144000" cy="6858000" type="screen4x3"/>
   <p:notesSz cx="6858000" cy="9144000"/>
@@ -201,7 +202,7 @@
             <a:fld id="{11812C92-0668-408F-AE44-47ECD1C69BA6}" type="datetimeFigureOut">
               <a:rPr lang="en-US" smtClean="0"/>
               <a:pPr/>
-              <a:t>3/16/2018</a:t>
+              <a:t>3/24/2018</a:t>
             </a:fld>
             <a:endParaRPr lang="en-US"/>
           </a:p>
@@ -731,7 +732,7 @@
             <a:fld id="{1BA50D42-C9CD-4801-B293-61D1F53EC57E}" type="datetimeFigureOut">
               <a:rPr lang="de-DE" smtClean="0"/>
               <a:pPr/>
-              <a:t>16.03.2018</a:t>
+              <a:t>24.03.2018</a:t>
             </a:fld>
             <a:endParaRPr lang="de-DE"/>
           </a:p>
@@ -898,7 +899,7 @@
             <a:fld id="{1BA50D42-C9CD-4801-B293-61D1F53EC57E}" type="datetimeFigureOut">
               <a:rPr lang="de-DE" smtClean="0"/>
               <a:pPr/>
-              <a:t>16.03.2018</a:t>
+              <a:t>24.03.2018</a:t>
             </a:fld>
             <a:endParaRPr lang="de-DE"/>
           </a:p>
@@ -1075,7 +1076,7 @@
             <a:fld id="{1BA50D42-C9CD-4801-B293-61D1F53EC57E}" type="datetimeFigureOut">
               <a:rPr lang="de-DE" smtClean="0"/>
               <a:pPr/>
-              <a:t>16.03.2018</a:t>
+              <a:t>24.03.2018</a:t>
             </a:fld>
             <a:endParaRPr lang="de-DE"/>
           </a:p>
@@ -1242,7 +1243,7 @@
             <a:fld id="{1BA50D42-C9CD-4801-B293-61D1F53EC57E}" type="datetimeFigureOut">
               <a:rPr lang="de-DE" smtClean="0"/>
               <a:pPr/>
-              <a:t>16.03.2018</a:t>
+              <a:t>24.03.2018</a:t>
             </a:fld>
             <a:endParaRPr lang="de-DE"/>
           </a:p>
@@ -1485,7 +1486,7 @@
             <a:fld id="{1BA50D42-C9CD-4801-B293-61D1F53EC57E}" type="datetimeFigureOut">
               <a:rPr lang="de-DE" smtClean="0"/>
               <a:pPr/>
-              <a:t>16.03.2018</a:t>
+              <a:t>24.03.2018</a:t>
             </a:fld>
             <a:endParaRPr lang="de-DE"/>
           </a:p>
@@ -1770,7 +1771,7 @@
             <a:fld id="{1BA50D42-C9CD-4801-B293-61D1F53EC57E}" type="datetimeFigureOut">
               <a:rPr lang="de-DE" smtClean="0"/>
               <a:pPr/>
-              <a:t>16.03.2018</a:t>
+              <a:t>24.03.2018</a:t>
             </a:fld>
             <a:endParaRPr lang="de-DE"/>
           </a:p>
@@ -2189,7 +2190,7 @@
             <a:fld id="{1BA50D42-C9CD-4801-B293-61D1F53EC57E}" type="datetimeFigureOut">
               <a:rPr lang="de-DE" smtClean="0"/>
               <a:pPr/>
-              <a:t>16.03.2018</a:t>
+              <a:t>24.03.2018</a:t>
             </a:fld>
             <a:endParaRPr lang="de-DE"/>
           </a:p>
@@ -2304,7 +2305,7 @@
             <a:fld id="{1BA50D42-C9CD-4801-B293-61D1F53EC57E}" type="datetimeFigureOut">
               <a:rPr lang="de-DE" smtClean="0"/>
               <a:pPr/>
-              <a:t>16.03.2018</a:t>
+              <a:t>24.03.2018</a:t>
             </a:fld>
             <a:endParaRPr lang="de-DE"/>
           </a:p>
@@ -2396,7 +2397,7 @@
             <a:fld id="{1BA50D42-C9CD-4801-B293-61D1F53EC57E}" type="datetimeFigureOut">
               <a:rPr lang="de-DE" smtClean="0"/>
               <a:pPr/>
-              <a:t>16.03.2018</a:t>
+              <a:t>24.03.2018</a:t>
             </a:fld>
             <a:endParaRPr lang="de-DE"/>
           </a:p>
@@ -2670,7 +2671,7 @@
             <a:fld id="{1BA50D42-C9CD-4801-B293-61D1F53EC57E}" type="datetimeFigureOut">
               <a:rPr lang="de-DE" smtClean="0"/>
               <a:pPr/>
-              <a:t>16.03.2018</a:t>
+              <a:t>24.03.2018</a:t>
             </a:fld>
             <a:endParaRPr lang="de-DE"/>
           </a:p>
@@ -2920,7 +2921,7 @@
             <a:fld id="{1BA50D42-C9CD-4801-B293-61D1F53EC57E}" type="datetimeFigureOut">
               <a:rPr lang="de-DE" smtClean="0"/>
               <a:pPr/>
-              <a:t>16.03.2018</a:t>
+              <a:t>24.03.2018</a:t>
             </a:fld>
             <a:endParaRPr lang="de-DE"/>
           </a:p>
@@ -3130,7 +3131,7 @@
             <a:fld id="{1BA50D42-C9CD-4801-B293-61D1F53EC57E}" type="datetimeFigureOut">
               <a:rPr lang="de-DE" smtClean="0"/>
               <a:pPr/>
-              <a:t>16.03.2018</a:t>
+              <a:t>24.03.2018</a:t>
             </a:fld>
             <a:endParaRPr lang="de-DE"/>
           </a:p>
@@ -4274,6 +4275,229 @@
 </p:sld>
 </file>
 
+<file path=ppt/slides/slide10.xml><?xml version="1.0" encoding="utf-8"?>
+<p:sld xmlns:a="http://schemas.openxmlformats.org/drawingml/2006/main" xmlns:r="http://schemas.openxmlformats.org/officeDocument/2006/relationships" xmlns:p="http://schemas.openxmlformats.org/presentationml/2006/main">
+  <p:cSld>
+    <p:spTree>
+      <p:nvGrpSpPr>
+        <p:cNvPr id="1" name=""/>
+        <p:cNvGrpSpPr/>
+        <p:nvPr/>
+      </p:nvGrpSpPr>
+      <p:grpSpPr>
+        <a:xfrm>
+          <a:off x="0" y="0"/>
+          <a:ext cx="0" cy="0"/>
+          <a:chOff x="0" y="0"/>
+          <a:chExt cx="0" cy="0"/>
+        </a:xfrm>
+      </p:grpSpPr>
+      <p:pic>
+        <p:nvPicPr>
+          <p:cNvPr id="5122" name="Picture 2"/>
+          <p:cNvPicPr>
+            <a:picLocks noChangeAspect="1" noChangeArrowheads="1"/>
+          </p:cNvPicPr>
+          <p:nvPr/>
+        </p:nvPicPr>
+        <p:blipFill>
+          <a:blip r:embed="rId2" cstate="print"/>
+          <a:srcRect/>
+          <a:stretch>
+            <a:fillRect/>
+          </a:stretch>
+        </p:blipFill>
+        <p:spPr bwMode="auto">
+          <a:xfrm>
+            <a:off x="2267744" y="1124744"/>
+            <a:ext cx="4333875" cy="2324100"/>
+          </a:xfrm>
+          <a:prstGeom prst="rect">
+            <a:avLst/>
+          </a:prstGeom>
+          <a:noFill/>
+          <a:ln w="9525">
+            <a:noFill/>
+            <a:miter lim="800000"/>
+            <a:headEnd/>
+            <a:tailEnd/>
+          </a:ln>
+        </p:spPr>
+      </p:pic>
+      <p:sp>
+        <p:nvSpPr>
+          <p:cNvPr id="5" name="Textfeld 4"/>
+          <p:cNvSpPr txBox="1"/>
+          <p:nvPr/>
+        </p:nvSpPr>
+        <p:spPr>
+          <a:xfrm>
+            <a:off x="5580112" y="980728"/>
+            <a:ext cx="785793" cy="253916"/>
+          </a:xfrm>
+          <a:prstGeom prst="rect">
+            <a:avLst/>
+          </a:prstGeom>
+          <a:solidFill>
+            <a:schemeClr val="accent6">
+              <a:lumMod val="20000"/>
+              <a:lumOff val="80000"/>
+              <a:alpha val="76000"/>
+            </a:schemeClr>
+          </a:solidFill>
+        </p:spPr>
+        <p:txBody>
+          <a:bodyPr wrap="none" rtlCol="0">
+            <a:spAutoFit/>
+          </a:bodyPr>
+          <a:lstStyle/>
+          <a:p>
+            <a:r>
+              <a:rPr lang="en-US" sz="1050" b="1" dirty="0" smtClean="0">
+                <a:solidFill>
+                  <a:srgbClr val="C00000"/>
+                </a:solidFill>
+              </a:rPr>
+              <a:t>definitions</a:t>
+            </a:r>
+          </a:p>
+        </p:txBody>
+      </p:sp>
+      <p:sp>
+        <p:nvSpPr>
+          <p:cNvPr id="8" name="Geschweifte Klammer rechts 7"/>
+          <p:cNvSpPr/>
+          <p:nvPr/>
+        </p:nvSpPr>
+        <p:spPr>
+          <a:xfrm rot="16200000">
+            <a:off x="5868146" y="764703"/>
+            <a:ext cx="144014" cy="1152130"/>
+          </a:xfrm>
+          <a:prstGeom prst="rightBrace">
+            <a:avLst/>
+          </a:prstGeom>
+        </p:spPr>
+        <p:style>
+          <a:lnRef idx="1">
+            <a:schemeClr val="accent1"/>
+          </a:lnRef>
+          <a:fillRef idx="0">
+            <a:schemeClr val="accent1"/>
+          </a:fillRef>
+          <a:effectRef idx="0">
+            <a:schemeClr val="accent1"/>
+          </a:effectRef>
+          <a:fontRef idx="minor">
+            <a:schemeClr val="tx1"/>
+          </a:fontRef>
+        </p:style>
+        <p:txBody>
+          <a:bodyPr rtlCol="0" anchor="ctr"/>
+          <a:lstStyle/>
+          <a:p>
+            <a:pPr algn="ctr"/>
+            <a:endParaRPr lang="en-US"/>
+          </a:p>
+        </p:txBody>
+      </p:sp>
+      <p:sp>
+        <p:nvSpPr>
+          <p:cNvPr id="9" name="Textfeld 8"/>
+          <p:cNvSpPr txBox="1"/>
+          <p:nvPr/>
+        </p:nvSpPr>
+        <p:spPr>
+          <a:xfrm>
+            <a:off x="3059832" y="3247092"/>
+            <a:ext cx="1813317" cy="253916"/>
+          </a:xfrm>
+          <a:prstGeom prst="rect">
+            <a:avLst/>
+          </a:prstGeom>
+          <a:solidFill>
+            <a:schemeClr val="accent6">
+              <a:lumMod val="20000"/>
+              <a:lumOff val="80000"/>
+              <a:alpha val="39000"/>
+            </a:schemeClr>
+          </a:solidFill>
+        </p:spPr>
+        <p:txBody>
+          <a:bodyPr wrap="none" rtlCol="0">
+            <a:spAutoFit/>
+          </a:bodyPr>
+          <a:lstStyle/>
+          <a:p>
+            <a:r>
+              <a:rPr lang="en-US" sz="1050" b="1" dirty="0" smtClean="0">
+                <a:solidFill>
+                  <a:srgbClr val="C00000"/>
+                </a:solidFill>
+              </a:rPr>
+              <a:t>complex cascaded conditions</a:t>
+            </a:r>
+            <a:endParaRPr lang="en-US" sz="1050" b="1" dirty="0">
+              <a:solidFill>
+                <a:srgbClr val="C00000"/>
+              </a:solidFill>
+            </a:endParaRPr>
+          </a:p>
+        </p:txBody>
+      </p:sp>
+      <p:sp>
+        <p:nvSpPr>
+          <p:cNvPr id="10" name="Geschweifte Klammer rechts 9"/>
+          <p:cNvSpPr/>
+          <p:nvPr/>
+        </p:nvSpPr>
+        <p:spPr>
+          <a:xfrm rot="5400000">
+            <a:off x="3887924" y="1952836"/>
+            <a:ext cx="144016" cy="2376264"/>
+          </a:xfrm>
+          <a:prstGeom prst="rightBrace">
+            <a:avLst/>
+          </a:prstGeom>
+        </p:spPr>
+        <p:style>
+          <a:lnRef idx="1">
+            <a:schemeClr val="accent1"/>
+          </a:lnRef>
+          <a:fillRef idx="0">
+            <a:schemeClr val="accent1"/>
+          </a:fillRef>
+          <a:effectRef idx="0">
+            <a:schemeClr val="accent1"/>
+          </a:effectRef>
+          <a:fontRef idx="minor">
+            <a:schemeClr val="tx1"/>
+          </a:fontRef>
+        </p:style>
+        <p:txBody>
+          <a:bodyPr rtlCol="0" anchor="ctr"/>
+          <a:lstStyle/>
+          <a:p>
+            <a:pPr algn="ctr"/>
+            <a:endParaRPr lang="en-US"/>
+          </a:p>
+        </p:txBody>
+      </p:sp>
+    </p:spTree>
+  </p:cSld>
+  <p:clrMapOvr>
+    <a:masterClrMapping/>
+  </p:clrMapOvr>
+  <p:timing>
+    <p:tnLst>
+      <p:par>
+        <p:cTn id="1" dur="indefinite" restart="never" nodeType="tmRoot"/>
+      </p:par>
+    </p:tnLst>
+  </p:timing>
+</p:sld>
+</file>
+
 <file path=ppt/slides/slide2.xml><?xml version="1.0" encoding="utf-8"?>
 <p:sld xmlns:a="http://schemas.openxmlformats.org/drawingml/2006/main" xmlns:r="http://schemas.openxmlformats.org/officeDocument/2006/relationships" xmlns:p="http://schemas.openxmlformats.org/presentationml/2006/main">
   <p:cSld>
@@ -4358,15 +4582,7 @@
                   <a:srgbClr val="C00000"/>
                 </a:solidFill>
               </a:rPr>
-              <a:t>‘*’ represent the fact that </a:t>
-            </a:r>
-            <a:r>
-              <a:rPr lang="en-US" sz="1050" b="1" dirty="0" smtClean="0">
-                <a:solidFill>
-                  <a:srgbClr val="C00000"/>
-                </a:solidFill>
-              </a:rPr>
-              <a:t>the</a:t>
+              <a:t>‘*’ represent the fact that the</a:t>
             </a:r>
           </a:p>
           <a:p>
@@ -4506,11 +4722,6 @@
               </a:rPr>
               <a:t>‘#’ means that the value of an output in a certain step is not interesting (don’t care)</a:t>
             </a:r>
-            <a:endParaRPr lang="en-US" sz="1050" b="1" dirty="0" smtClean="0">
-              <a:solidFill>
-                <a:srgbClr val="C00000"/>
-              </a:solidFill>
-            </a:endParaRPr>
           </a:p>
         </p:txBody>
       </p:sp>
@@ -4740,31 +4951,7 @@
                   <a:srgbClr val="C00000"/>
                 </a:solidFill>
               </a:rPr>
-              <a:t>(</a:t>
-            </a:r>
-            <a:r>
-              <a:rPr lang="en-US" sz="1050" b="1" dirty="0" smtClean="0">
-                <a:solidFill>
-                  <a:srgbClr val="C00000"/>
-                </a:solidFill>
-              </a:rPr>
-              <a:t>X (X act = exp)) &amp; (X (X </a:t>
-            </a:r>
-            <a:r>
-              <a:rPr lang="en-US" sz="1050" b="1" dirty="0" smtClean="0">
-                <a:solidFill>
-                  <a:srgbClr val="C00000"/>
-                </a:solidFill>
-              </a:rPr>
-              <a:t>(X act = exp</a:t>
-            </a:r>
-            <a:r>
-              <a:rPr lang="en-US" sz="1050" b="1" dirty="0" smtClean="0">
-                <a:solidFill>
-                  <a:srgbClr val="C00000"/>
-                </a:solidFill>
-              </a:rPr>
-              <a:t>))) &amp; …</a:t>
+              <a:t>(X (X act = exp)) &amp; (X (X (X act = exp))) &amp; …</a:t>
             </a:r>
           </a:p>
         </p:txBody>
@@ -4879,6 +5066,209 @@
       </p:grpSpPr>
       <p:pic>
         <p:nvPicPr>
+          <p:cNvPr id="1026" name="Picture 2"/>
+          <p:cNvPicPr>
+            <a:picLocks noChangeAspect="1" noChangeArrowheads="1"/>
+          </p:cNvPicPr>
+          <p:nvPr/>
+        </p:nvPicPr>
+        <p:blipFill>
+          <a:blip r:embed="rId2" cstate="print"/>
+          <a:srcRect/>
+          <a:stretch>
+            <a:fillRect/>
+          </a:stretch>
+        </p:blipFill>
+        <p:spPr bwMode="auto">
+          <a:xfrm>
+            <a:off x="1004888" y="1814513"/>
+            <a:ext cx="7134225" cy="3228975"/>
+          </a:xfrm>
+          <a:prstGeom prst="rect">
+            <a:avLst/>
+          </a:prstGeom>
+          <a:noFill/>
+          <a:ln w="9525">
+            <a:noFill/>
+            <a:miter lim="800000"/>
+            <a:headEnd/>
+            <a:tailEnd/>
+          </a:ln>
+        </p:spPr>
+      </p:pic>
+      <p:sp>
+        <p:nvSpPr>
+          <p:cNvPr id="5" name="Textfeld 4"/>
+          <p:cNvSpPr txBox="1"/>
+          <p:nvPr/>
+        </p:nvSpPr>
+        <p:spPr>
+          <a:xfrm>
+            <a:off x="5292080" y="3429000"/>
+            <a:ext cx="2592288" cy="1061829"/>
+          </a:xfrm>
+          <a:prstGeom prst="rect">
+            <a:avLst/>
+          </a:prstGeom>
+          <a:solidFill>
+            <a:schemeClr val="accent6">
+              <a:lumMod val="20000"/>
+              <a:lumOff val="80000"/>
+              <a:alpha val="65000"/>
+            </a:schemeClr>
+          </a:solidFill>
+        </p:spPr>
+        <p:txBody>
+          <a:bodyPr wrap="square" rtlCol="0">
+            <a:spAutoFit/>
+          </a:bodyPr>
+          <a:lstStyle/>
+          <a:p>
+            <a:pPr algn="ctr"/>
+            <a:r>
+              <a:rPr lang="en-US" sz="1050" b="1" dirty="0" smtClean="0">
+                <a:solidFill>
+                  <a:srgbClr val="C00000"/>
+                </a:solidFill>
+              </a:rPr>
+              <a:t>Initial condition </a:t>
+            </a:r>
+            <a:r>
+              <a:rPr lang="en-US" sz="1050" b="1" dirty="0" smtClean="0">
+                <a:solidFill>
+                  <a:srgbClr val="C00000"/>
+                </a:solidFill>
+              </a:rPr>
+              <a:t>means that the following test is run after the system reaches a state such that the initial condition is true. </a:t>
+            </a:r>
+          </a:p>
+          <a:p>
+            <a:pPr algn="ctr"/>
+            <a:endParaRPr lang="en-US" sz="1050" b="1" dirty="0" smtClean="0">
+              <a:solidFill>
+                <a:srgbClr val="C00000"/>
+              </a:solidFill>
+            </a:endParaRPr>
+          </a:p>
+          <a:p>
+            <a:pPr algn="ctr"/>
+            <a:r>
+              <a:rPr lang="en-US" sz="1050" b="1" dirty="0" smtClean="0">
+                <a:solidFill>
+                  <a:srgbClr val="C00000"/>
+                </a:solidFill>
+              </a:rPr>
+              <a:t>The first line of the test case starts from the next step.</a:t>
+            </a:r>
+            <a:endParaRPr lang="en-US" sz="1050" b="1" dirty="0" smtClean="0">
+              <a:solidFill>
+                <a:srgbClr val="C00000"/>
+              </a:solidFill>
+            </a:endParaRPr>
+          </a:p>
+        </p:txBody>
+      </p:sp>
+      <p:cxnSp>
+        <p:nvCxnSpPr>
+          <p:cNvPr id="6" name="Gerade Verbindung mit Pfeil 5"/>
+          <p:cNvCxnSpPr>
+            <a:stCxn id="5" idx="1"/>
+          </p:cNvCxnSpPr>
+          <p:nvPr/>
+        </p:nvCxnSpPr>
+        <p:spPr>
+          <a:xfrm flipH="1" flipV="1">
+            <a:off x="4716016" y="3573020"/>
+            <a:ext cx="576064" cy="386895"/>
+          </a:xfrm>
+          <a:prstGeom prst="straightConnector1">
+            <a:avLst/>
+          </a:prstGeom>
+          <a:ln w="19050">
+            <a:solidFill>
+              <a:srgbClr val="C00000"/>
+            </a:solidFill>
+            <a:tailEnd type="triangle"/>
+          </a:ln>
+        </p:spPr>
+        <p:style>
+          <a:lnRef idx="1">
+            <a:schemeClr val="accent1"/>
+          </a:lnRef>
+          <a:fillRef idx="0">
+            <a:schemeClr val="accent1"/>
+          </a:fillRef>
+          <a:effectRef idx="0">
+            <a:schemeClr val="accent1"/>
+          </a:effectRef>
+          <a:fontRef idx="minor">
+            <a:schemeClr val="tx1"/>
+          </a:fontRef>
+        </p:style>
+      </p:cxnSp>
+      <p:cxnSp>
+        <p:nvCxnSpPr>
+          <p:cNvPr id="10" name="Gerade Verbindung mit Pfeil 9"/>
+          <p:cNvCxnSpPr/>
+          <p:nvPr/>
+        </p:nvCxnSpPr>
+        <p:spPr>
+          <a:xfrm flipH="1" flipV="1">
+            <a:off x="4499992" y="4077072"/>
+            <a:ext cx="792088" cy="144016"/>
+          </a:xfrm>
+          <a:prstGeom prst="straightConnector1">
+            <a:avLst/>
+          </a:prstGeom>
+          <a:ln w="19050">
+            <a:solidFill>
+              <a:srgbClr val="C00000"/>
+            </a:solidFill>
+            <a:tailEnd type="triangle"/>
+          </a:ln>
+        </p:spPr>
+        <p:style>
+          <a:lnRef idx="1">
+            <a:schemeClr val="accent1"/>
+          </a:lnRef>
+          <a:fillRef idx="0">
+            <a:schemeClr val="accent1"/>
+          </a:fillRef>
+          <a:effectRef idx="0">
+            <a:schemeClr val="accent1"/>
+          </a:effectRef>
+          <a:fontRef idx="minor">
+            <a:schemeClr val="tx1"/>
+          </a:fontRef>
+        </p:style>
+      </p:cxnSp>
+    </p:spTree>
+  </p:cSld>
+  <p:clrMapOvr>
+    <a:masterClrMapping/>
+  </p:clrMapOvr>
+</p:sld>
+</file>
+
+<file path=ppt/slides/slide5.xml><?xml version="1.0" encoding="utf-8"?>
+<p:sld xmlns:a="http://schemas.openxmlformats.org/drawingml/2006/main" xmlns:r="http://schemas.openxmlformats.org/officeDocument/2006/relationships" xmlns:p="http://schemas.openxmlformats.org/presentationml/2006/main">
+  <p:cSld>
+    <p:spTree>
+      <p:nvGrpSpPr>
+        <p:cNvPr id="1" name=""/>
+        <p:cNvGrpSpPr/>
+        <p:nvPr/>
+      </p:nvGrpSpPr>
+      <p:grpSpPr>
+        <a:xfrm>
+          <a:off x="0" y="0"/>
+          <a:ext cx="0" cy="0"/>
+          <a:chOff x="0" y="0"/>
+          <a:chExt cx="0" cy="0"/>
+        </a:xfrm>
+      </p:grpSpPr>
+      <p:pic>
+        <p:nvPicPr>
           <p:cNvPr id="2051" name="Picture 3"/>
           <p:cNvPicPr>
             <a:picLocks noChangeAspect="1" noChangeArrowheads="1"/>
@@ -4924,7 +5314,7 @@
 </p:sld>
 </file>
 
-<file path=ppt/slides/slide5.xml><?xml version="1.0" encoding="utf-8"?>
+<file path=ppt/slides/slide6.xml><?xml version="1.0" encoding="utf-8"?>
 <p:sld xmlns:a="http://schemas.openxmlformats.org/drawingml/2006/main" xmlns:r="http://schemas.openxmlformats.org/officeDocument/2006/relationships" xmlns:p="http://schemas.openxmlformats.org/presentationml/2006/main">
   <p:cSld>
     <p:spTree>
@@ -4988,7 +5378,7 @@
 </p:sld>
 </file>
 
-<file path=ppt/slides/slide6.xml><?xml version="1.0" encoding="utf-8"?>
+<file path=ppt/slides/slide7.xml><?xml version="1.0" encoding="utf-8"?>
 <p:sld xmlns:a="http://schemas.openxmlformats.org/drawingml/2006/main" xmlns:r="http://schemas.openxmlformats.org/officeDocument/2006/relationships" xmlns:p="http://schemas.openxmlformats.org/presentationml/2006/main">
   <p:cSld>
     <p:spTree>
@@ -5052,7 +5442,7 @@
 </p:sld>
 </file>
 
-<file path=ppt/slides/slide7.xml><?xml version="1.0" encoding="utf-8"?>
+<file path=ppt/slides/slide8.xml><?xml version="1.0" encoding="utf-8"?>
 <p:sld xmlns:a="http://schemas.openxmlformats.org/drawingml/2006/main" xmlns:r="http://schemas.openxmlformats.org/officeDocument/2006/relationships" xmlns:p="http://schemas.openxmlformats.org/presentationml/2006/main">
   <p:cSld>
     <p:spTree>
@@ -5747,7 +6137,7 @@
 </p:sld>
 </file>
 
-<file path=ppt/slides/slide8.xml><?xml version="1.0" encoding="utf-8"?>
+<file path=ppt/slides/slide9.xml><?xml version="1.0" encoding="utf-8"?>
 <p:sld xmlns:a="http://schemas.openxmlformats.org/drawingml/2006/main" xmlns:r="http://schemas.openxmlformats.org/officeDocument/2006/relationships" xmlns:p="http://schemas.openxmlformats.org/presentationml/2006/main">
   <p:cSld>
     <p:spTree>
@@ -5796,229 +6186,6 @@
           </a:ln>
         </p:spPr>
       </p:pic>
-    </p:spTree>
-  </p:cSld>
-  <p:clrMapOvr>
-    <a:masterClrMapping/>
-  </p:clrMapOvr>
-  <p:timing>
-    <p:tnLst>
-      <p:par>
-        <p:cTn id="1" dur="indefinite" restart="never" nodeType="tmRoot"/>
-      </p:par>
-    </p:tnLst>
-  </p:timing>
-</p:sld>
-</file>
-
-<file path=ppt/slides/slide9.xml><?xml version="1.0" encoding="utf-8"?>
-<p:sld xmlns:a="http://schemas.openxmlformats.org/drawingml/2006/main" xmlns:r="http://schemas.openxmlformats.org/officeDocument/2006/relationships" xmlns:p="http://schemas.openxmlformats.org/presentationml/2006/main">
-  <p:cSld>
-    <p:spTree>
-      <p:nvGrpSpPr>
-        <p:cNvPr id="1" name=""/>
-        <p:cNvGrpSpPr/>
-        <p:nvPr/>
-      </p:nvGrpSpPr>
-      <p:grpSpPr>
-        <a:xfrm>
-          <a:off x="0" y="0"/>
-          <a:ext cx="0" cy="0"/>
-          <a:chOff x="0" y="0"/>
-          <a:chExt cx="0" cy="0"/>
-        </a:xfrm>
-      </p:grpSpPr>
-      <p:pic>
-        <p:nvPicPr>
-          <p:cNvPr id="5122" name="Picture 2"/>
-          <p:cNvPicPr>
-            <a:picLocks noChangeAspect="1" noChangeArrowheads="1"/>
-          </p:cNvPicPr>
-          <p:nvPr/>
-        </p:nvPicPr>
-        <p:blipFill>
-          <a:blip r:embed="rId2" cstate="print"/>
-          <a:srcRect/>
-          <a:stretch>
-            <a:fillRect/>
-          </a:stretch>
-        </p:blipFill>
-        <p:spPr bwMode="auto">
-          <a:xfrm>
-            <a:off x="2267744" y="1124744"/>
-            <a:ext cx="4333875" cy="2324100"/>
-          </a:xfrm>
-          <a:prstGeom prst="rect">
-            <a:avLst/>
-          </a:prstGeom>
-          <a:noFill/>
-          <a:ln w="9525">
-            <a:noFill/>
-            <a:miter lim="800000"/>
-            <a:headEnd/>
-            <a:tailEnd/>
-          </a:ln>
-        </p:spPr>
-      </p:pic>
-      <p:sp>
-        <p:nvSpPr>
-          <p:cNvPr id="5" name="Textfeld 4"/>
-          <p:cNvSpPr txBox="1"/>
-          <p:nvPr/>
-        </p:nvSpPr>
-        <p:spPr>
-          <a:xfrm>
-            <a:off x="5580112" y="980728"/>
-            <a:ext cx="785793" cy="253916"/>
-          </a:xfrm>
-          <a:prstGeom prst="rect">
-            <a:avLst/>
-          </a:prstGeom>
-          <a:solidFill>
-            <a:schemeClr val="accent6">
-              <a:lumMod val="20000"/>
-              <a:lumOff val="80000"/>
-              <a:alpha val="76000"/>
-            </a:schemeClr>
-          </a:solidFill>
-        </p:spPr>
-        <p:txBody>
-          <a:bodyPr wrap="none" rtlCol="0">
-            <a:spAutoFit/>
-          </a:bodyPr>
-          <a:lstStyle/>
-          <a:p>
-            <a:r>
-              <a:rPr lang="en-US" sz="1050" b="1" dirty="0" smtClean="0">
-                <a:solidFill>
-                  <a:srgbClr val="C00000"/>
-                </a:solidFill>
-              </a:rPr>
-              <a:t>definitions</a:t>
-            </a:r>
-          </a:p>
-        </p:txBody>
-      </p:sp>
-      <p:sp>
-        <p:nvSpPr>
-          <p:cNvPr id="8" name="Geschweifte Klammer rechts 7"/>
-          <p:cNvSpPr/>
-          <p:nvPr/>
-        </p:nvSpPr>
-        <p:spPr>
-          <a:xfrm rot="16200000">
-            <a:off x="5868146" y="764703"/>
-            <a:ext cx="144014" cy="1152130"/>
-          </a:xfrm>
-          <a:prstGeom prst="rightBrace">
-            <a:avLst/>
-          </a:prstGeom>
-        </p:spPr>
-        <p:style>
-          <a:lnRef idx="1">
-            <a:schemeClr val="accent1"/>
-          </a:lnRef>
-          <a:fillRef idx="0">
-            <a:schemeClr val="accent1"/>
-          </a:fillRef>
-          <a:effectRef idx="0">
-            <a:schemeClr val="accent1"/>
-          </a:effectRef>
-          <a:fontRef idx="minor">
-            <a:schemeClr val="tx1"/>
-          </a:fontRef>
-        </p:style>
-        <p:txBody>
-          <a:bodyPr rtlCol="0" anchor="ctr"/>
-          <a:lstStyle/>
-          <a:p>
-            <a:pPr algn="ctr"/>
-            <a:endParaRPr lang="en-US"/>
-          </a:p>
-        </p:txBody>
-      </p:sp>
-      <p:sp>
-        <p:nvSpPr>
-          <p:cNvPr id="9" name="Textfeld 8"/>
-          <p:cNvSpPr txBox="1"/>
-          <p:nvPr/>
-        </p:nvSpPr>
-        <p:spPr>
-          <a:xfrm>
-            <a:off x="3059832" y="3247092"/>
-            <a:ext cx="1813317" cy="253916"/>
-          </a:xfrm>
-          <a:prstGeom prst="rect">
-            <a:avLst/>
-          </a:prstGeom>
-          <a:solidFill>
-            <a:schemeClr val="accent6">
-              <a:lumMod val="20000"/>
-              <a:lumOff val="80000"/>
-              <a:alpha val="39000"/>
-            </a:schemeClr>
-          </a:solidFill>
-        </p:spPr>
-        <p:txBody>
-          <a:bodyPr wrap="none" rtlCol="0">
-            <a:spAutoFit/>
-          </a:bodyPr>
-          <a:lstStyle/>
-          <a:p>
-            <a:r>
-              <a:rPr lang="en-US" sz="1050" b="1" dirty="0" smtClean="0">
-                <a:solidFill>
-                  <a:srgbClr val="C00000"/>
-                </a:solidFill>
-              </a:rPr>
-              <a:t>complex cascaded conditions</a:t>
-            </a:r>
-            <a:endParaRPr lang="en-US" sz="1050" b="1" dirty="0">
-              <a:solidFill>
-                <a:srgbClr val="C00000"/>
-              </a:solidFill>
-            </a:endParaRPr>
-          </a:p>
-        </p:txBody>
-      </p:sp>
-      <p:sp>
-        <p:nvSpPr>
-          <p:cNvPr id="10" name="Geschweifte Klammer rechts 9"/>
-          <p:cNvSpPr/>
-          <p:nvPr/>
-        </p:nvSpPr>
-        <p:spPr>
-          <a:xfrm rot="5400000">
-            <a:off x="3887924" y="1952836"/>
-            <a:ext cx="144016" cy="2376264"/>
-          </a:xfrm>
-          <a:prstGeom prst="rightBrace">
-            <a:avLst/>
-          </a:prstGeom>
-        </p:spPr>
-        <p:style>
-          <a:lnRef idx="1">
-            <a:schemeClr val="accent1"/>
-          </a:lnRef>
-          <a:fillRef idx="0">
-            <a:schemeClr val="accent1"/>
-          </a:fillRef>
-          <a:effectRef idx="0">
-            <a:schemeClr val="accent1"/>
-          </a:effectRef>
-          <a:fontRef idx="minor">
-            <a:schemeClr val="tx1"/>
-          </a:fontRef>
-        </p:style>
-        <p:txBody>
-          <a:bodyPr rtlCol="0" anchor="ctr"/>
-          <a:lstStyle/>
-          <a:p>
-            <a:pPr algn="ctr"/>
-            <a:endParaRPr lang="en-US"/>
-          </a:p>
-        </p:txBody>
-      </p:sp>
     </p:spTree>
   </p:cSld>
   <p:clrMapOvr>

</xml_diff>

<commit_message>
doc + tutorial: added figures for the nusmv documentation and for the uder-guide from the tutorial
</commit_message>
<xml_diff>
--- a/code/tutorial/solutions/com.mbeddr.formal.nusmv.users_guide/figures/figures.pptx
+++ b/code/tutorial/solutions/com.mbeddr.formal.nusmv.users_guide/figures/figures.pptx
@@ -5,7 +5,7 @@
     <p:sldMasterId id="2147483648" r:id="rId1"/>
   </p:sldMasterIdLst>
   <p:notesMasterIdLst>
-    <p:notesMasterId r:id="rId12"/>
+    <p:notesMasterId r:id="rId13"/>
   </p:notesMasterIdLst>
   <p:sldIdLst>
     <p:sldId id="256" r:id="rId2"/>
@@ -15,9 +15,10 @@
     <p:sldId id="264" r:id="rId6"/>
     <p:sldId id="259" r:id="rId7"/>
     <p:sldId id="258" r:id="rId8"/>
-    <p:sldId id="260" r:id="rId9"/>
-    <p:sldId id="261" r:id="rId10"/>
-    <p:sldId id="262" r:id="rId11"/>
+    <p:sldId id="266" r:id="rId9"/>
+    <p:sldId id="260" r:id="rId10"/>
+    <p:sldId id="261" r:id="rId11"/>
+    <p:sldId id="262" r:id="rId12"/>
   </p:sldIdLst>
   <p:sldSz cx="9144000" cy="6858000" type="screen4x3"/>
   <p:notesSz cx="6858000" cy="9144000"/>
@@ -202,7 +203,7 @@
             <a:fld id="{11812C92-0668-408F-AE44-47ECD1C69BA6}" type="datetimeFigureOut">
               <a:rPr lang="en-US" smtClean="0"/>
               <a:pPr/>
-              <a:t>3/24/2018</a:t>
+              <a:t>6/15/2018</a:t>
             </a:fld>
             <a:endParaRPr lang="en-US"/>
           </a:p>
@@ -732,7 +733,7 @@
             <a:fld id="{1BA50D42-C9CD-4801-B293-61D1F53EC57E}" type="datetimeFigureOut">
               <a:rPr lang="de-DE" smtClean="0"/>
               <a:pPr/>
-              <a:t>24.03.2018</a:t>
+              <a:t>15.06.2018</a:t>
             </a:fld>
             <a:endParaRPr lang="de-DE"/>
           </a:p>
@@ -899,7 +900,7 @@
             <a:fld id="{1BA50D42-C9CD-4801-B293-61D1F53EC57E}" type="datetimeFigureOut">
               <a:rPr lang="de-DE" smtClean="0"/>
               <a:pPr/>
-              <a:t>24.03.2018</a:t>
+              <a:t>15.06.2018</a:t>
             </a:fld>
             <a:endParaRPr lang="de-DE"/>
           </a:p>
@@ -1076,7 +1077,7 @@
             <a:fld id="{1BA50D42-C9CD-4801-B293-61D1F53EC57E}" type="datetimeFigureOut">
               <a:rPr lang="de-DE" smtClean="0"/>
               <a:pPr/>
-              <a:t>24.03.2018</a:t>
+              <a:t>15.06.2018</a:t>
             </a:fld>
             <a:endParaRPr lang="de-DE"/>
           </a:p>
@@ -1243,7 +1244,7 @@
             <a:fld id="{1BA50D42-C9CD-4801-B293-61D1F53EC57E}" type="datetimeFigureOut">
               <a:rPr lang="de-DE" smtClean="0"/>
               <a:pPr/>
-              <a:t>24.03.2018</a:t>
+              <a:t>15.06.2018</a:t>
             </a:fld>
             <a:endParaRPr lang="de-DE"/>
           </a:p>
@@ -1486,7 +1487,7 @@
             <a:fld id="{1BA50D42-C9CD-4801-B293-61D1F53EC57E}" type="datetimeFigureOut">
               <a:rPr lang="de-DE" smtClean="0"/>
               <a:pPr/>
-              <a:t>24.03.2018</a:t>
+              <a:t>15.06.2018</a:t>
             </a:fld>
             <a:endParaRPr lang="de-DE"/>
           </a:p>
@@ -1771,7 +1772,7 @@
             <a:fld id="{1BA50D42-C9CD-4801-B293-61D1F53EC57E}" type="datetimeFigureOut">
               <a:rPr lang="de-DE" smtClean="0"/>
               <a:pPr/>
-              <a:t>24.03.2018</a:t>
+              <a:t>15.06.2018</a:t>
             </a:fld>
             <a:endParaRPr lang="de-DE"/>
           </a:p>
@@ -2190,7 +2191,7 @@
             <a:fld id="{1BA50D42-C9CD-4801-B293-61D1F53EC57E}" type="datetimeFigureOut">
               <a:rPr lang="de-DE" smtClean="0"/>
               <a:pPr/>
-              <a:t>24.03.2018</a:t>
+              <a:t>15.06.2018</a:t>
             </a:fld>
             <a:endParaRPr lang="de-DE"/>
           </a:p>
@@ -2305,7 +2306,7 @@
             <a:fld id="{1BA50D42-C9CD-4801-B293-61D1F53EC57E}" type="datetimeFigureOut">
               <a:rPr lang="de-DE" smtClean="0"/>
               <a:pPr/>
-              <a:t>24.03.2018</a:t>
+              <a:t>15.06.2018</a:t>
             </a:fld>
             <a:endParaRPr lang="de-DE"/>
           </a:p>
@@ -2397,7 +2398,7 @@
             <a:fld id="{1BA50D42-C9CD-4801-B293-61D1F53EC57E}" type="datetimeFigureOut">
               <a:rPr lang="de-DE" smtClean="0"/>
               <a:pPr/>
-              <a:t>24.03.2018</a:t>
+              <a:t>15.06.2018</a:t>
             </a:fld>
             <a:endParaRPr lang="de-DE"/>
           </a:p>
@@ -2671,7 +2672,7 @@
             <a:fld id="{1BA50D42-C9CD-4801-B293-61D1F53EC57E}" type="datetimeFigureOut">
               <a:rPr lang="de-DE" smtClean="0"/>
               <a:pPr/>
-              <a:t>24.03.2018</a:t>
+              <a:t>15.06.2018</a:t>
             </a:fld>
             <a:endParaRPr lang="de-DE"/>
           </a:p>
@@ -2921,7 +2922,7 @@
             <a:fld id="{1BA50D42-C9CD-4801-B293-61D1F53EC57E}" type="datetimeFigureOut">
               <a:rPr lang="de-DE" smtClean="0"/>
               <a:pPr/>
-              <a:t>24.03.2018</a:t>
+              <a:t>15.06.2018</a:t>
             </a:fld>
             <a:endParaRPr lang="de-DE"/>
           </a:p>
@@ -3131,7 +3132,7 @@
             <a:fld id="{1BA50D42-C9CD-4801-B293-61D1F53EC57E}" type="datetimeFigureOut">
               <a:rPr lang="de-DE" smtClean="0"/>
               <a:pPr/>
-              <a:t>24.03.2018</a:t>
+              <a:t>15.06.2018</a:t>
             </a:fld>
             <a:endParaRPr lang="de-DE"/>
           </a:p>
@@ -4294,6 +4295,70 @@
       </p:grpSpPr>
       <p:pic>
         <p:nvPicPr>
+          <p:cNvPr id="4098" name="Picture 2"/>
+          <p:cNvPicPr>
+            <a:picLocks noChangeAspect="1" noChangeArrowheads="1"/>
+          </p:cNvPicPr>
+          <p:nvPr/>
+        </p:nvPicPr>
+        <p:blipFill>
+          <a:blip r:embed="rId2" cstate="print"/>
+          <a:srcRect/>
+          <a:stretch>
+            <a:fillRect/>
+          </a:stretch>
+        </p:blipFill>
+        <p:spPr bwMode="auto">
+          <a:xfrm>
+            <a:off x="683568" y="404664"/>
+            <a:ext cx="7920881" cy="5112568"/>
+          </a:xfrm>
+          <a:prstGeom prst="rect">
+            <a:avLst/>
+          </a:prstGeom>
+          <a:noFill/>
+          <a:ln w="9525">
+            <a:noFill/>
+            <a:miter lim="800000"/>
+            <a:headEnd/>
+            <a:tailEnd/>
+          </a:ln>
+        </p:spPr>
+      </p:pic>
+    </p:spTree>
+  </p:cSld>
+  <p:clrMapOvr>
+    <a:masterClrMapping/>
+  </p:clrMapOvr>
+  <p:timing>
+    <p:tnLst>
+      <p:par>
+        <p:cTn id="1" dur="indefinite" restart="never" nodeType="tmRoot"/>
+      </p:par>
+    </p:tnLst>
+  </p:timing>
+</p:sld>
+</file>
+
+<file path=ppt/slides/slide11.xml><?xml version="1.0" encoding="utf-8"?>
+<p:sld xmlns:a="http://schemas.openxmlformats.org/drawingml/2006/main" xmlns:r="http://schemas.openxmlformats.org/officeDocument/2006/relationships" xmlns:p="http://schemas.openxmlformats.org/presentationml/2006/main">
+  <p:cSld>
+    <p:spTree>
+      <p:nvGrpSpPr>
+        <p:cNvPr id="1" name=""/>
+        <p:cNvGrpSpPr/>
+        <p:nvPr/>
+      </p:nvGrpSpPr>
+      <p:grpSpPr>
+        <a:xfrm>
+          <a:off x="0" y="0"/>
+          <a:ext cx="0" cy="0"/>
+          <a:chOff x="0" y="0"/>
+          <a:chExt cx="0" cy="0"/>
+        </a:xfrm>
+      </p:grpSpPr>
+      <p:pic>
+        <p:nvPicPr>
           <p:cNvPr id="5122" name="Picture 2"/>
           <p:cNvPicPr>
             <a:picLocks noChangeAspect="1" noChangeArrowheads="1"/>
@@ -5131,15 +5196,7 @@
                   <a:srgbClr val="C00000"/>
                 </a:solidFill>
               </a:rPr>
-              <a:t>Initial condition </a:t>
-            </a:r>
-            <a:r>
-              <a:rPr lang="en-US" sz="1050" b="1" dirty="0" smtClean="0">
-                <a:solidFill>
-                  <a:srgbClr val="C00000"/>
-                </a:solidFill>
-              </a:rPr>
-              <a:t>means that the following test is run after the system reaches a state such that the initial condition is true. </a:t>
+              <a:t>Initial condition means that the following test is run after the system reaches a state such that the initial condition is true. </a:t>
             </a:r>
           </a:p>
           <a:p>
@@ -5160,11 +5217,6 @@
               </a:rPr>
               <a:t>The first line of the test case starts from the next step.</a:t>
             </a:r>
-            <a:endParaRPr lang="en-US" sz="1050" b="1" dirty="0" smtClean="0">
-              <a:solidFill>
-                <a:srgbClr val="C00000"/>
-              </a:solidFill>
-            </a:endParaRPr>
           </a:p>
         </p:txBody>
       </p:sp>
@@ -5461,7 +5513,7 @@
       </p:grpSpPr>
       <p:pic>
         <p:nvPicPr>
-          <p:cNvPr id="3074" name="Picture 2"/>
+          <p:cNvPr id="1027" name="Picture 3"/>
           <p:cNvPicPr>
             <a:picLocks noChangeAspect="1" noChangeArrowheads="1"/>
           </p:cNvPicPr>
@@ -5469,15 +5521,15 @@
         </p:nvPicPr>
         <p:blipFill>
           <a:blip r:embed="rId2" cstate="print"/>
-          <a:srcRect/>
+          <a:srcRect l="34547" t="4851" r="6391" b="45800"/>
           <a:stretch>
             <a:fillRect/>
           </a:stretch>
         </p:blipFill>
         <p:spPr bwMode="auto">
           <a:xfrm>
-            <a:off x="1100138" y="371475"/>
-            <a:ext cx="6943725" cy="6115050"/>
+            <a:off x="1115616" y="260648"/>
+            <a:ext cx="7200800" cy="3384376"/>
           </a:xfrm>
           <a:prstGeom prst="rect">
             <a:avLst/>
@@ -5491,55 +5543,119 @@
           </a:ln>
         </p:spPr>
       </p:pic>
-      <p:sp>
-        <p:nvSpPr>
-          <p:cNvPr id="5" name="Textfeld 4"/>
-          <p:cNvSpPr txBox="1"/>
+      <p:grpSp>
+        <p:nvGrpSpPr>
+          <p:cNvPr id="8" name="Gruppieren 7"/>
+          <p:cNvGrpSpPr/>
           <p:nvPr/>
-        </p:nvSpPr>
-        <p:spPr>
+        </p:nvGrpSpPr>
+        <p:grpSpPr>
           <a:xfrm>
-            <a:off x="4932040" y="692696"/>
-            <a:ext cx="1096775" cy="253916"/>
-          </a:xfrm>
-          <a:prstGeom prst="rect">
-            <a:avLst/>
-          </a:prstGeom>
-          <a:solidFill>
-            <a:schemeClr val="accent6">
-              <a:lumMod val="20000"/>
-              <a:lumOff val="80000"/>
-              <a:alpha val="76000"/>
-            </a:schemeClr>
-          </a:solidFill>
-        </p:spPr>
-        <p:txBody>
-          <a:bodyPr wrap="none" rtlCol="0">
-            <a:spAutoFit/>
-          </a:bodyPr>
-          <a:lstStyle/>
-          <a:p>
-            <a:r>
-              <a:rPr lang="en-US" sz="1050" b="1" dirty="0" smtClean="0">
+            <a:off x="7164288" y="1484784"/>
+            <a:ext cx="1197764" cy="973996"/>
+            <a:chOff x="6876256" y="2924944"/>
+            <a:chExt cx="1197764" cy="973996"/>
+          </a:xfrm>
+        </p:grpSpPr>
+        <p:sp>
+          <p:nvSpPr>
+            <p:cNvPr id="5" name="Textfeld 4"/>
+            <p:cNvSpPr txBox="1"/>
+            <p:nvPr/>
+          </p:nvSpPr>
+          <p:spPr>
+            <a:xfrm>
+              <a:off x="6876256" y="3645024"/>
+              <a:ext cx="1197764" cy="253916"/>
+            </a:xfrm>
+            <a:prstGeom prst="rect">
+              <a:avLst/>
+            </a:prstGeom>
+            <a:solidFill>
+              <a:schemeClr val="accent6">
+                <a:lumMod val="20000"/>
+                <a:lumOff val="80000"/>
+                <a:alpha val="76000"/>
+              </a:schemeClr>
+            </a:solidFill>
+          </p:spPr>
+          <p:txBody>
+            <a:bodyPr wrap="none" rtlCol="0">
+              <a:spAutoFit/>
+            </a:bodyPr>
+            <a:lstStyle/>
+            <a:p>
+              <a:r>
+                <a:rPr lang="en-US" sz="1050" b="1" dirty="0" smtClean="0">
+                  <a:solidFill>
+                    <a:srgbClr val="C00000"/>
+                  </a:solidFill>
+                </a:rPr>
+                <a:t>o</a:t>
+              </a:r>
+              <a:r>
+                <a:rPr lang="en-US" sz="1050" b="1" dirty="0" smtClean="0">
+                  <a:solidFill>
+                    <a:srgbClr val="C00000"/>
+                  </a:solidFill>
+                </a:rPr>
+                <a:t>utputs definition</a:t>
+              </a:r>
+              <a:endParaRPr lang="en-US" sz="1050" b="1" dirty="0" smtClean="0">
                 <a:solidFill>
                   <a:srgbClr val="C00000"/>
                 </a:solidFill>
-              </a:rPr>
-              <a:t>states definition</a:t>
-            </a:r>
-          </a:p>
-        </p:txBody>
-      </p:sp>
+              </a:endParaRPr>
+            </a:p>
+          </p:txBody>
+        </p:sp>
+        <p:cxnSp>
+          <p:nvCxnSpPr>
+            <p:cNvPr id="6" name="Gerade Verbindung mit Pfeil 5"/>
+            <p:cNvCxnSpPr/>
+            <p:nvPr/>
+          </p:nvCxnSpPr>
+          <p:spPr>
+            <a:xfrm flipH="1" flipV="1">
+              <a:off x="7380312" y="2924944"/>
+              <a:ext cx="144016" cy="720080"/>
+            </a:xfrm>
+            <a:prstGeom prst="straightConnector1">
+              <a:avLst/>
+            </a:prstGeom>
+            <a:ln w="19050">
+              <a:solidFill>
+                <a:srgbClr val="C00000"/>
+              </a:solidFill>
+              <a:tailEnd type="triangle"/>
+            </a:ln>
+          </p:spPr>
+          <p:style>
+            <a:lnRef idx="1">
+              <a:schemeClr val="accent1"/>
+            </a:lnRef>
+            <a:fillRef idx="0">
+              <a:schemeClr val="accent1"/>
+            </a:fillRef>
+            <a:effectRef idx="0">
+              <a:schemeClr val="accent1"/>
+            </a:effectRef>
+            <a:fontRef idx="minor">
+              <a:schemeClr val="tx1"/>
+            </a:fontRef>
+          </p:style>
+        </p:cxnSp>
+      </p:grpSp>
       <p:cxnSp>
         <p:nvCxnSpPr>
-          <p:cNvPr id="6" name="Gerade Verbindung mit Pfeil 5"/>
+          <p:cNvPr id="11" name="Gerade Verbindung mit Pfeil 10"/>
           <p:cNvCxnSpPr/>
           <p:nvPr/>
         </p:nvCxnSpPr>
         <p:spPr>
-          <a:xfrm flipH="1">
-            <a:off x="3995936" y="836712"/>
-            <a:ext cx="864096" cy="0"/>
+          <a:xfrm flipH="1" flipV="1">
+            <a:off x="7164288" y="1484784"/>
+            <a:ext cx="144016" cy="720080"/>
           </a:xfrm>
           <a:prstGeom prst="straightConnector1">
             <a:avLst/>
@@ -5566,574 +5682,134 @@
           </a:fontRef>
         </p:style>
       </p:cxnSp>
-      <p:sp>
-        <p:nvSpPr>
-          <p:cNvPr id="8" name="Textfeld 7"/>
-          <p:cNvSpPr txBox="1"/>
+      <p:grpSp>
+        <p:nvGrpSpPr>
+          <p:cNvPr id="12" name="Gruppieren 11"/>
+          <p:cNvGrpSpPr/>
           <p:nvPr/>
-        </p:nvSpPr>
-        <p:spPr>
+        </p:nvGrpSpPr>
+        <p:grpSpPr>
           <a:xfrm>
-            <a:off x="3059832" y="1340768"/>
-            <a:ext cx="1008111" cy="253916"/>
-          </a:xfrm>
-          <a:prstGeom prst="rect">
-            <a:avLst/>
-          </a:prstGeom>
-          <a:solidFill>
-            <a:schemeClr val="accent6">
-              <a:lumMod val="20000"/>
-              <a:lumOff val="80000"/>
-              <a:alpha val="76000"/>
-            </a:schemeClr>
-          </a:solidFill>
-        </p:spPr>
-        <p:txBody>
-          <a:bodyPr wrap="square" rtlCol="0">
-            <a:spAutoFit/>
-          </a:bodyPr>
-          <a:lstStyle/>
-          <a:p>
-            <a:r>
-              <a:rPr lang="en-US" sz="1050" b="1" dirty="0" smtClean="0">
+            <a:off x="1763688" y="2636912"/>
+            <a:ext cx="2688557" cy="919554"/>
+            <a:chOff x="6876256" y="3140968"/>
+            <a:chExt cx="2688557" cy="919554"/>
+          </a:xfrm>
+        </p:grpSpPr>
+        <p:sp>
+          <p:nvSpPr>
+            <p:cNvPr id="13" name="Textfeld 12"/>
+            <p:cNvSpPr txBox="1"/>
+            <p:nvPr/>
+          </p:nvSpPr>
+          <p:spPr>
+            <a:xfrm>
+              <a:off x="6876256" y="3645024"/>
+              <a:ext cx="2688557" cy="415498"/>
+            </a:xfrm>
+            <a:prstGeom prst="rect">
+              <a:avLst/>
+            </a:prstGeom>
+            <a:solidFill>
+              <a:schemeClr val="accent6">
+                <a:lumMod val="20000"/>
+                <a:lumOff val="80000"/>
+                <a:alpha val="76000"/>
+              </a:schemeClr>
+            </a:solidFill>
+          </p:spPr>
+          <p:txBody>
+            <a:bodyPr wrap="none" rtlCol="0">
+              <a:spAutoFit/>
+            </a:bodyPr>
+            <a:lstStyle/>
+            <a:p>
+              <a:pPr algn="ctr"/>
+              <a:r>
+                <a:rPr lang="en-US" sz="1050" b="1" dirty="0" smtClean="0">
+                  <a:solidFill>
+                    <a:srgbClr val="C00000"/>
+                  </a:solidFill>
+                </a:rPr>
+                <a:t>only function results marked as ‘o</a:t>
+              </a:r>
+              <a:r>
+                <a:rPr lang="en-US" sz="1050" b="1" dirty="0" smtClean="0">
+                  <a:solidFill>
+                    <a:srgbClr val="C00000"/>
+                  </a:solidFill>
+                </a:rPr>
+                <a:t>utputs‘ are</a:t>
+              </a:r>
+            </a:p>
+            <a:p>
+              <a:pPr algn="ctr"/>
+              <a:r>
+                <a:rPr lang="en-US" sz="1050" b="1" dirty="0" smtClean="0">
+                  <a:solidFill>
+                    <a:srgbClr val="C00000"/>
+                  </a:solidFill>
+                </a:rPr>
+                <a:t>a</a:t>
+              </a:r>
+              <a:r>
+                <a:rPr lang="en-US" sz="1050" b="1" dirty="0" smtClean="0">
+                  <a:solidFill>
+                    <a:srgbClr val="C00000"/>
+                  </a:solidFill>
+                </a:rPr>
+                <a:t>vailable as output ports</a:t>
+              </a:r>
+              <a:endParaRPr lang="en-US" sz="1050" b="1" dirty="0" smtClean="0">
                 <a:solidFill>
                   <a:srgbClr val="C00000"/>
                 </a:solidFill>
-              </a:rPr>
-              <a:t>state variable</a:t>
-            </a:r>
-          </a:p>
-        </p:txBody>
-      </p:sp>
-      <p:cxnSp>
-        <p:nvCxnSpPr>
-          <p:cNvPr id="9" name="Gerade Verbindung mit Pfeil 8"/>
-          <p:cNvCxnSpPr/>
-          <p:nvPr/>
-        </p:nvCxnSpPr>
-        <p:spPr>
-          <a:xfrm flipH="1" flipV="1">
-            <a:off x="2195736" y="908720"/>
-            <a:ext cx="792088" cy="576064"/>
-          </a:xfrm>
-          <a:prstGeom prst="straightConnector1">
-            <a:avLst/>
-          </a:prstGeom>
-          <a:ln w="19050">
-            <a:solidFill>
-              <a:srgbClr val="C00000"/>
-            </a:solidFill>
-            <a:tailEnd type="triangle"/>
-          </a:ln>
-        </p:spPr>
-        <p:style>
-          <a:lnRef idx="1">
-            <a:schemeClr val="accent1"/>
-          </a:lnRef>
-          <a:fillRef idx="0">
-            <a:schemeClr val="accent1"/>
-          </a:fillRef>
-          <a:effectRef idx="0">
-            <a:schemeClr val="accent1"/>
-          </a:effectRef>
-          <a:fontRef idx="minor">
-            <a:schemeClr val="tx1"/>
-          </a:fontRef>
-        </p:style>
-      </p:cxnSp>
-      <p:sp>
-        <p:nvSpPr>
-          <p:cNvPr id="12" name="Textfeld 11"/>
-          <p:cNvSpPr txBox="1"/>
-          <p:nvPr/>
-        </p:nvSpPr>
-        <p:spPr>
-          <a:xfrm>
-            <a:off x="4499992" y="980728"/>
-            <a:ext cx="1598515" cy="253916"/>
-          </a:xfrm>
-          <a:prstGeom prst="rect">
-            <a:avLst/>
-          </a:prstGeom>
-          <a:solidFill>
-            <a:schemeClr val="accent6">
-              <a:lumMod val="20000"/>
-              <a:lumOff val="80000"/>
-              <a:alpha val="39000"/>
-            </a:schemeClr>
-          </a:solidFill>
-        </p:spPr>
-        <p:txBody>
-          <a:bodyPr wrap="none" rtlCol="0">
-            <a:spAutoFit/>
-          </a:bodyPr>
-          <a:lstStyle/>
-          <a:p>
-            <a:r>
-              <a:rPr lang="en-US" sz="1050" b="1" dirty="0" smtClean="0">
-                <a:solidFill>
-                  <a:srgbClr val="C00000"/>
-                </a:solidFill>
-              </a:rPr>
-              <a:t>additional state variables</a:t>
-            </a:r>
-            <a:endParaRPr lang="en-US" sz="1050" b="1" dirty="0">
+              </a:endParaRPr>
+            </a:p>
+          </p:txBody>
+        </p:sp>
+        <p:cxnSp>
+          <p:nvCxnSpPr>
+            <p:cNvPr id="14" name="Gerade Verbindung mit Pfeil 13"/>
+            <p:cNvCxnSpPr/>
+            <p:nvPr/>
+          </p:nvCxnSpPr>
+          <p:spPr>
+            <a:xfrm flipH="1" flipV="1">
+              <a:off x="8388424" y="3140968"/>
+              <a:ext cx="72008" cy="432048"/>
+            </a:xfrm>
+            <a:prstGeom prst="straightConnector1">
+              <a:avLst/>
+            </a:prstGeom>
+            <a:ln w="19050">
               <a:solidFill>
                 <a:srgbClr val="C00000"/>
               </a:solidFill>
-            </a:endParaRPr>
-          </a:p>
-        </p:txBody>
-      </p:sp>
-      <p:sp>
-        <p:nvSpPr>
-          <p:cNvPr id="13" name="Geschweifte Klammer rechts 12"/>
-          <p:cNvSpPr/>
-          <p:nvPr/>
-        </p:nvSpPr>
-        <p:spPr>
-          <a:xfrm>
-            <a:off x="4283968" y="908720"/>
-            <a:ext cx="144016" cy="360040"/>
-          </a:xfrm>
-          <a:prstGeom prst="rightBrace">
-            <a:avLst/>
-          </a:prstGeom>
-        </p:spPr>
-        <p:style>
-          <a:lnRef idx="1">
-            <a:schemeClr val="accent1"/>
-          </a:lnRef>
-          <a:fillRef idx="0">
-            <a:schemeClr val="accent1"/>
-          </a:fillRef>
-          <a:effectRef idx="0">
-            <a:schemeClr val="accent1"/>
-          </a:effectRef>
-          <a:fontRef idx="minor">
-            <a:schemeClr val="tx1"/>
-          </a:fontRef>
-        </p:style>
-        <p:txBody>
-          <a:bodyPr rtlCol="0" anchor="ctr"/>
-          <a:lstStyle/>
-          <a:p>
-            <a:pPr algn="ctr"/>
-            <a:endParaRPr lang="en-US"/>
-          </a:p>
-        </p:txBody>
-      </p:sp>
-      <p:sp>
-        <p:nvSpPr>
-          <p:cNvPr id="14" name="Textfeld 13"/>
-          <p:cNvSpPr txBox="1"/>
-          <p:nvPr/>
-        </p:nvSpPr>
-        <p:spPr>
-          <a:xfrm>
-            <a:off x="8028384" y="2708920"/>
-            <a:ext cx="784189" cy="415498"/>
-          </a:xfrm>
-          <a:prstGeom prst="rect">
-            <a:avLst/>
-          </a:prstGeom>
-          <a:solidFill>
-            <a:schemeClr val="accent6">
-              <a:lumMod val="20000"/>
-              <a:lumOff val="80000"/>
-              <a:alpha val="39000"/>
-            </a:schemeClr>
-          </a:solidFill>
-        </p:spPr>
-        <p:txBody>
-          <a:bodyPr wrap="none" rtlCol="0">
-            <a:spAutoFit/>
-          </a:bodyPr>
-          <a:lstStyle/>
-          <a:p>
-            <a:r>
-              <a:rPr lang="en-US" sz="1050" b="1" dirty="0" smtClean="0">
-                <a:solidFill>
-                  <a:srgbClr val="C00000"/>
-                </a:solidFill>
-              </a:rPr>
-              <a:t>transitions</a:t>
-            </a:r>
-          </a:p>
-          <a:p>
-            <a:r>
-              <a:rPr lang="en-US" sz="1050" b="1" dirty="0" smtClean="0">
-                <a:solidFill>
-                  <a:srgbClr val="C00000"/>
-                </a:solidFill>
-              </a:rPr>
-              <a:t>definitions</a:t>
-            </a:r>
-            <a:endParaRPr lang="en-US" sz="1050" b="1" dirty="0">
-              <a:solidFill>
-                <a:srgbClr val="C00000"/>
-              </a:solidFill>
-            </a:endParaRPr>
-          </a:p>
-        </p:txBody>
-      </p:sp>
-      <p:sp>
-        <p:nvSpPr>
-          <p:cNvPr id="15" name="Geschweifte Klammer rechts 14"/>
-          <p:cNvSpPr/>
-          <p:nvPr/>
-        </p:nvSpPr>
-        <p:spPr>
-          <a:xfrm>
-            <a:off x="7812360" y="2636912"/>
-            <a:ext cx="144016" cy="1080120"/>
-          </a:xfrm>
-          <a:prstGeom prst="rightBrace">
-            <a:avLst/>
-          </a:prstGeom>
-        </p:spPr>
-        <p:style>
-          <a:lnRef idx="1">
-            <a:schemeClr val="accent1"/>
-          </a:lnRef>
-          <a:fillRef idx="0">
-            <a:schemeClr val="accent1"/>
-          </a:fillRef>
-          <a:effectRef idx="0">
-            <a:schemeClr val="accent1"/>
-          </a:effectRef>
-          <a:fontRef idx="minor">
-            <a:schemeClr val="tx1"/>
-          </a:fontRef>
-        </p:style>
-        <p:txBody>
-          <a:bodyPr rtlCol="0" anchor="ctr"/>
-          <a:lstStyle/>
-          <a:p>
-            <a:pPr algn="ctr"/>
-            <a:endParaRPr lang="en-US"/>
-          </a:p>
-        </p:txBody>
-      </p:sp>
-      <p:sp>
-        <p:nvSpPr>
-          <p:cNvPr id="16" name="Textfeld 15"/>
-          <p:cNvSpPr txBox="1"/>
-          <p:nvPr/>
-        </p:nvSpPr>
-        <p:spPr>
-          <a:xfrm>
-            <a:off x="1403648" y="3068960"/>
-            <a:ext cx="1080119" cy="253916"/>
-          </a:xfrm>
-          <a:prstGeom prst="rect">
-            <a:avLst/>
-          </a:prstGeom>
-          <a:solidFill>
-            <a:schemeClr val="accent6">
-              <a:lumMod val="20000"/>
-              <a:lumOff val="80000"/>
-              <a:alpha val="76000"/>
-            </a:schemeClr>
-          </a:solidFill>
-        </p:spPr>
-        <p:txBody>
-          <a:bodyPr wrap="square" rtlCol="0">
-            <a:spAutoFit/>
-          </a:bodyPr>
-          <a:lstStyle/>
-          <a:p>
-            <a:r>
-              <a:rPr lang="en-US" sz="1050" b="1" dirty="0" smtClean="0">
-                <a:solidFill>
-                  <a:srgbClr val="C00000"/>
-                </a:solidFill>
-              </a:rPr>
-              <a:t>transition name</a:t>
-            </a:r>
-          </a:p>
-        </p:txBody>
-      </p:sp>
-      <p:cxnSp>
-        <p:nvCxnSpPr>
-          <p:cNvPr id="17" name="Gerade Verbindung mit Pfeil 16"/>
-          <p:cNvCxnSpPr/>
-          <p:nvPr/>
-        </p:nvCxnSpPr>
-        <p:spPr>
-          <a:xfrm flipV="1">
-            <a:off x="2555776" y="2996952"/>
-            <a:ext cx="288032" cy="144016"/>
-          </a:xfrm>
-          <a:prstGeom prst="straightConnector1">
-            <a:avLst/>
-          </a:prstGeom>
-          <a:ln w="19050">
-            <a:solidFill>
-              <a:srgbClr val="C00000"/>
-            </a:solidFill>
-            <a:tailEnd type="triangle"/>
-          </a:ln>
-        </p:spPr>
-        <p:style>
-          <a:lnRef idx="1">
-            <a:schemeClr val="accent1"/>
-          </a:lnRef>
-          <a:fillRef idx="0">
-            <a:schemeClr val="accent1"/>
-          </a:fillRef>
-          <a:effectRef idx="0">
-            <a:schemeClr val="accent1"/>
-          </a:effectRef>
-          <a:fontRef idx="minor">
-            <a:schemeClr val="tx1"/>
-          </a:fontRef>
-        </p:style>
-      </p:cxnSp>
-      <p:sp>
-        <p:nvSpPr>
-          <p:cNvPr id="19" name="Geschweifte Klammer rechts 18"/>
-          <p:cNvSpPr/>
-          <p:nvPr/>
-        </p:nvSpPr>
-        <p:spPr>
-          <a:xfrm rot="16200000">
-            <a:off x="5400092" y="1016732"/>
-            <a:ext cx="216023" cy="3024336"/>
-          </a:xfrm>
-          <a:prstGeom prst="rightBrace">
-            <a:avLst/>
-          </a:prstGeom>
-        </p:spPr>
-        <p:style>
-          <a:lnRef idx="1">
-            <a:schemeClr val="accent1"/>
-          </a:lnRef>
-          <a:fillRef idx="0">
-            <a:schemeClr val="accent1"/>
-          </a:fillRef>
-          <a:effectRef idx="0">
-            <a:schemeClr val="accent1"/>
-          </a:effectRef>
-          <a:fontRef idx="minor">
-            <a:schemeClr val="tx1"/>
-          </a:fontRef>
-        </p:style>
-        <p:txBody>
-          <a:bodyPr rtlCol="0" anchor="ctr"/>
-          <a:lstStyle/>
-          <a:p>
-            <a:pPr algn="ctr"/>
-            <a:endParaRPr lang="en-US"/>
-          </a:p>
-        </p:txBody>
-      </p:sp>
-      <p:sp>
-        <p:nvSpPr>
-          <p:cNvPr id="20" name="Textfeld 19"/>
-          <p:cNvSpPr txBox="1"/>
-          <p:nvPr/>
-        </p:nvSpPr>
-        <p:spPr>
-          <a:xfrm>
-            <a:off x="5220072" y="2132856"/>
-            <a:ext cx="506870" cy="253916"/>
-          </a:xfrm>
-          <a:prstGeom prst="rect">
-            <a:avLst/>
-          </a:prstGeom>
-          <a:solidFill>
-            <a:schemeClr val="accent6">
-              <a:lumMod val="20000"/>
-              <a:lumOff val="80000"/>
-              <a:alpha val="39000"/>
-            </a:schemeClr>
-          </a:solidFill>
-        </p:spPr>
-        <p:txBody>
-          <a:bodyPr wrap="none" rtlCol="0">
-            <a:spAutoFit/>
-          </a:bodyPr>
-          <a:lstStyle/>
-          <a:p>
-            <a:r>
-              <a:rPr lang="en-US" sz="1050" b="1" dirty="0" smtClean="0">
-                <a:solidFill>
-                  <a:srgbClr val="C00000"/>
-                </a:solidFill>
-              </a:rPr>
-              <a:t>guard</a:t>
-            </a:r>
-            <a:endParaRPr lang="en-US" sz="1050" b="1" dirty="0">
-              <a:solidFill>
-                <a:srgbClr val="C00000"/>
-              </a:solidFill>
-            </a:endParaRPr>
-          </a:p>
-        </p:txBody>
-      </p:sp>
-      <p:sp>
-        <p:nvSpPr>
-          <p:cNvPr id="22" name="Textfeld 21"/>
-          <p:cNvSpPr txBox="1"/>
-          <p:nvPr/>
-        </p:nvSpPr>
-        <p:spPr>
-          <a:xfrm>
-            <a:off x="1403648" y="4797152"/>
-            <a:ext cx="1296144" cy="253916"/>
-          </a:xfrm>
-          <a:prstGeom prst="rect">
-            <a:avLst/>
-          </a:prstGeom>
-          <a:solidFill>
-            <a:schemeClr val="accent6">
-              <a:lumMod val="20000"/>
-              <a:lumOff val="80000"/>
-              <a:alpha val="76000"/>
-            </a:schemeClr>
-          </a:solidFill>
-        </p:spPr>
-        <p:txBody>
-          <a:bodyPr wrap="square" rtlCol="0">
-            <a:spAutoFit/>
-          </a:bodyPr>
-          <a:lstStyle/>
-          <a:p>
-            <a:r>
-              <a:rPr lang="en-US" sz="1050" b="1" dirty="0" smtClean="0">
-                <a:solidFill>
-                  <a:srgbClr val="C00000"/>
-                </a:solidFill>
-              </a:rPr>
-              <a:t>transition reference</a:t>
-            </a:r>
-          </a:p>
-        </p:txBody>
-      </p:sp>
-      <p:cxnSp>
-        <p:nvCxnSpPr>
-          <p:cNvPr id="23" name="Gerade Verbindung mit Pfeil 22"/>
-          <p:cNvCxnSpPr/>
-          <p:nvPr/>
-        </p:nvCxnSpPr>
-        <p:spPr>
-          <a:xfrm flipV="1">
-            <a:off x="2555776" y="4615244"/>
-            <a:ext cx="288032" cy="144016"/>
-          </a:xfrm>
-          <a:prstGeom prst="straightConnector1">
-            <a:avLst/>
-          </a:prstGeom>
-          <a:ln w="19050">
-            <a:solidFill>
-              <a:srgbClr val="C00000"/>
-            </a:solidFill>
-            <a:tailEnd type="triangle"/>
-          </a:ln>
-        </p:spPr>
-        <p:style>
-          <a:lnRef idx="1">
-            <a:schemeClr val="accent1"/>
-          </a:lnRef>
-          <a:fillRef idx="0">
-            <a:schemeClr val="accent1"/>
-          </a:fillRef>
-          <a:effectRef idx="0">
-            <a:schemeClr val="accent1"/>
-          </a:effectRef>
-          <a:fontRef idx="minor">
-            <a:schemeClr val="tx1"/>
-          </a:fontRef>
-        </p:style>
-      </p:cxnSp>
-      <p:sp>
-        <p:nvSpPr>
-          <p:cNvPr id="24" name="Textfeld 23"/>
-          <p:cNvSpPr txBox="1"/>
-          <p:nvPr/>
-        </p:nvSpPr>
-        <p:spPr>
-          <a:xfrm>
-            <a:off x="3059832" y="2060848"/>
-            <a:ext cx="1440160" cy="253916"/>
-          </a:xfrm>
-          <a:prstGeom prst="rect">
-            <a:avLst/>
-          </a:prstGeom>
-          <a:solidFill>
-            <a:schemeClr val="accent6">
-              <a:lumMod val="20000"/>
-              <a:lumOff val="80000"/>
-              <a:alpha val="76000"/>
-            </a:schemeClr>
-          </a:solidFill>
-        </p:spPr>
-        <p:txBody>
-          <a:bodyPr wrap="square" rtlCol="0">
-            <a:spAutoFit/>
-          </a:bodyPr>
-          <a:lstStyle/>
-          <a:p>
-            <a:r>
-              <a:rPr lang="en-US" sz="1050" b="1" dirty="0" smtClean="0">
-                <a:solidFill>
-                  <a:srgbClr val="C00000"/>
-                </a:solidFill>
-              </a:rPr>
-              <a:t>state-machine section</a:t>
-            </a:r>
-          </a:p>
-        </p:txBody>
-      </p:sp>
-      <p:cxnSp>
-        <p:nvCxnSpPr>
-          <p:cNvPr id="25" name="Gerade Verbindung mit Pfeil 24"/>
-          <p:cNvCxnSpPr/>
-          <p:nvPr/>
-        </p:nvCxnSpPr>
-        <p:spPr>
-          <a:xfrm flipH="1">
-            <a:off x="2483768" y="2204864"/>
-            <a:ext cx="504056" cy="0"/>
-          </a:xfrm>
-          <a:prstGeom prst="straightConnector1">
-            <a:avLst/>
-          </a:prstGeom>
-          <a:ln w="19050">
-            <a:solidFill>
-              <a:srgbClr val="C00000"/>
-            </a:solidFill>
-            <a:tailEnd type="triangle"/>
-          </a:ln>
-        </p:spPr>
-        <p:style>
-          <a:lnRef idx="1">
-            <a:schemeClr val="accent1"/>
-          </a:lnRef>
-          <a:fillRef idx="0">
-            <a:schemeClr val="accent1"/>
-          </a:fillRef>
-          <a:effectRef idx="0">
-            <a:schemeClr val="accent1"/>
-          </a:effectRef>
-          <a:fontRef idx="minor">
-            <a:schemeClr val="tx1"/>
-          </a:fontRef>
-        </p:style>
-      </p:cxnSp>
+              <a:tailEnd type="triangle"/>
+            </a:ln>
+          </p:spPr>
+          <p:style>
+            <a:lnRef idx="1">
+              <a:schemeClr val="accent1"/>
+            </a:lnRef>
+            <a:fillRef idx="0">
+              <a:schemeClr val="accent1"/>
+            </a:fillRef>
+            <a:effectRef idx="0">
+              <a:schemeClr val="accent1"/>
+            </a:effectRef>
+            <a:fontRef idx="minor">
+              <a:schemeClr val="tx1"/>
+            </a:fontRef>
+          </p:style>
+        </p:cxnSp>
+      </p:grpSp>
     </p:spTree>
   </p:cSld>
   <p:clrMapOvr>
     <a:masterClrMapping/>
   </p:clrMapOvr>
-  <p:timing>
-    <p:tnLst>
-      <p:par>
-        <p:cTn id="1" dur="indefinite" restart="never" nodeType="tmRoot"/>
-      </p:par>
-    </p:tnLst>
-  </p:timing>
 </p:sld>
 </file>
 
@@ -6156,7 +5832,7 @@
       </p:grpSpPr>
       <p:pic>
         <p:nvPicPr>
-          <p:cNvPr id="4098" name="Picture 2"/>
+          <p:cNvPr id="3074" name="Picture 2"/>
           <p:cNvPicPr>
             <a:picLocks noChangeAspect="1" noChangeArrowheads="1"/>
           </p:cNvPicPr>
@@ -6171,8 +5847,8 @@
         </p:blipFill>
         <p:spPr bwMode="auto">
           <a:xfrm>
-            <a:off x="683568" y="404664"/>
-            <a:ext cx="7920881" cy="5112568"/>
+            <a:off x="1100138" y="371475"/>
+            <a:ext cx="6943725" cy="6115050"/>
           </a:xfrm>
           <a:prstGeom prst="rect">
             <a:avLst/>
@@ -6186,6 +5862,637 @@
           </a:ln>
         </p:spPr>
       </p:pic>
+      <p:sp>
+        <p:nvSpPr>
+          <p:cNvPr id="5" name="Textfeld 4"/>
+          <p:cNvSpPr txBox="1"/>
+          <p:nvPr/>
+        </p:nvSpPr>
+        <p:spPr>
+          <a:xfrm>
+            <a:off x="4932040" y="692696"/>
+            <a:ext cx="1096775" cy="253916"/>
+          </a:xfrm>
+          <a:prstGeom prst="rect">
+            <a:avLst/>
+          </a:prstGeom>
+          <a:solidFill>
+            <a:schemeClr val="accent6">
+              <a:lumMod val="20000"/>
+              <a:lumOff val="80000"/>
+              <a:alpha val="76000"/>
+            </a:schemeClr>
+          </a:solidFill>
+        </p:spPr>
+        <p:txBody>
+          <a:bodyPr wrap="none" rtlCol="0">
+            <a:spAutoFit/>
+          </a:bodyPr>
+          <a:lstStyle/>
+          <a:p>
+            <a:r>
+              <a:rPr lang="en-US" sz="1050" b="1" dirty="0" smtClean="0">
+                <a:solidFill>
+                  <a:srgbClr val="C00000"/>
+                </a:solidFill>
+              </a:rPr>
+              <a:t>states definition</a:t>
+            </a:r>
+          </a:p>
+        </p:txBody>
+      </p:sp>
+      <p:cxnSp>
+        <p:nvCxnSpPr>
+          <p:cNvPr id="6" name="Gerade Verbindung mit Pfeil 5"/>
+          <p:cNvCxnSpPr/>
+          <p:nvPr/>
+        </p:nvCxnSpPr>
+        <p:spPr>
+          <a:xfrm flipH="1">
+            <a:off x="3995936" y="836712"/>
+            <a:ext cx="864096" cy="0"/>
+          </a:xfrm>
+          <a:prstGeom prst="straightConnector1">
+            <a:avLst/>
+          </a:prstGeom>
+          <a:ln w="19050">
+            <a:solidFill>
+              <a:srgbClr val="C00000"/>
+            </a:solidFill>
+            <a:tailEnd type="triangle"/>
+          </a:ln>
+        </p:spPr>
+        <p:style>
+          <a:lnRef idx="1">
+            <a:schemeClr val="accent1"/>
+          </a:lnRef>
+          <a:fillRef idx="0">
+            <a:schemeClr val="accent1"/>
+          </a:fillRef>
+          <a:effectRef idx="0">
+            <a:schemeClr val="accent1"/>
+          </a:effectRef>
+          <a:fontRef idx="minor">
+            <a:schemeClr val="tx1"/>
+          </a:fontRef>
+        </p:style>
+      </p:cxnSp>
+      <p:sp>
+        <p:nvSpPr>
+          <p:cNvPr id="8" name="Textfeld 7"/>
+          <p:cNvSpPr txBox="1"/>
+          <p:nvPr/>
+        </p:nvSpPr>
+        <p:spPr>
+          <a:xfrm>
+            <a:off x="3059832" y="1340768"/>
+            <a:ext cx="1008111" cy="253916"/>
+          </a:xfrm>
+          <a:prstGeom prst="rect">
+            <a:avLst/>
+          </a:prstGeom>
+          <a:solidFill>
+            <a:schemeClr val="accent6">
+              <a:lumMod val="20000"/>
+              <a:lumOff val="80000"/>
+              <a:alpha val="76000"/>
+            </a:schemeClr>
+          </a:solidFill>
+        </p:spPr>
+        <p:txBody>
+          <a:bodyPr wrap="square" rtlCol="0">
+            <a:spAutoFit/>
+          </a:bodyPr>
+          <a:lstStyle/>
+          <a:p>
+            <a:r>
+              <a:rPr lang="en-US" sz="1050" b="1" dirty="0" smtClean="0">
+                <a:solidFill>
+                  <a:srgbClr val="C00000"/>
+                </a:solidFill>
+              </a:rPr>
+              <a:t>state variable</a:t>
+            </a:r>
+          </a:p>
+        </p:txBody>
+      </p:sp>
+      <p:cxnSp>
+        <p:nvCxnSpPr>
+          <p:cNvPr id="9" name="Gerade Verbindung mit Pfeil 8"/>
+          <p:cNvCxnSpPr/>
+          <p:nvPr/>
+        </p:nvCxnSpPr>
+        <p:spPr>
+          <a:xfrm flipH="1" flipV="1">
+            <a:off x="2195736" y="908720"/>
+            <a:ext cx="792088" cy="576064"/>
+          </a:xfrm>
+          <a:prstGeom prst="straightConnector1">
+            <a:avLst/>
+          </a:prstGeom>
+          <a:ln w="19050">
+            <a:solidFill>
+              <a:srgbClr val="C00000"/>
+            </a:solidFill>
+            <a:tailEnd type="triangle"/>
+          </a:ln>
+        </p:spPr>
+        <p:style>
+          <a:lnRef idx="1">
+            <a:schemeClr val="accent1"/>
+          </a:lnRef>
+          <a:fillRef idx="0">
+            <a:schemeClr val="accent1"/>
+          </a:fillRef>
+          <a:effectRef idx="0">
+            <a:schemeClr val="accent1"/>
+          </a:effectRef>
+          <a:fontRef idx="minor">
+            <a:schemeClr val="tx1"/>
+          </a:fontRef>
+        </p:style>
+      </p:cxnSp>
+      <p:sp>
+        <p:nvSpPr>
+          <p:cNvPr id="12" name="Textfeld 11"/>
+          <p:cNvSpPr txBox="1"/>
+          <p:nvPr/>
+        </p:nvSpPr>
+        <p:spPr>
+          <a:xfrm>
+            <a:off x="4499992" y="980728"/>
+            <a:ext cx="1598515" cy="253916"/>
+          </a:xfrm>
+          <a:prstGeom prst="rect">
+            <a:avLst/>
+          </a:prstGeom>
+          <a:solidFill>
+            <a:schemeClr val="accent6">
+              <a:lumMod val="20000"/>
+              <a:lumOff val="80000"/>
+              <a:alpha val="39000"/>
+            </a:schemeClr>
+          </a:solidFill>
+        </p:spPr>
+        <p:txBody>
+          <a:bodyPr wrap="none" rtlCol="0">
+            <a:spAutoFit/>
+          </a:bodyPr>
+          <a:lstStyle/>
+          <a:p>
+            <a:r>
+              <a:rPr lang="en-US" sz="1050" b="1" dirty="0" smtClean="0">
+                <a:solidFill>
+                  <a:srgbClr val="C00000"/>
+                </a:solidFill>
+              </a:rPr>
+              <a:t>additional state variables</a:t>
+            </a:r>
+            <a:endParaRPr lang="en-US" sz="1050" b="1" dirty="0">
+              <a:solidFill>
+                <a:srgbClr val="C00000"/>
+              </a:solidFill>
+            </a:endParaRPr>
+          </a:p>
+        </p:txBody>
+      </p:sp>
+      <p:sp>
+        <p:nvSpPr>
+          <p:cNvPr id="13" name="Geschweifte Klammer rechts 12"/>
+          <p:cNvSpPr/>
+          <p:nvPr/>
+        </p:nvSpPr>
+        <p:spPr>
+          <a:xfrm>
+            <a:off x="4283968" y="908720"/>
+            <a:ext cx="144016" cy="360040"/>
+          </a:xfrm>
+          <a:prstGeom prst="rightBrace">
+            <a:avLst/>
+          </a:prstGeom>
+        </p:spPr>
+        <p:style>
+          <a:lnRef idx="1">
+            <a:schemeClr val="accent1"/>
+          </a:lnRef>
+          <a:fillRef idx="0">
+            <a:schemeClr val="accent1"/>
+          </a:fillRef>
+          <a:effectRef idx="0">
+            <a:schemeClr val="accent1"/>
+          </a:effectRef>
+          <a:fontRef idx="minor">
+            <a:schemeClr val="tx1"/>
+          </a:fontRef>
+        </p:style>
+        <p:txBody>
+          <a:bodyPr rtlCol="0" anchor="ctr"/>
+          <a:lstStyle/>
+          <a:p>
+            <a:pPr algn="ctr"/>
+            <a:endParaRPr lang="en-US"/>
+          </a:p>
+        </p:txBody>
+      </p:sp>
+      <p:sp>
+        <p:nvSpPr>
+          <p:cNvPr id="14" name="Textfeld 13"/>
+          <p:cNvSpPr txBox="1"/>
+          <p:nvPr/>
+        </p:nvSpPr>
+        <p:spPr>
+          <a:xfrm>
+            <a:off x="8028384" y="2708920"/>
+            <a:ext cx="784189" cy="415498"/>
+          </a:xfrm>
+          <a:prstGeom prst="rect">
+            <a:avLst/>
+          </a:prstGeom>
+          <a:solidFill>
+            <a:schemeClr val="accent6">
+              <a:lumMod val="20000"/>
+              <a:lumOff val="80000"/>
+              <a:alpha val="39000"/>
+            </a:schemeClr>
+          </a:solidFill>
+        </p:spPr>
+        <p:txBody>
+          <a:bodyPr wrap="none" rtlCol="0">
+            <a:spAutoFit/>
+          </a:bodyPr>
+          <a:lstStyle/>
+          <a:p>
+            <a:r>
+              <a:rPr lang="en-US" sz="1050" b="1" dirty="0" smtClean="0">
+                <a:solidFill>
+                  <a:srgbClr val="C00000"/>
+                </a:solidFill>
+              </a:rPr>
+              <a:t>transitions</a:t>
+            </a:r>
+          </a:p>
+          <a:p>
+            <a:r>
+              <a:rPr lang="en-US" sz="1050" b="1" dirty="0" smtClean="0">
+                <a:solidFill>
+                  <a:srgbClr val="C00000"/>
+                </a:solidFill>
+              </a:rPr>
+              <a:t>definitions</a:t>
+            </a:r>
+            <a:endParaRPr lang="en-US" sz="1050" b="1" dirty="0">
+              <a:solidFill>
+                <a:srgbClr val="C00000"/>
+              </a:solidFill>
+            </a:endParaRPr>
+          </a:p>
+        </p:txBody>
+      </p:sp>
+      <p:sp>
+        <p:nvSpPr>
+          <p:cNvPr id="15" name="Geschweifte Klammer rechts 14"/>
+          <p:cNvSpPr/>
+          <p:nvPr/>
+        </p:nvSpPr>
+        <p:spPr>
+          <a:xfrm>
+            <a:off x="7812360" y="2636912"/>
+            <a:ext cx="144016" cy="1080120"/>
+          </a:xfrm>
+          <a:prstGeom prst="rightBrace">
+            <a:avLst/>
+          </a:prstGeom>
+        </p:spPr>
+        <p:style>
+          <a:lnRef idx="1">
+            <a:schemeClr val="accent1"/>
+          </a:lnRef>
+          <a:fillRef idx="0">
+            <a:schemeClr val="accent1"/>
+          </a:fillRef>
+          <a:effectRef idx="0">
+            <a:schemeClr val="accent1"/>
+          </a:effectRef>
+          <a:fontRef idx="minor">
+            <a:schemeClr val="tx1"/>
+          </a:fontRef>
+        </p:style>
+        <p:txBody>
+          <a:bodyPr rtlCol="0" anchor="ctr"/>
+          <a:lstStyle/>
+          <a:p>
+            <a:pPr algn="ctr"/>
+            <a:endParaRPr lang="en-US"/>
+          </a:p>
+        </p:txBody>
+      </p:sp>
+      <p:sp>
+        <p:nvSpPr>
+          <p:cNvPr id="16" name="Textfeld 15"/>
+          <p:cNvSpPr txBox="1"/>
+          <p:nvPr/>
+        </p:nvSpPr>
+        <p:spPr>
+          <a:xfrm>
+            <a:off x="1403648" y="3068960"/>
+            <a:ext cx="1080119" cy="253916"/>
+          </a:xfrm>
+          <a:prstGeom prst="rect">
+            <a:avLst/>
+          </a:prstGeom>
+          <a:solidFill>
+            <a:schemeClr val="accent6">
+              <a:lumMod val="20000"/>
+              <a:lumOff val="80000"/>
+              <a:alpha val="76000"/>
+            </a:schemeClr>
+          </a:solidFill>
+        </p:spPr>
+        <p:txBody>
+          <a:bodyPr wrap="square" rtlCol="0">
+            <a:spAutoFit/>
+          </a:bodyPr>
+          <a:lstStyle/>
+          <a:p>
+            <a:r>
+              <a:rPr lang="en-US" sz="1050" b="1" dirty="0" smtClean="0">
+                <a:solidFill>
+                  <a:srgbClr val="C00000"/>
+                </a:solidFill>
+              </a:rPr>
+              <a:t>transition name</a:t>
+            </a:r>
+          </a:p>
+        </p:txBody>
+      </p:sp>
+      <p:cxnSp>
+        <p:nvCxnSpPr>
+          <p:cNvPr id="17" name="Gerade Verbindung mit Pfeil 16"/>
+          <p:cNvCxnSpPr/>
+          <p:nvPr/>
+        </p:nvCxnSpPr>
+        <p:spPr>
+          <a:xfrm flipV="1">
+            <a:off x="2555776" y="2996952"/>
+            <a:ext cx="288032" cy="144016"/>
+          </a:xfrm>
+          <a:prstGeom prst="straightConnector1">
+            <a:avLst/>
+          </a:prstGeom>
+          <a:ln w="19050">
+            <a:solidFill>
+              <a:srgbClr val="C00000"/>
+            </a:solidFill>
+            <a:tailEnd type="triangle"/>
+          </a:ln>
+        </p:spPr>
+        <p:style>
+          <a:lnRef idx="1">
+            <a:schemeClr val="accent1"/>
+          </a:lnRef>
+          <a:fillRef idx="0">
+            <a:schemeClr val="accent1"/>
+          </a:fillRef>
+          <a:effectRef idx="0">
+            <a:schemeClr val="accent1"/>
+          </a:effectRef>
+          <a:fontRef idx="minor">
+            <a:schemeClr val="tx1"/>
+          </a:fontRef>
+        </p:style>
+      </p:cxnSp>
+      <p:sp>
+        <p:nvSpPr>
+          <p:cNvPr id="19" name="Geschweifte Klammer rechts 18"/>
+          <p:cNvSpPr/>
+          <p:nvPr/>
+        </p:nvSpPr>
+        <p:spPr>
+          <a:xfrm rot="16200000">
+            <a:off x="5400092" y="1016732"/>
+            <a:ext cx="216023" cy="3024336"/>
+          </a:xfrm>
+          <a:prstGeom prst="rightBrace">
+            <a:avLst/>
+          </a:prstGeom>
+        </p:spPr>
+        <p:style>
+          <a:lnRef idx="1">
+            <a:schemeClr val="accent1"/>
+          </a:lnRef>
+          <a:fillRef idx="0">
+            <a:schemeClr val="accent1"/>
+          </a:fillRef>
+          <a:effectRef idx="0">
+            <a:schemeClr val="accent1"/>
+          </a:effectRef>
+          <a:fontRef idx="minor">
+            <a:schemeClr val="tx1"/>
+          </a:fontRef>
+        </p:style>
+        <p:txBody>
+          <a:bodyPr rtlCol="0" anchor="ctr"/>
+          <a:lstStyle/>
+          <a:p>
+            <a:pPr algn="ctr"/>
+            <a:endParaRPr lang="en-US"/>
+          </a:p>
+        </p:txBody>
+      </p:sp>
+      <p:sp>
+        <p:nvSpPr>
+          <p:cNvPr id="20" name="Textfeld 19"/>
+          <p:cNvSpPr txBox="1"/>
+          <p:nvPr/>
+        </p:nvSpPr>
+        <p:spPr>
+          <a:xfrm>
+            <a:off x="5220072" y="2132856"/>
+            <a:ext cx="506870" cy="253916"/>
+          </a:xfrm>
+          <a:prstGeom prst="rect">
+            <a:avLst/>
+          </a:prstGeom>
+          <a:solidFill>
+            <a:schemeClr val="accent6">
+              <a:lumMod val="20000"/>
+              <a:lumOff val="80000"/>
+              <a:alpha val="39000"/>
+            </a:schemeClr>
+          </a:solidFill>
+        </p:spPr>
+        <p:txBody>
+          <a:bodyPr wrap="none" rtlCol="0">
+            <a:spAutoFit/>
+          </a:bodyPr>
+          <a:lstStyle/>
+          <a:p>
+            <a:r>
+              <a:rPr lang="en-US" sz="1050" b="1" dirty="0" smtClean="0">
+                <a:solidFill>
+                  <a:srgbClr val="C00000"/>
+                </a:solidFill>
+              </a:rPr>
+              <a:t>guard</a:t>
+            </a:r>
+            <a:endParaRPr lang="en-US" sz="1050" b="1" dirty="0">
+              <a:solidFill>
+                <a:srgbClr val="C00000"/>
+              </a:solidFill>
+            </a:endParaRPr>
+          </a:p>
+        </p:txBody>
+      </p:sp>
+      <p:sp>
+        <p:nvSpPr>
+          <p:cNvPr id="22" name="Textfeld 21"/>
+          <p:cNvSpPr txBox="1"/>
+          <p:nvPr/>
+        </p:nvSpPr>
+        <p:spPr>
+          <a:xfrm>
+            <a:off x="1403648" y="4797152"/>
+            <a:ext cx="1296144" cy="253916"/>
+          </a:xfrm>
+          <a:prstGeom prst="rect">
+            <a:avLst/>
+          </a:prstGeom>
+          <a:solidFill>
+            <a:schemeClr val="accent6">
+              <a:lumMod val="20000"/>
+              <a:lumOff val="80000"/>
+              <a:alpha val="76000"/>
+            </a:schemeClr>
+          </a:solidFill>
+        </p:spPr>
+        <p:txBody>
+          <a:bodyPr wrap="square" rtlCol="0">
+            <a:spAutoFit/>
+          </a:bodyPr>
+          <a:lstStyle/>
+          <a:p>
+            <a:r>
+              <a:rPr lang="en-US" sz="1050" b="1" dirty="0" smtClean="0">
+                <a:solidFill>
+                  <a:srgbClr val="C00000"/>
+                </a:solidFill>
+              </a:rPr>
+              <a:t>transition reference</a:t>
+            </a:r>
+          </a:p>
+        </p:txBody>
+      </p:sp>
+      <p:cxnSp>
+        <p:nvCxnSpPr>
+          <p:cNvPr id="23" name="Gerade Verbindung mit Pfeil 22"/>
+          <p:cNvCxnSpPr/>
+          <p:nvPr/>
+        </p:nvCxnSpPr>
+        <p:spPr>
+          <a:xfrm flipV="1">
+            <a:off x="2555776" y="4615244"/>
+            <a:ext cx="288032" cy="144016"/>
+          </a:xfrm>
+          <a:prstGeom prst="straightConnector1">
+            <a:avLst/>
+          </a:prstGeom>
+          <a:ln w="19050">
+            <a:solidFill>
+              <a:srgbClr val="C00000"/>
+            </a:solidFill>
+            <a:tailEnd type="triangle"/>
+          </a:ln>
+        </p:spPr>
+        <p:style>
+          <a:lnRef idx="1">
+            <a:schemeClr val="accent1"/>
+          </a:lnRef>
+          <a:fillRef idx="0">
+            <a:schemeClr val="accent1"/>
+          </a:fillRef>
+          <a:effectRef idx="0">
+            <a:schemeClr val="accent1"/>
+          </a:effectRef>
+          <a:fontRef idx="minor">
+            <a:schemeClr val="tx1"/>
+          </a:fontRef>
+        </p:style>
+      </p:cxnSp>
+      <p:sp>
+        <p:nvSpPr>
+          <p:cNvPr id="24" name="Textfeld 23"/>
+          <p:cNvSpPr txBox="1"/>
+          <p:nvPr/>
+        </p:nvSpPr>
+        <p:spPr>
+          <a:xfrm>
+            <a:off x="3059832" y="2060848"/>
+            <a:ext cx="1440160" cy="253916"/>
+          </a:xfrm>
+          <a:prstGeom prst="rect">
+            <a:avLst/>
+          </a:prstGeom>
+          <a:solidFill>
+            <a:schemeClr val="accent6">
+              <a:lumMod val="20000"/>
+              <a:lumOff val="80000"/>
+              <a:alpha val="76000"/>
+            </a:schemeClr>
+          </a:solidFill>
+        </p:spPr>
+        <p:txBody>
+          <a:bodyPr wrap="square" rtlCol="0">
+            <a:spAutoFit/>
+          </a:bodyPr>
+          <a:lstStyle/>
+          <a:p>
+            <a:r>
+              <a:rPr lang="en-US" sz="1050" b="1" dirty="0" smtClean="0">
+                <a:solidFill>
+                  <a:srgbClr val="C00000"/>
+                </a:solidFill>
+              </a:rPr>
+              <a:t>state-machine section</a:t>
+            </a:r>
+          </a:p>
+        </p:txBody>
+      </p:sp>
+      <p:cxnSp>
+        <p:nvCxnSpPr>
+          <p:cNvPr id="25" name="Gerade Verbindung mit Pfeil 24"/>
+          <p:cNvCxnSpPr/>
+          <p:nvPr/>
+        </p:nvCxnSpPr>
+        <p:spPr>
+          <a:xfrm flipH="1">
+            <a:off x="2483768" y="2204864"/>
+            <a:ext cx="504056" cy="0"/>
+          </a:xfrm>
+          <a:prstGeom prst="straightConnector1">
+            <a:avLst/>
+          </a:prstGeom>
+          <a:ln w="19050">
+            <a:solidFill>
+              <a:srgbClr val="C00000"/>
+            </a:solidFill>
+            <a:tailEnd type="triangle"/>
+          </a:ln>
+        </p:spPr>
+        <p:style>
+          <a:lnRef idx="1">
+            <a:schemeClr val="accent1"/>
+          </a:lnRef>
+          <a:fillRef idx="0">
+            <a:schemeClr val="accent1"/>
+          </a:fillRef>
+          <a:effectRef idx="0">
+            <a:schemeClr val="accent1"/>
+          </a:effectRef>
+          <a:fontRef idx="minor">
+            <a:schemeClr val="tx1"/>
+          </a:fontRef>
+        </p:style>
+      </p:cxnSp>
     </p:spTree>
   </p:cSld>
   <p:clrMapOvr>

</xml_diff>

<commit_message>
tutorial: operators panel users guide and example
</commit_message>
<xml_diff>
--- a/code/tutorial/solutions/com.mbeddr.formal.nusmv.users_guide/figures/figures.pptx
+++ b/code/tutorial/solutions/com.mbeddr.formal.nusmv.users_guide/figures/figures.pptx
@@ -5,7 +5,7 @@
     <p:sldMasterId id="2147483648" r:id="rId1"/>
   </p:sldMasterIdLst>
   <p:notesMasterIdLst>
-    <p:notesMasterId r:id="rId13"/>
+    <p:notesMasterId r:id="rId14"/>
   </p:notesMasterIdLst>
   <p:sldIdLst>
     <p:sldId id="256" r:id="rId2"/>
@@ -19,6 +19,7 @@
     <p:sldId id="260" r:id="rId10"/>
     <p:sldId id="261" r:id="rId11"/>
     <p:sldId id="262" r:id="rId12"/>
+    <p:sldId id="267" r:id="rId13"/>
   </p:sldIdLst>
   <p:sldSz cx="9144000" cy="6858000" type="screen4x3"/>
   <p:notesSz cx="6858000" cy="9144000"/>
@@ -203,7 +204,7 @@
             <a:fld id="{11812C92-0668-408F-AE44-47ECD1C69BA6}" type="datetimeFigureOut">
               <a:rPr lang="en-US" smtClean="0"/>
               <a:pPr/>
-              <a:t>6/15/2018</a:t>
+              <a:t>6/21/2018</a:t>
             </a:fld>
             <a:endParaRPr lang="en-US"/>
           </a:p>
@@ -733,7 +734,7 @@
             <a:fld id="{1BA50D42-C9CD-4801-B293-61D1F53EC57E}" type="datetimeFigureOut">
               <a:rPr lang="de-DE" smtClean="0"/>
               <a:pPr/>
-              <a:t>15.06.2018</a:t>
+              <a:t>21.06.2018</a:t>
             </a:fld>
             <a:endParaRPr lang="de-DE"/>
           </a:p>
@@ -900,7 +901,7 @@
             <a:fld id="{1BA50D42-C9CD-4801-B293-61D1F53EC57E}" type="datetimeFigureOut">
               <a:rPr lang="de-DE" smtClean="0"/>
               <a:pPr/>
-              <a:t>15.06.2018</a:t>
+              <a:t>21.06.2018</a:t>
             </a:fld>
             <a:endParaRPr lang="de-DE"/>
           </a:p>
@@ -1077,7 +1078,7 @@
             <a:fld id="{1BA50D42-C9CD-4801-B293-61D1F53EC57E}" type="datetimeFigureOut">
               <a:rPr lang="de-DE" smtClean="0"/>
               <a:pPr/>
-              <a:t>15.06.2018</a:t>
+              <a:t>21.06.2018</a:t>
             </a:fld>
             <a:endParaRPr lang="de-DE"/>
           </a:p>
@@ -1244,7 +1245,7 @@
             <a:fld id="{1BA50D42-C9CD-4801-B293-61D1F53EC57E}" type="datetimeFigureOut">
               <a:rPr lang="de-DE" smtClean="0"/>
               <a:pPr/>
-              <a:t>15.06.2018</a:t>
+              <a:t>21.06.2018</a:t>
             </a:fld>
             <a:endParaRPr lang="de-DE"/>
           </a:p>
@@ -1487,7 +1488,7 @@
             <a:fld id="{1BA50D42-C9CD-4801-B293-61D1F53EC57E}" type="datetimeFigureOut">
               <a:rPr lang="de-DE" smtClean="0"/>
               <a:pPr/>
-              <a:t>15.06.2018</a:t>
+              <a:t>21.06.2018</a:t>
             </a:fld>
             <a:endParaRPr lang="de-DE"/>
           </a:p>
@@ -1772,7 +1773,7 @@
             <a:fld id="{1BA50D42-C9CD-4801-B293-61D1F53EC57E}" type="datetimeFigureOut">
               <a:rPr lang="de-DE" smtClean="0"/>
               <a:pPr/>
-              <a:t>15.06.2018</a:t>
+              <a:t>21.06.2018</a:t>
             </a:fld>
             <a:endParaRPr lang="de-DE"/>
           </a:p>
@@ -2191,7 +2192,7 @@
             <a:fld id="{1BA50D42-C9CD-4801-B293-61D1F53EC57E}" type="datetimeFigureOut">
               <a:rPr lang="de-DE" smtClean="0"/>
               <a:pPr/>
-              <a:t>15.06.2018</a:t>
+              <a:t>21.06.2018</a:t>
             </a:fld>
             <a:endParaRPr lang="de-DE"/>
           </a:p>
@@ -2306,7 +2307,7 @@
             <a:fld id="{1BA50D42-C9CD-4801-B293-61D1F53EC57E}" type="datetimeFigureOut">
               <a:rPr lang="de-DE" smtClean="0"/>
               <a:pPr/>
-              <a:t>15.06.2018</a:t>
+              <a:t>21.06.2018</a:t>
             </a:fld>
             <a:endParaRPr lang="de-DE"/>
           </a:p>
@@ -2398,7 +2399,7 @@
             <a:fld id="{1BA50D42-C9CD-4801-B293-61D1F53EC57E}" type="datetimeFigureOut">
               <a:rPr lang="de-DE" smtClean="0"/>
               <a:pPr/>
-              <a:t>15.06.2018</a:t>
+              <a:t>21.06.2018</a:t>
             </a:fld>
             <a:endParaRPr lang="de-DE"/>
           </a:p>
@@ -2672,7 +2673,7 @@
             <a:fld id="{1BA50D42-C9CD-4801-B293-61D1F53EC57E}" type="datetimeFigureOut">
               <a:rPr lang="de-DE" smtClean="0"/>
               <a:pPr/>
-              <a:t>15.06.2018</a:t>
+              <a:t>21.06.2018</a:t>
             </a:fld>
             <a:endParaRPr lang="de-DE"/>
           </a:p>
@@ -2922,7 +2923,7 @@
             <a:fld id="{1BA50D42-C9CD-4801-B293-61D1F53EC57E}" type="datetimeFigureOut">
               <a:rPr lang="de-DE" smtClean="0"/>
               <a:pPr/>
-              <a:t>15.06.2018</a:t>
+              <a:t>21.06.2018</a:t>
             </a:fld>
             <a:endParaRPr lang="de-DE"/>
           </a:p>
@@ -3132,7 +3133,7 @@
             <a:fld id="{1BA50D42-C9CD-4801-B293-61D1F53EC57E}" type="datetimeFigureOut">
               <a:rPr lang="de-DE" smtClean="0"/>
               <a:pPr/>
-              <a:t>15.06.2018</a:t>
+              <a:t>21.06.2018</a:t>
             </a:fld>
             <a:endParaRPr lang="de-DE"/>
           </a:p>
@@ -4563,6 +4564,525 @@
 </p:sld>
 </file>
 
+<file path=ppt/slides/slide12.xml><?xml version="1.0" encoding="utf-8"?>
+<p:sld xmlns:a="http://schemas.openxmlformats.org/drawingml/2006/main" xmlns:r="http://schemas.openxmlformats.org/officeDocument/2006/relationships" xmlns:p="http://schemas.openxmlformats.org/presentationml/2006/main">
+  <p:cSld>
+    <p:spTree>
+      <p:nvGrpSpPr>
+        <p:cNvPr id="1" name=""/>
+        <p:cNvGrpSpPr/>
+        <p:nvPr/>
+      </p:nvGrpSpPr>
+      <p:grpSpPr>
+        <a:xfrm>
+          <a:off x="0" y="0"/>
+          <a:ext cx="0" cy="0"/>
+          <a:chOff x="0" y="0"/>
+          <a:chExt cx="0" cy="0"/>
+        </a:xfrm>
+      </p:grpSpPr>
+      <p:pic>
+        <p:nvPicPr>
+          <p:cNvPr id="1026" name="Picture 2"/>
+          <p:cNvPicPr>
+            <a:picLocks noChangeAspect="1" noChangeArrowheads="1"/>
+          </p:cNvPicPr>
+          <p:nvPr/>
+        </p:nvPicPr>
+        <p:blipFill>
+          <a:blip r:embed="rId2" cstate="print"/>
+          <a:srcRect/>
+          <a:stretch>
+            <a:fillRect/>
+          </a:stretch>
+        </p:blipFill>
+        <p:spPr bwMode="auto">
+          <a:xfrm>
+            <a:off x="323528" y="620688"/>
+            <a:ext cx="8325370" cy="4932586"/>
+          </a:xfrm>
+          <a:prstGeom prst="rect">
+            <a:avLst/>
+          </a:prstGeom>
+          <a:noFill/>
+          <a:ln w="9525">
+            <a:noFill/>
+            <a:miter lim="800000"/>
+            <a:headEnd/>
+            <a:tailEnd/>
+          </a:ln>
+        </p:spPr>
+      </p:pic>
+      <p:sp>
+        <p:nvSpPr>
+          <p:cNvPr id="5" name="Textfeld 4"/>
+          <p:cNvSpPr txBox="1"/>
+          <p:nvPr/>
+        </p:nvSpPr>
+        <p:spPr>
+          <a:xfrm>
+            <a:off x="2195736" y="2276872"/>
+            <a:ext cx="1224136" cy="253916"/>
+          </a:xfrm>
+          <a:prstGeom prst="rect">
+            <a:avLst/>
+          </a:prstGeom>
+          <a:solidFill>
+            <a:schemeClr val="accent6">
+              <a:lumMod val="20000"/>
+              <a:lumOff val="80000"/>
+              <a:alpha val="76000"/>
+            </a:schemeClr>
+          </a:solidFill>
+        </p:spPr>
+        <p:txBody>
+          <a:bodyPr wrap="square" rtlCol="0">
+            <a:spAutoFit/>
+          </a:bodyPr>
+          <a:lstStyle/>
+          <a:p>
+            <a:r>
+              <a:rPr lang="en-US" sz="1050" b="1" dirty="0" smtClean="0">
+                <a:solidFill>
+                  <a:srgbClr val="C00000"/>
+                </a:solidFill>
+              </a:rPr>
+              <a:t>g</a:t>
+            </a:r>
+            <a:r>
+              <a:rPr lang="en-US" sz="1050" b="1" dirty="0" smtClean="0">
+                <a:solidFill>
+                  <a:srgbClr val="C00000"/>
+                </a:solidFill>
+              </a:rPr>
+              <a:t>raphical widgets</a:t>
+            </a:r>
+            <a:endParaRPr lang="en-US" sz="1050" b="1" dirty="0" smtClean="0">
+              <a:solidFill>
+                <a:srgbClr val="C00000"/>
+              </a:solidFill>
+            </a:endParaRPr>
+          </a:p>
+        </p:txBody>
+      </p:sp>
+      <p:cxnSp>
+        <p:nvCxnSpPr>
+          <p:cNvPr id="6" name="Gerade Verbindung mit Pfeil 5"/>
+          <p:cNvCxnSpPr/>
+          <p:nvPr/>
+        </p:nvCxnSpPr>
+        <p:spPr>
+          <a:xfrm flipH="1" flipV="1">
+            <a:off x="1187624" y="1844824"/>
+            <a:ext cx="936104" cy="576064"/>
+          </a:xfrm>
+          <a:prstGeom prst="straightConnector1">
+            <a:avLst/>
+          </a:prstGeom>
+          <a:ln w="19050">
+            <a:solidFill>
+              <a:srgbClr val="C00000"/>
+            </a:solidFill>
+            <a:tailEnd type="triangle"/>
+          </a:ln>
+        </p:spPr>
+        <p:style>
+          <a:lnRef idx="1">
+            <a:schemeClr val="accent1"/>
+          </a:lnRef>
+          <a:fillRef idx="0">
+            <a:schemeClr val="accent1"/>
+          </a:fillRef>
+          <a:effectRef idx="0">
+            <a:schemeClr val="accent1"/>
+          </a:effectRef>
+          <a:fontRef idx="minor">
+            <a:schemeClr val="tx1"/>
+          </a:fontRef>
+        </p:style>
+      </p:cxnSp>
+      <p:cxnSp>
+        <p:nvCxnSpPr>
+          <p:cNvPr id="8" name="Gerade Verbindung mit Pfeil 7"/>
+          <p:cNvCxnSpPr/>
+          <p:nvPr/>
+        </p:nvCxnSpPr>
+        <p:spPr>
+          <a:xfrm flipH="1" flipV="1">
+            <a:off x="2699792" y="1988840"/>
+            <a:ext cx="504056" cy="288032"/>
+          </a:xfrm>
+          <a:prstGeom prst="straightConnector1">
+            <a:avLst/>
+          </a:prstGeom>
+          <a:ln w="19050">
+            <a:solidFill>
+              <a:srgbClr val="C00000"/>
+            </a:solidFill>
+            <a:tailEnd type="triangle"/>
+          </a:ln>
+        </p:spPr>
+        <p:style>
+          <a:lnRef idx="1">
+            <a:schemeClr val="accent1"/>
+          </a:lnRef>
+          <a:fillRef idx="0">
+            <a:schemeClr val="accent1"/>
+          </a:fillRef>
+          <a:effectRef idx="0">
+            <a:schemeClr val="accent1"/>
+          </a:effectRef>
+          <a:fontRef idx="minor">
+            <a:schemeClr val="tx1"/>
+          </a:fontRef>
+        </p:style>
+      </p:cxnSp>
+      <p:sp>
+        <p:nvSpPr>
+          <p:cNvPr id="10" name="Textfeld 9"/>
+          <p:cNvSpPr txBox="1"/>
+          <p:nvPr/>
+        </p:nvSpPr>
+        <p:spPr>
+          <a:xfrm>
+            <a:off x="1979712" y="2996952"/>
+            <a:ext cx="1800200" cy="577081"/>
+          </a:xfrm>
+          <a:prstGeom prst="rect">
+            <a:avLst/>
+          </a:prstGeom>
+          <a:solidFill>
+            <a:schemeClr val="accent6">
+              <a:lumMod val="20000"/>
+              <a:lumOff val="80000"/>
+              <a:alpha val="76000"/>
+            </a:schemeClr>
+          </a:solidFill>
+        </p:spPr>
+        <p:txBody>
+          <a:bodyPr wrap="square" rtlCol="0">
+            <a:spAutoFit/>
+          </a:bodyPr>
+          <a:lstStyle/>
+          <a:p>
+            <a:r>
+              <a:rPr lang="en-US" sz="1050" b="1" dirty="0" smtClean="0">
+                <a:solidFill>
+                  <a:srgbClr val="C00000"/>
+                </a:solidFill>
+              </a:rPr>
+              <a:t>By clicking on a widget, its properties are displayed in the inspector </a:t>
+            </a:r>
+            <a:endParaRPr lang="en-US" sz="1050" b="1" dirty="0" smtClean="0">
+              <a:solidFill>
+                <a:srgbClr val="C00000"/>
+              </a:solidFill>
+            </a:endParaRPr>
+          </a:p>
+        </p:txBody>
+      </p:sp>
+      <p:cxnSp>
+        <p:nvCxnSpPr>
+          <p:cNvPr id="11" name="Gerade Verbindung mit Pfeil 10"/>
+          <p:cNvCxnSpPr/>
+          <p:nvPr/>
+        </p:nvCxnSpPr>
+        <p:spPr>
+          <a:xfrm flipH="1" flipV="1">
+            <a:off x="1043608" y="2204864"/>
+            <a:ext cx="864096" cy="792088"/>
+          </a:xfrm>
+          <a:prstGeom prst="straightConnector1">
+            <a:avLst/>
+          </a:prstGeom>
+          <a:ln w="19050">
+            <a:solidFill>
+              <a:srgbClr val="C00000"/>
+            </a:solidFill>
+            <a:tailEnd type="triangle"/>
+          </a:ln>
+        </p:spPr>
+        <p:style>
+          <a:lnRef idx="1">
+            <a:schemeClr val="accent1"/>
+          </a:lnRef>
+          <a:fillRef idx="0">
+            <a:schemeClr val="accent1"/>
+          </a:fillRef>
+          <a:effectRef idx="0">
+            <a:schemeClr val="accent1"/>
+          </a:effectRef>
+          <a:fontRef idx="minor">
+            <a:schemeClr val="tx1"/>
+          </a:fontRef>
+        </p:style>
+      </p:cxnSp>
+      <p:cxnSp>
+        <p:nvCxnSpPr>
+          <p:cNvPr id="13" name="Gerade Verbindung mit Pfeil 12"/>
+          <p:cNvCxnSpPr>
+            <a:stCxn id="10" idx="2"/>
+          </p:cNvCxnSpPr>
+          <p:nvPr/>
+        </p:nvCxnSpPr>
+        <p:spPr>
+          <a:xfrm flipH="1">
+            <a:off x="2483768" y="3574033"/>
+            <a:ext cx="396044" cy="503039"/>
+          </a:xfrm>
+          <a:prstGeom prst="straightConnector1">
+            <a:avLst/>
+          </a:prstGeom>
+          <a:ln w="19050">
+            <a:solidFill>
+              <a:srgbClr val="C00000"/>
+            </a:solidFill>
+            <a:tailEnd type="triangle"/>
+          </a:ln>
+        </p:spPr>
+        <p:style>
+          <a:lnRef idx="1">
+            <a:schemeClr val="accent1"/>
+          </a:lnRef>
+          <a:fillRef idx="0">
+            <a:schemeClr val="accent1"/>
+          </a:fillRef>
+          <a:effectRef idx="0">
+            <a:schemeClr val="accent1"/>
+          </a:effectRef>
+          <a:fontRef idx="minor">
+            <a:schemeClr val="tx1"/>
+          </a:fontRef>
+        </p:style>
+      </p:cxnSp>
+      <p:sp>
+        <p:nvSpPr>
+          <p:cNvPr id="16" name="Textfeld 15"/>
+          <p:cNvSpPr txBox="1"/>
+          <p:nvPr/>
+        </p:nvSpPr>
+        <p:spPr>
+          <a:xfrm>
+            <a:off x="6660232" y="4005064"/>
+            <a:ext cx="1800200" cy="415498"/>
+          </a:xfrm>
+          <a:prstGeom prst="rect">
+            <a:avLst/>
+          </a:prstGeom>
+          <a:solidFill>
+            <a:schemeClr val="accent6">
+              <a:lumMod val="20000"/>
+              <a:lumOff val="80000"/>
+              <a:alpha val="76000"/>
+            </a:schemeClr>
+          </a:solidFill>
+        </p:spPr>
+        <p:txBody>
+          <a:bodyPr wrap="square" rtlCol="0">
+            <a:spAutoFit/>
+          </a:bodyPr>
+          <a:lstStyle/>
+          <a:p>
+            <a:r>
+              <a:rPr lang="en-US" sz="1050" b="1" dirty="0" smtClean="0">
+                <a:solidFill>
+                  <a:srgbClr val="C00000"/>
+                </a:solidFill>
+              </a:rPr>
+              <a:t>Properties of widget include its size, color, text</a:t>
+            </a:r>
+            <a:endParaRPr lang="en-US" sz="1050" b="1" dirty="0" smtClean="0">
+              <a:solidFill>
+                <a:srgbClr val="C00000"/>
+              </a:solidFill>
+            </a:endParaRPr>
+          </a:p>
+        </p:txBody>
+      </p:sp>
+      <p:sp>
+        <p:nvSpPr>
+          <p:cNvPr id="17" name="Textfeld 16"/>
+          <p:cNvSpPr txBox="1"/>
+          <p:nvPr/>
+        </p:nvSpPr>
+        <p:spPr>
+          <a:xfrm>
+            <a:off x="6444208" y="4652119"/>
+            <a:ext cx="2304256" cy="900246"/>
+          </a:xfrm>
+          <a:prstGeom prst="rect">
+            <a:avLst/>
+          </a:prstGeom>
+          <a:solidFill>
+            <a:schemeClr val="accent6">
+              <a:lumMod val="20000"/>
+              <a:lumOff val="80000"/>
+              <a:alpha val="76000"/>
+            </a:schemeClr>
+          </a:solidFill>
+        </p:spPr>
+        <p:txBody>
+          <a:bodyPr wrap="square" rtlCol="0">
+            <a:spAutoFit/>
+          </a:bodyPr>
+          <a:lstStyle/>
+          <a:p>
+            <a:r>
+              <a:rPr lang="en-US" sz="1050" b="1" dirty="0" smtClean="0">
+                <a:solidFill>
+                  <a:srgbClr val="C00000"/>
+                </a:solidFill>
+              </a:rPr>
+              <a:t>Some properties can be modified dynamically based on the values of a simulation. How a simulation value should be reflected by the widget is specified via “adapters”.</a:t>
+            </a:r>
+            <a:endParaRPr lang="en-US" sz="1050" b="1" dirty="0" smtClean="0">
+              <a:solidFill>
+                <a:srgbClr val="C00000"/>
+              </a:solidFill>
+            </a:endParaRPr>
+          </a:p>
+        </p:txBody>
+      </p:sp>
+      <p:sp>
+        <p:nvSpPr>
+          <p:cNvPr id="18" name="Textfeld 17"/>
+          <p:cNvSpPr txBox="1"/>
+          <p:nvPr/>
+        </p:nvSpPr>
+        <p:spPr>
+          <a:xfrm>
+            <a:off x="3131840" y="5013176"/>
+            <a:ext cx="3024336" cy="415498"/>
+          </a:xfrm>
+          <a:prstGeom prst="rect">
+            <a:avLst/>
+          </a:prstGeom>
+          <a:solidFill>
+            <a:schemeClr val="accent6">
+              <a:lumMod val="20000"/>
+              <a:lumOff val="80000"/>
+              <a:alpha val="76000"/>
+            </a:schemeClr>
+          </a:solidFill>
+        </p:spPr>
+        <p:txBody>
+          <a:bodyPr wrap="square" rtlCol="0">
+            <a:spAutoFit/>
+          </a:bodyPr>
+          <a:lstStyle/>
+          <a:p>
+            <a:r>
+              <a:rPr lang="en-US" sz="1050" b="1" dirty="0" smtClean="0">
+                <a:solidFill>
+                  <a:srgbClr val="C00000"/>
+                </a:solidFill>
+              </a:rPr>
+              <a:t>Adapter linking the current value of the “</a:t>
+            </a:r>
+            <a:r>
+              <a:rPr lang="en-US" sz="1050" b="1" dirty="0" err="1" smtClean="0">
+                <a:solidFill>
+                  <a:srgbClr val="C00000"/>
+                </a:solidFill>
+              </a:rPr>
+              <a:t>trafficSignal</a:t>
+            </a:r>
+            <a:r>
+              <a:rPr lang="en-US" sz="1050" b="1" dirty="0" smtClean="0">
+                <a:solidFill>
+                  <a:srgbClr val="C00000"/>
+                </a:solidFill>
+              </a:rPr>
+              <a:t>” define with the color of the widget.</a:t>
+            </a:r>
+            <a:endParaRPr lang="en-US" sz="1050" b="1" dirty="0" smtClean="0">
+              <a:solidFill>
+                <a:srgbClr val="C00000"/>
+              </a:solidFill>
+            </a:endParaRPr>
+          </a:p>
+        </p:txBody>
+      </p:sp>
+      <p:cxnSp>
+        <p:nvCxnSpPr>
+          <p:cNvPr id="19" name="Gerade Verbindung mit Pfeil 18"/>
+          <p:cNvCxnSpPr/>
+          <p:nvPr/>
+        </p:nvCxnSpPr>
+        <p:spPr>
+          <a:xfrm flipH="1" flipV="1">
+            <a:off x="3779912" y="4653136"/>
+            <a:ext cx="720080" cy="360040"/>
+          </a:xfrm>
+          <a:prstGeom prst="straightConnector1">
+            <a:avLst/>
+          </a:prstGeom>
+          <a:ln w="19050">
+            <a:solidFill>
+              <a:srgbClr val="C00000"/>
+            </a:solidFill>
+            <a:tailEnd type="triangle"/>
+          </a:ln>
+        </p:spPr>
+        <p:style>
+          <a:lnRef idx="1">
+            <a:schemeClr val="accent1"/>
+          </a:lnRef>
+          <a:fillRef idx="0">
+            <a:schemeClr val="accent1"/>
+          </a:fillRef>
+          <a:effectRef idx="0">
+            <a:schemeClr val="accent1"/>
+          </a:effectRef>
+          <a:fontRef idx="minor">
+            <a:schemeClr val="tx1"/>
+          </a:fontRef>
+        </p:style>
+      </p:cxnSp>
+      <p:cxnSp>
+        <p:nvCxnSpPr>
+          <p:cNvPr id="22" name="Gerade Verbindung mit Pfeil 21"/>
+          <p:cNvCxnSpPr/>
+          <p:nvPr/>
+        </p:nvCxnSpPr>
+        <p:spPr>
+          <a:xfrm flipV="1">
+            <a:off x="5004048" y="1628800"/>
+            <a:ext cx="432048" cy="3384376"/>
+          </a:xfrm>
+          <a:prstGeom prst="straightConnector1">
+            <a:avLst/>
+          </a:prstGeom>
+          <a:ln w="19050">
+            <a:solidFill>
+              <a:srgbClr val="C00000"/>
+            </a:solidFill>
+            <a:tailEnd type="triangle"/>
+          </a:ln>
+        </p:spPr>
+        <p:style>
+          <a:lnRef idx="1">
+            <a:schemeClr val="accent1"/>
+          </a:lnRef>
+          <a:fillRef idx="0">
+            <a:schemeClr val="accent1"/>
+          </a:fillRef>
+          <a:effectRef idx="0">
+            <a:schemeClr val="accent1"/>
+          </a:effectRef>
+          <a:fontRef idx="minor">
+            <a:schemeClr val="tx1"/>
+          </a:fontRef>
+        </p:style>
+      </p:cxnSp>
+    </p:spTree>
+  </p:cSld>
+  <p:clrMapOvr>
+    <a:masterClrMapping/>
+  </p:clrMapOvr>
+</p:sld>
+</file>
+
 <file path=ppt/slides/slide2.xml><?xml version="1.0" encoding="utf-8"?>
 <p:sld xmlns:a="http://schemas.openxmlformats.org/drawingml/2006/main" xmlns:r="http://schemas.openxmlformats.org/officeDocument/2006/relationships" xmlns:p="http://schemas.openxmlformats.org/presentationml/2006/main">
   <p:cSld>
@@ -5591,21 +6111,8 @@
                     <a:srgbClr val="C00000"/>
                   </a:solidFill>
                 </a:rPr>
-                <a:t>o</a:t>
+                <a:t>outputs definition</a:t>
               </a:r>
-              <a:r>
-                <a:rPr lang="en-US" sz="1050" b="1" dirty="0" smtClean="0">
-                  <a:solidFill>
-                    <a:srgbClr val="C00000"/>
-                  </a:solidFill>
-                </a:rPr>
-                <a:t>utputs definition</a:t>
-              </a:r>
-              <a:endParaRPr lang="en-US" sz="1050" b="1" dirty="0" smtClean="0">
-                <a:solidFill>
-                  <a:srgbClr val="C00000"/>
-                </a:solidFill>
-              </a:endParaRPr>
             </a:p>
           </p:txBody>
         </p:sp>
@@ -5731,15 +6238,7 @@
                     <a:srgbClr val="C00000"/>
                   </a:solidFill>
                 </a:rPr>
-                <a:t>only function results marked as ‘o</a:t>
-              </a:r>
-              <a:r>
-                <a:rPr lang="en-US" sz="1050" b="1" dirty="0" smtClean="0">
-                  <a:solidFill>
-                    <a:srgbClr val="C00000"/>
-                  </a:solidFill>
-                </a:rPr>
-                <a:t>utputs‘ are</a:t>
+                <a:t>only function results marked as ‘outputs‘ are</a:t>
               </a:r>
             </a:p>
             <a:p>
@@ -5750,21 +6249,8 @@
                     <a:srgbClr val="C00000"/>
                   </a:solidFill>
                 </a:rPr>
-                <a:t>a</a:t>
+                <a:t>available as output ports</a:t>
               </a:r>
-              <a:r>
-                <a:rPr lang="en-US" sz="1050" b="1" dirty="0" smtClean="0">
-                  <a:solidFill>
-                    <a:srgbClr val="C00000"/>
-                  </a:solidFill>
-                </a:rPr>
-                <a:t>vailable as output ports</a:t>
-              </a:r>
-              <a:endParaRPr lang="en-US" sz="1050" b="1" dirty="0" smtClean="0">
-                <a:solidFill>
-                  <a:srgbClr val="C00000"/>
-                </a:solidFill>
-              </a:endParaRPr>
             </a:p>
           </p:txBody>
         </p:sp>

</xml_diff>

<commit_message>
nusmv tutorial: added tutorial for operator-panels and importer
</commit_message>
<xml_diff>
--- a/code/tutorial/solutions/com.mbeddr.formal.nusmv.users_guide/figures/figures.pptx
+++ b/code/tutorial/solutions/com.mbeddr.formal.nusmv.users_guide/figures/figures.pptx
@@ -5,7 +5,7 @@
     <p:sldMasterId id="2147483648" r:id="rId1"/>
   </p:sldMasterIdLst>
   <p:notesMasterIdLst>
-    <p:notesMasterId r:id="rId14"/>
+    <p:notesMasterId r:id="rId15"/>
   </p:notesMasterIdLst>
   <p:sldIdLst>
     <p:sldId id="256" r:id="rId2"/>
@@ -20,6 +20,7 @@
     <p:sldId id="261" r:id="rId11"/>
     <p:sldId id="262" r:id="rId12"/>
     <p:sldId id="267" r:id="rId13"/>
+    <p:sldId id="268" r:id="rId14"/>
   </p:sldIdLst>
   <p:sldSz cx="9144000" cy="6858000" type="screen4x3"/>
   <p:notesSz cx="6858000" cy="9144000"/>
@@ -204,7 +205,7 @@
             <a:fld id="{11812C92-0668-408F-AE44-47ECD1C69BA6}" type="datetimeFigureOut">
               <a:rPr lang="en-US" smtClean="0"/>
               <a:pPr/>
-              <a:t>6/21/2018</a:t>
+              <a:t>6/27/2018</a:t>
             </a:fld>
             <a:endParaRPr lang="en-US"/>
           </a:p>
@@ -734,7 +735,7 @@
             <a:fld id="{1BA50D42-C9CD-4801-B293-61D1F53EC57E}" type="datetimeFigureOut">
               <a:rPr lang="de-DE" smtClean="0"/>
               <a:pPr/>
-              <a:t>21.06.2018</a:t>
+              <a:t>27.06.2018</a:t>
             </a:fld>
             <a:endParaRPr lang="de-DE"/>
           </a:p>
@@ -901,7 +902,7 @@
             <a:fld id="{1BA50D42-C9CD-4801-B293-61D1F53EC57E}" type="datetimeFigureOut">
               <a:rPr lang="de-DE" smtClean="0"/>
               <a:pPr/>
-              <a:t>21.06.2018</a:t>
+              <a:t>27.06.2018</a:t>
             </a:fld>
             <a:endParaRPr lang="de-DE"/>
           </a:p>
@@ -1078,7 +1079,7 @@
             <a:fld id="{1BA50D42-C9CD-4801-B293-61D1F53EC57E}" type="datetimeFigureOut">
               <a:rPr lang="de-DE" smtClean="0"/>
               <a:pPr/>
-              <a:t>21.06.2018</a:t>
+              <a:t>27.06.2018</a:t>
             </a:fld>
             <a:endParaRPr lang="de-DE"/>
           </a:p>
@@ -1245,7 +1246,7 @@
             <a:fld id="{1BA50D42-C9CD-4801-B293-61D1F53EC57E}" type="datetimeFigureOut">
               <a:rPr lang="de-DE" smtClean="0"/>
               <a:pPr/>
-              <a:t>21.06.2018</a:t>
+              <a:t>27.06.2018</a:t>
             </a:fld>
             <a:endParaRPr lang="de-DE"/>
           </a:p>
@@ -1488,7 +1489,7 @@
             <a:fld id="{1BA50D42-C9CD-4801-B293-61D1F53EC57E}" type="datetimeFigureOut">
               <a:rPr lang="de-DE" smtClean="0"/>
               <a:pPr/>
-              <a:t>21.06.2018</a:t>
+              <a:t>27.06.2018</a:t>
             </a:fld>
             <a:endParaRPr lang="de-DE"/>
           </a:p>
@@ -1773,7 +1774,7 @@
             <a:fld id="{1BA50D42-C9CD-4801-B293-61D1F53EC57E}" type="datetimeFigureOut">
               <a:rPr lang="de-DE" smtClean="0"/>
               <a:pPr/>
-              <a:t>21.06.2018</a:t>
+              <a:t>27.06.2018</a:t>
             </a:fld>
             <a:endParaRPr lang="de-DE"/>
           </a:p>
@@ -2192,7 +2193,7 @@
             <a:fld id="{1BA50D42-C9CD-4801-B293-61D1F53EC57E}" type="datetimeFigureOut">
               <a:rPr lang="de-DE" smtClean="0"/>
               <a:pPr/>
-              <a:t>21.06.2018</a:t>
+              <a:t>27.06.2018</a:t>
             </a:fld>
             <a:endParaRPr lang="de-DE"/>
           </a:p>
@@ -2307,7 +2308,7 @@
             <a:fld id="{1BA50D42-C9CD-4801-B293-61D1F53EC57E}" type="datetimeFigureOut">
               <a:rPr lang="de-DE" smtClean="0"/>
               <a:pPr/>
-              <a:t>21.06.2018</a:t>
+              <a:t>27.06.2018</a:t>
             </a:fld>
             <a:endParaRPr lang="de-DE"/>
           </a:p>
@@ -2399,7 +2400,7 @@
             <a:fld id="{1BA50D42-C9CD-4801-B293-61D1F53EC57E}" type="datetimeFigureOut">
               <a:rPr lang="de-DE" smtClean="0"/>
               <a:pPr/>
-              <a:t>21.06.2018</a:t>
+              <a:t>27.06.2018</a:t>
             </a:fld>
             <a:endParaRPr lang="de-DE"/>
           </a:p>
@@ -2673,7 +2674,7 @@
             <a:fld id="{1BA50D42-C9CD-4801-B293-61D1F53EC57E}" type="datetimeFigureOut">
               <a:rPr lang="de-DE" smtClean="0"/>
               <a:pPr/>
-              <a:t>21.06.2018</a:t>
+              <a:t>27.06.2018</a:t>
             </a:fld>
             <a:endParaRPr lang="de-DE"/>
           </a:p>
@@ -2923,7 +2924,7 @@
             <a:fld id="{1BA50D42-C9CD-4801-B293-61D1F53EC57E}" type="datetimeFigureOut">
               <a:rPr lang="de-DE" smtClean="0"/>
               <a:pPr/>
-              <a:t>21.06.2018</a:t>
+              <a:t>27.06.2018</a:t>
             </a:fld>
             <a:endParaRPr lang="de-DE"/>
           </a:p>
@@ -3133,7 +3134,7 @@
             <a:fld id="{1BA50D42-C9CD-4801-B293-61D1F53EC57E}" type="datetimeFigureOut">
               <a:rPr lang="de-DE" smtClean="0"/>
               <a:pPr/>
-              <a:t>21.06.2018</a:t>
+              <a:t>27.06.2018</a:t>
             </a:fld>
             <a:endParaRPr lang="de-DE"/>
           </a:p>
@@ -4647,21 +4648,8 @@
                   <a:srgbClr val="C00000"/>
                 </a:solidFill>
               </a:rPr>
-              <a:t>g</a:t>
-            </a:r>
-            <a:r>
-              <a:rPr lang="en-US" sz="1050" b="1" dirty="0" smtClean="0">
-                <a:solidFill>
-                  <a:srgbClr val="C00000"/>
-                </a:solidFill>
-              </a:rPr>
-              <a:t>raphical widgets</a:t>
-            </a:r>
-            <a:endParaRPr lang="en-US" sz="1050" b="1" dirty="0" smtClean="0">
-              <a:solidFill>
-                <a:srgbClr val="C00000"/>
-              </a:solidFill>
-            </a:endParaRPr>
+              <a:t>graphical widgets</a:t>
+            </a:r>
           </a:p>
         </p:txBody>
       </p:sp>
@@ -4773,11 +4761,6 @@
               </a:rPr>
               <a:t>By clicking on a widget, its properties are displayed in the inspector </a:t>
             </a:r>
-            <a:endParaRPr lang="en-US" sz="1050" b="1" dirty="0" smtClean="0">
-              <a:solidFill>
-                <a:srgbClr val="C00000"/>
-              </a:solidFill>
-            </a:endParaRPr>
           </a:p>
         </p:txBody>
       </p:sp>
@@ -4863,8 +4846,8 @@
         </p:nvSpPr>
         <p:spPr>
           <a:xfrm>
-            <a:off x="6660232" y="4005064"/>
-            <a:ext cx="1800200" cy="415498"/>
+            <a:off x="4283968" y="4005064"/>
+            <a:ext cx="3096344" cy="253916"/>
           </a:xfrm>
           <a:prstGeom prst="rect">
             <a:avLst/>
@@ -4889,13 +4872,8 @@
                   <a:srgbClr val="C00000"/>
                 </a:solidFill>
               </a:rPr>
-              <a:t>Properties of widget include its size, color, text</a:t>
-            </a:r>
-            <a:endParaRPr lang="en-US" sz="1050" b="1" dirty="0" smtClean="0">
-              <a:solidFill>
-                <a:srgbClr val="C00000"/>
-              </a:solidFill>
-            </a:endParaRPr>
+              <a:t>Properties of widget include its size, color, text, …</a:t>
+            </a:r>
           </a:p>
         </p:txBody>
       </p:sp>
@@ -4907,7 +4885,7 @@
         </p:nvSpPr>
         <p:spPr>
           <a:xfrm>
-            <a:off x="6444208" y="4652119"/>
+            <a:off x="6516216" y="4544978"/>
             <a:ext cx="2304256" cy="900246"/>
           </a:xfrm>
           <a:prstGeom prst="rect">
@@ -4933,13 +4911,8 @@
                   <a:srgbClr val="C00000"/>
                 </a:solidFill>
               </a:rPr>
-              <a:t>Some properties can be modified dynamically based on the values of a simulation. How a simulation value should be reflected by the widget is specified via “adapters”.</a:t>
-            </a:r>
-            <a:endParaRPr lang="en-US" sz="1050" b="1" dirty="0" smtClean="0">
-              <a:solidFill>
-                <a:srgbClr val="C00000"/>
-              </a:solidFill>
-            </a:endParaRPr>
+              <a:t>Some properties can be modified dynamically based on the values of a simulation. “Adapters” specify how a simulation value should be reflected by the widget.</a:t>
+            </a:r>
           </a:p>
         </p:txBody>
       </p:sp>
@@ -4951,8 +4924,8 @@
         </p:nvSpPr>
         <p:spPr>
           <a:xfrm>
-            <a:off x="3131840" y="5013176"/>
-            <a:ext cx="3024336" cy="415498"/>
+            <a:off x="1115616" y="5229200"/>
+            <a:ext cx="5112568" cy="253916"/>
           </a:xfrm>
           <a:prstGeom prst="rect">
             <a:avLst/>
@@ -4977,7 +4950,7 @@
                   <a:srgbClr val="C00000"/>
                 </a:solidFill>
               </a:rPr>
-              <a:t>Adapter linking the current value of the “</a:t>
+              <a:t>Adapter from  the current value of the “</a:t>
             </a:r>
             <a:r>
               <a:rPr lang="en-US" sz="1050" b="1" dirty="0" err="1" smtClean="0">
@@ -4993,13 +4966,8 @@
                   <a:srgbClr val="C00000"/>
                 </a:solidFill>
               </a:rPr>
-              <a:t>” define with the color of the widget.</a:t>
-            </a:r>
-            <a:endParaRPr lang="en-US" sz="1050" b="1" dirty="0" smtClean="0">
-              <a:solidFill>
-                <a:srgbClr val="C00000"/>
-              </a:solidFill>
-            </a:endParaRPr>
+              <a:t> define” to the color of the widget.</a:t>
+            </a:r>
           </a:p>
         </p:txBody>
       </p:sp>
@@ -5011,8 +4979,8 @@
         </p:nvCxnSpPr>
         <p:spPr>
           <a:xfrm flipH="1" flipV="1">
-            <a:off x="3779912" y="4653136"/>
-            <a:ext cx="720080" cy="360040"/>
+            <a:off x="3275856" y="4653136"/>
+            <a:ext cx="432048" cy="504056"/>
           </a:xfrm>
           <a:prstGeom prst="straightConnector1">
             <a:avLst/>
@@ -5047,8 +5015,376 @@
         </p:nvCxnSpPr>
         <p:spPr>
           <a:xfrm flipV="1">
-            <a:off x="5004048" y="1628800"/>
-            <a:ext cx="432048" cy="3384376"/>
+            <a:off x="3491880" y="1628800"/>
+            <a:ext cx="1944216" cy="2880320"/>
+          </a:xfrm>
+          <a:prstGeom prst="straightConnector1">
+            <a:avLst/>
+          </a:prstGeom>
+          <a:ln w="19050">
+            <a:solidFill>
+              <a:srgbClr val="C00000"/>
+            </a:solidFill>
+            <a:tailEnd type="triangle"/>
+          </a:ln>
+        </p:spPr>
+        <p:style>
+          <a:lnRef idx="1">
+            <a:schemeClr val="accent1"/>
+          </a:lnRef>
+          <a:fillRef idx="0">
+            <a:schemeClr val="accent1"/>
+          </a:fillRef>
+          <a:effectRef idx="0">
+            <a:schemeClr val="accent1"/>
+          </a:effectRef>
+          <a:fontRef idx="minor">
+            <a:schemeClr val="tx1"/>
+          </a:fontRef>
+        </p:style>
+      </p:cxnSp>
+      <p:sp>
+        <p:nvSpPr>
+          <p:cNvPr id="25" name="Geschweifte Klammer rechts 24"/>
+          <p:cNvSpPr/>
+          <p:nvPr/>
+        </p:nvSpPr>
+        <p:spPr>
+          <a:xfrm>
+            <a:off x="6300192" y="4509120"/>
+            <a:ext cx="144016" cy="1008112"/>
+          </a:xfrm>
+          <a:prstGeom prst="rightBrace">
+            <a:avLst/>
+          </a:prstGeom>
+        </p:spPr>
+        <p:style>
+          <a:lnRef idx="1">
+            <a:schemeClr val="accent1"/>
+          </a:lnRef>
+          <a:fillRef idx="0">
+            <a:schemeClr val="accent1"/>
+          </a:fillRef>
+          <a:effectRef idx="0">
+            <a:schemeClr val="accent1"/>
+          </a:effectRef>
+          <a:fontRef idx="minor">
+            <a:schemeClr val="tx1"/>
+          </a:fontRef>
+        </p:style>
+        <p:txBody>
+          <a:bodyPr rtlCol="0" anchor="ctr"/>
+          <a:lstStyle/>
+          <a:p>
+            <a:pPr algn="ctr"/>
+            <a:endParaRPr lang="en-US"/>
+          </a:p>
+        </p:txBody>
+      </p:sp>
+      <p:cxnSp>
+        <p:nvCxnSpPr>
+          <p:cNvPr id="29" name="Gerade Verbindung mit Pfeil 28"/>
+          <p:cNvCxnSpPr/>
+          <p:nvPr/>
+        </p:nvCxnSpPr>
+        <p:spPr>
+          <a:xfrm flipV="1">
+            <a:off x="5076056" y="5013176"/>
+            <a:ext cx="720080" cy="216024"/>
+          </a:xfrm>
+          <a:prstGeom prst="straightConnector1">
+            <a:avLst/>
+          </a:prstGeom>
+          <a:ln w="19050">
+            <a:solidFill>
+              <a:srgbClr val="C00000"/>
+            </a:solidFill>
+            <a:tailEnd type="triangle"/>
+          </a:ln>
+        </p:spPr>
+        <p:style>
+          <a:lnRef idx="1">
+            <a:schemeClr val="accent1"/>
+          </a:lnRef>
+          <a:fillRef idx="0">
+            <a:schemeClr val="accent1"/>
+          </a:fillRef>
+          <a:effectRef idx="0">
+            <a:schemeClr val="accent1"/>
+          </a:effectRef>
+          <a:fontRef idx="minor">
+            <a:schemeClr val="tx1"/>
+          </a:fontRef>
+        </p:style>
+      </p:cxnSp>
+      <p:sp>
+        <p:nvSpPr>
+          <p:cNvPr id="31" name="Textfeld 30"/>
+          <p:cNvSpPr txBox="1"/>
+          <p:nvPr/>
+        </p:nvSpPr>
+        <p:spPr>
+          <a:xfrm>
+            <a:off x="1403648" y="404664"/>
+            <a:ext cx="3096344" cy="253916"/>
+          </a:xfrm>
+          <a:prstGeom prst="rect">
+            <a:avLst/>
+          </a:prstGeom>
+          <a:solidFill>
+            <a:schemeClr val="accent6">
+              <a:lumMod val="20000"/>
+              <a:lumOff val="80000"/>
+              <a:alpha val="76000"/>
+            </a:schemeClr>
+          </a:solidFill>
+        </p:spPr>
+        <p:txBody>
+          <a:bodyPr wrap="square" rtlCol="0">
+            <a:spAutoFit/>
+          </a:bodyPr>
+          <a:lstStyle/>
+          <a:p>
+            <a:r>
+              <a:rPr lang="en-US" sz="1050" b="1" dirty="0" smtClean="0">
+                <a:solidFill>
+                  <a:srgbClr val="C00000"/>
+                </a:solidFill>
+              </a:rPr>
+              <a:t>Adapters must be re-loaded by pressing this button</a:t>
+            </a:r>
+          </a:p>
+        </p:txBody>
+      </p:sp>
+      <p:cxnSp>
+        <p:nvCxnSpPr>
+          <p:cNvPr id="32" name="Gerade Verbindung mit Pfeil 31"/>
+          <p:cNvCxnSpPr/>
+          <p:nvPr/>
+        </p:nvCxnSpPr>
+        <p:spPr>
+          <a:xfrm flipH="1">
+            <a:off x="2987824" y="692696"/>
+            <a:ext cx="72008" cy="288032"/>
+          </a:xfrm>
+          <a:prstGeom prst="straightConnector1">
+            <a:avLst/>
+          </a:prstGeom>
+          <a:ln w="19050">
+            <a:solidFill>
+              <a:srgbClr val="C00000"/>
+            </a:solidFill>
+            <a:tailEnd type="triangle"/>
+          </a:ln>
+        </p:spPr>
+        <p:style>
+          <a:lnRef idx="1">
+            <a:schemeClr val="accent1"/>
+          </a:lnRef>
+          <a:fillRef idx="0">
+            <a:schemeClr val="accent1"/>
+          </a:fillRef>
+          <a:effectRef idx="0">
+            <a:schemeClr val="accent1"/>
+          </a:effectRef>
+          <a:fontRef idx="minor">
+            <a:schemeClr val="tx1"/>
+          </a:fontRef>
+        </p:style>
+      </p:cxnSp>
+    </p:spTree>
+  </p:cSld>
+  <p:clrMapOvr>
+    <a:masterClrMapping/>
+  </p:clrMapOvr>
+</p:sld>
+</file>
+
+<file path=ppt/slides/slide13.xml><?xml version="1.0" encoding="utf-8"?>
+<p:sld xmlns:a="http://schemas.openxmlformats.org/drawingml/2006/main" xmlns:r="http://schemas.openxmlformats.org/officeDocument/2006/relationships" xmlns:p="http://schemas.openxmlformats.org/presentationml/2006/main">
+  <p:cSld>
+    <p:spTree>
+      <p:nvGrpSpPr>
+        <p:cNvPr id="1" name=""/>
+        <p:cNvGrpSpPr/>
+        <p:nvPr/>
+      </p:nvGrpSpPr>
+      <p:grpSpPr>
+        <a:xfrm>
+          <a:off x="0" y="0"/>
+          <a:ext cx="0" cy="0"/>
+          <a:chOff x="0" y="0"/>
+          <a:chExt cx="0" cy="0"/>
+        </a:xfrm>
+      </p:grpSpPr>
+      <p:pic>
+        <p:nvPicPr>
+          <p:cNvPr id="2050" name="Picture 2"/>
+          <p:cNvPicPr>
+            <a:picLocks noChangeAspect="1" noChangeArrowheads="1"/>
+          </p:cNvPicPr>
+          <p:nvPr/>
+        </p:nvPicPr>
+        <p:blipFill>
+          <a:blip r:embed="rId2" cstate="print"/>
+          <a:srcRect l="21262" t="8400" r="35032" b="58001"/>
+          <a:stretch>
+            <a:fillRect/>
+          </a:stretch>
+        </p:blipFill>
+        <p:spPr bwMode="auto">
+          <a:xfrm>
+            <a:off x="1979712" y="908720"/>
+            <a:ext cx="5328592" cy="2304256"/>
+          </a:xfrm>
+          <a:prstGeom prst="rect">
+            <a:avLst/>
+          </a:prstGeom>
+          <a:noFill/>
+          <a:ln w="9525">
+            <a:noFill/>
+            <a:miter lim="800000"/>
+            <a:headEnd/>
+            <a:tailEnd/>
+          </a:ln>
+        </p:spPr>
+      </p:pic>
+      <p:sp>
+        <p:nvSpPr>
+          <p:cNvPr id="5" name="Textfeld 4"/>
+          <p:cNvSpPr txBox="1"/>
+          <p:nvPr/>
+        </p:nvSpPr>
+        <p:spPr>
+          <a:xfrm>
+            <a:off x="5292080" y="2204864"/>
+            <a:ext cx="1944216" cy="738664"/>
+          </a:xfrm>
+          <a:prstGeom prst="rect">
+            <a:avLst/>
+          </a:prstGeom>
+          <a:solidFill>
+            <a:schemeClr val="accent6">
+              <a:lumMod val="20000"/>
+              <a:lumOff val="80000"/>
+              <a:alpha val="76000"/>
+            </a:schemeClr>
+          </a:solidFill>
+        </p:spPr>
+        <p:txBody>
+          <a:bodyPr wrap="square" rtlCol="0">
+            <a:spAutoFit/>
+          </a:bodyPr>
+          <a:lstStyle/>
+          <a:p>
+            <a:r>
+              <a:rPr lang="en-US" sz="1050" b="1" dirty="0" smtClean="0">
+                <a:solidFill>
+                  <a:srgbClr val="C00000"/>
+                </a:solidFill>
+              </a:rPr>
+              <a:t>By clicking on a widget, and opening the intention menu, one can add left or right siblings</a:t>
+            </a:r>
+          </a:p>
+        </p:txBody>
+      </p:sp>
+      <p:cxnSp>
+        <p:nvCxnSpPr>
+          <p:cNvPr id="6" name="Gerade Verbindung mit Pfeil 5"/>
+          <p:cNvCxnSpPr/>
+          <p:nvPr/>
+        </p:nvCxnSpPr>
+        <p:spPr>
+          <a:xfrm flipH="1" flipV="1">
+            <a:off x="6012160" y="1556792"/>
+            <a:ext cx="864096" cy="648072"/>
+          </a:xfrm>
+          <a:prstGeom prst="straightConnector1">
+            <a:avLst/>
+          </a:prstGeom>
+          <a:ln w="19050">
+            <a:solidFill>
+              <a:srgbClr val="C00000"/>
+            </a:solidFill>
+            <a:tailEnd type="triangle"/>
+          </a:ln>
+        </p:spPr>
+        <p:style>
+          <a:lnRef idx="1">
+            <a:schemeClr val="accent1"/>
+          </a:lnRef>
+          <a:fillRef idx="0">
+            <a:schemeClr val="accent1"/>
+          </a:fillRef>
+          <a:effectRef idx="0">
+            <a:schemeClr val="accent1"/>
+          </a:effectRef>
+          <a:fontRef idx="minor">
+            <a:schemeClr val="tx1"/>
+          </a:fontRef>
+        </p:style>
+      </p:cxnSp>
+      <p:sp>
+        <p:nvSpPr>
+          <p:cNvPr id="8" name="Textfeld 7"/>
+          <p:cNvSpPr txBox="1"/>
+          <p:nvPr/>
+        </p:nvSpPr>
+        <p:spPr>
+          <a:xfrm>
+            <a:off x="3995936" y="1772816"/>
+            <a:ext cx="576064" cy="415498"/>
+          </a:xfrm>
+          <a:prstGeom prst="rect">
+            <a:avLst/>
+          </a:prstGeom>
+          <a:solidFill>
+            <a:schemeClr val="accent6">
+              <a:lumMod val="20000"/>
+              <a:lumOff val="80000"/>
+              <a:alpha val="76000"/>
+            </a:schemeClr>
+          </a:solidFill>
+        </p:spPr>
+        <p:txBody>
+          <a:bodyPr wrap="square" rtlCol="0">
+            <a:spAutoFit/>
+          </a:bodyPr>
+          <a:lstStyle/>
+          <a:p>
+            <a:pPr algn="ctr"/>
+            <a:r>
+              <a:rPr lang="en-US" sz="1050" b="1" dirty="0" smtClean="0">
+                <a:solidFill>
+                  <a:srgbClr val="C00000"/>
+                </a:solidFill>
+              </a:rPr>
+              <a:t>New </a:t>
+            </a:r>
+          </a:p>
+          <a:p>
+            <a:pPr algn="ctr"/>
+            <a:r>
+              <a:rPr lang="en-US" sz="1050" b="1" dirty="0" smtClean="0">
+                <a:solidFill>
+                  <a:srgbClr val="C00000"/>
+                </a:solidFill>
+              </a:rPr>
+              <a:t>sibling</a:t>
+            </a:r>
+          </a:p>
+        </p:txBody>
+      </p:sp>
+      <p:cxnSp>
+        <p:nvCxnSpPr>
+          <p:cNvPr id="9" name="Gerade Verbindung mit Pfeil 8"/>
+          <p:cNvCxnSpPr/>
+          <p:nvPr/>
+        </p:nvCxnSpPr>
+        <p:spPr>
+          <a:xfrm flipV="1">
+            <a:off x="4283968" y="1484784"/>
+            <a:ext cx="144016" cy="288032"/>
           </a:xfrm>
           <a:prstGeom prst="straightConnector1">
             <a:avLst/>

</xml_diff>

<commit_message>
tutorial: added docu and example about the CBD
</commit_message>
<xml_diff>
--- a/code/tutorial/solutions/com.mbeddr.formal.nusmv.users_guide/figures/figures.pptx
+++ b/code/tutorial/solutions/com.mbeddr.formal.nusmv.users_guide/figures/figures.pptx
@@ -5,7 +5,7 @@
     <p:sldMasterId id="2147483648" r:id="rId1"/>
   </p:sldMasterIdLst>
   <p:notesMasterIdLst>
-    <p:notesMasterId r:id="rId15"/>
+    <p:notesMasterId r:id="rId17"/>
   </p:notesMasterIdLst>
   <p:sldIdLst>
     <p:sldId id="256" r:id="rId2"/>
@@ -21,6 +21,8 @@
     <p:sldId id="262" r:id="rId12"/>
     <p:sldId id="267" r:id="rId13"/>
     <p:sldId id="268" r:id="rId14"/>
+    <p:sldId id="269" r:id="rId15"/>
+    <p:sldId id="271" r:id="rId16"/>
   </p:sldIdLst>
   <p:sldSz cx="9144000" cy="6858000" type="screen4x3"/>
   <p:notesSz cx="6858000" cy="9144000"/>
@@ -205,7 +207,7 @@
             <a:fld id="{11812C92-0668-408F-AE44-47ECD1C69BA6}" type="datetimeFigureOut">
               <a:rPr lang="en-US" smtClean="0"/>
               <a:pPr/>
-              <a:t>6/27/2018</a:t>
+              <a:t>9/6/2018</a:t>
             </a:fld>
             <a:endParaRPr lang="en-US"/>
           </a:p>
@@ -735,7 +737,7 @@
             <a:fld id="{1BA50D42-C9CD-4801-B293-61D1F53EC57E}" type="datetimeFigureOut">
               <a:rPr lang="de-DE" smtClean="0"/>
               <a:pPr/>
-              <a:t>27.06.2018</a:t>
+              <a:t>06.09.2018</a:t>
             </a:fld>
             <a:endParaRPr lang="de-DE"/>
           </a:p>
@@ -902,7 +904,7 @@
             <a:fld id="{1BA50D42-C9CD-4801-B293-61D1F53EC57E}" type="datetimeFigureOut">
               <a:rPr lang="de-DE" smtClean="0"/>
               <a:pPr/>
-              <a:t>27.06.2018</a:t>
+              <a:t>06.09.2018</a:t>
             </a:fld>
             <a:endParaRPr lang="de-DE"/>
           </a:p>
@@ -1079,7 +1081,7 @@
             <a:fld id="{1BA50D42-C9CD-4801-B293-61D1F53EC57E}" type="datetimeFigureOut">
               <a:rPr lang="de-DE" smtClean="0"/>
               <a:pPr/>
-              <a:t>27.06.2018</a:t>
+              <a:t>06.09.2018</a:t>
             </a:fld>
             <a:endParaRPr lang="de-DE"/>
           </a:p>
@@ -1246,7 +1248,7 @@
             <a:fld id="{1BA50D42-C9CD-4801-B293-61D1F53EC57E}" type="datetimeFigureOut">
               <a:rPr lang="de-DE" smtClean="0"/>
               <a:pPr/>
-              <a:t>27.06.2018</a:t>
+              <a:t>06.09.2018</a:t>
             </a:fld>
             <a:endParaRPr lang="de-DE"/>
           </a:p>
@@ -1489,7 +1491,7 @@
             <a:fld id="{1BA50D42-C9CD-4801-B293-61D1F53EC57E}" type="datetimeFigureOut">
               <a:rPr lang="de-DE" smtClean="0"/>
               <a:pPr/>
-              <a:t>27.06.2018</a:t>
+              <a:t>06.09.2018</a:t>
             </a:fld>
             <a:endParaRPr lang="de-DE"/>
           </a:p>
@@ -1774,7 +1776,7 @@
             <a:fld id="{1BA50D42-C9CD-4801-B293-61D1F53EC57E}" type="datetimeFigureOut">
               <a:rPr lang="de-DE" smtClean="0"/>
               <a:pPr/>
-              <a:t>27.06.2018</a:t>
+              <a:t>06.09.2018</a:t>
             </a:fld>
             <a:endParaRPr lang="de-DE"/>
           </a:p>
@@ -2193,7 +2195,7 @@
             <a:fld id="{1BA50D42-C9CD-4801-B293-61D1F53EC57E}" type="datetimeFigureOut">
               <a:rPr lang="de-DE" smtClean="0"/>
               <a:pPr/>
-              <a:t>27.06.2018</a:t>
+              <a:t>06.09.2018</a:t>
             </a:fld>
             <a:endParaRPr lang="de-DE"/>
           </a:p>
@@ -2308,7 +2310,7 @@
             <a:fld id="{1BA50D42-C9CD-4801-B293-61D1F53EC57E}" type="datetimeFigureOut">
               <a:rPr lang="de-DE" smtClean="0"/>
               <a:pPr/>
-              <a:t>27.06.2018</a:t>
+              <a:t>06.09.2018</a:t>
             </a:fld>
             <a:endParaRPr lang="de-DE"/>
           </a:p>
@@ -2400,7 +2402,7 @@
             <a:fld id="{1BA50D42-C9CD-4801-B293-61D1F53EC57E}" type="datetimeFigureOut">
               <a:rPr lang="de-DE" smtClean="0"/>
               <a:pPr/>
-              <a:t>27.06.2018</a:t>
+              <a:t>06.09.2018</a:t>
             </a:fld>
             <a:endParaRPr lang="de-DE"/>
           </a:p>
@@ -2674,7 +2676,7 @@
             <a:fld id="{1BA50D42-C9CD-4801-B293-61D1F53EC57E}" type="datetimeFigureOut">
               <a:rPr lang="de-DE" smtClean="0"/>
               <a:pPr/>
-              <a:t>27.06.2018</a:t>
+              <a:t>06.09.2018</a:t>
             </a:fld>
             <a:endParaRPr lang="de-DE"/>
           </a:p>
@@ -2924,7 +2926,7 @@
             <a:fld id="{1BA50D42-C9CD-4801-B293-61D1F53EC57E}" type="datetimeFigureOut">
               <a:rPr lang="de-DE" smtClean="0"/>
               <a:pPr/>
-              <a:t>27.06.2018</a:t>
+              <a:t>06.09.2018</a:t>
             </a:fld>
             <a:endParaRPr lang="de-DE"/>
           </a:p>
@@ -3134,7 +3136,7 @@
             <a:fld id="{1BA50D42-C9CD-4801-B293-61D1F53EC57E}" type="datetimeFigureOut">
               <a:rPr lang="de-DE" smtClean="0"/>
               <a:pPr/>
-              <a:t>27.06.2018</a:t>
+              <a:t>06.09.2018</a:t>
             </a:fld>
             <a:endParaRPr lang="de-DE"/>
           </a:p>
@@ -5385,6 +5387,1006 @@
           <a:xfrm flipV="1">
             <a:off x="4283968" y="1484784"/>
             <a:ext cx="144016" cy="288032"/>
+          </a:xfrm>
+          <a:prstGeom prst="straightConnector1">
+            <a:avLst/>
+          </a:prstGeom>
+          <a:ln w="19050">
+            <a:solidFill>
+              <a:srgbClr val="C00000"/>
+            </a:solidFill>
+            <a:tailEnd type="triangle"/>
+          </a:ln>
+        </p:spPr>
+        <p:style>
+          <a:lnRef idx="1">
+            <a:schemeClr val="accent1"/>
+          </a:lnRef>
+          <a:fillRef idx="0">
+            <a:schemeClr val="accent1"/>
+          </a:fillRef>
+          <a:effectRef idx="0">
+            <a:schemeClr val="accent1"/>
+          </a:effectRef>
+          <a:fontRef idx="minor">
+            <a:schemeClr val="tx1"/>
+          </a:fontRef>
+        </p:style>
+      </p:cxnSp>
+    </p:spTree>
+  </p:cSld>
+  <p:clrMapOvr>
+    <a:masterClrMapping/>
+  </p:clrMapOvr>
+</p:sld>
+</file>
+
+<file path=ppt/slides/slide14.xml><?xml version="1.0" encoding="utf-8"?>
+<p:sld xmlns:a="http://schemas.openxmlformats.org/drawingml/2006/main" xmlns:r="http://schemas.openxmlformats.org/officeDocument/2006/relationships" xmlns:p="http://schemas.openxmlformats.org/presentationml/2006/main">
+  <p:cSld>
+    <p:spTree>
+      <p:nvGrpSpPr>
+        <p:cNvPr id="1" name=""/>
+        <p:cNvGrpSpPr/>
+        <p:nvPr/>
+      </p:nvGrpSpPr>
+      <p:grpSpPr>
+        <a:xfrm>
+          <a:off x="0" y="0"/>
+          <a:ext cx="0" cy="0"/>
+          <a:chOff x="0" y="0"/>
+          <a:chExt cx="0" cy="0"/>
+        </a:xfrm>
+      </p:grpSpPr>
+      <p:pic>
+        <p:nvPicPr>
+          <p:cNvPr id="1026" name="Picture 2"/>
+          <p:cNvPicPr>
+            <a:picLocks noChangeAspect="1" noChangeArrowheads="1"/>
+          </p:cNvPicPr>
+          <p:nvPr/>
+        </p:nvPicPr>
+        <p:blipFill>
+          <a:blip r:embed="rId2" cstate="print"/>
+          <a:srcRect/>
+          <a:stretch>
+            <a:fillRect/>
+          </a:stretch>
+        </p:blipFill>
+        <p:spPr bwMode="auto">
+          <a:xfrm>
+            <a:off x="895350" y="500063"/>
+            <a:ext cx="7353300" cy="5857875"/>
+          </a:xfrm>
+          <a:prstGeom prst="rect">
+            <a:avLst/>
+          </a:prstGeom>
+          <a:noFill/>
+          <a:ln w="9525">
+            <a:noFill/>
+            <a:miter lim="800000"/>
+            <a:headEnd/>
+            <a:tailEnd/>
+          </a:ln>
+        </p:spPr>
+      </p:pic>
+      <p:sp>
+        <p:nvSpPr>
+          <p:cNvPr id="5" name="Textfeld 4"/>
+          <p:cNvSpPr txBox="1"/>
+          <p:nvPr/>
+        </p:nvSpPr>
+        <p:spPr>
+          <a:xfrm>
+            <a:off x="4499992" y="565230"/>
+            <a:ext cx="792088" cy="415498"/>
+          </a:xfrm>
+          <a:prstGeom prst="rect">
+            <a:avLst/>
+          </a:prstGeom>
+          <a:solidFill>
+            <a:schemeClr val="accent6">
+              <a:lumMod val="20000"/>
+              <a:lumOff val="80000"/>
+              <a:alpha val="76000"/>
+            </a:schemeClr>
+          </a:solidFill>
+        </p:spPr>
+        <p:txBody>
+          <a:bodyPr wrap="square" rtlCol="0">
+            <a:spAutoFit/>
+          </a:bodyPr>
+          <a:lstStyle/>
+          <a:p>
+            <a:r>
+              <a:rPr lang="en-US" sz="1050" b="1" dirty="0" smtClean="0">
+                <a:solidFill>
+                  <a:srgbClr val="C00000"/>
+                </a:solidFill>
+              </a:rPr>
+              <a:t>Interface Definition</a:t>
+            </a:r>
+            <a:endParaRPr lang="en-US" sz="1050" b="1" dirty="0" smtClean="0">
+              <a:solidFill>
+                <a:srgbClr val="C00000"/>
+              </a:solidFill>
+            </a:endParaRPr>
+          </a:p>
+        </p:txBody>
+      </p:sp>
+      <p:cxnSp>
+        <p:nvCxnSpPr>
+          <p:cNvPr id="9" name="Gerade Verbindung mit Pfeil 8"/>
+          <p:cNvCxnSpPr/>
+          <p:nvPr/>
+        </p:nvCxnSpPr>
+        <p:spPr>
+          <a:xfrm flipH="1">
+            <a:off x="2483768" y="692696"/>
+            <a:ext cx="1944216" cy="0"/>
+          </a:xfrm>
+          <a:prstGeom prst="straightConnector1">
+            <a:avLst/>
+          </a:prstGeom>
+          <a:ln w="19050">
+            <a:solidFill>
+              <a:srgbClr val="C00000"/>
+            </a:solidFill>
+            <a:tailEnd type="triangle"/>
+          </a:ln>
+        </p:spPr>
+        <p:style>
+          <a:lnRef idx="1">
+            <a:schemeClr val="accent1"/>
+          </a:lnRef>
+          <a:fillRef idx="0">
+            <a:schemeClr val="accent1"/>
+          </a:fillRef>
+          <a:effectRef idx="0">
+            <a:schemeClr val="accent1"/>
+          </a:effectRef>
+          <a:fontRef idx="minor">
+            <a:schemeClr val="tx1"/>
+          </a:fontRef>
+        </p:style>
+      </p:cxnSp>
+      <p:sp>
+        <p:nvSpPr>
+          <p:cNvPr id="12" name="Textfeld 11"/>
+          <p:cNvSpPr txBox="1"/>
+          <p:nvPr/>
+        </p:nvSpPr>
+        <p:spPr>
+          <a:xfrm>
+            <a:off x="2411760" y="1484784"/>
+            <a:ext cx="1440160" cy="253916"/>
+          </a:xfrm>
+          <a:prstGeom prst="rect">
+            <a:avLst/>
+          </a:prstGeom>
+          <a:solidFill>
+            <a:schemeClr val="accent6">
+              <a:lumMod val="20000"/>
+              <a:lumOff val="80000"/>
+              <a:alpha val="76000"/>
+            </a:schemeClr>
+          </a:solidFill>
+        </p:spPr>
+        <p:txBody>
+          <a:bodyPr wrap="square" rtlCol="0">
+            <a:spAutoFit/>
+          </a:bodyPr>
+          <a:lstStyle/>
+          <a:p>
+            <a:r>
+              <a:rPr lang="en-US" sz="1050" b="1" dirty="0" err="1" smtClean="0">
+                <a:solidFill>
+                  <a:srgbClr val="C00000"/>
+                </a:solidFill>
+              </a:rPr>
+              <a:t>Input/Output</a:t>
+            </a:r>
+            <a:r>
+              <a:rPr lang="en-US" sz="1050" b="1" dirty="0" smtClean="0">
+                <a:solidFill>
+                  <a:srgbClr val="C00000"/>
+                </a:solidFill>
+              </a:rPr>
+              <a:t> ports</a:t>
+            </a:r>
+            <a:endParaRPr lang="en-US" sz="1050" b="1" dirty="0" smtClean="0">
+              <a:solidFill>
+                <a:srgbClr val="C00000"/>
+              </a:solidFill>
+            </a:endParaRPr>
+          </a:p>
+        </p:txBody>
+      </p:sp>
+      <p:cxnSp>
+        <p:nvCxnSpPr>
+          <p:cNvPr id="13" name="Gerade Verbindung mit Pfeil 12"/>
+          <p:cNvCxnSpPr/>
+          <p:nvPr/>
+        </p:nvCxnSpPr>
+        <p:spPr>
+          <a:xfrm flipH="1" flipV="1">
+            <a:off x="1907704" y="1124744"/>
+            <a:ext cx="720080" cy="360040"/>
+          </a:xfrm>
+          <a:prstGeom prst="straightConnector1">
+            <a:avLst/>
+          </a:prstGeom>
+          <a:ln w="19050">
+            <a:solidFill>
+              <a:srgbClr val="C00000"/>
+            </a:solidFill>
+            <a:tailEnd type="triangle"/>
+          </a:ln>
+        </p:spPr>
+        <p:style>
+          <a:lnRef idx="1">
+            <a:schemeClr val="accent1"/>
+          </a:lnRef>
+          <a:fillRef idx="0">
+            <a:schemeClr val="accent1"/>
+          </a:fillRef>
+          <a:effectRef idx="0">
+            <a:schemeClr val="accent1"/>
+          </a:effectRef>
+          <a:fontRef idx="minor">
+            <a:schemeClr val="tx1"/>
+          </a:fontRef>
+        </p:style>
+      </p:cxnSp>
+      <p:cxnSp>
+        <p:nvCxnSpPr>
+          <p:cNvPr id="16" name="Gerade Verbindung mit Pfeil 15"/>
+          <p:cNvCxnSpPr/>
+          <p:nvPr/>
+        </p:nvCxnSpPr>
+        <p:spPr>
+          <a:xfrm flipV="1">
+            <a:off x="3563888" y="1052736"/>
+            <a:ext cx="72008" cy="432048"/>
+          </a:xfrm>
+          <a:prstGeom prst="straightConnector1">
+            <a:avLst/>
+          </a:prstGeom>
+          <a:ln w="19050">
+            <a:solidFill>
+              <a:srgbClr val="C00000"/>
+            </a:solidFill>
+            <a:tailEnd type="triangle"/>
+          </a:ln>
+        </p:spPr>
+        <p:style>
+          <a:lnRef idx="1">
+            <a:schemeClr val="accent1"/>
+          </a:lnRef>
+          <a:fillRef idx="0">
+            <a:schemeClr val="accent1"/>
+          </a:fillRef>
+          <a:effectRef idx="0">
+            <a:schemeClr val="accent1"/>
+          </a:effectRef>
+          <a:fontRef idx="minor">
+            <a:schemeClr val="tx1"/>
+          </a:fontRef>
+        </p:style>
+      </p:cxnSp>
+      <p:sp>
+        <p:nvSpPr>
+          <p:cNvPr id="18" name="Textfeld 17"/>
+          <p:cNvSpPr txBox="1"/>
+          <p:nvPr/>
+        </p:nvSpPr>
+        <p:spPr>
+          <a:xfrm>
+            <a:off x="6732240" y="1196752"/>
+            <a:ext cx="1296144" cy="415498"/>
+          </a:xfrm>
+          <a:prstGeom prst="rect">
+            <a:avLst/>
+          </a:prstGeom>
+          <a:solidFill>
+            <a:schemeClr val="accent6">
+              <a:lumMod val="20000"/>
+              <a:lumOff val="80000"/>
+              <a:alpha val="76000"/>
+            </a:schemeClr>
+          </a:solidFill>
+        </p:spPr>
+        <p:txBody>
+          <a:bodyPr wrap="square" rtlCol="0">
+            <a:spAutoFit/>
+          </a:bodyPr>
+          <a:lstStyle/>
+          <a:p>
+            <a:r>
+              <a:rPr lang="en-US" sz="1050" b="1" dirty="0" smtClean="0">
+                <a:solidFill>
+                  <a:srgbClr val="C00000"/>
+                </a:solidFill>
+              </a:rPr>
+              <a:t>Contracts:</a:t>
+            </a:r>
+          </a:p>
+          <a:p>
+            <a:r>
+              <a:rPr lang="en-US" sz="1050" b="1" dirty="0" smtClean="0">
+                <a:solidFill>
+                  <a:srgbClr val="C00000"/>
+                </a:solidFill>
+              </a:rPr>
+              <a:t>Pre-/</a:t>
+            </a:r>
+            <a:r>
+              <a:rPr lang="en-US" sz="1050" b="1" dirty="0" err="1" smtClean="0">
+                <a:solidFill>
+                  <a:srgbClr val="C00000"/>
+                </a:solidFill>
+              </a:rPr>
+              <a:t>P</a:t>
+            </a:r>
+            <a:r>
+              <a:rPr lang="en-US" sz="1050" b="1" dirty="0" err="1" smtClean="0">
+                <a:solidFill>
+                  <a:srgbClr val="C00000"/>
+                </a:solidFill>
+              </a:rPr>
+              <a:t>ostconditions</a:t>
+            </a:r>
+            <a:endParaRPr lang="en-US" sz="1050" b="1" dirty="0" smtClean="0">
+              <a:solidFill>
+                <a:srgbClr val="C00000"/>
+              </a:solidFill>
+            </a:endParaRPr>
+          </a:p>
+        </p:txBody>
+      </p:sp>
+      <p:cxnSp>
+        <p:nvCxnSpPr>
+          <p:cNvPr id="19" name="Gerade Verbindung mit Pfeil 18"/>
+          <p:cNvCxnSpPr/>
+          <p:nvPr/>
+        </p:nvCxnSpPr>
+        <p:spPr>
+          <a:xfrm flipH="1">
+            <a:off x="5508104" y="1340768"/>
+            <a:ext cx="1152128" cy="1080120"/>
+          </a:xfrm>
+          <a:prstGeom prst="straightConnector1">
+            <a:avLst/>
+          </a:prstGeom>
+          <a:ln w="19050">
+            <a:solidFill>
+              <a:srgbClr val="C00000"/>
+            </a:solidFill>
+            <a:tailEnd type="triangle"/>
+          </a:ln>
+        </p:spPr>
+        <p:style>
+          <a:lnRef idx="1">
+            <a:schemeClr val="accent1"/>
+          </a:lnRef>
+          <a:fillRef idx="0">
+            <a:schemeClr val="accent1"/>
+          </a:fillRef>
+          <a:effectRef idx="0">
+            <a:schemeClr val="accent1"/>
+          </a:effectRef>
+          <a:fontRef idx="minor">
+            <a:schemeClr val="tx1"/>
+          </a:fontRef>
+        </p:style>
+      </p:cxnSp>
+      <p:sp>
+        <p:nvSpPr>
+          <p:cNvPr id="22" name="Textfeld 21"/>
+          <p:cNvSpPr txBox="1"/>
+          <p:nvPr/>
+        </p:nvSpPr>
+        <p:spPr>
+          <a:xfrm>
+            <a:off x="6660232" y="2941494"/>
+            <a:ext cx="792088" cy="415498"/>
+          </a:xfrm>
+          <a:prstGeom prst="rect">
+            <a:avLst/>
+          </a:prstGeom>
+          <a:solidFill>
+            <a:schemeClr val="accent6">
+              <a:lumMod val="20000"/>
+              <a:lumOff val="80000"/>
+              <a:alpha val="76000"/>
+            </a:schemeClr>
+          </a:solidFill>
+        </p:spPr>
+        <p:txBody>
+          <a:bodyPr wrap="square" rtlCol="0">
+            <a:spAutoFit/>
+          </a:bodyPr>
+          <a:lstStyle/>
+          <a:p>
+            <a:r>
+              <a:rPr lang="en-US" sz="1050" b="1" dirty="0" err="1" smtClean="0">
+                <a:solidFill>
+                  <a:srgbClr val="C00000"/>
+                </a:solidFill>
+              </a:rPr>
+              <a:t>AssemblyDefinition</a:t>
+            </a:r>
+            <a:endParaRPr lang="en-US" sz="1050" b="1" dirty="0" smtClean="0">
+              <a:solidFill>
+                <a:srgbClr val="C00000"/>
+              </a:solidFill>
+            </a:endParaRPr>
+          </a:p>
+        </p:txBody>
+      </p:sp>
+      <p:cxnSp>
+        <p:nvCxnSpPr>
+          <p:cNvPr id="23" name="Gerade Verbindung mit Pfeil 22"/>
+          <p:cNvCxnSpPr/>
+          <p:nvPr/>
+        </p:nvCxnSpPr>
+        <p:spPr>
+          <a:xfrm flipH="1">
+            <a:off x="4644008" y="3085510"/>
+            <a:ext cx="1944216" cy="0"/>
+          </a:xfrm>
+          <a:prstGeom prst="straightConnector1">
+            <a:avLst/>
+          </a:prstGeom>
+          <a:ln w="19050">
+            <a:solidFill>
+              <a:srgbClr val="C00000"/>
+            </a:solidFill>
+            <a:tailEnd type="triangle"/>
+          </a:ln>
+        </p:spPr>
+        <p:style>
+          <a:lnRef idx="1">
+            <a:schemeClr val="accent1"/>
+          </a:lnRef>
+          <a:fillRef idx="0">
+            <a:schemeClr val="accent1"/>
+          </a:fillRef>
+          <a:effectRef idx="0">
+            <a:schemeClr val="accent1"/>
+          </a:effectRef>
+          <a:fontRef idx="minor">
+            <a:schemeClr val="tx1"/>
+          </a:fontRef>
+        </p:style>
+      </p:cxnSp>
+      <p:sp>
+        <p:nvSpPr>
+          <p:cNvPr id="24" name="Textfeld 23"/>
+          <p:cNvSpPr txBox="1"/>
+          <p:nvPr/>
+        </p:nvSpPr>
+        <p:spPr>
+          <a:xfrm>
+            <a:off x="6300192" y="4941168"/>
+            <a:ext cx="1656184" cy="415498"/>
+          </a:xfrm>
+          <a:prstGeom prst="rect">
+            <a:avLst/>
+          </a:prstGeom>
+          <a:solidFill>
+            <a:schemeClr val="accent6">
+              <a:lumMod val="20000"/>
+              <a:lumOff val="80000"/>
+              <a:alpha val="76000"/>
+            </a:schemeClr>
+          </a:solidFill>
+        </p:spPr>
+        <p:txBody>
+          <a:bodyPr wrap="square" rtlCol="0">
+            <a:spAutoFit/>
+          </a:bodyPr>
+          <a:lstStyle/>
+          <a:p>
+            <a:r>
+              <a:rPr lang="en-US" sz="1050" b="1" dirty="0" smtClean="0">
+                <a:solidFill>
+                  <a:srgbClr val="C00000"/>
+                </a:solidFill>
+              </a:rPr>
+              <a:t>Assembly body using the diagrammatic notation</a:t>
+            </a:r>
+            <a:endParaRPr lang="en-US" sz="1050" b="1" dirty="0" smtClean="0">
+              <a:solidFill>
+                <a:srgbClr val="C00000"/>
+              </a:solidFill>
+            </a:endParaRPr>
+          </a:p>
+        </p:txBody>
+      </p:sp>
+    </p:spTree>
+  </p:cSld>
+  <p:clrMapOvr>
+    <a:masterClrMapping/>
+  </p:clrMapOvr>
+</p:sld>
+</file>
+
+<file path=ppt/slides/slide15.xml><?xml version="1.0" encoding="utf-8"?>
+<p:sld xmlns:a="http://schemas.openxmlformats.org/drawingml/2006/main" xmlns:r="http://schemas.openxmlformats.org/officeDocument/2006/relationships" xmlns:p="http://schemas.openxmlformats.org/presentationml/2006/main">
+  <p:cSld>
+    <p:spTree>
+      <p:nvGrpSpPr>
+        <p:cNvPr id="1" name=""/>
+        <p:cNvGrpSpPr/>
+        <p:nvPr/>
+      </p:nvGrpSpPr>
+      <p:grpSpPr>
+        <a:xfrm>
+          <a:off x="0" y="0"/>
+          <a:ext cx="0" cy="0"/>
+          <a:chOff x="0" y="0"/>
+          <a:chExt cx="0" cy="0"/>
+        </a:xfrm>
+      </p:grpSpPr>
+      <p:pic>
+        <p:nvPicPr>
+          <p:cNvPr id="3074" name="Picture 2"/>
+          <p:cNvPicPr>
+            <a:picLocks noChangeAspect="1" noChangeArrowheads="1"/>
+          </p:cNvPicPr>
+          <p:nvPr/>
+        </p:nvPicPr>
+        <p:blipFill>
+          <a:blip r:embed="rId2" cstate="print"/>
+          <a:srcRect/>
+          <a:stretch>
+            <a:fillRect/>
+          </a:stretch>
+        </p:blipFill>
+        <p:spPr bwMode="auto">
+          <a:xfrm>
+            <a:off x="611560" y="439374"/>
+            <a:ext cx="7776864" cy="4537762"/>
+          </a:xfrm>
+          <a:prstGeom prst="rect">
+            <a:avLst/>
+          </a:prstGeom>
+          <a:noFill/>
+          <a:ln w="9525">
+            <a:noFill/>
+            <a:miter lim="800000"/>
+            <a:headEnd/>
+            <a:tailEnd/>
+          </a:ln>
+        </p:spPr>
+      </p:pic>
+      <p:sp>
+        <p:nvSpPr>
+          <p:cNvPr id="4" name="Textfeld 3"/>
+          <p:cNvSpPr txBox="1"/>
+          <p:nvPr/>
+        </p:nvSpPr>
+        <p:spPr>
+          <a:xfrm>
+            <a:off x="2915816" y="681791"/>
+            <a:ext cx="2520280" cy="253916"/>
+          </a:xfrm>
+          <a:prstGeom prst="rect">
+            <a:avLst/>
+          </a:prstGeom>
+          <a:solidFill>
+            <a:schemeClr val="accent6">
+              <a:lumMod val="20000"/>
+              <a:lumOff val="80000"/>
+              <a:alpha val="76000"/>
+            </a:schemeClr>
+          </a:solidFill>
+        </p:spPr>
+        <p:txBody>
+          <a:bodyPr wrap="square" rtlCol="0">
+            <a:spAutoFit/>
+          </a:bodyPr>
+          <a:lstStyle/>
+          <a:p>
+            <a:r>
+              <a:rPr lang="en-US" sz="1050" b="1" dirty="0" smtClean="0">
+                <a:solidFill>
+                  <a:srgbClr val="C00000"/>
+                </a:solidFill>
+              </a:rPr>
+              <a:t>Step 1: Start the AG </a:t>
+            </a:r>
+            <a:r>
+              <a:rPr lang="en-US" sz="1050" b="1" dirty="0" smtClean="0">
+                <a:solidFill>
+                  <a:srgbClr val="C00000"/>
+                </a:solidFill>
+              </a:rPr>
+              <a:t>analysis</a:t>
+            </a:r>
+            <a:endParaRPr lang="en-US" sz="1050" b="1" dirty="0" smtClean="0">
+              <a:solidFill>
+                <a:srgbClr val="C00000"/>
+              </a:solidFill>
+            </a:endParaRPr>
+          </a:p>
+        </p:txBody>
+      </p:sp>
+      <p:cxnSp>
+        <p:nvCxnSpPr>
+          <p:cNvPr id="5" name="Gerade Verbindung mit Pfeil 4"/>
+          <p:cNvCxnSpPr/>
+          <p:nvPr/>
+        </p:nvCxnSpPr>
+        <p:spPr>
+          <a:xfrm flipH="1">
+            <a:off x="2123728" y="908720"/>
+            <a:ext cx="720080" cy="1800200"/>
+          </a:xfrm>
+          <a:prstGeom prst="straightConnector1">
+            <a:avLst/>
+          </a:prstGeom>
+          <a:ln w="19050">
+            <a:solidFill>
+              <a:srgbClr val="C00000"/>
+            </a:solidFill>
+            <a:tailEnd type="triangle"/>
+          </a:ln>
+        </p:spPr>
+        <p:style>
+          <a:lnRef idx="1">
+            <a:schemeClr val="accent1"/>
+          </a:lnRef>
+          <a:fillRef idx="0">
+            <a:schemeClr val="accent1"/>
+          </a:fillRef>
+          <a:effectRef idx="0">
+            <a:schemeClr val="accent1"/>
+          </a:effectRef>
+          <a:fontRef idx="minor">
+            <a:schemeClr val="tx1"/>
+          </a:fontRef>
+        </p:style>
+      </p:cxnSp>
+      <p:sp>
+        <p:nvSpPr>
+          <p:cNvPr id="7" name="Textfeld 6"/>
+          <p:cNvSpPr txBox="1"/>
+          <p:nvPr/>
+        </p:nvSpPr>
+        <p:spPr>
+          <a:xfrm>
+            <a:off x="2915816" y="997278"/>
+            <a:ext cx="2520280" cy="415498"/>
+          </a:xfrm>
+          <a:prstGeom prst="rect">
+            <a:avLst/>
+          </a:prstGeom>
+          <a:solidFill>
+            <a:schemeClr val="accent6">
+              <a:lumMod val="20000"/>
+              <a:lumOff val="80000"/>
+              <a:alpha val="76000"/>
+            </a:schemeClr>
+          </a:solidFill>
+        </p:spPr>
+        <p:txBody>
+          <a:bodyPr wrap="square" rtlCol="0">
+            <a:spAutoFit/>
+          </a:bodyPr>
+          <a:lstStyle/>
+          <a:p>
+            <a:r>
+              <a:rPr lang="en-US" sz="1050" b="1" dirty="0" smtClean="0">
+                <a:solidFill>
+                  <a:srgbClr val="C00000"/>
+                </a:solidFill>
+              </a:rPr>
+              <a:t>Step 2: After the </a:t>
+            </a:r>
+            <a:r>
+              <a:rPr lang="en-US" sz="1050" b="1" dirty="0" smtClean="0">
+                <a:solidFill>
+                  <a:srgbClr val="C00000"/>
+                </a:solidFill>
+              </a:rPr>
+              <a:t>analysis finishes, the results are displayed</a:t>
+            </a:r>
+            <a:endParaRPr lang="en-US" sz="1050" b="1" dirty="0" smtClean="0">
+              <a:solidFill>
+                <a:srgbClr val="C00000"/>
+              </a:solidFill>
+            </a:endParaRPr>
+          </a:p>
+        </p:txBody>
+      </p:sp>
+      <p:cxnSp>
+        <p:nvCxnSpPr>
+          <p:cNvPr id="10" name="Gerade Verbindung mit Pfeil 9"/>
+          <p:cNvCxnSpPr/>
+          <p:nvPr/>
+        </p:nvCxnSpPr>
+        <p:spPr>
+          <a:xfrm flipV="1">
+            <a:off x="5436096" y="1124744"/>
+            <a:ext cx="1080120" cy="144016"/>
+          </a:xfrm>
+          <a:prstGeom prst="straightConnector1">
+            <a:avLst/>
+          </a:prstGeom>
+          <a:ln w="19050">
+            <a:solidFill>
+              <a:srgbClr val="C00000"/>
+            </a:solidFill>
+            <a:tailEnd type="triangle"/>
+          </a:ln>
+        </p:spPr>
+        <p:style>
+          <a:lnRef idx="1">
+            <a:schemeClr val="accent1"/>
+          </a:lnRef>
+          <a:fillRef idx="0">
+            <a:schemeClr val="accent1"/>
+          </a:fillRef>
+          <a:effectRef idx="0">
+            <a:schemeClr val="accent1"/>
+          </a:effectRef>
+          <a:fontRef idx="minor">
+            <a:schemeClr val="tx1"/>
+          </a:fontRef>
+        </p:style>
+      </p:cxnSp>
+      <p:cxnSp>
+        <p:nvCxnSpPr>
+          <p:cNvPr id="14" name="Gerade Verbindung mit Pfeil 13"/>
+          <p:cNvCxnSpPr/>
+          <p:nvPr/>
+        </p:nvCxnSpPr>
+        <p:spPr>
+          <a:xfrm flipV="1">
+            <a:off x="4788024" y="3140968"/>
+            <a:ext cx="1728192" cy="936104"/>
+          </a:xfrm>
+          <a:prstGeom prst="straightConnector1">
+            <a:avLst/>
+          </a:prstGeom>
+          <a:ln w="19050">
+            <a:solidFill>
+              <a:srgbClr val="C00000"/>
+            </a:solidFill>
+            <a:tailEnd type="triangle"/>
+          </a:ln>
+        </p:spPr>
+        <p:style>
+          <a:lnRef idx="1">
+            <a:schemeClr val="accent1"/>
+          </a:lnRef>
+          <a:fillRef idx="0">
+            <a:schemeClr val="accent1"/>
+          </a:fillRef>
+          <a:effectRef idx="0">
+            <a:schemeClr val="accent1"/>
+          </a:effectRef>
+          <a:fontRef idx="minor">
+            <a:schemeClr val="tx1"/>
+          </a:fontRef>
+        </p:style>
+      </p:cxnSp>
+      <p:pic>
+        <p:nvPicPr>
+          <p:cNvPr id="3075" name="Picture 3"/>
+          <p:cNvPicPr>
+            <a:picLocks noChangeAspect="1" noChangeArrowheads="1"/>
+          </p:cNvPicPr>
+          <p:nvPr/>
+        </p:nvPicPr>
+        <p:blipFill>
+          <a:blip r:embed="rId3" cstate="print"/>
+          <a:srcRect/>
+          <a:stretch>
+            <a:fillRect/>
+          </a:stretch>
+        </p:blipFill>
+        <p:spPr bwMode="auto">
+          <a:xfrm>
+            <a:off x="899592" y="3068960"/>
+            <a:ext cx="4104456" cy="1080119"/>
+          </a:xfrm>
+          <a:prstGeom prst="rect">
+            <a:avLst/>
+          </a:prstGeom>
+          <a:noFill/>
+          <a:ln w="9525">
+            <a:noFill/>
+            <a:miter lim="800000"/>
+            <a:headEnd/>
+            <a:tailEnd/>
+          </a:ln>
+        </p:spPr>
+      </p:pic>
+      <p:sp>
+        <p:nvSpPr>
+          <p:cNvPr id="20" name="Rechteck 19"/>
+          <p:cNvSpPr/>
+          <p:nvPr/>
+        </p:nvSpPr>
+        <p:spPr>
+          <a:xfrm>
+            <a:off x="1259632" y="4149080"/>
+            <a:ext cx="2592288" cy="936104"/>
+          </a:xfrm>
+          <a:prstGeom prst="rect">
+            <a:avLst/>
+          </a:prstGeom>
+          <a:solidFill>
+            <a:schemeClr val="bg1"/>
+          </a:solidFill>
+          <a:ln>
+            <a:noFill/>
+          </a:ln>
+        </p:spPr>
+        <p:style>
+          <a:lnRef idx="2">
+            <a:schemeClr val="accent1">
+              <a:shade val="50000"/>
+            </a:schemeClr>
+          </a:lnRef>
+          <a:fillRef idx="1">
+            <a:schemeClr val="accent1"/>
+          </a:fillRef>
+          <a:effectRef idx="0">
+            <a:schemeClr val="accent1"/>
+          </a:effectRef>
+          <a:fontRef idx="minor">
+            <a:schemeClr val="lt1"/>
+          </a:fontRef>
+        </p:style>
+        <p:txBody>
+          <a:bodyPr rtlCol="0" anchor="ctr"/>
+          <a:lstStyle/>
+          <a:p>
+            <a:pPr algn="ctr"/>
+            <a:endParaRPr lang="en-US"/>
+          </a:p>
+        </p:txBody>
+      </p:sp>
+      <p:sp>
+        <p:nvSpPr>
+          <p:cNvPr id="8" name="Textfeld 7"/>
+          <p:cNvSpPr txBox="1"/>
+          <p:nvPr/>
+        </p:nvSpPr>
+        <p:spPr>
+          <a:xfrm>
+            <a:off x="1907704" y="3932039"/>
+            <a:ext cx="3528392" cy="577081"/>
+          </a:xfrm>
+          <a:prstGeom prst="rect">
+            <a:avLst/>
+          </a:prstGeom>
+          <a:solidFill>
+            <a:schemeClr val="accent6">
+              <a:lumMod val="20000"/>
+              <a:lumOff val="80000"/>
+              <a:alpha val="76000"/>
+            </a:schemeClr>
+          </a:solidFill>
+        </p:spPr>
+        <p:txBody>
+          <a:bodyPr wrap="square" rtlCol="0">
+            <a:spAutoFit/>
+          </a:bodyPr>
+          <a:lstStyle/>
+          <a:p>
+            <a:r>
+              <a:rPr lang="en-US" sz="1050" b="1" dirty="0" smtClean="0">
+                <a:solidFill>
+                  <a:srgbClr val="C00000"/>
+                </a:solidFill>
+              </a:rPr>
+              <a:t>Step 3: Double-clicking on a failed result will display the counterexample. By clicking on “Simulate”, the CEX will be simulated.</a:t>
+            </a:r>
+            <a:endParaRPr lang="en-US" sz="1050" b="1" dirty="0" smtClean="0">
+              <a:solidFill>
+                <a:srgbClr val="C00000"/>
+              </a:solidFill>
+            </a:endParaRPr>
+          </a:p>
+        </p:txBody>
+      </p:sp>
+      <p:sp>
+        <p:nvSpPr>
+          <p:cNvPr id="17" name="Textfeld 16"/>
+          <p:cNvSpPr txBox="1"/>
+          <p:nvPr/>
+        </p:nvSpPr>
+        <p:spPr>
+          <a:xfrm>
+            <a:off x="1907704" y="4581128"/>
+            <a:ext cx="3528392" cy="577081"/>
+          </a:xfrm>
+          <a:prstGeom prst="rect">
+            <a:avLst/>
+          </a:prstGeom>
+          <a:solidFill>
+            <a:schemeClr val="accent6">
+              <a:lumMod val="20000"/>
+              <a:lumOff val="80000"/>
+              <a:alpha val="76000"/>
+            </a:schemeClr>
+          </a:solidFill>
+        </p:spPr>
+        <p:txBody>
+          <a:bodyPr wrap="square" rtlCol="0">
+            <a:spAutoFit/>
+          </a:bodyPr>
+          <a:lstStyle/>
+          <a:p>
+            <a:r>
+              <a:rPr lang="en-US" sz="1050" b="1" dirty="0" smtClean="0">
+                <a:solidFill>
+                  <a:srgbClr val="C00000"/>
+                </a:solidFill>
+              </a:rPr>
+              <a:t>Step 4: Using the simulation bar, one can step-through the counterexample, the values of ports in a certain step are displayed in the IDE as annotations.</a:t>
+            </a:r>
+            <a:endParaRPr lang="en-US" sz="1050" b="1" dirty="0" smtClean="0">
+              <a:solidFill>
+                <a:srgbClr val="C00000"/>
+              </a:solidFill>
+            </a:endParaRPr>
+          </a:p>
+        </p:txBody>
+      </p:sp>
+      <p:cxnSp>
+        <p:nvCxnSpPr>
+          <p:cNvPr id="26" name="Gerade Verbindung mit Pfeil 25"/>
+          <p:cNvCxnSpPr/>
+          <p:nvPr/>
+        </p:nvCxnSpPr>
+        <p:spPr>
+          <a:xfrm>
+            <a:off x="4283968" y="4293096"/>
+            <a:ext cx="2664296" cy="360040"/>
+          </a:xfrm>
+          <a:prstGeom prst="straightConnector1">
+            <a:avLst/>
+          </a:prstGeom>
+          <a:ln w="19050">
+            <a:solidFill>
+              <a:srgbClr val="C00000"/>
+            </a:solidFill>
+            <a:tailEnd type="triangle"/>
+          </a:ln>
+        </p:spPr>
+        <p:style>
+          <a:lnRef idx="1">
+            <a:schemeClr val="accent1"/>
+          </a:lnRef>
+          <a:fillRef idx="0">
+            <a:schemeClr val="accent1"/>
+          </a:fillRef>
+          <a:effectRef idx="0">
+            <a:schemeClr val="accent1"/>
+          </a:effectRef>
+          <a:fontRef idx="minor">
+            <a:schemeClr val="tx1"/>
+          </a:fontRef>
+        </p:style>
+      </p:cxnSp>
+      <p:cxnSp>
+        <p:nvCxnSpPr>
+          <p:cNvPr id="29" name="Gerade Verbindung mit Pfeil 28"/>
+          <p:cNvCxnSpPr>
+            <a:stCxn id="17" idx="1"/>
+          </p:cNvCxnSpPr>
+          <p:nvPr/>
+        </p:nvCxnSpPr>
+        <p:spPr>
+          <a:xfrm flipH="1" flipV="1">
+            <a:off x="1115616" y="2332331"/>
+            <a:ext cx="792088" cy="2537338"/>
           </a:xfrm>
           <a:prstGeom prst="straightConnector1">
             <a:avLst/>

</xml_diff>

<commit_message>
tutorial: added info in the users-guide about running BMC based AG analyses
</commit_message>
<xml_diff>
--- a/code/tutorial/solutions/com.mbeddr.formal.nusmv.users_guide/figures/figures.pptx
+++ b/code/tutorial/solutions/com.mbeddr.formal.nusmv.users_guide/figures/figures.pptx
@@ -5,7 +5,7 @@
     <p:sldMasterId id="2147483648" r:id="rId1"/>
   </p:sldMasterIdLst>
   <p:notesMasterIdLst>
-    <p:notesMasterId r:id="rId17"/>
+    <p:notesMasterId r:id="rId18"/>
   </p:notesMasterIdLst>
   <p:sldIdLst>
     <p:sldId id="256" r:id="rId2"/>
@@ -23,6 +23,7 @@
     <p:sldId id="268" r:id="rId14"/>
     <p:sldId id="269" r:id="rId15"/>
     <p:sldId id="271" r:id="rId16"/>
+    <p:sldId id="272" r:id="rId17"/>
   </p:sldIdLst>
   <p:sldSz cx="9144000" cy="6858000" type="screen4x3"/>
   <p:notesSz cx="6858000" cy="9144000"/>
@@ -207,7 +208,7 @@
             <a:fld id="{11812C92-0668-408F-AE44-47ECD1C69BA6}" type="datetimeFigureOut">
               <a:rPr lang="en-US" smtClean="0"/>
               <a:pPr/>
-              <a:t>9/9/2018</a:t>
+              <a:t>9/28/2018</a:t>
             </a:fld>
             <a:endParaRPr lang="en-US"/>
           </a:p>
@@ -737,7 +738,7 @@
             <a:fld id="{1BA50D42-C9CD-4801-B293-61D1F53EC57E}" type="datetimeFigureOut">
               <a:rPr lang="de-DE" smtClean="0"/>
               <a:pPr/>
-              <a:t>09.09.2018</a:t>
+              <a:t>28.09.2018</a:t>
             </a:fld>
             <a:endParaRPr lang="de-DE"/>
           </a:p>
@@ -904,7 +905,7 @@
             <a:fld id="{1BA50D42-C9CD-4801-B293-61D1F53EC57E}" type="datetimeFigureOut">
               <a:rPr lang="de-DE" smtClean="0"/>
               <a:pPr/>
-              <a:t>09.09.2018</a:t>
+              <a:t>28.09.2018</a:t>
             </a:fld>
             <a:endParaRPr lang="de-DE"/>
           </a:p>
@@ -1081,7 +1082,7 @@
             <a:fld id="{1BA50D42-C9CD-4801-B293-61D1F53EC57E}" type="datetimeFigureOut">
               <a:rPr lang="de-DE" smtClean="0"/>
               <a:pPr/>
-              <a:t>09.09.2018</a:t>
+              <a:t>28.09.2018</a:t>
             </a:fld>
             <a:endParaRPr lang="de-DE"/>
           </a:p>
@@ -1248,7 +1249,7 @@
             <a:fld id="{1BA50D42-C9CD-4801-B293-61D1F53EC57E}" type="datetimeFigureOut">
               <a:rPr lang="de-DE" smtClean="0"/>
               <a:pPr/>
-              <a:t>09.09.2018</a:t>
+              <a:t>28.09.2018</a:t>
             </a:fld>
             <a:endParaRPr lang="de-DE"/>
           </a:p>
@@ -1491,7 +1492,7 @@
             <a:fld id="{1BA50D42-C9CD-4801-B293-61D1F53EC57E}" type="datetimeFigureOut">
               <a:rPr lang="de-DE" smtClean="0"/>
               <a:pPr/>
-              <a:t>09.09.2018</a:t>
+              <a:t>28.09.2018</a:t>
             </a:fld>
             <a:endParaRPr lang="de-DE"/>
           </a:p>
@@ -1776,7 +1777,7 @@
             <a:fld id="{1BA50D42-C9CD-4801-B293-61D1F53EC57E}" type="datetimeFigureOut">
               <a:rPr lang="de-DE" smtClean="0"/>
               <a:pPr/>
-              <a:t>09.09.2018</a:t>
+              <a:t>28.09.2018</a:t>
             </a:fld>
             <a:endParaRPr lang="de-DE"/>
           </a:p>
@@ -2195,7 +2196,7 @@
             <a:fld id="{1BA50D42-C9CD-4801-B293-61D1F53EC57E}" type="datetimeFigureOut">
               <a:rPr lang="de-DE" smtClean="0"/>
               <a:pPr/>
-              <a:t>09.09.2018</a:t>
+              <a:t>28.09.2018</a:t>
             </a:fld>
             <a:endParaRPr lang="de-DE"/>
           </a:p>
@@ -2310,7 +2311,7 @@
             <a:fld id="{1BA50D42-C9CD-4801-B293-61D1F53EC57E}" type="datetimeFigureOut">
               <a:rPr lang="de-DE" smtClean="0"/>
               <a:pPr/>
-              <a:t>09.09.2018</a:t>
+              <a:t>28.09.2018</a:t>
             </a:fld>
             <a:endParaRPr lang="de-DE"/>
           </a:p>
@@ -2402,7 +2403,7 @@
             <a:fld id="{1BA50D42-C9CD-4801-B293-61D1F53EC57E}" type="datetimeFigureOut">
               <a:rPr lang="de-DE" smtClean="0"/>
               <a:pPr/>
-              <a:t>09.09.2018</a:t>
+              <a:t>28.09.2018</a:t>
             </a:fld>
             <a:endParaRPr lang="de-DE"/>
           </a:p>
@@ -2676,7 +2677,7 @@
             <a:fld id="{1BA50D42-C9CD-4801-B293-61D1F53EC57E}" type="datetimeFigureOut">
               <a:rPr lang="de-DE" smtClean="0"/>
               <a:pPr/>
-              <a:t>09.09.2018</a:t>
+              <a:t>28.09.2018</a:t>
             </a:fld>
             <a:endParaRPr lang="de-DE"/>
           </a:p>
@@ -2926,7 +2927,7 @@
             <a:fld id="{1BA50D42-C9CD-4801-B293-61D1F53EC57E}" type="datetimeFigureOut">
               <a:rPr lang="de-DE" smtClean="0"/>
               <a:pPr/>
-              <a:t>09.09.2018</a:t>
+              <a:t>28.09.2018</a:t>
             </a:fld>
             <a:endParaRPr lang="de-DE"/>
           </a:p>
@@ -3136,7 +3137,7 @@
             <a:fld id="{1BA50D42-C9CD-4801-B293-61D1F53EC57E}" type="datetimeFigureOut">
               <a:rPr lang="de-DE" smtClean="0"/>
               <a:pPr/>
-              <a:t>09.09.2018</a:t>
+              <a:t>28.09.2018</a:t>
             </a:fld>
             <a:endParaRPr lang="de-DE"/>
           </a:p>
@@ -6239,23 +6240,7 @@
                   <a:srgbClr val="C00000"/>
                 </a:solidFill>
               </a:rPr>
-              <a:t>Step 4: Using the simulation bar, one can step-through the </a:t>
-            </a:r>
-            <a:r>
-              <a:rPr lang="en-US" sz="1050" b="1" dirty="0" smtClean="0">
-                <a:solidFill>
-                  <a:srgbClr val="C00000"/>
-                </a:solidFill>
-              </a:rPr>
-              <a:t>counterexample. The </a:t>
-            </a:r>
-            <a:r>
-              <a:rPr lang="en-US" sz="1050" b="1" dirty="0" smtClean="0">
-                <a:solidFill>
-                  <a:srgbClr val="C00000"/>
-                </a:solidFill>
-              </a:rPr>
-              <a:t>values of ports in a certain step are displayed in the IDE as annotations.</a:t>
+              <a:t>Step 4: Using the simulation bar, one can step-through the counterexample. The values of ports in a certain step are displayed in the IDE as annotations.</a:t>
             </a:r>
           </a:p>
         </p:txBody>
@@ -6344,6 +6329,179 @@
           <a:xfrm flipV="1">
             <a:off x="4788024" y="3140968"/>
             <a:ext cx="1728192" cy="864096"/>
+          </a:xfrm>
+          <a:prstGeom prst="straightConnector1">
+            <a:avLst/>
+          </a:prstGeom>
+          <a:ln w="19050">
+            <a:solidFill>
+              <a:srgbClr val="C00000"/>
+            </a:solidFill>
+            <a:tailEnd type="triangle"/>
+          </a:ln>
+        </p:spPr>
+        <p:style>
+          <a:lnRef idx="1">
+            <a:schemeClr val="accent1"/>
+          </a:lnRef>
+          <a:fillRef idx="0">
+            <a:schemeClr val="accent1"/>
+          </a:fillRef>
+          <a:effectRef idx="0">
+            <a:schemeClr val="accent1"/>
+          </a:effectRef>
+          <a:fontRef idx="minor">
+            <a:schemeClr val="tx1"/>
+          </a:fontRef>
+        </p:style>
+      </p:cxnSp>
+    </p:spTree>
+  </p:cSld>
+  <p:clrMapOvr>
+    <a:masterClrMapping/>
+  </p:clrMapOvr>
+</p:sld>
+</file>
+
+<file path=ppt/slides/slide16.xml><?xml version="1.0" encoding="utf-8"?>
+<p:sld xmlns:a="http://schemas.openxmlformats.org/drawingml/2006/main" xmlns:r="http://schemas.openxmlformats.org/officeDocument/2006/relationships" xmlns:p="http://schemas.openxmlformats.org/presentationml/2006/main">
+  <p:cSld>
+    <p:spTree>
+      <p:nvGrpSpPr>
+        <p:cNvPr id="1" name=""/>
+        <p:cNvGrpSpPr/>
+        <p:nvPr/>
+      </p:nvGrpSpPr>
+      <p:grpSpPr>
+        <a:xfrm>
+          <a:off x="0" y="0"/>
+          <a:ext cx="0" cy="0"/>
+          <a:chOff x="0" y="0"/>
+          <a:chExt cx="0" cy="0"/>
+        </a:xfrm>
+      </p:grpSpPr>
+      <p:pic>
+        <p:nvPicPr>
+          <p:cNvPr id="1026" name="Picture 2"/>
+          <p:cNvPicPr>
+            <a:picLocks noChangeAspect="1" noChangeArrowheads="1"/>
+          </p:cNvPicPr>
+          <p:nvPr/>
+        </p:nvPicPr>
+        <p:blipFill>
+          <a:blip r:embed="rId2" cstate="print"/>
+          <a:srcRect/>
+          <a:stretch>
+            <a:fillRect/>
+          </a:stretch>
+        </p:blipFill>
+        <p:spPr bwMode="auto">
+          <a:xfrm>
+            <a:off x="1022350" y="914400"/>
+            <a:ext cx="7099300" cy="5029200"/>
+          </a:xfrm>
+          <a:prstGeom prst="rect">
+            <a:avLst/>
+          </a:prstGeom>
+          <a:noFill/>
+          <a:ln w="9525">
+            <a:noFill/>
+            <a:miter lim="800000"/>
+            <a:headEnd/>
+            <a:tailEnd/>
+          </a:ln>
+        </p:spPr>
+      </p:pic>
+      <p:sp>
+        <p:nvSpPr>
+          <p:cNvPr id="5" name="Textfeld 4"/>
+          <p:cNvSpPr txBox="1"/>
+          <p:nvPr/>
+        </p:nvSpPr>
+        <p:spPr>
+          <a:xfrm>
+            <a:off x="3923928" y="2420888"/>
+            <a:ext cx="2520280" cy="577081"/>
+          </a:xfrm>
+          <a:prstGeom prst="rect">
+            <a:avLst/>
+          </a:prstGeom>
+          <a:solidFill>
+            <a:schemeClr val="accent6">
+              <a:lumMod val="20000"/>
+              <a:lumOff val="80000"/>
+              <a:alpha val="76000"/>
+            </a:schemeClr>
+          </a:solidFill>
+        </p:spPr>
+        <p:txBody>
+          <a:bodyPr wrap="square" rtlCol="0">
+            <a:spAutoFit/>
+          </a:bodyPr>
+          <a:lstStyle/>
+          <a:p>
+            <a:r>
+              <a:rPr lang="en-US" sz="1050" b="1" dirty="0" smtClean="0">
+                <a:solidFill>
+                  <a:srgbClr val="C00000"/>
+                </a:solidFill>
+              </a:rPr>
+              <a:t>In the Inspector view of an “assembly” we can specify that the AG analysis should be performed with the BMC algorithm.</a:t>
+            </a:r>
+            <a:endParaRPr lang="en-US" sz="1050" b="1" dirty="0" smtClean="0">
+              <a:solidFill>
+                <a:srgbClr val="C00000"/>
+              </a:solidFill>
+            </a:endParaRPr>
+          </a:p>
+        </p:txBody>
+      </p:sp>
+      <p:cxnSp>
+        <p:nvCxnSpPr>
+          <p:cNvPr id="6" name="Gerade Verbindung mit Pfeil 5"/>
+          <p:cNvCxnSpPr/>
+          <p:nvPr/>
+        </p:nvCxnSpPr>
+        <p:spPr>
+          <a:xfrm flipH="1" flipV="1">
+            <a:off x="2123728" y="1268760"/>
+            <a:ext cx="1800200" cy="1296144"/>
+          </a:xfrm>
+          <a:prstGeom prst="straightConnector1">
+            <a:avLst/>
+          </a:prstGeom>
+          <a:ln w="19050">
+            <a:solidFill>
+              <a:srgbClr val="C00000"/>
+            </a:solidFill>
+            <a:tailEnd type="triangle"/>
+          </a:ln>
+        </p:spPr>
+        <p:style>
+          <a:lnRef idx="1">
+            <a:schemeClr val="accent1"/>
+          </a:lnRef>
+          <a:fillRef idx="0">
+            <a:schemeClr val="accent1"/>
+          </a:fillRef>
+          <a:effectRef idx="0">
+            <a:schemeClr val="accent1"/>
+          </a:effectRef>
+          <a:fontRef idx="minor">
+            <a:schemeClr val="tx1"/>
+          </a:fontRef>
+        </p:style>
+      </p:cxnSp>
+      <p:cxnSp>
+        <p:nvCxnSpPr>
+          <p:cNvPr id="11" name="Gerade Verbindung mit Pfeil 10"/>
+          <p:cNvCxnSpPr/>
+          <p:nvPr/>
+        </p:nvCxnSpPr>
+        <p:spPr>
+          <a:xfrm flipH="1">
+            <a:off x="1979712" y="2852936"/>
+            <a:ext cx="1944216" cy="2520280"/>
           </a:xfrm>
           <a:prstGeom prst="straightConnector1">
             <a:avLst/>

</xml_diff>

<commit_message>
tutorial: added an example about refinement of a CBD - Component-Interface by a NuSMV Module for the TrafficLightsController example
</commit_message>
<xml_diff>
--- a/code/tutorial/solutions/com.mbeddr.formal.nusmv.users_guide/figures/figures.pptx
+++ b/code/tutorial/solutions/com.mbeddr.formal.nusmv.users_guide/figures/figures.pptx
@@ -5,7 +5,7 @@
     <p:sldMasterId id="2147483648" r:id="rId1"/>
   </p:sldMasterIdLst>
   <p:notesMasterIdLst>
-    <p:notesMasterId r:id="rId18"/>
+    <p:notesMasterId r:id="rId19"/>
   </p:notesMasterIdLst>
   <p:sldIdLst>
     <p:sldId id="256" r:id="rId2"/>
@@ -24,6 +24,7 @@
     <p:sldId id="269" r:id="rId15"/>
     <p:sldId id="271" r:id="rId16"/>
     <p:sldId id="272" r:id="rId17"/>
+    <p:sldId id="273" r:id="rId18"/>
   </p:sldIdLst>
   <p:sldSz cx="9144000" cy="6858000" type="screen4x3"/>
   <p:notesSz cx="6858000" cy="9144000"/>
@@ -208,7 +209,7 @@
             <a:fld id="{11812C92-0668-408F-AE44-47ECD1C69BA6}" type="datetimeFigureOut">
               <a:rPr lang="en-US" smtClean="0"/>
               <a:pPr/>
-              <a:t>9/28/2018</a:t>
+              <a:t>10/22/2018</a:t>
             </a:fld>
             <a:endParaRPr lang="en-US"/>
           </a:p>
@@ -738,7 +739,7 @@
             <a:fld id="{1BA50D42-C9CD-4801-B293-61D1F53EC57E}" type="datetimeFigureOut">
               <a:rPr lang="de-DE" smtClean="0"/>
               <a:pPr/>
-              <a:t>28.09.2018</a:t>
+              <a:t>22.10.2018</a:t>
             </a:fld>
             <a:endParaRPr lang="de-DE"/>
           </a:p>
@@ -905,7 +906,7 @@
             <a:fld id="{1BA50D42-C9CD-4801-B293-61D1F53EC57E}" type="datetimeFigureOut">
               <a:rPr lang="de-DE" smtClean="0"/>
               <a:pPr/>
-              <a:t>28.09.2018</a:t>
+              <a:t>22.10.2018</a:t>
             </a:fld>
             <a:endParaRPr lang="de-DE"/>
           </a:p>
@@ -1082,7 +1083,7 @@
             <a:fld id="{1BA50D42-C9CD-4801-B293-61D1F53EC57E}" type="datetimeFigureOut">
               <a:rPr lang="de-DE" smtClean="0"/>
               <a:pPr/>
-              <a:t>28.09.2018</a:t>
+              <a:t>22.10.2018</a:t>
             </a:fld>
             <a:endParaRPr lang="de-DE"/>
           </a:p>
@@ -1249,7 +1250,7 @@
             <a:fld id="{1BA50D42-C9CD-4801-B293-61D1F53EC57E}" type="datetimeFigureOut">
               <a:rPr lang="de-DE" smtClean="0"/>
               <a:pPr/>
-              <a:t>28.09.2018</a:t>
+              <a:t>22.10.2018</a:t>
             </a:fld>
             <a:endParaRPr lang="de-DE"/>
           </a:p>
@@ -1492,7 +1493,7 @@
             <a:fld id="{1BA50D42-C9CD-4801-B293-61D1F53EC57E}" type="datetimeFigureOut">
               <a:rPr lang="de-DE" smtClean="0"/>
               <a:pPr/>
-              <a:t>28.09.2018</a:t>
+              <a:t>22.10.2018</a:t>
             </a:fld>
             <a:endParaRPr lang="de-DE"/>
           </a:p>
@@ -1777,7 +1778,7 @@
             <a:fld id="{1BA50D42-C9CD-4801-B293-61D1F53EC57E}" type="datetimeFigureOut">
               <a:rPr lang="de-DE" smtClean="0"/>
               <a:pPr/>
-              <a:t>28.09.2018</a:t>
+              <a:t>22.10.2018</a:t>
             </a:fld>
             <a:endParaRPr lang="de-DE"/>
           </a:p>
@@ -2196,7 +2197,7 @@
             <a:fld id="{1BA50D42-C9CD-4801-B293-61D1F53EC57E}" type="datetimeFigureOut">
               <a:rPr lang="de-DE" smtClean="0"/>
               <a:pPr/>
-              <a:t>28.09.2018</a:t>
+              <a:t>22.10.2018</a:t>
             </a:fld>
             <a:endParaRPr lang="de-DE"/>
           </a:p>
@@ -2311,7 +2312,7 @@
             <a:fld id="{1BA50D42-C9CD-4801-B293-61D1F53EC57E}" type="datetimeFigureOut">
               <a:rPr lang="de-DE" smtClean="0"/>
               <a:pPr/>
-              <a:t>28.09.2018</a:t>
+              <a:t>22.10.2018</a:t>
             </a:fld>
             <a:endParaRPr lang="de-DE"/>
           </a:p>
@@ -2403,7 +2404,7 @@
             <a:fld id="{1BA50D42-C9CD-4801-B293-61D1F53EC57E}" type="datetimeFigureOut">
               <a:rPr lang="de-DE" smtClean="0"/>
               <a:pPr/>
-              <a:t>28.09.2018</a:t>
+              <a:t>22.10.2018</a:t>
             </a:fld>
             <a:endParaRPr lang="de-DE"/>
           </a:p>
@@ -2677,7 +2678,7 @@
             <a:fld id="{1BA50D42-C9CD-4801-B293-61D1F53EC57E}" type="datetimeFigureOut">
               <a:rPr lang="de-DE" smtClean="0"/>
               <a:pPr/>
-              <a:t>28.09.2018</a:t>
+              <a:t>22.10.2018</a:t>
             </a:fld>
             <a:endParaRPr lang="de-DE"/>
           </a:p>
@@ -2927,7 +2928,7 @@
             <a:fld id="{1BA50D42-C9CD-4801-B293-61D1F53EC57E}" type="datetimeFigureOut">
               <a:rPr lang="de-DE" smtClean="0"/>
               <a:pPr/>
-              <a:t>28.09.2018</a:t>
+              <a:t>22.10.2018</a:t>
             </a:fld>
             <a:endParaRPr lang="de-DE"/>
           </a:p>
@@ -3137,7 +3138,7 @@
             <a:fld id="{1BA50D42-C9CD-4801-B293-61D1F53EC57E}" type="datetimeFigureOut">
               <a:rPr lang="de-DE" smtClean="0"/>
               <a:pPr/>
-              <a:t>28.09.2018</a:t>
+              <a:t>22.10.2018</a:t>
             </a:fld>
             <a:endParaRPr lang="de-DE"/>
           </a:p>
@@ -6448,11 +6449,6 @@
               </a:rPr>
               <a:t>In the Inspector view of an “assembly” we can specify that the AG analysis should be performed with the BMC algorithm.</a:t>
             </a:r>
-            <a:endParaRPr lang="en-US" sz="1050" b="1" dirty="0" smtClean="0">
-              <a:solidFill>
-                <a:srgbClr val="C00000"/>
-              </a:solidFill>
-            </a:endParaRPr>
           </a:p>
         </p:txBody>
       </p:sp>
@@ -6502,6 +6498,179 @@
           <a:xfrm flipH="1">
             <a:off x="1979712" y="2852936"/>
             <a:ext cx="1944216" cy="2520280"/>
+          </a:xfrm>
+          <a:prstGeom prst="straightConnector1">
+            <a:avLst/>
+          </a:prstGeom>
+          <a:ln w="19050">
+            <a:solidFill>
+              <a:srgbClr val="C00000"/>
+            </a:solidFill>
+            <a:tailEnd type="triangle"/>
+          </a:ln>
+        </p:spPr>
+        <p:style>
+          <a:lnRef idx="1">
+            <a:schemeClr val="accent1"/>
+          </a:lnRef>
+          <a:fillRef idx="0">
+            <a:schemeClr val="accent1"/>
+          </a:fillRef>
+          <a:effectRef idx="0">
+            <a:schemeClr val="accent1"/>
+          </a:effectRef>
+          <a:fontRef idx="minor">
+            <a:schemeClr val="tx1"/>
+          </a:fontRef>
+        </p:style>
+      </p:cxnSp>
+    </p:spTree>
+  </p:cSld>
+  <p:clrMapOvr>
+    <a:masterClrMapping/>
+  </p:clrMapOvr>
+</p:sld>
+</file>
+
+<file path=ppt/slides/slide17.xml><?xml version="1.0" encoding="utf-8"?>
+<p:sld xmlns:a="http://schemas.openxmlformats.org/drawingml/2006/main" xmlns:r="http://schemas.openxmlformats.org/officeDocument/2006/relationships" xmlns:p="http://schemas.openxmlformats.org/presentationml/2006/main">
+  <p:cSld>
+    <p:spTree>
+      <p:nvGrpSpPr>
+        <p:cNvPr id="1" name=""/>
+        <p:cNvGrpSpPr/>
+        <p:nvPr/>
+      </p:nvGrpSpPr>
+      <p:grpSpPr>
+        <a:xfrm>
+          <a:off x="0" y="0"/>
+          <a:ext cx="0" cy="0"/>
+          <a:chOff x="0" y="0"/>
+          <a:chExt cx="0" cy="0"/>
+        </a:xfrm>
+      </p:grpSpPr>
+      <p:pic>
+        <p:nvPicPr>
+          <p:cNvPr id="1027" name="Picture 3"/>
+          <p:cNvPicPr>
+            <a:picLocks noChangeAspect="1" noChangeArrowheads="1"/>
+          </p:cNvPicPr>
+          <p:nvPr/>
+        </p:nvPicPr>
+        <p:blipFill>
+          <a:blip r:embed="rId2" cstate="print"/>
+          <a:srcRect l="24013" t="4851" r="21650" b="67850"/>
+          <a:stretch>
+            <a:fillRect/>
+          </a:stretch>
+        </p:blipFill>
+        <p:spPr bwMode="auto">
+          <a:xfrm>
+            <a:off x="534013" y="332656"/>
+            <a:ext cx="7134331" cy="2016224"/>
+          </a:xfrm>
+          <a:prstGeom prst="rect">
+            <a:avLst/>
+          </a:prstGeom>
+          <a:noFill/>
+          <a:ln w="9525">
+            <a:noFill/>
+            <a:miter lim="800000"/>
+            <a:headEnd/>
+            <a:tailEnd/>
+          </a:ln>
+        </p:spPr>
+      </p:pic>
+      <p:sp>
+        <p:nvSpPr>
+          <p:cNvPr id="6" name="Textfeld 5"/>
+          <p:cNvSpPr txBox="1"/>
+          <p:nvPr/>
+        </p:nvSpPr>
+        <p:spPr>
+          <a:xfrm>
+            <a:off x="1403648" y="1556792"/>
+            <a:ext cx="2520280" cy="900246"/>
+          </a:xfrm>
+          <a:prstGeom prst="rect">
+            <a:avLst/>
+          </a:prstGeom>
+          <a:solidFill>
+            <a:schemeClr val="accent6">
+              <a:lumMod val="20000"/>
+              <a:lumOff val="80000"/>
+              <a:alpha val="76000"/>
+            </a:schemeClr>
+          </a:solidFill>
+        </p:spPr>
+        <p:txBody>
+          <a:bodyPr wrap="square" rtlCol="0">
+            <a:spAutoFit/>
+          </a:bodyPr>
+          <a:lstStyle/>
+          <a:p>
+            <a:r>
+              <a:rPr lang="en-US" sz="1050" b="1" dirty="0" smtClean="0">
+                <a:solidFill>
+                  <a:srgbClr val="C00000"/>
+                </a:solidFill>
+              </a:rPr>
+              <a:t>A refinement declaration links a component interface to a SMV module. Checking the refinement is performed by  using the “Check Refinement” pop-up menu.</a:t>
+            </a:r>
+            <a:endParaRPr lang="en-US" sz="1050" b="1" dirty="0" smtClean="0">
+              <a:solidFill>
+                <a:srgbClr val="C00000"/>
+              </a:solidFill>
+            </a:endParaRPr>
+          </a:p>
+        </p:txBody>
+      </p:sp>
+      <p:cxnSp>
+        <p:nvCxnSpPr>
+          <p:cNvPr id="7" name="Gerade Verbindung mit Pfeil 6"/>
+          <p:cNvCxnSpPr/>
+          <p:nvPr/>
+        </p:nvCxnSpPr>
+        <p:spPr>
+          <a:xfrm flipH="1" flipV="1">
+            <a:off x="1115616" y="1340768"/>
+            <a:ext cx="288032" cy="360040"/>
+          </a:xfrm>
+          <a:prstGeom prst="straightConnector1">
+            <a:avLst/>
+          </a:prstGeom>
+          <a:ln w="19050">
+            <a:solidFill>
+              <a:srgbClr val="C00000"/>
+            </a:solidFill>
+            <a:tailEnd type="triangle"/>
+          </a:ln>
+        </p:spPr>
+        <p:style>
+          <a:lnRef idx="1">
+            <a:schemeClr val="accent1"/>
+          </a:lnRef>
+          <a:fillRef idx="0">
+            <a:schemeClr val="accent1"/>
+          </a:fillRef>
+          <a:effectRef idx="0">
+            <a:schemeClr val="accent1"/>
+          </a:effectRef>
+          <a:fontRef idx="minor">
+            <a:schemeClr val="tx1"/>
+          </a:fontRef>
+        </p:style>
+      </p:cxnSp>
+      <p:cxnSp>
+        <p:nvCxnSpPr>
+          <p:cNvPr id="9" name="Gerade Verbindung mit Pfeil 8"/>
+          <p:cNvCxnSpPr/>
+          <p:nvPr/>
+        </p:nvCxnSpPr>
+        <p:spPr>
+          <a:xfrm flipV="1">
+            <a:off x="3923928" y="1628800"/>
+            <a:ext cx="648072" cy="360040"/>
           </a:xfrm>
           <a:prstGeom prst="straightConnector1">
             <a:avLst/>

</xml_diff>

<commit_message>
tutorial: added docu and example for "allowed_scenario" construct
</commit_message>
<xml_diff>
--- a/code/tutorial/solutions/com.mbeddr.formal.nusmv.users_guide/figures/figures.pptx
+++ b/code/tutorial/solutions/com.mbeddr.formal.nusmv.users_guide/figures/figures.pptx
@@ -5,26 +5,27 @@
     <p:sldMasterId id="2147483648" r:id="rId1"/>
   </p:sldMasterIdLst>
   <p:notesMasterIdLst>
-    <p:notesMasterId r:id="rId19"/>
+    <p:notesMasterId r:id="rId20"/>
   </p:notesMasterIdLst>
   <p:sldIdLst>
     <p:sldId id="256" r:id="rId2"/>
     <p:sldId id="263" r:id="rId3"/>
     <p:sldId id="257" r:id="rId4"/>
-    <p:sldId id="265" r:id="rId5"/>
-    <p:sldId id="264" r:id="rId6"/>
-    <p:sldId id="259" r:id="rId7"/>
-    <p:sldId id="258" r:id="rId8"/>
-    <p:sldId id="266" r:id="rId9"/>
-    <p:sldId id="260" r:id="rId10"/>
-    <p:sldId id="261" r:id="rId11"/>
-    <p:sldId id="262" r:id="rId12"/>
-    <p:sldId id="267" r:id="rId13"/>
-    <p:sldId id="268" r:id="rId14"/>
-    <p:sldId id="269" r:id="rId15"/>
-    <p:sldId id="271" r:id="rId16"/>
-    <p:sldId id="272" r:id="rId17"/>
-    <p:sldId id="273" r:id="rId18"/>
+    <p:sldId id="274" r:id="rId5"/>
+    <p:sldId id="265" r:id="rId6"/>
+    <p:sldId id="264" r:id="rId7"/>
+    <p:sldId id="259" r:id="rId8"/>
+    <p:sldId id="258" r:id="rId9"/>
+    <p:sldId id="266" r:id="rId10"/>
+    <p:sldId id="260" r:id="rId11"/>
+    <p:sldId id="261" r:id="rId12"/>
+    <p:sldId id="262" r:id="rId13"/>
+    <p:sldId id="267" r:id="rId14"/>
+    <p:sldId id="268" r:id="rId15"/>
+    <p:sldId id="269" r:id="rId16"/>
+    <p:sldId id="271" r:id="rId17"/>
+    <p:sldId id="272" r:id="rId18"/>
+    <p:sldId id="273" r:id="rId19"/>
   </p:sldIdLst>
   <p:sldSz cx="9144000" cy="6858000" type="screen4x3"/>
   <p:notesSz cx="6858000" cy="9144000"/>
@@ -209,7 +210,7 @@
             <a:fld id="{11812C92-0668-408F-AE44-47ECD1C69BA6}" type="datetimeFigureOut">
               <a:rPr lang="en-US" smtClean="0"/>
               <a:pPr/>
-              <a:t>10/22/2018</a:t>
+              <a:t>11/4/2018</a:t>
             </a:fld>
             <a:endParaRPr lang="en-US"/>
           </a:p>
@@ -739,7 +740,7 @@
             <a:fld id="{1BA50D42-C9CD-4801-B293-61D1F53EC57E}" type="datetimeFigureOut">
               <a:rPr lang="de-DE" smtClean="0"/>
               <a:pPr/>
-              <a:t>22.10.2018</a:t>
+              <a:t>04.11.2018</a:t>
             </a:fld>
             <a:endParaRPr lang="de-DE"/>
           </a:p>
@@ -906,7 +907,7 @@
             <a:fld id="{1BA50D42-C9CD-4801-B293-61D1F53EC57E}" type="datetimeFigureOut">
               <a:rPr lang="de-DE" smtClean="0"/>
               <a:pPr/>
-              <a:t>22.10.2018</a:t>
+              <a:t>04.11.2018</a:t>
             </a:fld>
             <a:endParaRPr lang="de-DE"/>
           </a:p>
@@ -1083,7 +1084,7 @@
             <a:fld id="{1BA50D42-C9CD-4801-B293-61D1F53EC57E}" type="datetimeFigureOut">
               <a:rPr lang="de-DE" smtClean="0"/>
               <a:pPr/>
-              <a:t>22.10.2018</a:t>
+              <a:t>04.11.2018</a:t>
             </a:fld>
             <a:endParaRPr lang="de-DE"/>
           </a:p>
@@ -1250,7 +1251,7 @@
             <a:fld id="{1BA50D42-C9CD-4801-B293-61D1F53EC57E}" type="datetimeFigureOut">
               <a:rPr lang="de-DE" smtClean="0"/>
               <a:pPr/>
-              <a:t>22.10.2018</a:t>
+              <a:t>04.11.2018</a:t>
             </a:fld>
             <a:endParaRPr lang="de-DE"/>
           </a:p>
@@ -1493,7 +1494,7 @@
             <a:fld id="{1BA50D42-C9CD-4801-B293-61D1F53EC57E}" type="datetimeFigureOut">
               <a:rPr lang="de-DE" smtClean="0"/>
               <a:pPr/>
-              <a:t>22.10.2018</a:t>
+              <a:t>04.11.2018</a:t>
             </a:fld>
             <a:endParaRPr lang="de-DE"/>
           </a:p>
@@ -1778,7 +1779,7 @@
             <a:fld id="{1BA50D42-C9CD-4801-B293-61D1F53EC57E}" type="datetimeFigureOut">
               <a:rPr lang="de-DE" smtClean="0"/>
               <a:pPr/>
-              <a:t>22.10.2018</a:t>
+              <a:t>04.11.2018</a:t>
             </a:fld>
             <a:endParaRPr lang="de-DE"/>
           </a:p>
@@ -2197,7 +2198,7 @@
             <a:fld id="{1BA50D42-C9CD-4801-B293-61D1F53EC57E}" type="datetimeFigureOut">
               <a:rPr lang="de-DE" smtClean="0"/>
               <a:pPr/>
-              <a:t>22.10.2018</a:t>
+              <a:t>04.11.2018</a:t>
             </a:fld>
             <a:endParaRPr lang="de-DE"/>
           </a:p>
@@ -2312,7 +2313,7 @@
             <a:fld id="{1BA50D42-C9CD-4801-B293-61D1F53EC57E}" type="datetimeFigureOut">
               <a:rPr lang="de-DE" smtClean="0"/>
               <a:pPr/>
-              <a:t>22.10.2018</a:t>
+              <a:t>04.11.2018</a:t>
             </a:fld>
             <a:endParaRPr lang="de-DE"/>
           </a:p>
@@ -2404,7 +2405,7 @@
             <a:fld id="{1BA50D42-C9CD-4801-B293-61D1F53EC57E}" type="datetimeFigureOut">
               <a:rPr lang="de-DE" smtClean="0"/>
               <a:pPr/>
-              <a:t>22.10.2018</a:t>
+              <a:t>04.11.2018</a:t>
             </a:fld>
             <a:endParaRPr lang="de-DE"/>
           </a:p>
@@ -2678,7 +2679,7 @@
             <a:fld id="{1BA50D42-C9CD-4801-B293-61D1F53EC57E}" type="datetimeFigureOut">
               <a:rPr lang="de-DE" smtClean="0"/>
               <a:pPr/>
-              <a:t>22.10.2018</a:t>
+              <a:t>04.11.2018</a:t>
             </a:fld>
             <a:endParaRPr lang="de-DE"/>
           </a:p>
@@ -2928,7 +2929,7 @@
             <a:fld id="{1BA50D42-C9CD-4801-B293-61D1F53EC57E}" type="datetimeFigureOut">
               <a:rPr lang="de-DE" smtClean="0"/>
               <a:pPr/>
-              <a:t>22.10.2018</a:t>
+              <a:t>04.11.2018</a:t>
             </a:fld>
             <a:endParaRPr lang="de-DE"/>
           </a:p>
@@ -3138,7 +3139,7 @@
             <a:fld id="{1BA50D42-C9CD-4801-B293-61D1F53EC57E}" type="datetimeFigureOut">
               <a:rPr lang="de-DE" smtClean="0"/>
               <a:pPr/>
-              <a:t>22.10.2018</a:t>
+              <a:t>04.11.2018</a:t>
             </a:fld>
             <a:endParaRPr lang="de-DE"/>
           </a:p>
@@ -4301,7 +4302,7 @@
       </p:grpSpPr>
       <p:pic>
         <p:nvPicPr>
-          <p:cNvPr id="4098" name="Picture 2"/>
+          <p:cNvPr id="3074" name="Picture 2"/>
           <p:cNvPicPr>
             <a:picLocks noChangeAspect="1" noChangeArrowheads="1"/>
           </p:cNvPicPr>
@@ -4316,8 +4317,8 @@
         </p:blipFill>
         <p:spPr bwMode="auto">
           <a:xfrm>
-            <a:off x="683568" y="404664"/>
-            <a:ext cx="7920881" cy="5112568"/>
+            <a:off x="1100138" y="371475"/>
+            <a:ext cx="6943725" cy="6115050"/>
           </a:xfrm>
           <a:prstGeom prst="rect">
             <a:avLst/>
@@ -4331,6 +4332,637 @@
           </a:ln>
         </p:spPr>
       </p:pic>
+      <p:sp>
+        <p:nvSpPr>
+          <p:cNvPr id="5" name="Textfeld 4"/>
+          <p:cNvSpPr txBox="1"/>
+          <p:nvPr/>
+        </p:nvSpPr>
+        <p:spPr>
+          <a:xfrm>
+            <a:off x="4932040" y="692696"/>
+            <a:ext cx="1096775" cy="253916"/>
+          </a:xfrm>
+          <a:prstGeom prst="rect">
+            <a:avLst/>
+          </a:prstGeom>
+          <a:solidFill>
+            <a:schemeClr val="accent6">
+              <a:lumMod val="20000"/>
+              <a:lumOff val="80000"/>
+              <a:alpha val="76000"/>
+            </a:schemeClr>
+          </a:solidFill>
+        </p:spPr>
+        <p:txBody>
+          <a:bodyPr wrap="none" rtlCol="0">
+            <a:spAutoFit/>
+          </a:bodyPr>
+          <a:lstStyle/>
+          <a:p>
+            <a:r>
+              <a:rPr lang="en-US" sz="1050" b="1" dirty="0" smtClean="0">
+                <a:solidFill>
+                  <a:srgbClr val="C00000"/>
+                </a:solidFill>
+              </a:rPr>
+              <a:t>states definition</a:t>
+            </a:r>
+          </a:p>
+        </p:txBody>
+      </p:sp>
+      <p:cxnSp>
+        <p:nvCxnSpPr>
+          <p:cNvPr id="6" name="Gerade Verbindung mit Pfeil 5"/>
+          <p:cNvCxnSpPr/>
+          <p:nvPr/>
+        </p:nvCxnSpPr>
+        <p:spPr>
+          <a:xfrm flipH="1">
+            <a:off x="3995936" y="836712"/>
+            <a:ext cx="864096" cy="0"/>
+          </a:xfrm>
+          <a:prstGeom prst="straightConnector1">
+            <a:avLst/>
+          </a:prstGeom>
+          <a:ln w="19050">
+            <a:solidFill>
+              <a:srgbClr val="C00000"/>
+            </a:solidFill>
+            <a:tailEnd type="triangle"/>
+          </a:ln>
+        </p:spPr>
+        <p:style>
+          <a:lnRef idx="1">
+            <a:schemeClr val="accent1"/>
+          </a:lnRef>
+          <a:fillRef idx="0">
+            <a:schemeClr val="accent1"/>
+          </a:fillRef>
+          <a:effectRef idx="0">
+            <a:schemeClr val="accent1"/>
+          </a:effectRef>
+          <a:fontRef idx="minor">
+            <a:schemeClr val="tx1"/>
+          </a:fontRef>
+        </p:style>
+      </p:cxnSp>
+      <p:sp>
+        <p:nvSpPr>
+          <p:cNvPr id="8" name="Textfeld 7"/>
+          <p:cNvSpPr txBox="1"/>
+          <p:nvPr/>
+        </p:nvSpPr>
+        <p:spPr>
+          <a:xfrm>
+            <a:off x="3059832" y="1340768"/>
+            <a:ext cx="1008111" cy="253916"/>
+          </a:xfrm>
+          <a:prstGeom prst="rect">
+            <a:avLst/>
+          </a:prstGeom>
+          <a:solidFill>
+            <a:schemeClr val="accent6">
+              <a:lumMod val="20000"/>
+              <a:lumOff val="80000"/>
+              <a:alpha val="76000"/>
+            </a:schemeClr>
+          </a:solidFill>
+        </p:spPr>
+        <p:txBody>
+          <a:bodyPr wrap="square" rtlCol="0">
+            <a:spAutoFit/>
+          </a:bodyPr>
+          <a:lstStyle/>
+          <a:p>
+            <a:r>
+              <a:rPr lang="en-US" sz="1050" b="1" dirty="0" smtClean="0">
+                <a:solidFill>
+                  <a:srgbClr val="C00000"/>
+                </a:solidFill>
+              </a:rPr>
+              <a:t>state variable</a:t>
+            </a:r>
+          </a:p>
+        </p:txBody>
+      </p:sp>
+      <p:cxnSp>
+        <p:nvCxnSpPr>
+          <p:cNvPr id="9" name="Gerade Verbindung mit Pfeil 8"/>
+          <p:cNvCxnSpPr/>
+          <p:nvPr/>
+        </p:nvCxnSpPr>
+        <p:spPr>
+          <a:xfrm flipH="1" flipV="1">
+            <a:off x="2195736" y="908720"/>
+            <a:ext cx="792088" cy="576064"/>
+          </a:xfrm>
+          <a:prstGeom prst="straightConnector1">
+            <a:avLst/>
+          </a:prstGeom>
+          <a:ln w="19050">
+            <a:solidFill>
+              <a:srgbClr val="C00000"/>
+            </a:solidFill>
+            <a:tailEnd type="triangle"/>
+          </a:ln>
+        </p:spPr>
+        <p:style>
+          <a:lnRef idx="1">
+            <a:schemeClr val="accent1"/>
+          </a:lnRef>
+          <a:fillRef idx="0">
+            <a:schemeClr val="accent1"/>
+          </a:fillRef>
+          <a:effectRef idx="0">
+            <a:schemeClr val="accent1"/>
+          </a:effectRef>
+          <a:fontRef idx="minor">
+            <a:schemeClr val="tx1"/>
+          </a:fontRef>
+        </p:style>
+      </p:cxnSp>
+      <p:sp>
+        <p:nvSpPr>
+          <p:cNvPr id="12" name="Textfeld 11"/>
+          <p:cNvSpPr txBox="1"/>
+          <p:nvPr/>
+        </p:nvSpPr>
+        <p:spPr>
+          <a:xfrm>
+            <a:off x="4499992" y="980728"/>
+            <a:ext cx="1598515" cy="253916"/>
+          </a:xfrm>
+          <a:prstGeom prst="rect">
+            <a:avLst/>
+          </a:prstGeom>
+          <a:solidFill>
+            <a:schemeClr val="accent6">
+              <a:lumMod val="20000"/>
+              <a:lumOff val="80000"/>
+              <a:alpha val="39000"/>
+            </a:schemeClr>
+          </a:solidFill>
+        </p:spPr>
+        <p:txBody>
+          <a:bodyPr wrap="none" rtlCol="0">
+            <a:spAutoFit/>
+          </a:bodyPr>
+          <a:lstStyle/>
+          <a:p>
+            <a:r>
+              <a:rPr lang="en-US" sz="1050" b="1" dirty="0" smtClean="0">
+                <a:solidFill>
+                  <a:srgbClr val="C00000"/>
+                </a:solidFill>
+              </a:rPr>
+              <a:t>additional state variables</a:t>
+            </a:r>
+            <a:endParaRPr lang="en-US" sz="1050" b="1" dirty="0">
+              <a:solidFill>
+                <a:srgbClr val="C00000"/>
+              </a:solidFill>
+            </a:endParaRPr>
+          </a:p>
+        </p:txBody>
+      </p:sp>
+      <p:sp>
+        <p:nvSpPr>
+          <p:cNvPr id="13" name="Geschweifte Klammer rechts 12"/>
+          <p:cNvSpPr/>
+          <p:nvPr/>
+        </p:nvSpPr>
+        <p:spPr>
+          <a:xfrm>
+            <a:off x="4283968" y="908720"/>
+            <a:ext cx="144016" cy="360040"/>
+          </a:xfrm>
+          <a:prstGeom prst="rightBrace">
+            <a:avLst/>
+          </a:prstGeom>
+        </p:spPr>
+        <p:style>
+          <a:lnRef idx="1">
+            <a:schemeClr val="accent1"/>
+          </a:lnRef>
+          <a:fillRef idx="0">
+            <a:schemeClr val="accent1"/>
+          </a:fillRef>
+          <a:effectRef idx="0">
+            <a:schemeClr val="accent1"/>
+          </a:effectRef>
+          <a:fontRef idx="minor">
+            <a:schemeClr val="tx1"/>
+          </a:fontRef>
+        </p:style>
+        <p:txBody>
+          <a:bodyPr rtlCol="0" anchor="ctr"/>
+          <a:lstStyle/>
+          <a:p>
+            <a:pPr algn="ctr"/>
+            <a:endParaRPr lang="en-US"/>
+          </a:p>
+        </p:txBody>
+      </p:sp>
+      <p:sp>
+        <p:nvSpPr>
+          <p:cNvPr id="14" name="Textfeld 13"/>
+          <p:cNvSpPr txBox="1"/>
+          <p:nvPr/>
+        </p:nvSpPr>
+        <p:spPr>
+          <a:xfrm>
+            <a:off x="8028384" y="2708920"/>
+            <a:ext cx="784189" cy="415498"/>
+          </a:xfrm>
+          <a:prstGeom prst="rect">
+            <a:avLst/>
+          </a:prstGeom>
+          <a:solidFill>
+            <a:schemeClr val="accent6">
+              <a:lumMod val="20000"/>
+              <a:lumOff val="80000"/>
+              <a:alpha val="39000"/>
+            </a:schemeClr>
+          </a:solidFill>
+        </p:spPr>
+        <p:txBody>
+          <a:bodyPr wrap="none" rtlCol="0">
+            <a:spAutoFit/>
+          </a:bodyPr>
+          <a:lstStyle/>
+          <a:p>
+            <a:r>
+              <a:rPr lang="en-US" sz="1050" b="1" dirty="0" smtClean="0">
+                <a:solidFill>
+                  <a:srgbClr val="C00000"/>
+                </a:solidFill>
+              </a:rPr>
+              <a:t>transitions</a:t>
+            </a:r>
+          </a:p>
+          <a:p>
+            <a:r>
+              <a:rPr lang="en-US" sz="1050" b="1" dirty="0" smtClean="0">
+                <a:solidFill>
+                  <a:srgbClr val="C00000"/>
+                </a:solidFill>
+              </a:rPr>
+              <a:t>definitions</a:t>
+            </a:r>
+            <a:endParaRPr lang="en-US" sz="1050" b="1" dirty="0">
+              <a:solidFill>
+                <a:srgbClr val="C00000"/>
+              </a:solidFill>
+            </a:endParaRPr>
+          </a:p>
+        </p:txBody>
+      </p:sp>
+      <p:sp>
+        <p:nvSpPr>
+          <p:cNvPr id="15" name="Geschweifte Klammer rechts 14"/>
+          <p:cNvSpPr/>
+          <p:nvPr/>
+        </p:nvSpPr>
+        <p:spPr>
+          <a:xfrm>
+            <a:off x="7812360" y="2636912"/>
+            <a:ext cx="144016" cy="1080120"/>
+          </a:xfrm>
+          <a:prstGeom prst="rightBrace">
+            <a:avLst/>
+          </a:prstGeom>
+        </p:spPr>
+        <p:style>
+          <a:lnRef idx="1">
+            <a:schemeClr val="accent1"/>
+          </a:lnRef>
+          <a:fillRef idx="0">
+            <a:schemeClr val="accent1"/>
+          </a:fillRef>
+          <a:effectRef idx="0">
+            <a:schemeClr val="accent1"/>
+          </a:effectRef>
+          <a:fontRef idx="minor">
+            <a:schemeClr val="tx1"/>
+          </a:fontRef>
+        </p:style>
+        <p:txBody>
+          <a:bodyPr rtlCol="0" anchor="ctr"/>
+          <a:lstStyle/>
+          <a:p>
+            <a:pPr algn="ctr"/>
+            <a:endParaRPr lang="en-US"/>
+          </a:p>
+        </p:txBody>
+      </p:sp>
+      <p:sp>
+        <p:nvSpPr>
+          <p:cNvPr id="16" name="Textfeld 15"/>
+          <p:cNvSpPr txBox="1"/>
+          <p:nvPr/>
+        </p:nvSpPr>
+        <p:spPr>
+          <a:xfrm>
+            <a:off x="1403648" y="3068960"/>
+            <a:ext cx="1080119" cy="253916"/>
+          </a:xfrm>
+          <a:prstGeom prst="rect">
+            <a:avLst/>
+          </a:prstGeom>
+          <a:solidFill>
+            <a:schemeClr val="accent6">
+              <a:lumMod val="20000"/>
+              <a:lumOff val="80000"/>
+              <a:alpha val="76000"/>
+            </a:schemeClr>
+          </a:solidFill>
+        </p:spPr>
+        <p:txBody>
+          <a:bodyPr wrap="square" rtlCol="0">
+            <a:spAutoFit/>
+          </a:bodyPr>
+          <a:lstStyle/>
+          <a:p>
+            <a:r>
+              <a:rPr lang="en-US" sz="1050" b="1" dirty="0" smtClean="0">
+                <a:solidFill>
+                  <a:srgbClr val="C00000"/>
+                </a:solidFill>
+              </a:rPr>
+              <a:t>transition name</a:t>
+            </a:r>
+          </a:p>
+        </p:txBody>
+      </p:sp>
+      <p:cxnSp>
+        <p:nvCxnSpPr>
+          <p:cNvPr id="17" name="Gerade Verbindung mit Pfeil 16"/>
+          <p:cNvCxnSpPr/>
+          <p:nvPr/>
+        </p:nvCxnSpPr>
+        <p:spPr>
+          <a:xfrm flipV="1">
+            <a:off x="2555776" y="2996952"/>
+            <a:ext cx="288032" cy="144016"/>
+          </a:xfrm>
+          <a:prstGeom prst="straightConnector1">
+            <a:avLst/>
+          </a:prstGeom>
+          <a:ln w="19050">
+            <a:solidFill>
+              <a:srgbClr val="C00000"/>
+            </a:solidFill>
+            <a:tailEnd type="triangle"/>
+          </a:ln>
+        </p:spPr>
+        <p:style>
+          <a:lnRef idx="1">
+            <a:schemeClr val="accent1"/>
+          </a:lnRef>
+          <a:fillRef idx="0">
+            <a:schemeClr val="accent1"/>
+          </a:fillRef>
+          <a:effectRef idx="0">
+            <a:schemeClr val="accent1"/>
+          </a:effectRef>
+          <a:fontRef idx="minor">
+            <a:schemeClr val="tx1"/>
+          </a:fontRef>
+        </p:style>
+      </p:cxnSp>
+      <p:sp>
+        <p:nvSpPr>
+          <p:cNvPr id="19" name="Geschweifte Klammer rechts 18"/>
+          <p:cNvSpPr/>
+          <p:nvPr/>
+        </p:nvSpPr>
+        <p:spPr>
+          <a:xfrm rot="16200000">
+            <a:off x="5400092" y="1016732"/>
+            <a:ext cx="216023" cy="3024336"/>
+          </a:xfrm>
+          <a:prstGeom prst="rightBrace">
+            <a:avLst/>
+          </a:prstGeom>
+        </p:spPr>
+        <p:style>
+          <a:lnRef idx="1">
+            <a:schemeClr val="accent1"/>
+          </a:lnRef>
+          <a:fillRef idx="0">
+            <a:schemeClr val="accent1"/>
+          </a:fillRef>
+          <a:effectRef idx="0">
+            <a:schemeClr val="accent1"/>
+          </a:effectRef>
+          <a:fontRef idx="minor">
+            <a:schemeClr val="tx1"/>
+          </a:fontRef>
+        </p:style>
+        <p:txBody>
+          <a:bodyPr rtlCol="0" anchor="ctr"/>
+          <a:lstStyle/>
+          <a:p>
+            <a:pPr algn="ctr"/>
+            <a:endParaRPr lang="en-US"/>
+          </a:p>
+        </p:txBody>
+      </p:sp>
+      <p:sp>
+        <p:nvSpPr>
+          <p:cNvPr id="20" name="Textfeld 19"/>
+          <p:cNvSpPr txBox="1"/>
+          <p:nvPr/>
+        </p:nvSpPr>
+        <p:spPr>
+          <a:xfrm>
+            <a:off x="5220072" y="2132856"/>
+            <a:ext cx="506870" cy="253916"/>
+          </a:xfrm>
+          <a:prstGeom prst="rect">
+            <a:avLst/>
+          </a:prstGeom>
+          <a:solidFill>
+            <a:schemeClr val="accent6">
+              <a:lumMod val="20000"/>
+              <a:lumOff val="80000"/>
+              <a:alpha val="39000"/>
+            </a:schemeClr>
+          </a:solidFill>
+        </p:spPr>
+        <p:txBody>
+          <a:bodyPr wrap="none" rtlCol="0">
+            <a:spAutoFit/>
+          </a:bodyPr>
+          <a:lstStyle/>
+          <a:p>
+            <a:r>
+              <a:rPr lang="en-US" sz="1050" b="1" dirty="0" smtClean="0">
+                <a:solidFill>
+                  <a:srgbClr val="C00000"/>
+                </a:solidFill>
+              </a:rPr>
+              <a:t>guard</a:t>
+            </a:r>
+            <a:endParaRPr lang="en-US" sz="1050" b="1" dirty="0">
+              <a:solidFill>
+                <a:srgbClr val="C00000"/>
+              </a:solidFill>
+            </a:endParaRPr>
+          </a:p>
+        </p:txBody>
+      </p:sp>
+      <p:sp>
+        <p:nvSpPr>
+          <p:cNvPr id="22" name="Textfeld 21"/>
+          <p:cNvSpPr txBox="1"/>
+          <p:nvPr/>
+        </p:nvSpPr>
+        <p:spPr>
+          <a:xfrm>
+            <a:off x="1403648" y="4797152"/>
+            <a:ext cx="1296144" cy="253916"/>
+          </a:xfrm>
+          <a:prstGeom prst="rect">
+            <a:avLst/>
+          </a:prstGeom>
+          <a:solidFill>
+            <a:schemeClr val="accent6">
+              <a:lumMod val="20000"/>
+              <a:lumOff val="80000"/>
+              <a:alpha val="76000"/>
+            </a:schemeClr>
+          </a:solidFill>
+        </p:spPr>
+        <p:txBody>
+          <a:bodyPr wrap="square" rtlCol="0">
+            <a:spAutoFit/>
+          </a:bodyPr>
+          <a:lstStyle/>
+          <a:p>
+            <a:r>
+              <a:rPr lang="en-US" sz="1050" b="1" dirty="0" smtClean="0">
+                <a:solidFill>
+                  <a:srgbClr val="C00000"/>
+                </a:solidFill>
+              </a:rPr>
+              <a:t>transition reference</a:t>
+            </a:r>
+          </a:p>
+        </p:txBody>
+      </p:sp>
+      <p:cxnSp>
+        <p:nvCxnSpPr>
+          <p:cNvPr id="23" name="Gerade Verbindung mit Pfeil 22"/>
+          <p:cNvCxnSpPr/>
+          <p:nvPr/>
+        </p:nvCxnSpPr>
+        <p:spPr>
+          <a:xfrm flipV="1">
+            <a:off x="2555776" y="4615244"/>
+            <a:ext cx="288032" cy="144016"/>
+          </a:xfrm>
+          <a:prstGeom prst="straightConnector1">
+            <a:avLst/>
+          </a:prstGeom>
+          <a:ln w="19050">
+            <a:solidFill>
+              <a:srgbClr val="C00000"/>
+            </a:solidFill>
+            <a:tailEnd type="triangle"/>
+          </a:ln>
+        </p:spPr>
+        <p:style>
+          <a:lnRef idx="1">
+            <a:schemeClr val="accent1"/>
+          </a:lnRef>
+          <a:fillRef idx="0">
+            <a:schemeClr val="accent1"/>
+          </a:fillRef>
+          <a:effectRef idx="0">
+            <a:schemeClr val="accent1"/>
+          </a:effectRef>
+          <a:fontRef idx="minor">
+            <a:schemeClr val="tx1"/>
+          </a:fontRef>
+        </p:style>
+      </p:cxnSp>
+      <p:sp>
+        <p:nvSpPr>
+          <p:cNvPr id="24" name="Textfeld 23"/>
+          <p:cNvSpPr txBox="1"/>
+          <p:nvPr/>
+        </p:nvSpPr>
+        <p:spPr>
+          <a:xfrm>
+            <a:off x="3059832" y="2060848"/>
+            <a:ext cx="1440160" cy="253916"/>
+          </a:xfrm>
+          <a:prstGeom prst="rect">
+            <a:avLst/>
+          </a:prstGeom>
+          <a:solidFill>
+            <a:schemeClr val="accent6">
+              <a:lumMod val="20000"/>
+              <a:lumOff val="80000"/>
+              <a:alpha val="76000"/>
+            </a:schemeClr>
+          </a:solidFill>
+        </p:spPr>
+        <p:txBody>
+          <a:bodyPr wrap="square" rtlCol="0">
+            <a:spAutoFit/>
+          </a:bodyPr>
+          <a:lstStyle/>
+          <a:p>
+            <a:r>
+              <a:rPr lang="en-US" sz="1050" b="1" dirty="0" smtClean="0">
+                <a:solidFill>
+                  <a:srgbClr val="C00000"/>
+                </a:solidFill>
+              </a:rPr>
+              <a:t>state-machine section</a:t>
+            </a:r>
+          </a:p>
+        </p:txBody>
+      </p:sp>
+      <p:cxnSp>
+        <p:nvCxnSpPr>
+          <p:cNvPr id="25" name="Gerade Verbindung mit Pfeil 24"/>
+          <p:cNvCxnSpPr/>
+          <p:nvPr/>
+        </p:nvCxnSpPr>
+        <p:spPr>
+          <a:xfrm flipH="1">
+            <a:off x="2483768" y="2204864"/>
+            <a:ext cx="504056" cy="0"/>
+          </a:xfrm>
+          <a:prstGeom prst="straightConnector1">
+            <a:avLst/>
+          </a:prstGeom>
+          <a:ln w="19050">
+            <a:solidFill>
+              <a:srgbClr val="C00000"/>
+            </a:solidFill>
+            <a:tailEnd type="triangle"/>
+          </a:ln>
+        </p:spPr>
+        <p:style>
+          <a:lnRef idx="1">
+            <a:schemeClr val="accent1"/>
+          </a:lnRef>
+          <a:fillRef idx="0">
+            <a:schemeClr val="accent1"/>
+          </a:fillRef>
+          <a:effectRef idx="0">
+            <a:schemeClr val="accent1"/>
+          </a:effectRef>
+          <a:fontRef idx="minor">
+            <a:schemeClr val="tx1"/>
+          </a:fontRef>
+        </p:style>
+      </p:cxnSp>
     </p:spTree>
   </p:cSld>
   <p:clrMapOvr>
@@ -4365,7 +4997,7 @@
       </p:grpSpPr>
       <p:pic>
         <p:nvPicPr>
-          <p:cNvPr id="5122" name="Picture 2"/>
+          <p:cNvPr id="4098" name="Picture 2"/>
           <p:cNvPicPr>
             <a:picLocks noChangeAspect="1" noChangeArrowheads="1"/>
           </p:cNvPicPr>
@@ -4380,8 +5012,8 @@
         </p:blipFill>
         <p:spPr bwMode="auto">
           <a:xfrm>
-            <a:off x="2267744" y="1124744"/>
-            <a:ext cx="4333875" cy="2324100"/>
+            <a:off x="683568" y="404664"/>
+            <a:ext cx="7920881" cy="5112568"/>
           </a:xfrm>
           <a:prstGeom prst="rect">
             <a:avLst/>
@@ -4395,165 +5027,6 @@
           </a:ln>
         </p:spPr>
       </p:pic>
-      <p:sp>
-        <p:nvSpPr>
-          <p:cNvPr id="5" name="Textfeld 4"/>
-          <p:cNvSpPr txBox="1"/>
-          <p:nvPr/>
-        </p:nvSpPr>
-        <p:spPr>
-          <a:xfrm>
-            <a:off x="5580112" y="980728"/>
-            <a:ext cx="785793" cy="253916"/>
-          </a:xfrm>
-          <a:prstGeom prst="rect">
-            <a:avLst/>
-          </a:prstGeom>
-          <a:solidFill>
-            <a:schemeClr val="accent6">
-              <a:lumMod val="20000"/>
-              <a:lumOff val="80000"/>
-              <a:alpha val="76000"/>
-            </a:schemeClr>
-          </a:solidFill>
-        </p:spPr>
-        <p:txBody>
-          <a:bodyPr wrap="none" rtlCol="0">
-            <a:spAutoFit/>
-          </a:bodyPr>
-          <a:lstStyle/>
-          <a:p>
-            <a:r>
-              <a:rPr lang="en-US" sz="1050" b="1" dirty="0" smtClean="0">
-                <a:solidFill>
-                  <a:srgbClr val="C00000"/>
-                </a:solidFill>
-              </a:rPr>
-              <a:t>definitions</a:t>
-            </a:r>
-          </a:p>
-        </p:txBody>
-      </p:sp>
-      <p:sp>
-        <p:nvSpPr>
-          <p:cNvPr id="8" name="Geschweifte Klammer rechts 7"/>
-          <p:cNvSpPr/>
-          <p:nvPr/>
-        </p:nvSpPr>
-        <p:spPr>
-          <a:xfrm rot="16200000">
-            <a:off x="5868146" y="764703"/>
-            <a:ext cx="144014" cy="1152130"/>
-          </a:xfrm>
-          <a:prstGeom prst="rightBrace">
-            <a:avLst/>
-          </a:prstGeom>
-        </p:spPr>
-        <p:style>
-          <a:lnRef idx="1">
-            <a:schemeClr val="accent1"/>
-          </a:lnRef>
-          <a:fillRef idx="0">
-            <a:schemeClr val="accent1"/>
-          </a:fillRef>
-          <a:effectRef idx="0">
-            <a:schemeClr val="accent1"/>
-          </a:effectRef>
-          <a:fontRef idx="minor">
-            <a:schemeClr val="tx1"/>
-          </a:fontRef>
-        </p:style>
-        <p:txBody>
-          <a:bodyPr rtlCol="0" anchor="ctr"/>
-          <a:lstStyle/>
-          <a:p>
-            <a:pPr algn="ctr"/>
-            <a:endParaRPr lang="en-US"/>
-          </a:p>
-        </p:txBody>
-      </p:sp>
-      <p:sp>
-        <p:nvSpPr>
-          <p:cNvPr id="9" name="Textfeld 8"/>
-          <p:cNvSpPr txBox="1"/>
-          <p:nvPr/>
-        </p:nvSpPr>
-        <p:spPr>
-          <a:xfrm>
-            <a:off x="3059832" y="3247092"/>
-            <a:ext cx="1813317" cy="253916"/>
-          </a:xfrm>
-          <a:prstGeom prst="rect">
-            <a:avLst/>
-          </a:prstGeom>
-          <a:solidFill>
-            <a:schemeClr val="accent6">
-              <a:lumMod val="20000"/>
-              <a:lumOff val="80000"/>
-              <a:alpha val="39000"/>
-            </a:schemeClr>
-          </a:solidFill>
-        </p:spPr>
-        <p:txBody>
-          <a:bodyPr wrap="none" rtlCol="0">
-            <a:spAutoFit/>
-          </a:bodyPr>
-          <a:lstStyle/>
-          <a:p>
-            <a:r>
-              <a:rPr lang="en-US" sz="1050" b="1" dirty="0" smtClean="0">
-                <a:solidFill>
-                  <a:srgbClr val="C00000"/>
-                </a:solidFill>
-              </a:rPr>
-              <a:t>complex cascaded conditions</a:t>
-            </a:r>
-            <a:endParaRPr lang="en-US" sz="1050" b="1" dirty="0">
-              <a:solidFill>
-                <a:srgbClr val="C00000"/>
-              </a:solidFill>
-            </a:endParaRPr>
-          </a:p>
-        </p:txBody>
-      </p:sp>
-      <p:sp>
-        <p:nvSpPr>
-          <p:cNvPr id="10" name="Geschweifte Klammer rechts 9"/>
-          <p:cNvSpPr/>
-          <p:nvPr/>
-        </p:nvSpPr>
-        <p:spPr>
-          <a:xfrm rot="5400000">
-            <a:off x="3887924" y="1952836"/>
-            <a:ext cx="144016" cy="2376264"/>
-          </a:xfrm>
-          <a:prstGeom prst="rightBrace">
-            <a:avLst/>
-          </a:prstGeom>
-        </p:spPr>
-        <p:style>
-          <a:lnRef idx="1">
-            <a:schemeClr val="accent1"/>
-          </a:lnRef>
-          <a:fillRef idx="0">
-            <a:schemeClr val="accent1"/>
-          </a:fillRef>
-          <a:effectRef idx="0">
-            <a:schemeClr val="accent1"/>
-          </a:effectRef>
-          <a:fontRef idx="minor">
-            <a:schemeClr val="tx1"/>
-          </a:fontRef>
-        </p:style>
-        <p:txBody>
-          <a:bodyPr rtlCol="0" anchor="ctr"/>
-          <a:lstStyle/>
-          <a:p>
-            <a:pPr algn="ctr"/>
-            <a:endParaRPr lang="en-US"/>
-          </a:p>
-        </p:txBody>
-      </p:sp>
     </p:spTree>
   </p:cSld>
   <p:clrMapOvr>
@@ -4588,7 +5061,7 @@
       </p:grpSpPr>
       <p:pic>
         <p:nvPicPr>
-          <p:cNvPr id="1026" name="Picture 2"/>
+          <p:cNvPr id="5122" name="Picture 2"/>
           <p:cNvPicPr>
             <a:picLocks noChangeAspect="1" noChangeArrowheads="1"/>
           </p:cNvPicPr>
@@ -4603,8 +5076,8 @@
         </p:blipFill>
         <p:spPr bwMode="auto">
           <a:xfrm>
-            <a:off x="323528" y="620688"/>
-            <a:ext cx="8325370" cy="4932586"/>
+            <a:off x="2267744" y="1124744"/>
+            <a:ext cx="4333875" cy="2324100"/>
           </a:xfrm>
           <a:prstGeom prst="rect">
             <a:avLst/>
@@ -4626,8 +5099,8 @@
         </p:nvSpPr>
         <p:spPr>
           <a:xfrm>
-            <a:off x="2195736" y="2276872"/>
-            <a:ext cx="1224136" cy="253916"/>
+            <a:off x="5580112" y="980728"/>
+            <a:ext cx="785793" cy="253916"/>
           </a:xfrm>
           <a:prstGeom prst="rect">
             <a:avLst/>
@@ -4641,7 +5114,7 @@
           </a:solidFill>
         </p:spPr>
         <p:txBody>
-          <a:bodyPr wrap="square" rtlCol="0">
+          <a:bodyPr wrap="none" rtlCol="0">
             <a:spAutoFit/>
           </a:bodyPr>
           <a:lstStyle/>
@@ -4652,31 +5125,25 @@
                   <a:srgbClr val="C00000"/>
                 </a:solidFill>
               </a:rPr>
-              <a:t>graphical widgets</a:t>
-            </a:r>
-          </a:p>
-        </p:txBody>
-      </p:sp>
-      <p:cxnSp>
-        <p:nvCxnSpPr>
-          <p:cNvPr id="6" name="Gerade Verbindung mit Pfeil 5"/>
-          <p:cNvCxnSpPr/>
-          <p:nvPr/>
-        </p:nvCxnSpPr>
-        <p:spPr>
-          <a:xfrm flipH="1" flipV="1">
-            <a:off x="1187624" y="1844824"/>
-            <a:ext cx="936104" cy="576064"/>
-          </a:xfrm>
-          <a:prstGeom prst="straightConnector1">
-            <a:avLst/>
-          </a:prstGeom>
-          <a:ln w="19050">
-            <a:solidFill>
-              <a:srgbClr val="C00000"/>
-            </a:solidFill>
-            <a:tailEnd type="triangle"/>
-          </a:ln>
+              <a:t>definitions</a:t>
+            </a:r>
+          </a:p>
+        </p:txBody>
+      </p:sp>
+      <p:sp>
+        <p:nvSpPr>
+          <p:cNvPr id="8" name="Geschweifte Klammer rechts 7"/>
+          <p:cNvSpPr/>
+          <p:nvPr/>
+        </p:nvSpPr>
+        <p:spPr>
+          <a:xfrm rot="16200000">
+            <a:off x="5868146" y="764703"/>
+            <a:ext cx="144014" cy="1152130"/>
+          </a:xfrm>
+          <a:prstGeom prst="rightBrace">
+            <a:avLst/>
+          </a:prstGeom>
         </p:spPr>
         <p:style>
           <a:lnRef idx="1">
@@ -4692,27 +5159,73 @@
             <a:schemeClr val="tx1"/>
           </a:fontRef>
         </p:style>
-      </p:cxnSp>
-      <p:cxnSp>
-        <p:nvCxnSpPr>
-          <p:cNvPr id="8" name="Gerade Verbindung mit Pfeil 7"/>
-          <p:cNvCxnSpPr/>
-          <p:nvPr/>
-        </p:nvCxnSpPr>
-        <p:spPr>
-          <a:xfrm flipH="1" flipV="1">
-            <a:off x="2699792" y="1988840"/>
-            <a:ext cx="504056" cy="288032"/>
-          </a:xfrm>
-          <a:prstGeom prst="straightConnector1">
-            <a:avLst/>
-          </a:prstGeom>
-          <a:ln w="19050">
-            <a:solidFill>
-              <a:srgbClr val="C00000"/>
-            </a:solidFill>
-            <a:tailEnd type="triangle"/>
-          </a:ln>
+        <p:txBody>
+          <a:bodyPr rtlCol="0" anchor="ctr"/>
+          <a:lstStyle/>
+          <a:p>
+            <a:pPr algn="ctr"/>
+            <a:endParaRPr lang="en-US"/>
+          </a:p>
+        </p:txBody>
+      </p:sp>
+      <p:sp>
+        <p:nvSpPr>
+          <p:cNvPr id="9" name="Textfeld 8"/>
+          <p:cNvSpPr txBox="1"/>
+          <p:nvPr/>
+        </p:nvSpPr>
+        <p:spPr>
+          <a:xfrm>
+            <a:off x="3059832" y="3247092"/>
+            <a:ext cx="1813317" cy="253916"/>
+          </a:xfrm>
+          <a:prstGeom prst="rect">
+            <a:avLst/>
+          </a:prstGeom>
+          <a:solidFill>
+            <a:schemeClr val="accent6">
+              <a:lumMod val="20000"/>
+              <a:lumOff val="80000"/>
+              <a:alpha val="39000"/>
+            </a:schemeClr>
+          </a:solidFill>
+        </p:spPr>
+        <p:txBody>
+          <a:bodyPr wrap="none" rtlCol="0">
+            <a:spAutoFit/>
+          </a:bodyPr>
+          <a:lstStyle/>
+          <a:p>
+            <a:r>
+              <a:rPr lang="en-US" sz="1050" b="1" dirty="0" smtClean="0">
+                <a:solidFill>
+                  <a:srgbClr val="C00000"/>
+                </a:solidFill>
+              </a:rPr>
+              <a:t>complex cascaded conditions</a:t>
+            </a:r>
+            <a:endParaRPr lang="en-US" sz="1050" b="1" dirty="0">
+              <a:solidFill>
+                <a:srgbClr val="C00000"/>
+              </a:solidFill>
+            </a:endParaRPr>
+          </a:p>
+        </p:txBody>
+      </p:sp>
+      <p:sp>
+        <p:nvSpPr>
+          <p:cNvPr id="10" name="Geschweifte Klammer rechts 9"/>
+          <p:cNvSpPr/>
+          <p:nvPr/>
+        </p:nvSpPr>
+        <p:spPr>
+          <a:xfrm rot="5400000">
+            <a:off x="3887924" y="1952836"/>
+            <a:ext cx="144016" cy="2376264"/>
+          </a:xfrm>
+          <a:prstGeom prst="rightBrace">
+            <a:avLst/>
+          </a:prstGeom>
         </p:spPr>
         <p:style>
           <a:lnRef idx="1">
@@ -4728,354 +5241,6 @@
             <a:schemeClr val="tx1"/>
           </a:fontRef>
         </p:style>
-      </p:cxnSp>
-      <p:sp>
-        <p:nvSpPr>
-          <p:cNvPr id="10" name="Textfeld 9"/>
-          <p:cNvSpPr txBox="1"/>
-          <p:nvPr/>
-        </p:nvSpPr>
-        <p:spPr>
-          <a:xfrm>
-            <a:off x="1979712" y="2996952"/>
-            <a:ext cx="1800200" cy="577081"/>
-          </a:xfrm>
-          <a:prstGeom prst="rect">
-            <a:avLst/>
-          </a:prstGeom>
-          <a:solidFill>
-            <a:schemeClr val="accent6">
-              <a:lumMod val="20000"/>
-              <a:lumOff val="80000"/>
-              <a:alpha val="76000"/>
-            </a:schemeClr>
-          </a:solidFill>
-        </p:spPr>
-        <p:txBody>
-          <a:bodyPr wrap="square" rtlCol="0">
-            <a:spAutoFit/>
-          </a:bodyPr>
-          <a:lstStyle/>
-          <a:p>
-            <a:r>
-              <a:rPr lang="en-US" sz="1050" b="1" dirty="0" smtClean="0">
-                <a:solidFill>
-                  <a:srgbClr val="C00000"/>
-                </a:solidFill>
-              </a:rPr>
-              <a:t>By clicking on a widget, its properties are displayed in the inspector </a:t>
-            </a:r>
-          </a:p>
-        </p:txBody>
-      </p:sp>
-      <p:cxnSp>
-        <p:nvCxnSpPr>
-          <p:cNvPr id="11" name="Gerade Verbindung mit Pfeil 10"/>
-          <p:cNvCxnSpPr/>
-          <p:nvPr/>
-        </p:nvCxnSpPr>
-        <p:spPr>
-          <a:xfrm flipH="1" flipV="1">
-            <a:off x="1043608" y="2204864"/>
-            <a:ext cx="864096" cy="792088"/>
-          </a:xfrm>
-          <a:prstGeom prst="straightConnector1">
-            <a:avLst/>
-          </a:prstGeom>
-          <a:ln w="19050">
-            <a:solidFill>
-              <a:srgbClr val="C00000"/>
-            </a:solidFill>
-            <a:tailEnd type="triangle"/>
-          </a:ln>
-        </p:spPr>
-        <p:style>
-          <a:lnRef idx="1">
-            <a:schemeClr val="accent1"/>
-          </a:lnRef>
-          <a:fillRef idx="0">
-            <a:schemeClr val="accent1"/>
-          </a:fillRef>
-          <a:effectRef idx="0">
-            <a:schemeClr val="accent1"/>
-          </a:effectRef>
-          <a:fontRef idx="minor">
-            <a:schemeClr val="tx1"/>
-          </a:fontRef>
-        </p:style>
-      </p:cxnSp>
-      <p:cxnSp>
-        <p:nvCxnSpPr>
-          <p:cNvPr id="13" name="Gerade Verbindung mit Pfeil 12"/>
-          <p:cNvCxnSpPr>
-            <a:stCxn id="10" idx="2"/>
-          </p:cNvCxnSpPr>
-          <p:nvPr/>
-        </p:nvCxnSpPr>
-        <p:spPr>
-          <a:xfrm flipH="1">
-            <a:off x="2483768" y="3574033"/>
-            <a:ext cx="396044" cy="503039"/>
-          </a:xfrm>
-          <a:prstGeom prst="straightConnector1">
-            <a:avLst/>
-          </a:prstGeom>
-          <a:ln w="19050">
-            <a:solidFill>
-              <a:srgbClr val="C00000"/>
-            </a:solidFill>
-            <a:tailEnd type="triangle"/>
-          </a:ln>
-        </p:spPr>
-        <p:style>
-          <a:lnRef idx="1">
-            <a:schemeClr val="accent1"/>
-          </a:lnRef>
-          <a:fillRef idx="0">
-            <a:schemeClr val="accent1"/>
-          </a:fillRef>
-          <a:effectRef idx="0">
-            <a:schemeClr val="accent1"/>
-          </a:effectRef>
-          <a:fontRef idx="minor">
-            <a:schemeClr val="tx1"/>
-          </a:fontRef>
-        </p:style>
-      </p:cxnSp>
-      <p:sp>
-        <p:nvSpPr>
-          <p:cNvPr id="16" name="Textfeld 15"/>
-          <p:cNvSpPr txBox="1"/>
-          <p:nvPr/>
-        </p:nvSpPr>
-        <p:spPr>
-          <a:xfrm>
-            <a:off x="4283968" y="4005064"/>
-            <a:ext cx="3096344" cy="253916"/>
-          </a:xfrm>
-          <a:prstGeom prst="rect">
-            <a:avLst/>
-          </a:prstGeom>
-          <a:solidFill>
-            <a:schemeClr val="accent6">
-              <a:lumMod val="20000"/>
-              <a:lumOff val="80000"/>
-              <a:alpha val="76000"/>
-            </a:schemeClr>
-          </a:solidFill>
-        </p:spPr>
-        <p:txBody>
-          <a:bodyPr wrap="square" rtlCol="0">
-            <a:spAutoFit/>
-          </a:bodyPr>
-          <a:lstStyle/>
-          <a:p>
-            <a:r>
-              <a:rPr lang="en-US" sz="1050" b="1" dirty="0" smtClean="0">
-                <a:solidFill>
-                  <a:srgbClr val="C00000"/>
-                </a:solidFill>
-              </a:rPr>
-              <a:t>Properties of widget include its size, color, text, …</a:t>
-            </a:r>
-          </a:p>
-        </p:txBody>
-      </p:sp>
-      <p:sp>
-        <p:nvSpPr>
-          <p:cNvPr id="17" name="Textfeld 16"/>
-          <p:cNvSpPr txBox="1"/>
-          <p:nvPr/>
-        </p:nvSpPr>
-        <p:spPr>
-          <a:xfrm>
-            <a:off x="6516216" y="4544978"/>
-            <a:ext cx="2304256" cy="900246"/>
-          </a:xfrm>
-          <a:prstGeom prst="rect">
-            <a:avLst/>
-          </a:prstGeom>
-          <a:solidFill>
-            <a:schemeClr val="accent6">
-              <a:lumMod val="20000"/>
-              <a:lumOff val="80000"/>
-              <a:alpha val="76000"/>
-            </a:schemeClr>
-          </a:solidFill>
-        </p:spPr>
-        <p:txBody>
-          <a:bodyPr wrap="square" rtlCol="0">
-            <a:spAutoFit/>
-          </a:bodyPr>
-          <a:lstStyle/>
-          <a:p>
-            <a:r>
-              <a:rPr lang="en-US" sz="1050" b="1" dirty="0" smtClean="0">
-                <a:solidFill>
-                  <a:srgbClr val="C00000"/>
-                </a:solidFill>
-              </a:rPr>
-              <a:t>Some properties can be modified dynamically based on the values of a simulation. “Adapters” specify how a simulation value should be reflected by the widget.</a:t>
-            </a:r>
-          </a:p>
-        </p:txBody>
-      </p:sp>
-      <p:sp>
-        <p:nvSpPr>
-          <p:cNvPr id="18" name="Textfeld 17"/>
-          <p:cNvSpPr txBox="1"/>
-          <p:nvPr/>
-        </p:nvSpPr>
-        <p:spPr>
-          <a:xfrm>
-            <a:off x="1115616" y="5229200"/>
-            <a:ext cx="5112568" cy="253916"/>
-          </a:xfrm>
-          <a:prstGeom prst="rect">
-            <a:avLst/>
-          </a:prstGeom>
-          <a:solidFill>
-            <a:schemeClr val="accent6">
-              <a:lumMod val="20000"/>
-              <a:lumOff val="80000"/>
-              <a:alpha val="76000"/>
-            </a:schemeClr>
-          </a:solidFill>
-        </p:spPr>
-        <p:txBody>
-          <a:bodyPr wrap="square" rtlCol="0">
-            <a:spAutoFit/>
-          </a:bodyPr>
-          <a:lstStyle/>
-          <a:p>
-            <a:r>
-              <a:rPr lang="en-US" sz="1050" b="1" dirty="0" smtClean="0">
-                <a:solidFill>
-                  <a:srgbClr val="C00000"/>
-                </a:solidFill>
-              </a:rPr>
-              <a:t>Adapter from  the current value of the “</a:t>
-            </a:r>
-            <a:r>
-              <a:rPr lang="en-US" sz="1050" b="1" dirty="0" err="1" smtClean="0">
-                <a:solidFill>
-                  <a:srgbClr val="C00000"/>
-                </a:solidFill>
-              </a:rPr>
-              <a:t>trafficSignal</a:t>
-            </a:r>
-            <a:r>
-              <a:rPr lang="en-US" sz="1050" b="1" dirty="0" smtClean="0">
-                <a:solidFill>
-                  <a:srgbClr val="C00000"/>
-                </a:solidFill>
-              </a:rPr>
-              <a:t> define” to the color of the widget.</a:t>
-            </a:r>
-          </a:p>
-        </p:txBody>
-      </p:sp>
-      <p:cxnSp>
-        <p:nvCxnSpPr>
-          <p:cNvPr id="19" name="Gerade Verbindung mit Pfeil 18"/>
-          <p:cNvCxnSpPr/>
-          <p:nvPr/>
-        </p:nvCxnSpPr>
-        <p:spPr>
-          <a:xfrm flipH="1" flipV="1">
-            <a:off x="3275856" y="4653136"/>
-            <a:ext cx="432048" cy="504056"/>
-          </a:xfrm>
-          <a:prstGeom prst="straightConnector1">
-            <a:avLst/>
-          </a:prstGeom>
-          <a:ln w="19050">
-            <a:solidFill>
-              <a:srgbClr val="C00000"/>
-            </a:solidFill>
-            <a:tailEnd type="triangle"/>
-          </a:ln>
-        </p:spPr>
-        <p:style>
-          <a:lnRef idx="1">
-            <a:schemeClr val="accent1"/>
-          </a:lnRef>
-          <a:fillRef idx="0">
-            <a:schemeClr val="accent1"/>
-          </a:fillRef>
-          <a:effectRef idx="0">
-            <a:schemeClr val="accent1"/>
-          </a:effectRef>
-          <a:fontRef idx="minor">
-            <a:schemeClr val="tx1"/>
-          </a:fontRef>
-        </p:style>
-      </p:cxnSp>
-      <p:cxnSp>
-        <p:nvCxnSpPr>
-          <p:cNvPr id="22" name="Gerade Verbindung mit Pfeil 21"/>
-          <p:cNvCxnSpPr/>
-          <p:nvPr/>
-        </p:nvCxnSpPr>
-        <p:spPr>
-          <a:xfrm flipV="1">
-            <a:off x="3491880" y="1628800"/>
-            <a:ext cx="1944216" cy="2880320"/>
-          </a:xfrm>
-          <a:prstGeom prst="straightConnector1">
-            <a:avLst/>
-          </a:prstGeom>
-          <a:ln w="19050">
-            <a:solidFill>
-              <a:srgbClr val="C00000"/>
-            </a:solidFill>
-            <a:tailEnd type="triangle"/>
-          </a:ln>
-        </p:spPr>
-        <p:style>
-          <a:lnRef idx="1">
-            <a:schemeClr val="accent1"/>
-          </a:lnRef>
-          <a:fillRef idx="0">
-            <a:schemeClr val="accent1"/>
-          </a:fillRef>
-          <a:effectRef idx="0">
-            <a:schemeClr val="accent1"/>
-          </a:effectRef>
-          <a:fontRef idx="minor">
-            <a:schemeClr val="tx1"/>
-          </a:fontRef>
-        </p:style>
-      </p:cxnSp>
-      <p:sp>
-        <p:nvSpPr>
-          <p:cNvPr id="25" name="Geschweifte Klammer rechts 24"/>
-          <p:cNvSpPr/>
-          <p:nvPr/>
-        </p:nvSpPr>
-        <p:spPr>
-          <a:xfrm>
-            <a:off x="6300192" y="4509120"/>
-            <a:ext cx="144016" cy="1008112"/>
-          </a:xfrm>
-          <a:prstGeom prst="rightBrace">
-            <a:avLst/>
-          </a:prstGeom>
-        </p:spPr>
-        <p:style>
-          <a:lnRef idx="1">
-            <a:schemeClr val="accent1"/>
-          </a:lnRef>
-          <a:fillRef idx="0">
-            <a:schemeClr val="accent1"/>
-          </a:fillRef>
-          <a:effectRef idx="0">
-            <a:schemeClr val="accent1"/>
-          </a:effectRef>
-          <a:fontRef idx="minor">
-            <a:schemeClr val="tx1"/>
-          </a:fontRef>
-        </p:style>
         <p:txBody>
           <a:bodyPr rtlCol="0" anchor="ctr"/>
           <a:lstStyle/>
@@ -5085,122 +5250,18 @@
           </a:p>
         </p:txBody>
       </p:sp>
-      <p:cxnSp>
-        <p:nvCxnSpPr>
-          <p:cNvPr id="29" name="Gerade Verbindung mit Pfeil 28"/>
-          <p:cNvCxnSpPr/>
-          <p:nvPr/>
-        </p:nvCxnSpPr>
-        <p:spPr>
-          <a:xfrm flipV="1">
-            <a:off x="5076056" y="5013176"/>
-            <a:ext cx="720080" cy="216024"/>
-          </a:xfrm>
-          <a:prstGeom prst="straightConnector1">
-            <a:avLst/>
-          </a:prstGeom>
-          <a:ln w="19050">
-            <a:solidFill>
-              <a:srgbClr val="C00000"/>
-            </a:solidFill>
-            <a:tailEnd type="triangle"/>
-          </a:ln>
-        </p:spPr>
-        <p:style>
-          <a:lnRef idx="1">
-            <a:schemeClr val="accent1"/>
-          </a:lnRef>
-          <a:fillRef idx="0">
-            <a:schemeClr val="accent1"/>
-          </a:fillRef>
-          <a:effectRef idx="0">
-            <a:schemeClr val="accent1"/>
-          </a:effectRef>
-          <a:fontRef idx="minor">
-            <a:schemeClr val="tx1"/>
-          </a:fontRef>
-        </p:style>
-      </p:cxnSp>
-      <p:sp>
-        <p:nvSpPr>
-          <p:cNvPr id="31" name="Textfeld 30"/>
-          <p:cNvSpPr txBox="1"/>
-          <p:nvPr/>
-        </p:nvSpPr>
-        <p:spPr>
-          <a:xfrm>
-            <a:off x="1403648" y="404664"/>
-            <a:ext cx="3096344" cy="253916"/>
-          </a:xfrm>
-          <a:prstGeom prst="rect">
-            <a:avLst/>
-          </a:prstGeom>
-          <a:solidFill>
-            <a:schemeClr val="accent6">
-              <a:lumMod val="20000"/>
-              <a:lumOff val="80000"/>
-              <a:alpha val="76000"/>
-            </a:schemeClr>
-          </a:solidFill>
-        </p:spPr>
-        <p:txBody>
-          <a:bodyPr wrap="square" rtlCol="0">
-            <a:spAutoFit/>
-          </a:bodyPr>
-          <a:lstStyle/>
-          <a:p>
-            <a:r>
-              <a:rPr lang="en-US" sz="1050" b="1" dirty="0" smtClean="0">
-                <a:solidFill>
-                  <a:srgbClr val="C00000"/>
-                </a:solidFill>
-              </a:rPr>
-              <a:t>Adapters must be re-loaded by pressing this button</a:t>
-            </a:r>
-          </a:p>
-        </p:txBody>
-      </p:sp>
-      <p:cxnSp>
-        <p:nvCxnSpPr>
-          <p:cNvPr id="32" name="Gerade Verbindung mit Pfeil 31"/>
-          <p:cNvCxnSpPr/>
-          <p:nvPr/>
-        </p:nvCxnSpPr>
-        <p:spPr>
-          <a:xfrm flipH="1">
-            <a:off x="2987824" y="692696"/>
-            <a:ext cx="72008" cy="288032"/>
-          </a:xfrm>
-          <a:prstGeom prst="straightConnector1">
-            <a:avLst/>
-          </a:prstGeom>
-          <a:ln w="19050">
-            <a:solidFill>
-              <a:srgbClr val="C00000"/>
-            </a:solidFill>
-            <a:tailEnd type="triangle"/>
-          </a:ln>
-        </p:spPr>
-        <p:style>
-          <a:lnRef idx="1">
-            <a:schemeClr val="accent1"/>
-          </a:lnRef>
-          <a:fillRef idx="0">
-            <a:schemeClr val="accent1"/>
-          </a:fillRef>
-          <a:effectRef idx="0">
-            <a:schemeClr val="accent1"/>
-          </a:effectRef>
-          <a:fontRef idx="minor">
-            <a:schemeClr val="tx1"/>
-          </a:fontRef>
-        </p:style>
-      </p:cxnSp>
     </p:spTree>
   </p:cSld>
   <p:clrMapOvr>
     <a:masterClrMapping/>
   </p:clrMapOvr>
+  <p:timing>
+    <p:tnLst>
+      <p:par>
+        <p:cTn id="1" dur="indefinite" restart="never" nodeType="tmRoot"/>
+      </p:par>
+    </p:tnLst>
+  </p:timing>
 </p:sld>
 </file>
 
@@ -5223,7 +5284,7 @@
       </p:grpSpPr>
       <p:pic>
         <p:nvPicPr>
-          <p:cNvPr id="2050" name="Picture 2"/>
+          <p:cNvPr id="1026" name="Picture 2"/>
           <p:cNvPicPr>
             <a:picLocks noChangeAspect="1" noChangeArrowheads="1"/>
           </p:cNvPicPr>
@@ -5231,15 +5292,15 @@
         </p:nvPicPr>
         <p:blipFill>
           <a:blip r:embed="rId2" cstate="print"/>
-          <a:srcRect l="21262" t="8400" r="35032" b="58001"/>
+          <a:srcRect/>
           <a:stretch>
             <a:fillRect/>
           </a:stretch>
         </p:blipFill>
         <p:spPr bwMode="auto">
           <a:xfrm>
-            <a:off x="1979712" y="908720"/>
-            <a:ext cx="5328592" cy="2304256"/>
+            <a:off x="323528" y="620688"/>
+            <a:ext cx="8325370" cy="4932586"/>
           </a:xfrm>
           <a:prstGeom prst="rect">
             <a:avLst/>
@@ -5261,8 +5322,8 @@
         </p:nvSpPr>
         <p:spPr>
           <a:xfrm>
-            <a:off x="5292080" y="2204864"/>
-            <a:ext cx="1944216" cy="738664"/>
+            <a:off x="2195736" y="2276872"/>
+            <a:ext cx="1224136" cy="253916"/>
           </a:xfrm>
           <a:prstGeom prst="rect">
             <a:avLst/>
@@ -5287,7 +5348,7 @@
                   <a:srgbClr val="C00000"/>
                 </a:solidFill>
               </a:rPr>
-              <a:t>By clicking on a widget, and opening the intention menu, one can add left or right siblings</a:t>
+              <a:t>graphical widgets</a:t>
             </a:r>
           </a:p>
         </p:txBody>
@@ -5300,8 +5361,8 @@
         </p:nvCxnSpPr>
         <p:spPr>
           <a:xfrm flipH="1" flipV="1">
-            <a:off x="6012160" y="1556792"/>
-            <a:ext cx="864096" cy="648072"/>
+            <a:off x="1187624" y="1844824"/>
+            <a:ext cx="936104" cy="576064"/>
           </a:xfrm>
           <a:prstGeom prst="straightConnector1">
             <a:avLst/>
@@ -5328,16 +5389,52 @@
           </a:fontRef>
         </p:style>
       </p:cxnSp>
-      <p:sp>
-        <p:nvSpPr>
-          <p:cNvPr id="8" name="Textfeld 7"/>
+      <p:cxnSp>
+        <p:nvCxnSpPr>
+          <p:cNvPr id="8" name="Gerade Verbindung mit Pfeil 7"/>
+          <p:cNvCxnSpPr/>
+          <p:nvPr/>
+        </p:nvCxnSpPr>
+        <p:spPr>
+          <a:xfrm flipH="1" flipV="1">
+            <a:off x="2699792" y="1988840"/>
+            <a:ext cx="504056" cy="288032"/>
+          </a:xfrm>
+          <a:prstGeom prst="straightConnector1">
+            <a:avLst/>
+          </a:prstGeom>
+          <a:ln w="19050">
+            <a:solidFill>
+              <a:srgbClr val="C00000"/>
+            </a:solidFill>
+            <a:tailEnd type="triangle"/>
+          </a:ln>
+        </p:spPr>
+        <p:style>
+          <a:lnRef idx="1">
+            <a:schemeClr val="accent1"/>
+          </a:lnRef>
+          <a:fillRef idx="0">
+            <a:schemeClr val="accent1"/>
+          </a:fillRef>
+          <a:effectRef idx="0">
+            <a:schemeClr val="accent1"/>
+          </a:effectRef>
+          <a:fontRef idx="minor">
+            <a:schemeClr val="tx1"/>
+          </a:fontRef>
+        </p:style>
+      </p:cxnSp>
+      <p:sp>
+        <p:nvSpPr>
+          <p:cNvPr id="10" name="Textfeld 9"/>
           <p:cNvSpPr txBox="1"/>
           <p:nvPr/>
         </p:nvSpPr>
         <p:spPr>
           <a:xfrm>
-            <a:off x="3995936" y="1772816"/>
-            <a:ext cx="576064" cy="415498"/>
+            <a:off x="1979712" y="2996952"/>
+            <a:ext cx="1800200" cy="577081"/>
           </a:xfrm>
           <a:prstGeom prst="rect">
             <a:avLst/>
@@ -5356,39 +5453,419 @@
           </a:bodyPr>
           <a:lstStyle/>
           <a:p>
-            <a:pPr algn="ctr"/>
             <a:r>
               <a:rPr lang="en-US" sz="1050" b="1" dirty="0" smtClean="0">
                 <a:solidFill>
                   <a:srgbClr val="C00000"/>
                 </a:solidFill>
               </a:rPr>
-              <a:t>New </a:t>
-            </a:r>
-          </a:p>
-          <a:p>
-            <a:pPr algn="ctr"/>
+              <a:t>By clicking on a widget, its properties are displayed in the inspector </a:t>
+            </a:r>
+          </a:p>
+        </p:txBody>
+      </p:sp>
+      <p:cxnSp>
+        <p:nvCxnSpPr>
+          <p:cNvPr id="11" name="Gerade Verbindung mit Pfeil 10"/>
+          <p:cNvCxnSpPr/>
+          <p:nvPr/>
+        </p:nvCxnSpPr>
+        <p:spPr>
+          <a:xfrm flipH="1" flipV="1">
+            <a:off x="1043608" y="2204864"/>
+            <a:ext cx="864096" cy="792088"/>
+          </a:xfrm>
+          <a:prstGeom prst="straightConnector1">
+            <a:avLst/>
+          </a:prstGeom>
+          <a:ln w="19050">
+            <a:solidFill>
+              <a:srgbClr val="C00000"/>
+            </a:solidFill>
+            <a:tailEnd type="triangle"/>
+          </a:ln>
+        </p:spPr>
+        <p:style>
+          <a:lnRef idx="1">
+            <a:schemeClr val="accent1"/>
+          </a:lnRef>
+          <a:fillRef idx="0">
+            <a:schemeClr val="accent1"/>
+          </a:fillRef>
+          <a:effectRef idx="0">
+            <a:schemeClr val="accent1"/>
+          </a:effectRef>
+          <a:fontRef idx="minor">
+            <a:schemeClr val="tx1"/>
+          </a:fontRef>
+        </p:style>
+      </p:cxnSp>
+      <p:cxnSp>
+        <p:nvCxnSpPr>
+          <p:cNvPr id="13" name="Gerade Verbindung mit Pfeil 12"/>
+          <p:cNvCxnSpPr>
+            <a:stCxn id="10" idx="2"/>
+          </p:cNvCxnSpPr>
+          <p:nvPr/>
+        </p:nvCxnSpPr>
+        <p:spPr>
+          <a:xfrm flipH="1">
+            <a:off x="2483768" y="3574033"/>
+            <a:ext cx="396044" cy="503039"/>
+          </a:xfrm>
+          <a:prstGeom prst="straightConnector1">
+            <a:avLst/>
+          </a:prstGeom>
+          <a:ln w="19050">
+            <a:solidFill>
+              <a:srgbClr val="C00000"/>
+            </a:solidFill>
+            <a:tailEnd type="triangle"/>
+          </a:ln>
+        </p:spPr>
+        <p:style>
+          <a:lnRef idx="1">
+            <a:schemeClr val="accent1"/>
+          </a:lnRef>
+          <a:fillRef idx="0">
+            <a:schemeClr val="accent1"/>
+          </a:fillRef>
+          <a:effectRef idx="0">
+            <a:schemeClr val="accent1"/>
+          </a:effectRef>
+          <a:fontRef idx="minor">
+            <a:schemeClr val="tx1"/>
+          </a:fontRef>
+        </p:style>
+      </p:cxnSp>
+      <p:sp>
+        <p:nvSpPr>
+          <p:cNvPr id="16" name="Textfeld 15"/>
+          <p:cNvSpPr txBox="1"/>
+          <p:nvPr/>
+        </p:nvSpPr>
+        <p:spPr>
+          <a:xfrm>
+            <a:off x="4283968" y="4005064"/>
+            <a:ext cx="3096344" cy="253916"/>
+          </a:xfrm>
+          <a:prstGeom prst="rect">
+            <a:avLst/>
+          </a:prstGeom>
+          <a:solidFill>
+            <a:schemeClr val="accent6">
+              <a:lumMod val="20000"/>
+              <a:lumOff val="80000"/>
+              <a:alpha val="76000"/>
+            </a:schemeClr>
+          </a:solidFill>
+        </p:spPr>
+        <p:txBody>
+          <a:bodyPr wrap="square" rtlCol="0">
+            <a:spAutoFit/>
+          </a:bodyPr>
+          <a:lstStyle/>
+          <a:p>
             <a:r>
               <a:rPr lang="en-US" sz="1050" b="1" dirty="0" smtClean="0">
                 <a:solidFill>
                   <a:srgbClr val="C00000"/>
                 </a:solidFill>
               </a:rPr>
-              <a:t>sibling</a:t>
+              <a:t>Properties of widget include its size, color, text, …</a:t>
+            </a:r>
+          </a:p>
+        </p:txBody>
+      </p:sp>
+      <p:sp>
+        <p:nvSpPr>
+          <p:cNvPr id="17" name="Textfeld 16"/>
+          <p:cNvSpPr txBox="1"/>
+          <p:nvPr/>
+        </p:nvSpPr>
+        <p:spPr>
+          <a:xfrm>
+            <a:off x="6516216" y="4544978"/>
+            <a:ext cx="2304256" cy="900246"/>
+          </a:xfrm>
+          <a:prstGeom prst="rect">
+            <a:avLst/>
+          </a:prstGeom>
+          <a:solidFill>
+            <a:schemeClr val="accent6">
+              <a:lumMod val="20000"/>
+              <a:lumOff val="80000"/>
+              <a:alpha val="76000"/>
+            </a:schemeClr>
+          </a:solidFill>
+        </p:spPr>
+        <p:txBody>
+          <a:bodyPr wrap="square" rtlCol="0">
+            <a:spAutoFit/>
+          </a:bodyPr>
+          <a:lstStyle/>
+          <a:p>
+            <a:r>
+              <a:rPr lang="en-US" sz="1050" b="1" dirty="0" smtClean="0">
+                <a:solidFill>
+                  <a:srgbClr val="C00000"/>
+                </a:solidFill>
+              </a:rPr>
+              <a:t>Some properties can be modified dynamically based on the values of a simulation. “Adapters” specify how a simulation value should be reflected by the widget.</a:t>
+            </a:r>
+          </a:p>
+        </p:txBody>
+      </p:sp>
+      <p:sp>
+        <p:nvSpPr>
+          <p:cNvPr id="18" name="Textfeld 17"/>
+          <p:cNvSpPr txBox="1"/>
+          <p:nvPr/>
+        </p:nvSpPr>
+        <p:spPr>
+          <a:xfrm>
+            <a:off x="1115616" y="5229200"/>
+            <a:ext cx="5112568" cy="253916"/>
+          </a:xfrm>
+          <a:prstGeom prst="rect">
+            <a:avLst/>
+          </a:prstGeom>
+          <a:solidFill>
+            <a:schemeClr val="accent6">
+              <a:lumMod val="20000"/>
+              <a:lumOff val="80000"/>
+              <a:alpha val="76000"/>
+            </a:schemeClr>
+          </a:solidFill>
+        </p:spPr>
+        <p:txBody>
+          <a:bodyPr wrap="square" rtlCol="0">
+            <a:spAutoFit/>
+          </a:bodyPr>
+          <a:lstStyle/>
+          <a:p>
+            <a:r>
+              <a:rPr lang="en-US" sz="1050" b="1" dirty="0" smtClean="0">
+                <a:solidFill>
+                  <a:srgbClr val="C00000"/>
+                </a:solidFill>
+              </a:rPr>
+              <a:t>Adapter from  the current value of the “</a:t>
+            </a:r>
+            <a:r>
+              <a:rPr lang="en-US" sz="1050" b="1" dirty="0" err="1" smtClean="0">
+                <a:solidFill>
+                  <a:srgbClr val="C00000"/>
+                </a:solidFill>
+              </a:rPr>
+              <a:t>trafficSignal</a:t>
+            </a:r>
+            <a:r>
+              <a:rPr lang="en-US" sz="1050" b="1" dirty="0" smtClean="0">
+                <a:solidFill>
+                  <a:srgbClr val="C00000"/>
+                </a:solidFill>
+              </a:rPr>
+              <a:t> define” to the color of the widget.</a:t>
             </a:r>
           </a:p>
         </p:txBody>
       </p:sp>
       <p:cxnSp>
         <p:nvCxnSpPr>
-          <p:cNvPr id="9" name="Gerade Verbindung mit Pfeil 8"/>
+          <p:cNvPr id="19" name="Gerade Verbindung mit Pfeil 18"/>
           <p:cNvCxnSpPr/>
           <p:nvPr/>
         </p:nvCxnSpPr>
         <p:spPr>
+          <a:xfrm flipH="1" flipV="1">
+            <a:off x="3275856" y="4653136"/>
+            <a:ext cx="432048" cy="504056"/>
+          </a:xfrm>
+          <a:prstGeom prst="straightConnector1">
+            <a:avLst/>
+          </a:prstGeom>
+          <a:ln w="19050">
+            <a:solidFill>
+              <a:srgbClr val="C00000"/>
+            </a:solidFill>
+            <a:tailEnd type="triangle"/>
+          </a:ln>
+        </p:spPr>
+        <p:style>
+          <a:lnRef idx="1">
+            <a:schemeClr val="accent1"/>
+          </a:lnRef>
+          <a:fillRef idx="0">
+            <a:schemeClr val="accent1"/>
+          </a:fillRef>
+          <a:effectRef idx="0">
+            <a:schemeClr val="accent1"/>
+          </a:effectRef>
+          <a:fontRef idx="minor">
+            <a:schemeClr val="tx1"/>
+          </a:fontRef>
+        </p:style>
+      </p:cxnSp>
+      <p:cxnSp>
+        <p:nvCxnSpPr>
+          <p:cNvPr id="22" name="Gerade Verbindung mit Pfeil 21"/>
+          <p:cNvCxnSpPr/>
+          <p:nvPr/>
+        </p:nvCxnSpPr>
+        <p:spPr>
           <a:xfrm flipV="1">
-            <a:off x="4283968" y="1484784"/>
-            <a:ext cx="144016" cy="288032"/>
+            <a:off x="3491880" y="1628800"/>
+            <a:ext cx="1944216" cy="2880320"/>
+          </a:xfrm>
+          <a:prstGeom prst="straightConnector1">
+            <a:avLst/>
+          </a:prstGeom>
+          <a:ln w="19050">
+            <a:solidFill>
+              <a:srgbClr val="C00000"/>
+            </a:solidFill>
+            <a:tailEnd type="triangle"/>
+          </a:ln>
+        </p:spPr>
+        <p:style>
+          <a:lnRef idx="1">
+            <a:schemeClr val="accent1"/>
+          </a:lnRef>
+          <a:fillRef idx="0">
+            <a:schemeClr val="accent1"/>
+          </a:fillRef>
+          <a:effectRef idx="0">
+            <a:schemeClr val="accent1"/>
+          </a:effectRef>
+          <a:fontRef idx="minor">
+            <a:schemeClr val="tx1"/>
+          </a:fontRef>
+        </p:style>
+      </p:cxnSp>
+      <p:sp>
+        <p:nvSpPr>
+          <p:cNvPr id="25" name="Geschweifte Klammer rechts 24"/>
+          <p:cNvSpPr/>
+          <p:nvPr/>
+        </p:nvSpPr>
+        <p:spPr>
+          <a:xfrm>
+            <a:off x="6300192" y="4509120"/>
+            <a:ext cx="144016" cy="1008112"/>
+          </a:xfrm>
+          <a:prstGeom prst="rightBrace">
+            <a:avLst/>
+          </a:prstGeom>
+        </p:spPr>
+        <p:style>
+          <a:lnRef idx="1">
+            <a:schemeClr val="accent1"/>
+          </a:lnRef>
+          <a:fillRef idx="0">
+            <a:schemeClr val="accent1"/>
+          </a:fillRef>
+          <a:effectRef idx="0">
+            <a:schemeClr val="accent1"/>
+          </a:effectRef>
+          <a:fontRef idx="minor">
+            <a:schemeClr val="tx1"/>
+          </a:fontRef>
+        </p:style>
+        <p:txBody>
+          <a:bodyPr rtlCol="0" anchor="ctr"/>
+          <a:lstStyle/>
+          <a:p>
+            <a:pPr algn="ctr"/>
+            <a:endParaRPr lang="en-US"/>
+          </a:p>
+        </p:txBody>
+      </p:sp>
+      <p:cxnSp>
+        <p:nvCxnSpPr>
+          <p:cNvPr id="29" name="Gerade Verbindung mit Pfeil 28"/>
+          <p:cNvCxnSpPr/>
+          <p:nvPr/>
+        </p:nvCxnSpPr>
+        <p:spPr>
+          <a:xfrm flipV="1">
+            <a:off x="5076056" y="5013176"/>
+            <a:ext cx="720080" cy="216024"/>
+          </a:xfrm>
+          <a:prstGeom prst="straightConnector1">
+            <a:avLst/>
+          </a:prstGeom>
+          <a:ln w="19050">
+            <a:solidFill>
+              <a:srgbClr val="C00000"/>
+            </a:solidFill>
+            <a:tailEnd type="triangle"/>
+          </a:ln>
+        </p:spPr>
+        <p:style>
+          <a:lnRef idx="1">
+            <a:schemeClr val="accent1"/>
+          </a:lnRef>
+          <a:fillRef idx="0">
+            <a:schemeClr val="accent1"/>
+          </a:fillRef>
+          <a:effectRef idx="0">
+            <a:schemeClr val="accent1"/>
+          </a:effectRef>
+          <a:fontRef idx="minor">
+            <a:schemeClr val="tx1"/>
+          </a:fontRef>
+        </p:style>
+      </p:cxnSp>
+      <p:sp>
+        <p:nvSpPr>
+          <p:cNvPr id="31" name="Textfeld 30"/>
+          <p:cNvSpPr txBox="1"/>
+          <p:nvPr/>
+        </p:nvSpPr>
+        <p:spPr>
+          <a:xfrm>
+            <a:off x="1403648" y="404664"/>
+            <a:ext cx="3096344" cy="253916"/>
+          </a:xfrm>
+          <a:prstGeom prst="rect">
+            <a:avLst/>
+          </a:prstGeom>
+          <a:solidFill>
+            <a:schemeClr val="accent6">
+              <a:lumMod val="20000"/>
+              <a:lumOff val="80000"/>
+              <a:alpha val="76000"/>
+            </a:schemeClr>
+          </a:solidFill>
+        </p:spPr>
+        <p:txBody>
+          <a:bodyPr wrap="square" rtlCol="0">
+            <a:spAutoFit/>
+          </a:bodyPr>
+          <a:lstStyle/>
+          <a:p>
+            <a:r>
+              <a:rPr lang="en-US" sz="1050" b="1" dirty="0" smtClean="0">
+                <a:solidFill>
+                  <a:srgbClr val="C00000"/>
+                </a:solidFill>
+              </a:rPr>
+              <a:t>Adapters must be re-loaded by pressing this button</a:t>
+            </a:r>
+          </a:p>
+        </p:txBody>
+      </p:sp>
+      <p:cxnSp>
+        <p:nvCxnSpPr>
+          <p:cNvPr id="32" name="Gerade Verbindung mit Pfeil 31"/>
+          <p:cNvCxnSpPr/>
+          <p:nvPr/>
+        </p:nvCxnSpPr>
+        <p:spPr>
+          <a:xfrm flipH="1">
+            <a:off x="2987824" y="692696"/>
+            <a:ext cx="72008" cy="288032"/>
           </a:xfrm>
           <a:prstGeom prst="straightConnector1">
             <a:avLst/>
@@ -5442,7 +5919,7 @@
       </p:grpSpPr>
       <p:pic>
         <p:nvPicPr>
-          <p:cNvPr id="1026" name="Picture 2"/>
+          <p:cNvPr id="2050" name="Picture 2"/>
           <p:cNvPicPr>
             <a:picLocks noChangeAspect="1" noChangeArrowheads="1"/>
           </p:cNvPicPr>
@@ -5450,15 +5927,15 @@
         </p:nvPicPr>
         <p:blipFill>
           <a:blip r:embed="rId2" cstate="print"/>
-          <a:srcRect/>
+          <a:srcRect l="21262" t="8400" r="35032" b="58001"/>
           <a:stretch>
             <a:fillRect/>
           </a:stretch>
         </p:blipFill>
         <p:spPr bwMode="auto">
           <a:xfrm>
-            <a:off x="895350" y="500063"/>
-            <a:ext cx="7353300" cy="5857875"/>
+            <a:off x="1979712" y="908720"/>
+            <a:ext cx="5328592" cy="2304256"/>
           </a:xfrm>
           <a:prstGeom prst="rect">
             <a:avLst/>
@@ -5480,8 +5957,8 @@
         </p:nvSpPr>
         <p:spPr>
           <a:xfrm>
-            <a:off x="4499992" y="565230"/>
-            <a:ext cx="792088" cy="415498"/>
+            <a:off x="5292080" y="2204864"/>
+            <a:ext cx="1944216" cy="738664"/>
           </a:xfrm>
           <a:prstGeom prst="rect">
             <a:avLst/>
@@ -5506,21 +5983,21 @@
                   <a:srgbClr val="C00000"/>
                 </a:solidFill>
               </a:rPr>
-              <a:t>Interface Definition</a:t>
+              <a:t>By clicking on a widget, and opening the intention menu, one can add left or right siblings</a:t>
             </a:r>
           </a:p>
         </p:txBody>
       </p:sp>
       <p:cxnSp>
         <p:nvCxnSpPr>
-          <p:cNvPr id="9" name="Gerade Verbindung mit Pfeil 8"/>
+          <p:cNvPr id="6" name="Gerade Verbindung mit Pfeil 5"/>
           <p:cNvCxnSpPr/>
           <p:nvPr/>
         </p:nvCxnSpPr>
         <p:spPr>
-          <a:xfrm flipH="1">
-            <a:off x="2483768" y="692696"/>
-            <a:ext cx="1944216" cy="0"/>
+          <a:xfrm flipH="1" flipV="1">
+            <a:off x="6012160" y="1556792"/>
+            <a:ext cx="864096" cy="648072"/>
           </a:xfrm>
           <a:prstGeom prst="straightConnector1">
             <a:avLst/>
@@ -5549,14 +6026,14 @@
       </p:cxnSp>
       <p:sp>
         <p:nvSpPr>
-          <p:cNvPr id="12" name="Textfeld 11"/>
+          <p:cNvPr id="8" name="Textfeld 7"/>
           <p:cNvSpPr txBox="1"/>
           <p:nvPr/>
         </p:nvSpPr>
         <p:spPr>
           <a:xfrm>
-            <a:off x="2411760" y="1484784"/>
-            <a:ext cx="1440160" cy="253916"/>
+            <a:off x="3995936" y="1772816"/>
+            <a:ext cx="576064" cy="415498"/>
           </a:xfrm>
           <a:prstGeom prst="rect">
             <a:avLst/>
@@ -5575,35 +6052,39 @@
           </a:bodyPr>
           <a:lstStyle/>
           <a:p>
-            <a:r>
-              <a:rPr lang="en-US" sz="1050" b="1" dirty="0" err="1" smtClean="0">
-                <a:solidFill>
-                  <a:srgbClr val="C00000"/>
-                </a:solidFill>
-              </a:rPr>
-              <a:t>Input/Output</a:t>
-            </a:r>
+            <a:pPr algn="ctr"/>
             <a:r>
               <a:rPr lang="en-US" sz="1050" b="1" dirty="0" smtClean="0">
                 <a:solidFill>
                   <a:srgbClr val="C00000"/>
                 </a:solidFill>
               </a:rPr>
-              <a:t> ports</a:t>
+              <a:t>New </a:t>
+            </a:r>
+          </a:p>
+          <a:p>
+            <a:pPr algn="ctr"/>
+            <a:r>
+              <a:rPr lang="en-US" sz="1050" b="1" dirty="0" smtClean="0">
+                <a:solidFill>
+                  <a:srgbClr val="C00000"/>
+                </a:solidFill>
+              </a:rPr>
+              <a:t>sibling</a:t>
             </a:r>
           </a:p>
         </p:txBody>
       </p:sp>
       <p:cxnSp>
         <p:nvCxnSpPr>
-          <p:cNvPr id="13" name="Gerade Verbindung mit Pfeil 12"/>
+          <p:cNvPr id="9" name="Gerade Verbindung mit Pfeil 8"/>
           <p:cNvCxnSpPr/>
           <p:nvPr/>
         </p:nvCxnSpPr>
         <p:spPr>
-          <a:xfrm flipH="1" flipV="1">
-            <a:off x="1907704" y="1124744"/>
-            <a:ext cx="720080" cy="360040"/>
+          <a:xfrm flipV="1">
+            <a:off x="4283968" y="1484784"/>
+            <a:ext cx="144016" cy="288032"/>
           </a:xfrm>
           <a:prstGeom prst="straightConnector1">
             <a:avLst/>
@@ -5630,259 +6111,6 @@
           </a:fontRef>
         </p:style>
       </p:cxnSp>
-      <p:cxnSp>
-        <p:nvCxnSpPr>
-          <p:cNvPr id="16" name="Gerade Verbindung mit Pfeil 15"/>
-          <p:cNvCxnSpPr/>
-          <p:nvPr/>
-        </p:nvCxnSpPr>
-        <p:spPr>
-          <a:xfrm flipV="1">
-            <a:off x="3563888" y="1052736"/>
-            <a:ext cx="72008" cy="432048"/>
-          </a:xfrm>
-          <a:prstGeom prst="straightConnector1">
-            <a:avLst/>
-          </a:prstGeom>
-          <a:ln w="19050">
-            <a:solidFill>
-              <a:srgbClr val="C00000"/>
-            </a:solidFill>
-            <a:tailEnd type="triangle"/>
-          </a:ln>
-        </p:spPr>
-        <p:style>
-          <a:lnRef idx="1">
-            <a:schemeClr val="accent1"/>
-          </a:lnRef>
-          <a:fillRef idx="0">
-            <a:schemeClr val="accent1"/>
-          </a:fillRef>
-          <a:effectRef idx="0">
-            <a:schemeClr val="accent1"/>
-          </a:effectRef>
-          <a:fontRef idx="minor">
-            <a:schemeClr val="tx1"/>
-          </a:fontRef>
-        </p:style>
-      </p:cxnSp>
-      <p:sp>
-        <p:nvSpPr>
-          <p:cNvPr id="18" name="Textfeld 17"/>
-          <p:cNvSpPr txBox="1"/>
-          <p:nvPr/>
-        </p:nvSpPr>
-        <p:spPr>
-          <a:xfrm>
-            <a:off x="6732240" y="1196752"/>
-            <a:ext cx="1296144" cy="415498"/>
-          </a:xfrm>
-          <a:prstGeom prst="rect">
-            <a:avLst/>
-          </a:prstGeom>
-          <a:solidFill>
-            <a:schemeClr val="accent6">
-              <a:lumMod val="20000"/>
-              <a:lumOff val="80000"/>
-              <a:alpha val="76000"/>
-            </a:schemeClr>
-          </a:solidFill>
-        </p:spPr>
-        <p:txBody>
-          <a:bodyPr wrap="square" rtlCol="0">
-            <a:spAutoFit/>
-          </a:bodyPr>
-          <a:lstStyle/>
-          <a:p>
-            <a:r>
-              <a:rPr lang="en-US" sz="1050" b="1" dirty="0" smtClean="0">
-                <a:solidFill>
-                  <a:srgbClr val="C00000"/>
-                </a:solidFill>
-              </a:rPr>
-              <a:t>Contracts:</a:t>
-            </a:r>
-          </a:p>
-          <a:p>
-            <a:r>
-              <a:rPr lang="en-US" sz="1050" b="1" dirty="0" smtClean="0">
-                <a:solidFill>
-                  <a:srgbClr val="C00000"/>
-                </a:solidFill>
-              </a:rPr>
-              <a:t>Pre-/</a:t>
-            </a:r>
-            <a:r>
-              <a:rPr lang="en-US" sz="1050" b="1" dirty="0" err="1" smtClean="0">
-                <a:solidFill>
-                  <a:srgbClr val="C00000"/>
-                </a:solidFill>
-              </a:rPr>
-              <a:t>Postconditions</a:t>
-            </a:r>
-            <a:endParaRPr lang="en-US" sz="1050" b="1" dirty="0" smtClean="0">
-              <a:solidFill>
-                <a:srgbClr val="C00000"/>
-              </a:solidFill>
-            </a:endParaRPr>
-          </a:p>
-        </p:txBody>
-      </p:sp>
-      <p:cxnSp>
-        <p:nvCxnSpPr>
-          <p:cNvPr id="19" name="Gerade Verbindung mit Pfeil 18"/>
-          <p:cNvCxnSpPr/>
-          <p:nvPr/>
-        </p:nvCxnSpPr>
-        <p:spPr>
-          <a:xfrm flipH="1">
-            <a:off x="5508104" y="1340768"/>
-            <a:ext cx="1152128" cy="1080120"/>
-          </a:xfrm>
-          <a:prstGeom prst="straightConnector1">
-            <a:avLst/>
-          </a:prstGeom>
-          <a:ln w="19050">
-            <a:solidFill>
-              <a:srgbClr val="C00000"/>
-            </a:solidFill>
-            <a:tailEnd type="triangle"/>
-          </a:ln>
-        </p:spPr>
-        <p:style>
-          <a:lnRef idx="1">
-            <a:schemeClr val="accent1"/>
-          </a:lnRef>
-          <a:fillRef idx="0">
-            <a:schemeClr val="accent1"/>
-          </a:fillRef>
-          <a:effectRef idx="0">
-            <a:schemeClr val="accent1"/>
-          </a:effectRef>
-          <a:fontRef idx="minor">
-            <a:schemeClr val="tx1"/>
-          </a:fontRef>
-        </p:style>
-      </p:cxnSp>
-      <p:sp>
-        <p:nvSpPr>
-          <p:cNvPr id="22" name="Textfeld 21"/>
-          <p:cNvSpPr txBox="1"/>
-          <p:nvPr/>
-        </p:nvSpPr>
-        <p:spPr>
-          <a:xfrm>
-            <a:off x="6660232" y="2941494"/>
-            <a:ext cx="792088" cy="415498"/>
-          </a:xfrm>
-          <a:prstGeom prst="rect">
-            <a:avLst/>
-          </a:prstGeom>
-          <a:solidFill>
-            <a:schemeClr val="accent6">
-              <a:lumMod val="20000"/>
-              <a:lumOff val="80000"/>
-              <a:alpha val="76000"/>
-            </a:schemeClr>
-          </a:solidFill>
-        </p:spPr>
-        <p:txBody>
-          <a:bodyPr wrap="square" rtlCol="0">
-            <a:spAutoFit/>
-          </a:bodyPr>
-          <a:lstStyle/>
-          <a:p>
-            <a:r>
-              <a:rPr lang="en-US" sz="1050" b="1" dirty="0" err="1" smtClean="0">
-                <a:solidFill>
-                  <a:srgbClr val="C00000"/>
-                </a:solidFill>
-              </a:rPr>
-              <a:t>AssemblyDefinition</a:t>
-            </a:r>
-            <a:endParaRPr lang="en-US" sz="1050" b="1" dirty="0" smtClean="0">
-              <a:solidFill>
-                <a:srgbClr val="C00000"/>
-              </a:solidFill>
-            </a:endParaRPr>
-          </a:p>
-        </p:txBody>
-      </p:sp>
-      <p:cxnSp>
-        <p:nvCxnSpPr>
-          <p:cNvPr id="23" name="Gerade Verbindung mit Pfeil 22"/>
-          <p:cNvCxnSpPr/>
-          <p:nvPr/>
-        </p:nvCxnSpPr>
-        <p:spPr>
-          <a:xfrm flipH="1">
-            <a:off x="4644008" y="3085510"/>
-            <a:ext cx="1944216" cy="0"/>
-          </a:xfrm>
-          <a:prstGeom prst="straightConnector1">
-            <a:avLst/>
-          </a:prstGeom>
-          <a:ln w="19050">
-            <a:solidFill>
-              <a:srgbClr val="C00000"/>
-            </a:solidFill>
-            <a:tailEnd type="triangle"/>
-          </a:ln>
-        </p:spPr>
-        <p:style>
-          <a:lnRef idx="1">
-            <a:schemeClr val="accent1"/>
-          </a:lnRef>
-          <a:fillRef idx="0">
-            <a:schemeClr val="accent1"/>
-          </a:fillRef>
-          <a:effectRef idx="0">
-            <a:schemeClr val="accent1"/>
-          </a:effectRef>
-          <a:fontRef idx="minor">
-            <a:schemeClr val="tx1"/>
-          </a:fontRef>
-        </p:style>
-      </p:cxnSp>
-      <p:sp>
-        <p:nvSpPr>
-          <p:cNvPr id="24" name="Textfeld 23"/>
-          <p:cNvSpPr txBox="1"/>
-          <p:nvPr/>
-        </p:nvSpPr>
-        <p:spPr>
-          <a:xfrm>
-            <a:off x="6300192" y="4941168"/>
-            <a:ext cx="1656184" cy="415498"/>
-          </a:xfrm>
-          <a:prstGeom prst="rect">
-            <a:avLst/>
-          </a:prstGeom>
-          <a:solidFill>
-            <a:schemeClr val="accent6">
-              <a:lumMod val="20000"/>
-              <a:lumOff val="80000"/>
-              <a:alpha val="76000"/>
-            </a:schemeClr>
-          </a:solidFill>
-        </p:spPr>
-        <p:txBody>
-          <a:bodyPr wrap="square" rtlCol="0">
-            <a:spAutoFit/>
-          </a:bodyPr>
-          <a:lstStyle/>
-          <a:p>
-            <a:r>
-              <a:rPr lang="en-US" sz="1050" b="1" dirty="0" smtClean="0">
-                <a:solidFill>
-                  <a:srgbClr val="C00000"/>
-                </a:solidFill>
-              </a:rPr>
-              <a:t>Assembly body using the diagrammatic notation</a:t>
-            </a:r>
-          </a:p>
-        </p:txBody>
-      </p:sp>
     </p:spTree>
   </p:cSld>
   <p:clrMapOvr>
@@ -5910,7 +6138,7 @@
       </p:grpSpPr>
       <p:pic>
         <p:nvPicPr>
-          <p:cNvPr id="3074" name="Picture 2"/>
+          <p:cNvPr id="1026" name="Picture 2"/>
           <p:cNvPicPr>
             <a:picLocks noChangeAspect="1" noChangeArrowheads="1"/>
           </p:cNvPicPr>
@@ -5925,8 +6153,8 @@
         </p:blipFill>
         <p:spPr bwMode="auto">
           <a:xfrm>
-            <a:off x="611560" y="439374"/>
-            <a:ext cx="7776864" cy="4537762"/>
+            <a:off x="895350" y="500063"/>
+            <a:ext cx="7353300" cy="5857875"/>
           </a:xfrm>
           <a:prstGeom prst="rect">
             <a:avLst/>
@@ -5942,14 +6170,14 @@
       </p:pic>
       <p:sp>
         <p:nvSpPr>
-          <p:cNvPr id="4" name="Textfeld 3"/>
+          <p:cNvPr id="5" name="Textfeld 4"/>
           <p:cNvSpPr txBox="1"/>
           <p:nvPr/>
         </p:nvSpPr>
         <p:spPr>
           <a:xfrm>
-            <a:off x="2915816" y="681791"/>
-            <a:ext cx="2520280" cy="253916"/>
+            <a:off x="4499992" y="565230"/>
+            <a:ext cx="792088" cy="415498"/>
           </a:xfrm>
           <a:prstGeom prst="rect">
             <a:avLst/>
@@ -5974,21 +6202,21 @@
                   <a:srgbClr val="C00000"/>
                 </a:solidFill>
               </a:rPr>
-              <a:t>Step 1: Start the AG analysis</a:t>
+              <a:t>Interface Definition</a:t>
             </a:r>
           </a:p>
         </p:txBody>
       </p:sp>
       <p:cxnSp>
         <p:nvCxnSpPr>
-          <p:cNvPr id="5" name="Gerade Verbindung mit Pfeil 4"/>
+          <p:cNvPr id="9" name="Gerade Verbindung mit Pfeil 8"/>
           <p:cNvCxnSpPr/>
           <p:nvPr/>
         </p:nvCxnSpPr>
         <p:spPr>
           <a:xfrm flipH="1">
-            <a:off x="2123728" y="908720"/>
-            <a:ext cx="720080" cy="1800200"/>
+            <a:off x="2483768" y="692696"/>
+            <a:ext cx="1944216" cy="0"/>
           </a:xfrm>
           <a:prstGeom prst="straightConnector1">
             <a:avLst/>
@@ -6017,14 +6245,14 @@
       </p:cxnSp>
       <p:sp>
         <p:nvSpPr>
-          <p:cNvPr id="7" name="Textfeld 6"/>
+          <p:cNvPr id="12" name="Textfeld 11"/>
           <p:cNvSpPr txBox="1"/>
           <p:nvPr/>
         </p:nvSpPr>
         <p:spPr>
           <a:xfrm>
-            <a:off x="2915816" y="997278"/>
-            <a:ext cx="2520280" cy="415498"/>
+            <a:off x="2411760" y="1484784"/>
+            <a:ext cx="1440160" cy="253916"/>
           </a:xfrm>
           <a:prstGeom prst="rect">
             <a:avLst/>
@@ -6044,218 +6272,34 @@
           <a:lstStyle/>
           <a:p>
             <a:r>
+              <a:rPr lang="en-US" sz="1050" b="1" dirty="0" err="1" smtClean="0">
+                <a:solidFill>
+                  <a:srgbClr val="C00000"/>
+                </a:solidFill>
+              </a:rPr>
+              <a:t>Input/Output</a:t>
+            </a:r>
+            <a:r>
               <a:rPr lang="en-US" sz="1050" b="1" dirty="0" smtClean="0">
                 <a:solidFill>
                   <a:srgbClr val="C00000"/>
                 </a:solidFill>
               </a:rPr>
-              <a:t>Step 2: After the analysis finishes, the results are displayed</a:t>
+              <a:t> ports</a:t>
             </a:r>
           </a:p>
         </p:txBody>
       </p:sp>
       <p:cxnSp>
         <p:nvCxnSpPr>
-          <p:cNvPr id="10" name="Gerade Verbindung mit Pfeil 9"/>
+          <p:cNvPr id="13" name="Gerade Verbindung mit Pfeil 12"/>
           <p:cNvCxnSpPr/>
           <p:nvPr/>
         </p:nvCxnSpPr>
         <p:spPr>
-          <a:xfrm flipV="1">
-            <a:off x="5436096" y="1124744"/>
-            <a:ext cx="1080120" cy="144016"/>
-          </a:xfrm>
-          <a:prstGeom prst="straightConnector1">
-            <a:avLst/>
-          </a:prstGeom>
-          <a:ln w="19050">
-            <a:solidFill>
-              <a:srgbClr val="C00000"/>
-            </a:solidFill>
-            <a:tailEnd type="triangle"/>
-          </a:ln>
-        </p:spPr>
-        <p:style>
-          <a:lnRef idx="1">
-            <a:schemeClr val="accent1"/>
-          </a:lnRef>
-          <a:fillRef idx="0">
-            <a:schemeClr val="accent1"/>
-          </a:fillRef>
-          <a:effectRef idx="0">
-            <a:schemeClr val="accent1"/>
-          </a:effectRef>
-          <a:fontRef idx="minor">
-            <a:schemeClr val="tx1"/>
-          </a:fontRef>
-        </p:style>
-      </p:cxnSp>
-      <p:pic>
-        <p:nvPicPr>
-          <p:cNvPr id="3075" name="Picture 3"/>
-          <p:cNvPicPr>
-            <a:picLocks noChangeAspect="1" noChangeArrowheads="1"/>
-          </p:cNvPicPr>
-          <p:nvPr/>
-        </p:nvPicPr>
-        <p:blipFill>
-          <a:blip r:embed="rId3" cstate="print"/>
-          <a:srcRect/>
-          <a:stretch>
-            <a:fillRect/>
-          </a:stretch>
-        </p:blipFill>
-        <p:spPr bwMode="auto">
-          <a:xfrm>
-            <a:off x="899592" y="3068960"/>
-            <a:ext cx="4104456" cy="1080119"/>
-          </a:xfrm>
-          <a:prstGeom prst="rect">
-            <a:avLst/>
-          </a:prstGeom>
-          <a:noFill/>
-          <a:ln w="9525">
-            <a:noFill/>
-            <a:miter lim="800000"/>
-            <a:headEnd/>
-            <a:tailEnd/>
-          </a:ln>
-        </p:spPr>
-      </p:pic>
-      <p:sp>
-        <p:nvSpPr>
-          <p:cNvPr id="20" name="Rechteck 19"/>
-          <p:cNvSpPr/>
-          <p:nvPr/>
-        </p:nvSpPr>
-        <p:spPr>
-          <a:xfrm>
-            <a:off x="1259632" y="4149080"/>
-            <a:ext cx="2592288" cy="936104"/>
-          </a:xfrm>
-          <a:prstGeom prst="rect">
-            <a:avLst/>
-          </a:prstGeom>
-          <a:solidFill>
-            <a:schemeClr val="bg1"/>
-          </a:solidFill>
-          <a:ln>
-            <a:noFill/>
-          </a:ln>
-        </p:spPr>
-        <p:style>
-          <a:lnRef idx="2">
-            <a:schemeClr val="accent1">
-              <a:shade val="50000"/>
-            </a:schemeClr>
-          </a:lnRef>
-          <a:fillRef idx="1">
-            <a:schemeClr val="accent1"/>
-          </a:fillRef>
-          <a:effectRef idx="0">
-            <a:schemeClr val="accent1"/>
-          </a:effectRef>
-          <a:fontRef idx="minor">
-            <a:schemeClr val="lt1"/>
-          </a:fontRef>
-        </p:style>
-        <p:txBody>
-          <a:bodyPr rtlCol="0" anchor="ctr"/>
-          <a:lstStyle/>
-          <a:p>
-            <a:pPr algn="ctr"/>
-            <a:endParaRPr lang="en-US"/>
-          </a:p>
-        </p:txBody>
-      </p:sp>
-      <p:sp>
-        <p:nvSpPr>
-          <p:cNvPr id="8" name="Textfeld 7"/>
-          <p:cNvSpPr txBox="1"/>
-          <p:nvPr/>
-        </p:nvSpPr>
-        <p:spPr>
-          <a:xfrm>
-            <a:off x="1907704" y="3932039"/>
-            <a:ext cx="3528392" cy="577081"/>
-          </a:xfrm>
-          <a:prstGeom prst="rect">
-            <a:avLst/>
-          </a:prstGeom>
-          <a:solidFill>
-            <a:schemeClr val="accent6">
-              <a:lumMod val="20000"/>
-              <a:lumOff val="80000"/>
-              <a:alpha val="76000"/>
-            </a:schemeClr>
-          </a:solidFill>
-        </p:spPr>
-        <p:txBody>
-          <a:bodyPr wrap="square" rtlCol="0">
-            <a:spAutoFit/>
-          </a:bodyPr>
-          <a:lstStyle/>
-          <a:p>
-            <a:r>
-              <a:rPr lang="en-US" sz="1050" b="1" dirty="0" smtClean="0">
-                <a:solidFill>
-                  <a:srgbClr val="C00000"/>
-                </a:solidFill>
-              </a:rPr>
-              <a:t>Step 3: Double-clicking on a failed result will display the counterexample. By clicking on “Simulate”, the CEX will be simulated.</a:t>
-            </a:r>
-          </a:p>
-        </p:txBody>
-      </p:sp>
-      <p:sp>
-        <p:nvSpPr>
-          <p:cNvPr id="17" name="Textfeld 16"/>
-          <p:cNvSpPr txBox="1"/>
-          <p:nvPr/>
-        </p:nvSpPr>
-        <p:spPr>
-          <a:xfrm>
-            <a:off x="1907704" y="4581128"/>
-            <a:ext cx="3528392" cy="577081"/>
-          </a:xfrm>
-          <a:prstGeom prst="rect">
-            <a:avLst/>
-          </a:prstGeom>
-          <a:solidFill>
-            <a:schemeClr val="accent6">
-              <a:lumMod val="20000"/>
-              <a:lumOff val="80000"/>
-              <a:alpha val="76000"/>
-            </a:schemeClr>
-          </a:solidFill>
-        </p:spPr>
-        <p:txBody>
-          <a:bodyPr wrap="square" rtlCol="0">
-            <a:spAutoFit/>
-          </a:bodyPr>
-          <a:lstStyle/>
-          <a:p>
-            <a:r>
-              <a:rPr lang="en-US" sz="1050" b="1" dirty="0" smtClean="0">
-                <a:solidFill>
-                  <a:srgbClr val="C00000"/>
-                </a:solidFill>
-              </a:rPr>
-              <a:t>Step 4: Using the simulation bar, one can step-through the counterexample. The values of ports in a certain step are displayed in the IDE as annotations.</a:t>
-            </a:r>
-          </a:p>
-        </p:txBody>
-      </p:sp>
-      <p:cxnSp>
-        <p:nvCxnSpPr>
-          <p:cNvPr id="26" name="Gerade Verbindung mit Pfeil 25"/>
-          <p:cNvCxnSpPr/>
-          <p:nvPr/>
-        </p:nvCxnSpPr>
-        <p:spPr>
-          <a:xfrm>
-            <a:off x="4283968" y="4365104"/>
-            <a:ext cx="2664296" cy="288032"/>
+          <a:xfrm flipH="1" flipV="1">
+            <a:off x="1907704" y="1124744"/>
+            <a:ext cx="720080" cy="360040"/>
           </a:xfrm>
           <a:prstGeom prst="straightConnector1">
             <a:avLst/>
@@ -6284,16 +6328,14 @@
       </p:cxnSp>
       <p:cxnSp>
         <p:nvCxnSpPr>
-          <p:cNvPr id="29" name="Gerade Verbindung mit Pfeil 28"/>
-          <p:cNvCxnSpPr>
-            <a:stCxn id="17" idx="1"/>
-          </p:cNvCxnSpPr>
+          <p:cNvPr id="16" name="Gerade Verbindung mit Pfeil 15"/>
+          <p:cNvCxnSpPr/>
           <p:nvPr/>
         </p:nvCxnSpPr>
         <p:spPr>
-          <a:xfrm flipH="1" flipV="1">
-            <a:off x="1115616" y="2420888"/>
-            <a:ext cx="792088" cy="2448781"/>
+          <a:xfrm flipV="1">
+            <a:off x="3563888" y="1052736"/>
+            <a:ext cx="72008" cy="432048"/>
           </a:xfrm>
           <a:prstGeom prst="straightConnector1">
             <a:avLst/>
@@ -6320,16 +6362,78 @@
           </a:fontRef>
         </p:style>
       </p:cxnSp>
+      <p:sp>
+        <p:nvSpPr>
+          <p:cNvPr id="18" name="Textfeld 17"/>
+          <p:cNvSpPr txBox="1"/>
+          <p:nvPr/>
+        </p:nvSpPr>
+        <p:spPr>
+          <a:xfrm>
+            <a:off x="6732240" y="1196752"/>
+            <a:ext cx="1296144" cy="415498"/>
+          </a:xfrm>
+          <a:prstGeom prst="rect">
+            <a:avLst/>
+          </a:prstGeom>
+          <a:solidFill>
+            <a:schemeClr val="accent6">
+              <a:lumMod val="20000"/>
+              <a:lumOff val="80000"/>
+              <a:alpha val="76000"/>
+            </a:schemeClr>
+          </a:solidFill>
+        </p:spPr>
+        <p:txBody>
+          <a:bodyPr wrap="square" rtlCol="0">
+            <a:spAutoFit/>
+          </a:bodyPr>
+          <a:lstStyle/>
+          <a:p>
+            <a:r>
+              <a:rPr lang="en-US" sz="1050" b="1" dirty="0" smtClean="0">
+                <a:solidFill>
+                  <a:srgbClr val="C00000"/>
+                </a:solidFill>
+              </a:rPr>
+              <a:t>Contracts:</a:t>
+            </a:r>
+          </a:p>
+          <a:p>
+            <a:r>
+              <a:rPr lang="en-US" sz="1050" b="1" dirty="0" smtClean="0">
+                <a:solidFill>
+                  <a:srgbClr val="C00000"/>
+                </a:solidFill>
+              </a:rPr>
+              <a:t>Pre-/</a:t>
+            </a:r>
+            <a:r>
+              <a:rPr lang="en-US" sz="1050" b="1" dirty="0" err="1" smtClean="0">
+                <a:solidFill>
+                  <a:srgbClr val="C00000"/>
+                </a:solidFill>
+              </a:rPr>
+              <a:t>Postconditions</a:t>
+            </a:r>
+            <a:endParaRPr lang="en-US" sz="1050" b="1" dirty="0" smtClean="0">
+              <a:solidFill>
+                <a:srgbClr val="C00000"/>
+              </a:solidFill>
+            </a:endParaRPr>
+          </a:p>
+        </p:txBody>
+      </p:sp>
       <p:cxnSp>
         <p:nvCxnSpPr>
-          <p:cNvPr id="14" name="Gerade Verbindung mit Pfeil 13"/>
+          <p:cNvPr id="19" name="Gerade Verbindung mit Pfeil 18"/>
           <p:cNvCxnSpPr/>
           <p:nvPr/>
         </p:nvCxnSpPr>
         <p:spPr>
-          <a:xfrm flipV="1">
-            <a:off x="4788024" y="3140968"/>
-            <a:ext cx="1728192" cy="864096"/>
+          <a:xfrm flipH="1">
+            <a:off x="5508104" y="1340768"/>
+            <a:ext cx="1152128" cy="1080120"/>
           </a:xfrm>
           <a:prstGeom prst="straightConnector1">
             <a:avLst/>
@@ -6356,6 +6460,125 @@
           </a:fontRef>
         </p:style>
       </p:cxnSp>
+      <p:sp>
+        <p:nvSpPr>
+          <p:cNvPr id="22" name="Textfeld 21"/>
+          <p:cNvSpPr txBox="1"/>
+          <p:nvPr/>
+        </p:nvSpPr>
+        <p:spPr>
+          <a:xfrm>
+            <a:off x="6660232" y="2941494"/>
+            <a:ext cx="792088" cy="415498"/>
+          </a:xfrm>
+          <a:prstGeom prst="rect">
+            <a:avLst/>
+          </a:prstGeom>
+          <a:solidFill>
+            <a:schemeClr val="accent6">
+              <a:lumMod val="20000"/>
+              <a:lumOff val="80000"/>
+              <a:alpha val="76000"/>
+            </a:schemeClr>
+          </a:solidFill>
+        </p:spPr>
+        <p:txBody>
+          <a:bodyPr wrap="square" rtlCol="0">
+            <a:spAutoFit/>
+          </a:bodyPr>
+          <a:lstStyle/>
+          <a:p>
+            <a:r>
+              <a:rPr lang="en-US" sz="1050" b="1" dirty="0" err="1" smtClean="0">
+                <a:solidFill>
+                  <a:srgbClr val="C00000"/>
+                </a:solidFill>
+              </a:rPr>
+              <a:t>AssemblyDefinition</a:t>
+            </a:r>
+            <a:endParaRPr lang="en-US" sz="1050" b="1" dirty="0" smtClean="0">
+              <a:solidFill>
+                <a:srgbClr val="C00000"/>
+              </a:solidFill>
+            </a:endParaRPr>
+          </a:p>
+        </p:txBody>
+      </p:sp>
+      <p:cxnSp>
+        <p:nvCxnSpPr>
+          <p:cNvPr id="23" name="Gerade Verbindung mit Pfeil 22"/>
+          <p:cNvCxnSpPr/>
+          <p:nvPr/>
+        </p:nvCxnSpPr>
+        <p:spPr>
+          <a:xfrm flipH="1">
+            <a:off x="4644008" y="3085510"/>
+            <a:ext cx="1944216" cy="0"/>
+          </a:xfrm>
+          <a:prstGeom prst="straightConnector1">
+            <a:avLst/>
+          </a:prstGeom>
+          <a:ln w="19050">
+            <a:solidFill>
+              <a:srgbClr val="C00000"/>
+            </a:solidFill>
+            <a:tailEnd type="triangle"/>
+          </a:ln>
+        </p:spPr>
+        <p:style>
+          <a:lnRef idx="1">
+            <a:schemeClr val="accent1"/>
+          </a:lnRef>
+          <a:fillRef idx="0">
+            <a:schemeClr val="accent1"/>
+          </a:fillRef>
+          <a:effectRef idx="0">
+            <a:schemeClr val="accent1"/>
+          </a:effectRef>
+          <a:fontRef idx="minor">
+            <a:schemeClr val="tx1"/>
+          </a:fontRef>
+        </p:style>
+      </p:cxnSp>
+      <p:sp>
+        <p:nvSpPr>
+          <p:cNvPr id="24" name="Textfeld 23"/>
+          <p:cNvSpPr txBox="1"/>
+          <p:nvPr/>
+        </p:nvSpPr>
+        <p:spPr>
+          <a:xfrm>
+            <a:off x="6300192" y="4941168"/>
+            <a:ext cx="1656184" cy="415498"/>
+          </a:xfrm>
+          <a:prstGeom prst="rect">
+            <a:avLst/>
+          </a:prstGeom>
+          <a:solidFill>
+            <a:schemeClr val="accent6">
+              <a:lumMod val="20000"/>
+              <a:lumOff val="80000"/>
+              <a:alpha val="76000"/>
+            </a:schemeClr>
+          </a:solidFill>
+        </p:spPr>
+        <p:txBody>
+          <a:bodyPr wrap="square" rtlCol="0">
+            <a:spAutoFit/>
+          </a:bodyPr>
+          <a:lstStyle/>
+          <a:p>
+            <a:r>
+              <a:rPr lang="en-US" sz="1050" b="1" dirty="0" smtClean="0">
+                <a:solidFill>
+                  <a:srgbClr val="C00000"/>
+                </a:solidFill>
+              </a:rPr>
+              <a:t>Assembly body using the diagrammatic notation</a:t>
+            </a:r>
+          </a:p>
+        </p:txBody>
+      </p:sp>
     </p:spTree>
   </p:cSld>
   <p:clrMapOvr>
@@ -6383,7 +6606,7 @@
       </p:grpSpPr>
       <p:pic>
         <p:nvPicPr>
-          <p:cNvPr id="1026" name="Picture 2"/>
+          <p:cNvPr id="3074" name="Picture 2"/>
           <p:cNvPicPr>
             <a:picLocks noChangeAspect="1" noChangeArrowheads="1"/>
           </p:cNvPicPr>
@@ -6398,8 +6621,8 @@
         </p:blipFill>
         <p:spPr bwMode="auto">
           <a:xfrm>
-            <a:off x="1022350" y="914400"/>
-            <a:ext cx="7099300" cy="5029200"/>
+            <a:off x="611560" y="439374"/>
+            <a:ext cx="7776864" cy="4537762"/>
           </a:xfrm>
           <a:prstGeom prst="rect">
             <a:avLst/>
@@ -6415,14 +6638,14 @@
       </p:pic>
       <p:sp>
         <p:nvSpPr>
-          <p:cNvPr id="5" name="Textfeld 4"/>
+          <p:cNvPr id="4" name="Textfeld 3"/>
           <p:cNvSpPr txBox="1"/>
           <p:nvPr/>
         </p:nvSpPr>
         <p:spPr>
           <a:xfrm>
-            <a:off x="3923928" y="2420888"/>
-            <a:ext cx="2520280" cy="577081"/>
+            <a:off x="2915816" y="681791"/>
+            <a:ext cx="2520280" cy="253916"/>
           </a:xfrm>
           <a:prstGeom prst="rect">
             <a:avLst/>
@@ -6447,21 +6670,288 @@
                   <a:srgbClr val="C00000"/>
                 </a:solidFill>
               </a:rPr>
-              <a:t>In the Inspector view of an “assembly” we can specify that the AG analysis should be performed with the BMC algorithm.</a:t>
+              <a:t>Step 1: Start the AG analysis</a:t>
             </a:r>
           </a:p>
         </p:txBody>
       </p:sp>
       <p:cxnSp>
         <p:nvCxnSpPr>
-          <p:cNvPr id="6" name="Gerade Verbindung mit Pfeil 5"/>
+          <p:cNvPr id="5" name="Gerade Verbindung mit Pfeil 4"/>
           <p:cNvCxnSpPr/>
           <p:nvPr/>
         </p:nvCxnSpPr>
         <p:spPr>
-          <a:xfrm flipH="1" flipV="1">
-            <a:off x="2123728" y="1268760"/>
-            <a:ext cx="1800200" cy="1296144"/>
+          <a:xfrm flipH="1">
+            <a:off x="2123728" y="908720"/>
+            <a:ext cx="720080" cy="1800200"/>
+          </a:xfrm>
+          <a:prstGeom prst="straightConnector1">
+            <a:avLst/>
+          </a:prstGeom>
+          <a:ln w="19050">
+            <a:solidFill>
+              <a:srgbClr val="C00000"/>
+            </a:solidFill>
+            <a:tailEnd type="triangle"/>
+          </a:ln>
+        </p:spPr>
+        <p:style>
+          <a:lnRef idx="1">
+            <a:schemeClr val="accent1"/>
+          </a:lnRef>
+          <a:fillRef idx="0">
+            <a:schemeClr val="accent1"/>
+          </a:fillRef>
+          <a:effectRef idx="0">
+            <a:schemeClr val="accent1"/>
+          </a:effectRef>
+          <a:fontRef idx="minor">
+            <a:schemeClr val="tx1"/>
+          </a:fontRef>
+        </p:style>
+      </p:cxnSp>
+      <p:sp>
+        <p:nvSpPr>
+          <p:cNvPr id="7" name="Textfeld 6"/>
+          <p:cNvSpPr txBox="1"/>
+          <p:nvPr/>
+        </p:nvSpPr>
+        <p:spPr>
+          <a:xfrm>
+            <a:off x="2915816" y="997278"/>
+            <a:ext cx="2520280" cy="415498"/>
+          </a:xfrm>
+          <a:prstGeom prst="rect">
+            <a:avLst/>
+          </a:prstGeom>
+          <a:solidFill>
+            <a:schemeClr val="accent6">
+              <a:lumMod val="20000"/>
+              <a:lumOff val="80000"/>
+              <a:alpha val="76000"/>
+            </a:schemeClr>
+          </a:solidFill>
+        </p:spPr>
+        <p:txBody>
+          <a:bodyPr wrap="square" rtlCol="0">
+            <a:spAutoFit/>
+          </a:bodyPr>
+          <a:lstStyle/>
+          <a:p>
+            <a:r>
+              <a:rPr lang="en-US" sz="1050" b="1" dirty="0" smtClean="0">
+                <a:solidFill>
+                  <a:srgbClr val="C00000"/>
+                </a:solidFill>
+              </a:rPr>
+              <a:t>Step 2: After the analysis finishes, the results are displayed</a:t>
+            </a:r>
+          </a:p>
+        </p:txBody>
+      </p:sp>
+      <p:cxnSp>
+        <p:nvCxnSpPr>
+          <p:cNvPr id="10" name="Gerade Verbindung mit Pfeil 9"/>
+          <p:cNvCxnSpPr/>
+          <p:nvPr/>
+        </p:nvCxnSpPr>
+        <p:spPr>
+          <a:xfrm flipV="1">
+            <a:off x="5436096" y="1124744"/>
+            <a:ext cx="1080120" cy="144016"/>
+          </a:xfrm>
+          <a:prstGeom prst="straightConnector1">
+            <a:avLst/>
+          </a:prstGeom>
+          <a:ln w="19050">
+            <a:solidFill>
+              <a:srgbClr val="C00000"/>
+            </a:solidFill>
+            <a:tailEnd type="triangle"/>
+          </a:ln>
+        </p:spPr>
+        <p:style>
+          <a:lnRef idx="1">
+            <a:schemeClr val="accent1"/>
+          </a:lnRef>
+          <a:fillRef idx="0">
+            <a:schemeClr val="accent1"/>
+          </a:fillRef>
+          <a:effectRef idx="0">
+            <a:schemeClr val="accent1"/>
+          </a:effectRef>
+          <a:fontRef idx="minor">
+            <a:schemeClr val="tx1"/>
+          </a:fontRef>
+        </p:style>
+      </p:cxnSp>
+      <p:pic>
+        <p:nvPicPr>
+          <p:cNvPr id="3075" name="Picture 3"/>
+          <p:cNvPicPr>
+            <a:picLocks noChangeAspect="1" noChangeArrowheads="1"/>
+          </p:cNvPicPr>
+          <p:nvPr/>
+        </p:nvPicPr>
+        <p:blipFill>
+          <a:blip r:embed="rId3" cstate="print"/>
+          <a:srcRect/>
+          <a:stretch>
+            <a:fillRect/>
+          </a:stretch>
+        </p:blipFill>
+        <p:spPr bwMode="auto">
+          <a:xfrm>
+            <a:off x="899592" y="3068960"/>
+            <a:ext cx="4104456" cy="1080119"/>
+          </a:xfrm>
+          <a:prstGeom prst="rect">
+            <a:avLst/>
+          </a:prstGeom>
+          <a:noFill/>
+          <a:ln w="9525">
+            <a:noFill/>
+            <a:miter lim="800000"/>
+            <a:headEnd/>
+            <a:tailEnd/>
+          </a:ln>
+        </p:spPr>
+      </p:pic>
+      <p:sp>
+        <p:nvSpPr>
+          <p:cNvPr id="20" name="Rechteck 19"/>
+          <p:cNvSpPr/>
+          <p:nvPr/>
+        </p:nvSpPr>
+        <p:spPr>
+          <a:xfrm>
+            <a:off x="1259632" y="4149080"/>
+            <a:ext cx="2592288" cy="936104"/>
+          </a:xfrm>
+          <a:prstGeom prst="rect">
+            <a:avLst/>
+          </a:prstGeom>
+          <a:solidFill>
+            <a:schemeClr val="bg1"/>
+          </a:solidFill>
+          <a:ln>
+            <a:noFill/>
+          </a:ln>
+        </p:spPr>
+        <p:style>
+          <a:lnRef idx="2">
+            <a:schemeClr val="accent1">
+              <a:shade val="50000"/>
+            </a:schemeClr>
+          </a:lnRef>
+          <a:fillRef idx="1">
+            <a:schemeClr val="accent1"/>
+          </a:fillRef>
+          <a:effectRef idx="0">
+            <a:schemeClr val="accent1"/>
+          </a:effectRef>
+          <a:fontRef idx="minor">
+            <a:schemeClr val="lt1"/>
+          </a:fontRef>
+        </p:style>
+        <p:txBody>
+          <a:bodyPr rtlCol="0" anchor="ctr"/>
+          <a:lstStyle/>
+          <a:p>
+            <a:pPr algn="ctr"/>
+            <a:endParaRPr lang="en-US"/>
+          </a:p>
+        </p:txBody>
+      </p:sp>
+      <p:sp>
+        <p:nvSpPr>
+          <p:cNvPr id="8" name="Textfeld 7"/>
+          <p:cNvSpPr txBox="1"/>
+          <p:nvPr/>
+        </p:nvSpPr>
+        <p:spPr>
+          <a:xfrm>
+            <a:off x="1907704" y="3932039"/>
+            <a:ext cx="3528392" cy="577081"/>
+          </a:xfrm>
+          <a:prstGeom prst="rect">
+            <a:avLst/>
+          </a:prstGeom>
+          <a:solidFill>
+            <a:schemeClr val="accent6">
+              <a:lumMod val="20000"/>
+              <a:lumOff val="80000"/>
+              <a:alpha val="76000"/>
+            </a:schemeClr>
+          </a:solidFill>
+        </p:spPr>
+        <p:txBody>
+          <a:bodyPr wrap="square" rtlCol="0">
+            <a:spAutoFit/>
+          </a:bodyPr>
+          <a:lstStyle/>
+          <a:p>
+            <a:r>
+              <a:rPr lang="en-US" sz="1050" b="1" dirty="0" smtClean="0">
+                <a:solidFill>
+                  <a:srgbClr val="C00000"/>
+                </a:solidFill>
+              </a:rPr>
+              <a:t>Step 3: Double-clicking on a failed result will display the counterexample. By clicking on “Simulate”, the CEX will be simulated.</a:t>
+            </a:r>
+          </a:p>
+        </p:txBody>
+      </p:sp>
+      <p:sp>
+        <p:nvSpPr>
+          <p:cNvPr id="17" name="Textfeld 16"/>
+          <p:cNvSpPr txBox="1"/>
+          <p:nvPr/>
+        </p:nvSpPr>
+        <p:spPr>
+          <a:xfrm>
+            <a:off x="1907704" y="4581128"/>
+            <a:ext cx="3528392" cy="577081"/>
+          </a:xfrm>
+          <a:prstGeom prst="rect">
+            <a:avLst/>
+          </a:prstGeom>
+          <a:solidFill>
+            <a:schemeClr val="accent6">
+              <a:lumMod val="20000"/>
+              <a:lumOff val="80000"/>
+              <a:alpha val="76000"/>
+            </a:schemeClr>
+          </a:solidFill>
+        </p:spPr>
+        <p:txBody>
+          <a:bodyPr wrap="square" rtlCol="0">
+            <a:spAutoFit/>
+          </a:bodyPr>
+          <a:lstStyle/>
+          <a:p>
+            <a:r>
+              <a:rPr lang="en-US" sz="1050" b="1" dirty="0" smtClean="0">
+                <a:solidFill>
+                  <a:srgbClr val="C00000"/>
+                </a:solidFill>
+              </a:rPr>
+              <a:t>Step 4: Using the simulation bar, one can step-through the counterexample. The values of ports in a certain step are displayed in the IDE as annotations.</a:t>
+            </a:r>
+          </a:p>
+        </p:txBody>
+      </p:sp>
+      <p:cxnSp>
+        <p:nvCxnSpPr>
+          <p:cNvPr id="26" name="Gerade Verbindung mit Pfeil 25"/>
+          <p:cNvCxnSpPr/>
+          <p:nvPr/>
+        </p:nvCxnSpPr>
+        <p:spPr>
+          <a:xfrm>
+            <a:off x="4283968" y="4365104"/>
+            <a:ext cx="2664296" cy="288032"/>
           </a:xfrm>
           <a:prstGeom prst="straightConnector1">
             <a:avLst/>
@@ -6490,14 +6980,52 @@
       </p:cxnSp>
       <p:cxnSp>
         <p:nvCxnSpPr>
-          <p:cNvPr id="11" name="Gerade Verbindung mit Pfeil 10"/>
+          <p:cNvPr id="29" name="Gerade Verbindung mit Pfeil 28"/>
+          <p:cNvCxnSpPr>
+            <a:stCxn id="17" idx="1"/>
+          </p:cNvCxnSpPr>
+          <p:nvPr/>
+        </p:nvCxnSpPr>
+        <p:spPr>
+          <a:xfrm flipH="1" flipV="1">
+            <a:off x="1115616" y="2420888"/>
+            <a:ext cx="792088" cy="2448781"/>
+          </a:xfrm>
+          <a:prstGeom prst="straightConnector1">
+            <a:avLst/>
+          </a:prstGeom>
+          <a:ln w="19050">
+            <a:solidFill>
+              <a:srgbClr val="C00000"/>
+            </a:solidFill>
+            <a:tailEnd type="triangle"/>
+          </a:ln>
+        </p:spPr>
+        <p:style>
+          <a:lnRef idx="1">
+            <a:schemeClr val="accent1"/>
+          </a:lnRef>
+          <a:fillRef idx="0">
+            <a:schemeClr val="accent1"/>
+          </a:fillRef>
+          <a:effectRef idx="0">
+            <a:schemeClr val="accent1"/>
+          </a:effectRef>
+          <a:fontRef idx="minor">
+            <a:schemeClr val="tx1"/>
+          </a:fontRef>
+        </p:style>
+      </p:cxnSp>
+      <p:cxnSp>
+        <p:nvCxnSpPr>
+          <p:cNvPr id="14" name="Gerade Verbindung mit Pfeil 13"/>
           <p:cNvCxnSpPr/>
           <p:nvPr/>
         </p:nvCxnSpPr>
         <p:spPr>
-          <a:xfrm flipH="1">
-            <a:off x="1979712" y="2852936"/>
-            <a:ext cx="1944216" cy="2520280"/>
+          <a:xfrm flipV="1">
+            <a:off x="4788024" y="3140968"/>
+            <a:ext cx="1728192" cy="864096"/>
           </a:xfrm>
           <a:prstGeom prst="straightConnector1">
             <a:avLst/>
@@ -6551,6 +7079,174 @@
       </p:grpSpPr>
       <p:pic>
         <p:nvPicPr>
+          <p:cNvPr id="1026" name="Picture 2"/>
+          <p:cNvPicPr>
+            <a:picLocks noChangeAspect="1" noChangeArrowheads="1"/>
+          </p:cNvPicPr>
+          <p:nvPr/>
+        </p:nvPicPr>
+        <p:blipFill>
+          <a:blip r:embed="rId2" cstate="print"/>
+          <a:srcRect/>
+          <a:stretch>
+            <a:fillRect/>
+          </a:stretch>
+        </p:blipFill>
+        <p:spPr bwMode="auto">
+          <a:xfrm>
+            <a:off x="1022350" y="914400"/>
+            <a:ext cx="7099300" cy="5029200"/>
+          </a:xfrm>
+          <a:prstGeom prst="rect">
+            <a:avLst/>
+          </a:prstGeom>
+          <a:noFill/>
+          <a:ln w="9525">
+            <a:noFill/>
+            <a:miter lim="800000"/>
+            <a:headEnd/>
+            <a:tailEnd/>
+          </a:ln>
+        </p:spPr>
+      </p:pic>
+      <p:sp>
+        <p:nvSpPr>
+          <p:cNvPr id="5" name="Textfeld 4"/>
+          <p:cNvSpPr txBox="1"/>
+          <p:nvPr/>
+        </p:nvSpPr>
+        <p:spPr>
+          <a:xfrm>
+            <a:off x="3923928" y="2420888"/>
+            <a:ext cx="2520280" cy="577081"/>
+          </a:xfrm>
+          <a:prstGeom prst="rect">
+            <a:avLst/>
+          </a:prstGeom>
+          <a:solidFill>
+            <a:schemeClr val="accent6">
+              <a:lumMod val="20000"/>
+              <a:lumOff val="80000"/>
+              <a:alpha val="76000"/>
+            </a:schemeClr>
+          </a:solidFill>
+        </p:spPr>
+        <p:txBody>
+          <a:bodyPr wrap="square" rtlCol="0">
+            <a:spAutoFit/>
+          </a:bodyPr>
+          <a:lstStyle/>
+          <a:p>
+            <a:r>
+              <a:rPr lang="en-US" sz="1050" b="1" dirty="0" smtClean="0">
+                <a:solidFill>
+                  <a:srgbClr val="C00000"/>
+                </a:solidFill>
+              </a:rPr>
+              <a:t>In the Inspector view of an “assembly” we can specify that the AG analysis should be performed with the BMC algorithm.</a:t>
+            </a:r>
+          </a:p>
+        </p:txBody>
+      </p:sp>
+      <p:cxnSp>
+        <p:nvCxnSpPr>
+          <p:cNvPr id="6" name="Gerade Verbindung mit Pfeil 5"/>
+          <p:cNvCxnSpPr/>
+          <p:nvPr/>
+        </p:nvCxnSpPr>
+        <p:spPr>
+          <a:xfrm flipH="1" flipV="1">
+            <a:off x="2123728" y="1268760"/>
+            <a:ext cx="1800200" cy="1296144"/>
+          </a:xfrm>
+          <a:prstGeom prst="straightConnector1">
+            <a:avLst/>
+          </a:prstGeom>
+          <a:ln w="19050">
+            <a:solidFill>
+              <a:srgbClr val="C00000"/>
+            </a:solidFill>
+            <a:tailEnd type="triangle"/>
+          </a:ln>
+        </p:spPr>
+        <p:style>
+          <a:lnRef idx="1">
+            <a:schemeClr val="accent1"/>
+          </a:lnRef>
+          <a:fillRef idx="0">
+            <a:schemeClr val="accent1"/>
+          </a:fillRef>
+          <a:effectRef idx="0">
+            <a:schemeClr val="accent1"/>
+          </a:effectRef>
+          <a:fontRef idx="minor">
+            <a:schemeClr val="tx1"/>
+          </a:fontRef>
+        </p:style>
+      </p:cxnSp>
+      <p:cxnSp>
+        <p:nvCxnSpPr>
+          <p:cNvPr id="11" name="Gerade Verbindung mit Pfeil 10"/>
+          <p:cNvCxnSpPr/>
+          <p:nvPr/>
+        </p:nvCxnSpPr>
+        <p:spPr>
+          <a:xfrm flipH="1">
+            <a:off x="1979712" y="2852936"/>
+            <a:ext cx="1944216" cy="2520280"/>
+          </a:xfrm>
+          <a:prstGeom prst="straightConnector1">
+            <a:avLst/>
+          </a:prstGeom>
+          <a:ln w="19050">
+            <a:solidFill>
+              <a:srgbClr val="C00000"/>
+            </a:solidFill>
+            <a:tailEnd type="triangle"/>
+          </a:ln>
+        </p:spPr>
+        <p:style>
+          <a:lnRef idx="1">
+            <a:schemeClr val="accent1"/>
+          </a:lnRef>
+          <a:fillRef idx="0">
+            <a:schemeClr val="accent1"/>
+          </a:fillRef>
+          <a:effectRef idx="0">
+            <a:schemeClr val="accent1"/>
+          </a:effectRef>
+          <a:fontRef idx="minor">
+            <a:schemeClr val="tx1"/>
+          </a:fontRef>
+        </p:style>
+      </p:cxnSp>
+    </p:spTree>
+  </p:cSld>
+  <p:clrMapOvr>
+    <a:masterClrMapping/>
+  </p:clrMapOvr>
+</p:sld>
+</file>
+
+<file path=ppt/slides/slide18.xml><?xml version="1.0" encoding="utf-8"?>
+<p:sld xmlns:a="http://schemas.openxmlformats.org/drawingml/2006/main" xmlns:r="http://schemas.openxmlformats.org/officeDocument/2006/relationships" xmlns:p="http://schemas.openxmlformats.org/presentationml/2006/main">
+  <p:cSld>
+    <p:spTree>
+      <p:nvGrpSpPr>
+        <p:cNvPr id="1" name=""/>
+        <p:cNvGrpSpPr/>
+        <p:nvPr/>
+      </p:nvGrpSpPr>
+      <p:grpSpPr>
+        <a:xfrm>
+          <a:off x="0" y="0"/>
+          <a:ext cx="0" cy="0"/>
+          <a:chOff x="0" y="0"/>
+          <a:chExt cx="0" cy="0"/>
+        </a:xfrm>
+      </p:grpSpPr>
+      <p:pic>
+        <p:nvPicPr>
           <p:cNvPr id="1027" name="Picture 3"/>
           <p:cNvPicPr>
             <a:picLocks noChangeAspect="1" noChangeArrowheads="1"/>
@@ -6617,11 +7313,6 @@
               </a:rPr>
               <a:t>A refinement declaration links a component interface to a SMV module. Checking the refinement is performed by  using the “Check Refinement” pop-up menu.</a:t>
             </a:r>
-            <a:endParaRPr lang="en-US" sz="1050" b="1" dirty="0" smtClean="0">
-              <a:solidFill>
-                <a:srgbClr val="C00000"/>
-              </a:solidFill>
-            </a:endParaRPr>
           </a:p>
         </p:txBody>
       </p:sp>
@@ -7281,15 +7972,15 @@
         </p:nvPicPr>
         <p:blipFill>
           <a:blip r:embed="rId2" cstate="print"/>
-          <a:srcRect/>
+          <a:srcRect r="12361"/>
           <a:stretch>
             <a:fillRect/>
           </a:stretch>
         </p:blipFill>
         <p:spPr bwMode="auto">
           <a:xfrm>
-            <a:off x="1004888" y="1814513"/>
-            <a:ext cx="7134225" cy="3228975"/>
+            <a:off x="15123" y="908720"/>
+            <a:ext cx="9093381" cy="3744416"/>
           </a:xfrm>
           <a:prstGeom prst="rect">
             <a:avLst/>
@@ -7311,8 +8002,8 @@
         </p:nvSpPr>
         <p:spPr>
           <a:xfrm>
-            <a:off x="5292080" y="3429000"/>
-            <a:ext cx="2592288" cy="1061829"/>
+            <a:off x="3563888" y="1772816"/>
+            <a:ext cx="2160240" cy="577081"/>
           </a:xfrm>
           <a:prstGeom prst="rect">
             <a:avLst/>
@@ -7338,42 +8029,68 @@
                   <a:srgbClr val="C00000"/>
                 </a:solidFill>
               </a:rPr>
-              <a:t>Initial condition means that the following test is run after the system reaches a state such that the initial condition is true. </a:t>
-            </a:r>
-          </a:p>
-          <a:p>
-            <a:pPr algn="ctr"/>
+              <a:t>System with </a:t>
+            </a:r>
+            <a:r>
+              <a:rPr lang="en-US" sz="1050" b="1" dirty="0" err="1" smtClean="0">
+                <a:solidFill>
+                  <a:srgbClr val="C00000"/>
+                </a:solidFill>
+              </a:rPr>
+              <a:t>nondeterminism</a:t>
+            </a:r>
+            <a:r>
+              <a:rPr lang="en-US" sz="1050" b="1" dirty="0" smtClean="0">
+                <a:solidFill>
+                  <a:srgbClr val="C00000"/>
+                </a:solidFill>
+              </a:rPr>
+              <a:t>: the next value of the </a:t>
+            </a:r>
+            <a:r>
+              <a:rPr lang="en-US" sz="1050" b="1" dirty="0" err="1" smtClean="0">
+                <a:solidFill>
+                  <a:srgbClr val="C00000"/>
+                </a:solidFill>
+              </a:rPr>
+              <a:t>ped_signal</a:t>
+            </a:r>
+            <a:r>
+              <a:rPr lang="en-US" sz="1050" b="1" dirty="0" smtClean="0">
+                <a:solidFill>
+                  <a:srgbClr val="C00000"/>
+                </a:solidFill>
+              </a:rPr>
+              <a:t> can be either Walk or </a:t>
+            </a:r>
+            <a:r>
+              <a:rPr lang="en-US" sz="1050" b="1" dirty="0" err="1" smtClean="0">
+                <a:solidFill>
+                  <a:srgbClr val="C00000"/>
+                </a:solidFill>
+              </a:rPr>
+              <a:t>DontWalk</a:t>
+            </a:r>
             <a:endParaRPr lang="en-US" sz="1050" b="1" dirty="0" smtClean="0">
               <a:solidFill>
                 <a:srgbClr val="C00000"/>
               </a:solidFill>
             </a:endParaRPr>
           </a:p>
-          <a:p>
-            <a:pPr algn="ctr"/>
-            <a:r>
-              <a:rPr lang="en-US" sz="1050" b="1" dirty="0" smtClean="0">
-                <a:solidFill>
-                  <a:srgbClr val="C00000"/>
-                </a:solidFill>
-              </a:rPr>
-              <a:t>The first line of the test case starts from the next step.</a:t>
-            </a:r>
-          </a:p>
         </p:txBody>
       </p:sp>
       <p:cxnSp>
         <p:nvCxnSpPr>
           <p:cNvPr id="6" name="Gerade Verbindung mit Pfeil 5"/>
           <p:cNvCxnSpPr>
-            <a:stCxn id="5" idx="1"/>
+            <a:stCxn id="5" idx="2"/>
           </p:cNvCxnSpPr>
           <p:nvPr/>
         </p:nvCxnSpPr>
         <p:spPr>
-          <a:xfrm flipH="1" flipV="1">
-            <a:off x="4716016" y="3573020"/>
-            <a:ext cx="576064" cy="386895"/>
+          <a:xfrm>
+            <a:off x="4644008" y="2349897"/>
+            <a:ext cx="432048" cy="431031"/>
           </a:xfrm>
           <a:prstGeom prst="straightConnector1">
             <a:avLst/>
@@ -7402,14 +8119,14 @@
       </p:cxnSp>
       <p:cxnSp>
         <p:nvCxnSpPr>
-          <p:cNvPr id="10" name="Gerade Verbindung mit Pfeil 9"/>
+          <p:cNvPr id="7" name="Gerade Verbindung mit Pfeil 6"/>
           <p:cNvCxnSpPr/>
           <p:nvPr/>
         </p:nvCxnSpPr>
         <p:spPr>
-          <a:xfrm flipH="1" flipV="1">
-            <a:off x="4499992" y="4077072"/>
-            <a:ext cx="792088" cy="144016"/>
+          <a:xfrm flipV="1">
+            <a:off x="6084168" y="2708920"/>
+            <a:ext cx="2160240" cy="648072"/>
           </a:xfrm>
           <a:prstGeom prst="straightConnector1">
             <a:avLst/>
@@ -7436,6 +8153,87 @@
           </a:fontRef>
         </p:style>
       </p:cxnSp>
+      <p:cxnSp>
+        <p:nvCxnSpPr>
+          <p:cNvPr id="14" name="Gerade Verbindung mit Pfeil 13"/>
+          <p:cNvCxnSpPr/>
+          <p:nvPr/>
+        </p:nvCxnSpPr>
+        <p:spPr>
+          <a:xfrm>
+            <a:off x="6084168" y="3933056"/>
+            <a:ext cx="2016224" cy="432048"/>
+          </a:xfrm>
+          <a:prstGeom prst="straightConnector1">
+            <a:avLst/>
+          </a:prstGeom>
+          <a:ln w="19050">
+            <a:solidFill>
+              <a:srgbClr val="C00000"/>
+            </a:solidFill>
+            <a:tailEnd type="triangle"/>
+          </a:ln>
+        </p:spPr>
+        <p:style>
+          <a:lnRef idx="1">
+            <a:schemeClr val="accent1"/>
+          </a:lnRef>
+          <a:fillRef idx="0">
+            <a:schemeClr val="accent1"/>
+          </a:fillRef>
+          <a:effectRef idx="0">
+            <a:schemeClr val="accent1"/>
+          </a:effectRef>
+          <a:fontRef idx="minor">
+            <a:schemeClr val="tx1"/>
+          </a:fontRef>
+        </p:style>
+      </p:cxnSp>
+      <p:sp>
+        <p:nvSpPr>
+          <p:cNvPr id="16" name="Textfeld 15"/>
+          <p:cNvSpPr txBox="1"/>
+          <p:nvPr/>
+        </p:nvSpPr>
+        <p:spPr>
+          <a:xfrm>
+            <a:off x="3563888" y="3356992"/>
+            <a:ext cx="2592288" cy="738664"/>
+          </a:xfrm>
+          <a:prstGeom prst="rect">
+            <a:avLst/>
+          </a:prstGeom>
+          <a:solidFill>
+            <a:schemeClr val="accent6">
+              <a:lumMod val="20000"/>
+              <a:lumOff val="80000"/>
+              <a:alpha val="65000"/>
+            </a:schemeClr>
+          </a:solidFill>
+        </p:spPr>
+        <p:txBody>
+          <a:bodyPr wrap="square" rtlCol="0">
+            <a:spAutoFit/>
+          </a:bodyPr>
+          <a:lstStyle/>
+          <a:p>
+            <a:pPr algn="ctr"/>
+            <a:r>
+              <a:rPr lang="en-US" sz="1050" b="1" dirty="0" smtClean="0">
+                <a:solidFill>
+                  <a:srgbClr val="C00000"/>
+                </a:solidFill>
+              </a:rPr>
+              <a:t>Two scenarios which are both allowed by this system: the inputs of these scenarios have the same values – the difference is between the output value in step 8.</a:t>
+            </a:r>
+            <a:endParaRPr lang="en-US" sz="1050" b="1" dirty="0" smtClean="0">
+              <a:solidFill>
+                <a:srgbClr val="C00000"/>
+              </a:solidFill>
+            </a:endParaRPr>
+          </a:p>
+        </p:txBody>
+      </p:sp>
     </p:spTree>
   </p:cSld>
   <p:clrMapOvr>
@@ -7463,7 +8261,7 @@
       </p:grpSpPr>
       <p:pic>
         <p:nvPicPr>
-          <p:cNvPr id="2051" name="Picture 3"/>
+          <p:cNvPr id="1026" name="Picture 2"/>
           <p:cNvPicPr>
             <a:picLocks noChangeAspect="1" noChangeArrowheads="1"/>
           </p:cNvPicPr>
@@ -7471,15 +8269,15 @@
         </p:nvPicPr>
         <p:blipFill>
           <a:blip r:embed="rId2" cstate="print"/>
-          <a:srcRect l="26375" t="4467" r="38778" b="39159"/>
+          <a:srcRect/>
           <a:stretch>
             <a:fillRect/>
           </a:stretch>
         </p:blipFill>
         <p:spPr bwMode="auto">
           <a:xfrm>
-            <a:off x="2411760" y="188640"/>
-            <a:ext cx="4248472" cy="3744416"/>
+            <a:off x="1004888" y="1814513"/>
+            <a:ext cx="7134225" cy="3228975"/>
           </a:xfrm>
           <a:prstGeom prst="rect">
             <a:avLst/>
@@ -7493,18 +8291,144 @@
           </a:ln>
         </p:spPr>
       </p:pic>
+      <p:sp>
+        <p:nvSpPr>
+          <p:cNvPr id="5" name="Textfeld 4"/>
+          <p:cNvSpPr txBox="1"/>
+          <p:nvPr/>
+        </p:nvSpPr>
+        <p:spPr>
+          <a:xfrm>
+            <a:off x="5292080" y="3429000"/>
+            <a:ext cx="2592288" cy="1061829"/>
+          </a:xfrm>
+          <a:prstGeom prst="rect">
+            <a:avLst/>
+          </a:prstGeom>
+          <a:solidFill>
+            <a:schemeClr val="accent6">
+              <a:lumMod val="20000"/>
+              <a:lumOff val="80000"/>
+              <a:alpha val="65000"/>
+            </a:schemeClr>
+          </a:solidFill>
+        </p:spPr>
+        <p:txBody>
+          <a:bodyPr wrap="square" rtlCol="0">
+            <a:spAutoFit/>
+          </a:bodyPr>
+          <a:lstStyle/>
+          <a:p>
+            <a:pPr algn="ctr"/>
+            <a:r>
+              <a:rPr lang="en-US" sz="1050" b="1" dirty="0" smtClean="0">
+                <a:solidFill>
+                  <a:srgbClr val="C00000"/>
+                </a:solidFill>
+              </a:rPr>
+              <a:t>Initial condition means that the following test is run after the system reaches a state such that the initial condition is true. </a:t>
+            </a:r>
+          </a:p>
+          <a:p>
+            <a:pPr algn="ctr"/>
+            <a:endParaRPr lang="en-US" sz="1050" b="1" dirty="0" smtClean="0">
+              <a:solidFill>
+                <a:srgbClr val="C00000"/>
+              </a:solidFill>
+            </a:endParaRPr>
+          </a:p>
+          <a:p>
+            <a:pPr algn="ctr"/>
+            <a:r>
+              <a:rPr lang="en-US" sz="1050" b="1" dirty="0" smtClean="0">
+                <a:solidFill>
+                  <a:srgbClr val="C00000"/>
+                </a:solidFill>
+              </a:rPr>
+              <a:t>The first line of the test case starts from the next step.</a:t>
+            </a:r>
+          </a:p>
+        </p:txBody>
+      </p:sp>
+      <p:cxnSp>
+        <p:nvCxnSpPr>
+          <p:cNvPr id="6" name="Gerade Verbindung mit Pfeil 5"/>
+          <p:cNvCxnSpPr>
+            <a:stCxn id="5" idx="1"/>
+          </p:cNvCxnSpPr>
+          <p:nvPr/>
+        </p:nvCxnSpPr>
+        <p:spPr>
+          <a:xfrm flipH="1" flipV="1">
+            <a:off x="4716016" y="3573020"/>
+            <a:ext cx="576064" cy="386895"/>
+          </a:xfrm>
+          <a:prstGeom prst="straightConnector1">
+            <a:avLst/>
+          </a:prstGeom>
+          <a:ln w="19050">
+            <a:solidFill>
+              <a:srgbClr val="C00000"/>
+            </a:solidFill>
+            <a:tailEnd type="triangle"/>
+          </a:ln>
+        </p:spPr>
+        <p:style>
+          <a:lnRef idx="1">
+            <a:schemeClr val="accent1"/>
+          </a:lnRef>
+          <a:fillRef idx="0">
+            <a:schemeClr val="accent1"/>
+          </a:fillRef>
+          <a:effectRef idx="0">
+            <a:schemeClr val="accent1"/>
+          </a:effectRef>
+          <a:fontRef idx="minor">
+            <a:schemeClr val="tx1"/>
+          </a:fontRef>
+        </p:style>
+      </p:cxnSp>
+      <p:cxnSp>
+        <p:nvCxnSpPr>
+          <p:cNvPr id="10" name="Gerade Verbindung mit Pfeil 9"/>
+          <p:cNvCxnSpPr/>
+          <p:nvPr/>
+        </p:nvCxnSpPr>
+        <p:spPr>
+          <a:xfrm flipH="1" flipV="1">
+            <a:off x="4499992" y="4077072"/>
+            <a:ext cx="792088" cy="144016"/>
+          </a:xfrm>
+          <a:prstGeom prst="straightConnector1">
+            <a:avLst/>
+          </a:prstGeom>
+          <a:ln w="19050">
+            <a:solidFill>
+              <a:srgbClr val="C00000"/>
+            </a:solidFill>
+            <a:tailEnd type="triangle"/>
+          </a:ln>
+        </p:spPr>
+        <p:style>
+          <a:lnRef idx="1">
+            <a:schemeClr val="accent1"/>
+          </a:lnRef>
+          <a:fillRef idx="0">
+            <a:schemeClr val="accent1"/>
+          </a:fillRef>
+          <a:effectRef idx="0">
+            <a:schemeClr val="accent1"/>
+          </a:effectRef>
+          <a:fontRef idx="minor">
+            <a:schemeClr val="tx1"/>
+          </a:fontRef>
+        </p:style>
+      </p:cxnSp>
     </p:spTree>
   </p:cSld>
   <p:clrMapOvr>
     <a:masterClrMapping/>
   </p:clrMapOvr>
-  <p:timing>
-    <p:tnLst>
-      <p:par>
-        <p:cTn id="1" dur="indefinite" restart="never" nodeType="tmRoot"/>
-      </p:par>
-    </p:tnLst>
-  </p:timing>
 </p:sld>
 </file>
 
@@ -7527,7 +8451,7 @@
       </p:grpSpPr>
       <p:pic>
         <p:nvPicPr>
-          <p:cNvPr id="2050" name="Picture 2"/>
+          <p:cNvPr id="2051" name="Picture 3"/>
           <p:cNvPicPr>
             <a:picLocks noChangeAspect="1" noChangeArrowheads="1"/>
           </p:cNvPicPr>
@@ -7535,15 +8459,15 @@
         </p:nvPicPr>
         <p:blipFill>
           <a:blip r:embed="rId2" cstate="print"/>
-          <a:srcRect r="54822" b="52168"/>
+          <a:srcRect l="26375" t="4467" r="38778" b="39159"/>
           <a:stretch>
             <a:fillRect/>
           </a:stretch>
         </p:blipFill>
         <p:spPr bwMode="auto">
           <a:xfrm>
-            <a:off x="1187624" y="188640"/>
-            <a:ext cx="5508104" cy="3177034"/>
+            <a:off x="2411760" y="188640"/>
+            <a:ext cx="4248472" cy="3744416"/>
           </a:xfrm>
           <a:prstGeom prst="rect">
             <a:avLst/>
@@ -7591,7 +8515,7 @@
       </p:grpSpPr>
       <p:pic>
         <p:nvPicPr>
-          <p:cNvPr id="1027" name="Picture 3"/>
+          <p:cNvPr id="2050" name="Picture 2"/>
           <p:cNvPicPr>
             <a:picLocks noChangeAspect="1" noChangeArrowheads="1"/>
           </p:cNvPicPr>
@@ -7599,15 +8523,15 @@
         </p:nvPicPr>
         <p:blipFill>
           <a:blip r:embed="rId2" cstate="print"/>
-          <a:srcRect/>
+          <a:srcRect r="54822" b="52168"/>
           <a:stretch>
             <a:fillRect/>
           </a:stretch>
         </p:blipFill>
         <p:spPr bwMode="auto">
           <a:xfrm>
-            <a:off x="1763688" y="404664"/>
-            <a:ext cx="6400800" cy="4006850"/>
+            <a:off x="1187624" y="188640"/>
+            <a:ext cx="5508104" cy="3177034"/>
           </a:xfrm>
           <a:prstGeom prst="rect">
             <a:avLst/>
@@ -7637,6 +8561,70 @@
 </file>
 
 <file path=ppt/slides/slide8.xml><?xml version="1.0" encoding="utf-8"?>
+<p:sld xmlns:a="http://schemas.openxmlformats.org/drawingml/2006/main" xmlns:r="http://schemas.openxmlformats.org/officeDocument/2006/relationships" xmlns:p="http://schemas.openxmlformats.org/presentationml/2006/main">
+  <p:cSld>
+    <p:spTree>
+      <p:nvGrpSpPr>
+        <p:cNvPr id="1" name=""/>
+        <p:cNvGrpSpPr/>
+        <p:nvPr/>
+      </p:nvGrpSpPr>
+      <p:grpSpPr>
+        <a:xfrm>
+          <a:off x="0" y="0"/>
+          <a:ext cx="0" cy="0"/>
+          <a:chOff x="0" y="0"/>
+          <a:chExt cx="0" cy="0"/>
+        </a:xfrm>
+      </p:grpSpPr>
+      <p:pic>
+        <p:nvPicPr>
+          <p:cNvPr id="1027" name="Picture 3"/>
+          <p:cNvPicPr>
+            <a:picLocks noChangeAspect="1" noChangeArrowheads="1"/>
+          </p:cNvPicPr>
+          <p:nvPr/>
+        </p:nvPicPr>
+        <p:blipFill>
+          <a:blip r:embed="rId2" cstate="print"/>
+          <a:srcRect/>
+          <a:stretch>
+            <a:fillRect/>
+          </a:stretch>
+        </p:blipFill>
+        <p:spPr bwMode="auto">
+          <a:xfrm>
+            <a:off x="1763688" y="404664"/>
+            <a:ext cx="6400800" cy="4006850"/>
+          </a:xfrm>
+          <a:prstGeom prst="rect">
+            <a:avLst/>
+          </a:prstGeom>
+          <a:noFill/>
+          <a:ln w="9525">
+            <a:noFill/>
+            <a:miter lim="800000"/>
+            <a:headEnd/>
+            <a:tailEnd/>
+          </a:ln>
+        </p:spPr>
+      </p:pic>
+    </p:spTree>
+  </p:cSld>
+  <p:clrMapOvr>
+    <a:masterClrMapping/>
+  </p:clrMapOvr>
+  <p:timing>
+    <p:tnLst>
+      <p:par>
+        <p:cTn id="1" dur="indefinite" restart="never" nodeType="tmRoot"/>
+      </p:par>
+    </p:tnLst>
+  </p:timing>
+</p:sld>
+</file>
+
+<file path=ppt/slides/slide9.xml><?xml version="1.0" encoding="utf-8"?>
 <p:sld xmlns:a="http://schemas.openxmlformats.org/drawingml/2006/main" xmlns:r="http://schemas.openxmlformats.org/officeDocument/2006/relationships" xmlns:p="http://schemas.openxmlformats.org/presentationml/2006/main">
   <p:cSld>
     <p:spTree>
@@ -7918,701 +8906,6 @@
   <p:clrMapOvr>
     <a:masterClrMapping/>
   </p:clrMapOvr>
-</p:sld>
-</file>
-
-<file path=ppt/slides/slide9.xml><?xml version="1.0" encoding="utf-8"?>
-<p:sld xmlns:a="http://schemas.openxmlformats.org/drawingml/2006/main" xmlns:r="http://schemas.openxmlformats.org/officeDocument/2006/relationships" xmlns:p="http://schemas.openxmlformats.org/presentationml/2006/main">
-  <p:cSld>
-    <p:spTree>
-      <p:nvGrpSpPr>
-        <p:cNvPr id="1" name=""/>
-        <p:cNvGrpSpPr/>
-        <p:nvPr/>
-      </p:nvGrpSpPr>
-      <p:grpSpPr>
-        <a:xfrm>
-          <a:off x="0" y="0"/>
-          <a:ext cx="0" cy="0"/>
-          <a:chOff x="0" y="0"/>
-          <a:chExt cx="0" cy="0"/>
-        </a:xfrm>
-      </p:grpSpPr>
-      <p:pic>
-        <p:nvPicPr>
-          <p:cNvPr id="3074" name="Picture 2"/>
-          <p:cNvPicPr>
-            <a:picLocks noChangeAspect="1" noChangeArrowheads="1"/>
-          </p:cNvPicPr>
-          <p:nvPr/>
-        </p:nvPicPr>
-        <p:blipFill>
-          <a:blip r:embed="rId2" cstate="print"/>
-          <a:srcRect/>
-          <a:stretch>
-            <a:fillRect/>
-          </a:stretch>
-        </p:blipFill>
-        <p:spPr bwMode="auto">
-          <a:xfrm>
-            <a:off x="1100138" y="371475"/>
-            <a:ext cx="6943725" cy="6115050"/>
-          </a:xfrm>
-          <a:prstGeom prst="rect">
-            <a:avLst/>
-          </a:prstGeom>
-          <a:noFill/>
-          <a:ln w="9525">
-            <a:noFill/>
-            <a:miter lim="800000"/>
-            <a:headEnd/>
-            <a:tailEnd/>
-          </a:ln>
-        </p:spPr>
-      </p:pic>
-      <p:sp>
-        <p:nvSpPr>
-          <p:cNvPr id="5" name="Textfeld 4"/>
-          <p:cNvSpPr txBox="1"/>
-          <p:nvPr/>
-        </p:nvSpPr>
-        <p:spPr>
-          <a:xfrm>
-            <a:off x="4932040" y="692696"/>
-            <a:ext cx="1096775" cy="253916"/>
-          </a:xfrm>
-          <a:prstGeom prst="rect">
-            <a:avLst/>
-          </a:prstGeom>
-          <a:solidFill>
-            <a:schemeClr val="accent6">
-              <a:lumMod val="20000"/>
-              <a:lumOff val="80000"/>
-              <a:alpha val="76000"/>
-            </a:schemeClr>
-          </a:solidFill>
-        </p:spPr>
-        <p:txBody>
-          <a:bodyPr wrap="none" rtlCol="0">
-            <a:spAutoFit/>
-          </a:bodyPr>
-          <a:lstStyle/>
-          <a:p>
-            <a:r>
-              <a:rPr lang="en-US" sz="1050" b="1" dirty="0" smtClean="0">
-                <a:solidFill>
-                  <a:srgbClr val="C00000"/>
-                </a:solidFill>
-              </a:rPr>
-              <a:t>states definition</a:t>
-            </a:r>
-          </a:p>
-        </p:txBody>
-      </p:sp>
-      <p:cxnSp>
-        <p:nvCxnSpPr>
-          <p:cNvPr id="6" name="Gerade Verbindung mit Pfeil 5"/>
-          <p:cNvCxnSpPr/>
-          <p:nvPr/>
-        </p:nvCxnSpPr>
-        <p:spPr>
-          <a:xfrm flipH="1">
-            <a:off x="3995936" y="836712"/>
-            <a:ext cx="864096" cy="0"/>
-          </a:xfrm>
-          <a:prstGeom prst="straightConnector1">
-            <a:avLst/>
-          </a:prstGeom>
-          <a:ln w="19050">
-            <a:solidFill>
-              <a:srgbClr val="C00000"/>
-            </a:solidFill>
-            <a:tailEnd type="triangle"/>
-          </a:ln>
-        </p:spPr>
-        <p:style>
-          <a:lnRef idx="1">
-            <a:schemeClr val="accent1"/>
-          </a:lnRef>
-          <a:fillRef idx="0">
-            <a:schemeClr val="accent1"/>
-          </a:fillRef>
-          <a:effectRef idx="0">
-            <a:schemeClr val="accent1"/>
-          </a:effectRef>
-          <a:fontRef idx="minor">
-            <a:schemeClr val="tx1"/>
-          </a:fontRef>
-        </p:style>
-      </p:cxnSp>
-      <p:sp>
-        <p:nvSpPr>
-          <p:cNvPr id="8" name="Textfeld 7"/>
-          <p:cNvSpPr txBox="1"/>
-          <p:nvPr/>
-        </p:nvSpPr>
-        <p:spPr>
-          <a:xfrm>
-            <a:off x="3059832" y="1340768"/>
-            <a:ext cx="1008111" cy="253916"/>
-          </a:xfrm>
-          <a:prstGeom prst="rect">
-            <a:avLst/>
-          </a:prstGeom>
-          <a:solidFill>
-            <a:schemeClr val="accent6">
-              <a:lumMod val="20000"/>
-              <a:lumOff val="80000"/>
-              <a:alpha val="76000"/>
-            </a:schemeClr>
-          </a:solidFill>
-        </p:spPr>
-        <p:txBody>
-          <a:bodyPr wrap="square" rtlCol="0">
-            <a:spAutoFit/>
-          </a:bodyPr>
-          <a:lstStyle/>
-          <a:p>
-            <a:r>
-              <a:rPr lang="en-US" sz="1050" b="1" dirty="0" smtClean="0">
-                <a:solidFill>
-                  <a:srgbClr val="C00000"/>
-                </a:solidFill>
-              </a:rPr>
-              <a:t>state variable</a:t>
-            </a:r>
-          </a:p>
-        </p:txBody>
-      </p:sp>
-      <p:cxnSp>
-        <p:nvCxnSpPr>
-          <p:cNvPr id="9" name="Gerade Verbindung mit Pfeil 8"/>
-          <p:cNvCxnSpPr/>
-          <p:nvPr/>
-        </p:nvCxnSpPr>
-        <p:spPr>
-          <a:xfrm flipH="1" flipV="1">
-            <a:off x="2195736" y="908720"/>
-            <a:ext cx="792088" cy="576064"/>
-          </a:xfrm>
-          <a:prstGeom prst="straightConnector1">
-            <a:avLst/>
-          </a:prstGeom>
-          <a:ln w="19050">
-            <a:solidFill>
-              <a:srgbClr val="C00000"/>
-            </a:solidFill>
-            <a:tailEnd type="triangle"/>
-          </a:ln>
-        </p:spPr>
-        <p:style>
-          <a:lnRef idx="1">
-            <a:schemeClr val="accent1"/>
-          </a:lnRef>
-          <a:fillRef idx="0">
-            <a:schemeClr val="accent1"/>
-          </a:fillRef>
-          <a:effectRef idx="0">
-            <a:schemeClr val="accent1"/>
-          </a:effectRef>
-          <a:fontRef idx="minor">
-            <a:schemeClr val="tx1"/>
-          </a:fontRef>
-        </p:style>
-      </p:cxnSp>
-      <p:sp>
-        <p:nvSpPr>
-          <p:cNvPr id="12" name="Textfeld 11"/>
-          <p:cNvSpPr txBox="1"/>
-          <p:nvPr/>
-        </p:nvSpPr>
-        <p:spPr>
-          <a:xfrm>
-            <a:off x="4499992" y="980728"/>
-            <a:ext cx="1598515" cy="253916"/>
-          </a:xfrm>
-          <a:prstGeom prst="rect">
-            <a:avLst/>
-          </a:prstGeom>
-          <a:solidFill>
-            <a:schemeClr val="accent6">
-              <a:lumMod val="20000"/>
-              <a:lumOff val="80000"/>
-              <a:alpha val="39000"/>
-            </a:schemeClr>
-          </a:solidFill>
-        </p:spPr>
-        <p:txBody>
-          <a:bodyPr wrap="none" rtlCol="0">
-            <a:spAutoFit/>
-          </a:bodyPr>
-          <a:lstStyle/>
-          <a:p>
-            <a:r>
-              <a:rPr lang="en-US" sz="1050" b="1" dirty="0" smtClean="0">
-                <a:solidFill>
-                  <a:srgbClr val="C00000"/>
-                </a:solidFill>
-              </a:rPr>
-              <a:t>additional state variables</a:t>
-            </a:r>
-            <a:endParaRPr lang="en-US" sz="1050" b="1" dirty="0">
-              <a:solidFill>
-                <a:srgbClr val="C00000"/>
-              </a:solidFill>
-            </a:endParaRPr>
-          </a:p>
-        </p:txBody>
-      </p:sp>
-      <p:sp>
-        <p:nvSpPr>
-          <p:cNvPr id="13" name="Geschweifte Klammer rechts 12"/>
-          <p:cNvSpPr/>
-          <p:nvPr/>
-        </p:nvSpPr>
-        <p:spPr>
-          <a:xfrm>
-            <a:off x="4283968" y="908720"/>
-            <a:ext cx="144016" cy="360040"/>
-          </a:xfrm>
-          <a:prstGeom prst="rightBrace">
-            <a:avLst/>
-          </a:prstGeom>
-        </p:spPr>
-        <p:style>
-          <a:lnRef idx="1">
-            <a:schemeClr val="accent1"/>
-          </a:lnRef>
-          <a:fillRef idx="0">
-            <a:schemeClr val="accent1"/>
-          </a:fillRef>
-          <a:effectRef idx="0">
-            <a:schemeClr val="accent1"/>
-          </a:effectRef>
-          <a:fontRef idx="minor">
-            <a:schemeClr val="tx1"/>
-          </a:fontRef>
-        </p:style>
-        <p:txBody>
-          <a:bodyPr rtlCol="0" anchor="ctr"/>
-          <a:lstStyle/>
-          <a:p>
-            <a:pPr algn="ctr"/>
-            <a:endParaRPr lang="en-US"/>
-          </a:p>
-        </p:txBody>
-      </p:sp>
-      <p:sp>
-        <p:nvSpPr>
-          <p:cNvPr id="14" name="Textfeld 13"/>
-          <p:cNvSpPr txBox="1"/>
-          <p:nvPr/>
-        </p:nvSpPr>
-        <p:spPr>
-          <a:xfrm>
-            <a:off x="8028384" y="2708920"/>
-            <a:ext cx="784189" cy="415498"/>
-          </a:xfrm>
-          <a:prstGeom prst="rect">
-            <a:avLst/>
-          </a:prstGeom>
-          <a:solidFill>
-            <a:schemeClr val="accent6">
-              <a:lumMod val="20000"/>
-              <a:lumOff val="80000"/>
-              <a:alpha val="39000"/>
-            </a:schemeClr>
-          </a:solidFill>
-        </p:spPr>
-        <p:txBody>
-          <a:bodyPr wrap="none" rtlCol="0">
-            <a:spAutoFit/>
-          </a:bodyPr>
-          <a:lstStyle/>
-          <a:p>
-            <a:r>
-              <a:rPr lang="en-US" sz="1050" b="1" dirty="0" smtClean="0">
-                <a:solidFill>
-                  <a:srgbClr val="C00000"/>
-                </a:solidFill>
-              </a:rPr>
-              <a:t>transitions</a:t>
-            </a:r>
-          </a:p>
-          <a:p>
-            <a:r>
-              <a:rPr lang="en-US" sz="1050" b="1" dirty="0" smtClean="0">
-                <a:solidFill>
-                  <a:srgbClr val="C00000"/>
-                </a:solidFill>
-              </a:rPr>
-              <a:t>definitions</a:t>
-            </a:r>
-            <a:endParaRPr lang="en-US" sz="1050" b="1" dirty="0">
-              <a:solidFill>
-                <a:srgbClr val="C00000"/>
-              </a:solidFill>
-            </a:endParaRPr>
-          </a:p>
-        </p:txBody>
-      </p:sp>
-      <p:sp>
-        <p:nvSpPr>
-          <p:cNvPr id="15" name="Geschweifte Klammer rechts 14"/>
-          <p:cNvSpPr/>
-          <p:nvPr/>
-        </p:nvSpPr>
-        <p:spPr>
-          <a:xfrm>
-            <a:off x="7812360" y="2636912"/>
-            <a:ext cx="144016" cy="1080120"/>
-          </a:xfrm>
-          <a:prstGeom prst="rightBrace">
-            <a:avLst/>
-          </a:prstGeom>
-        </p:spPr>
-        <p:style>
-          <a:lnRef idx="1">
-            <a:schemeClr val="accent1"/>
-          </a:lnRef>
-          <a:fillRef idx="0">
-            <a:schemeClr val="accent1"/>
-          </a:fillRef>
-          <a:effectRef idx="0">
-            <a:schemeClr val="accent1"/>
-          </a:effectRef>
-          <a:fontRef idx="minor">
-            <a:schemeClr val="tx1"/>
-          </a:fontRef>
-        </p:style>
-        <p:txBody>
-          <a:bodyPr rtlCol="0" anchor="ctr"/>
-          <a:lstStyle/>
-          <a:p>
-            <a:pPr algn="ctr"/>
-            <a:endParaRPr lang="en-US"/>
-          </a:p>
-        </p:txBody>
-      </p:sp>
-      <p:sp>
-        <p:nvSpPr>
-          <p:cNvPr id="16" name="Textfeld 15"/>
-          <p:cNvSpPr txBox="1"/>
-          <p:nvPr/>
-        </p:nvSpPr>
-        <p:spPr>
-          <a:xfrm>
-            <a:off x="1403648" y="3068960"/>
-            <a:ext cx="1080119" cy="253916"/>
-          </a:xfrm>
-          <a:prstGeom prst="rect">
-            <a:avLst/>
-          </a:prstGeom>
-          <a:solidFill>
-            <a:schemeClr val="accent6">
-              <a:lumMod val="20000"/>
-              <a:lumOff val="80000"/>
-              <a:alpha val="76000"/>
-            </a:schemeClr>
-          </a:solidFill>
-        </p:spPr>
-        <p:txBody>
-          <a:bodyPr wrap="square" rtlCol="0">
-            <a:spAutoFit/>
-          </a:bodyPr>
-          <a:lstStyle/>
-          <a:p>
-            <a:r>
-              <a:rPr lang="en-US" sz="1050" b="1" dirty="0" smtClean="0">
-                <a:solidFill>
-                  <a:srgbClr val="C00000"/>
-                </a:solidFill>
-              </a:rPr>
-              <a:t>transition name</a:t>
-            </a:r>
-          </a:p>
-        </p:txBody>
-      </p:sp>
-      <p:cxnSp>
-        <p:nvCxnSpPr>
-          <p:cNvPr id="17" name="Gerade Verbindung mit Pfeil 16"/>
-          <p:cNvCxnSpPr/>
-          <p:nvPr/>
-        </p:nvCxnSpPr>
-        <p:spPr>
-          <a:xfrm flipV="1">
-            <a:off x="2555776" y="2996952"/>
-            <a:ext cx="288032" cy="144016"/>
-          </a:xfrm>
-          <a:prstGeom prst="straightConnector1">
-            <a:avLst/>
-          </a:prstGeom>
-          <a:ln w="19050">
-            <a:solidFill>
-              <a:srgbClr val="C00000"/>
-            </a:solidFill>
-            <a:tailEnd type="triangle"/>
-          </a:ln>
-        </p:spPr>
-        <p:style>
-          <a:lnRef idx="1">
-            <a:schemeClr val="accent1"/>
-          </a:lnRef>
-          <a:fillRef idx="0">
-            <a:schemeClr val="accent1"/>
-          </a:fillRef>
-          <a:effectRef idx="0">
-            <a:schemeClr val="accent1"/>
-          </a:effectRef>
-          <a:fontRef idx="minor">
-            <a:schemeClr val="tx1"/>
-          </a:fontRef>
-        </p:style>
-      </p:cxnSp>
-      <p:sp>
-        <p:nvSpPr>
-          <p:cNvPr id="19" name="Geschweifte Klammer rechts 18"/>
-          <p:cNvSpPr/>
-          <p:nvPr/>
-        </p:nvSpPr>
-        <p:spPr>
-          <a:xfrm rot="16200000">
-            <a:off x="5400092" y="1016732"/>
-            <a:ext cx="216023" cy="3024336"/>
-          </a:xfrm>
-          <a:prstGeom prst="rightBrace">
-            <a:avLst/>
-          </a:prstGeom>
-        </p:spPr>
-        <p:style>
-          <a:lnRef idx="1">
-            <a:schemeClr val="accent1"/>
-          </a:lnRef>
-          <a:fillRef idx="0">
-            <a:schemeClr val="accent1"/>
-          </a:fillRef>
-          <a:effectRef idx="0">
-            <a:schemeClr val="accent1"/>
-          </a:effectRef>
-          <a:fontRef idx="minor">
-            <a:schemeClr val="tx1"/>
-          </a:fontRef>
-        </p:style>
-        <p:txBody>
-          <a:bodyPr rtlCol="0" anchor="ctr"/>
-          <a:lstStyle/>
-          <a:p>
-            <a:pPr algn="ctr"/>
-            <a:endParaRPr lang="en-US"/>
-          </a:p>
-        </p:txBody>
-      </p:sp>
-      <p:sp>
-        <p:nvSpPr>
-          <p:cNvPr id="20" name="Textfeld 19"/>
-          <p:cNvSpPr txBox="1"/>
-          <p:nvPr/>
-        </p:nvSpPr>
-        <p:spPr>
-          <a:xfrm>
-            <a:off x="5220072" y="2132856"/>
-            <a:ext cx="506870" cy="253916"/>
-          </a:xfrm>
-          <a:prstGeom prst="rect">
-            <a:avLst/>
-          </a:prstGeom>
-          <a:solidFill>
-            <a:schemeClr val="accent6">
-              <a:lumMod val="20000"/>
-              <a:lumOff val="80000"/>
-              <a:alpha val="39000"/>
-            </a:schemeClr>
-          </a:solidFill>
-        </p:spPr>
-        <p:txBody>
-          <a:bodyPr wrap="none" rtlCol="0">
-            <a:spAutoFit/>
-          </a:bodyPr>
-          <a:lstStyle/>
-          <a:p>
-            <a:r>
-              <a:rPr lang="en-US" sz="1050" b="1" dirty="0" smtClean="0">
-                <a:solidFill>
-                  <a:srgbClr val="C00000"/>
-                </a:solidFill>
-              </a:rPr>
-              <a:t>guard</a:t>
-            </a:r>
-            <a:endParaRPr lang="en-US" sz="1050" b="1" dirty="0">
-              <a:solidFill>
-                <a:srgbClr val="C00000"/>
-              </a:solidFill>
-            </a:endParaRPr>
-          </a:p>
-        </p:txBody>
-      </p:sp>
-      <p:sp>
-        <p:nvSpPr>
-          <p:cNvPr id="22" name="Textfeld 21"/>
-          <p:cNvSpPr txBox="1"/>
-          <p:nvPr/>
-        </p:nvSpPr>
-        <p:spPr>
-          <a:xfrm>
-            <a:off x="1403648" y="4797152"/>
-            <a:ext cx="1296144" cy="253916"/>
-          </a:xfrm>
-          <a:prstGeom prst="rect">
-            <a:avLst/>
-          </a:prstGeom>
-          <a:solidFill>
-            <a:schemeClr val="accent6">
-              <a:lumMod val="20000"/>
-              <a:lumOff val="80000"/>
-              <a:alpha val="76000"/>
-            </a:schemeClr>
-          </a:solidFill>
-        </p:spPr>
-        <p:txBody>
-          <a:bodyPr wrap="square" rtlCol="0">
-            <a:spAutoFit/>
-          </a:bodyPr>
-          <a:lstStyle/>
-          <a:p>
-            <a:r>
-              <a:rPr lang="en-US" sz="1050" b="1" dirty="0" smtClean="0">
-                <a:solidFill>
-                  <a:srgbClr val="C00000"/>
-                </a:solidFill>
-              </a:rPr>
-              <a:t>transition reference</a:t>
-            </a:r>
-          </a:p>
-        </p:txBody>
-      </p:sp>
-      <p:cxnSp>
-        <p:nvCxnSpPr>
-          <p:cNvPr id="23" name="Gerade Verbindung mit Pfeil 22"/>
-          <p:cNvCxnSpPr/>
-          <p:nvPr/>
-        </p:nvCxnSpPr>
-        <p:spPr>
-          <a:xfrm flipV="1">
-            <a:off x="2555776" y="4615244"/>
-            <a:ext cx="288032" cy="144016"/>
-          </a:xfrm>
-          <a:prstGeom prst="straightConnector1">
-            <a:avLst/>
-          </a:prstGeom>
-          <a:ln w="19050">
-            <a:solidFill>
-              <a:srgbClr val="C00000"/>
-            </a:solidFill>
-            <a:tailEnd type="triangle"/>
-          </a:ln>
-        </p:spPr>
-        <p:style>
-          <a:lnRef idx="1">
-            <a:schemeClr val="accent1"/>
-          </a:lnRef>
-          <a:fillRef idx="0">
-            <a:schemeClr val="accent1"/>
-          </a:fillRef>
-          <a:effectRef idx="0">
-            <a:schemeClr val="accent1"/>
-          </a:effectRef>
-          <a:fontRef idx="minor">
-            <a:schemeClr val="tx1"/>
-          </a:fontRef>
-        </p:style>
-      </p:cxnSp>
-      <p:sp>
-        <p:nvSpPr>
-          <p:cNvPr id="24" name="Textfeld 23"/>
-          <p:cNvSpPr txBox="1"/>
-          <p:nvPr/>
-        </p:nvSpPr>
-        <p:spPr>
-          <a:xfrm>
-            <a:off x="3059832" y="2060848"/>
-            <a:ext cx="1440160" cy="253916"/>
-          </a:xfrm>
-          <a:prstGeom prst="rect">
-            <a:avLst/>
-          </a:prstGeom>
-          <a:solidFill>
-            <a:schemeClr val="accent6">
-              <a:lumMod val="20000"/>
-              <a:lumOff val="80000"/>
-              <a:alpha val="76000"/>
-            </a:schemeClr>
-          </a:solidFill>
-        </p:spPr>
-        <p:txBody>
-          <a:bodyPr wrap="square" rtlCol="0">
-            <a:spAutoFit/>
-          </a:bodyPr>
-          <a:lstStyle/>
-          <a:p>
-            <a:r>
-              <a:rPr lang="en-US" sz="1050" b="1" dirty="0" smtClean="0">
-                <a:solidFill>
-                  <a:srgbClr val="C00000"/>
-                </a:solidFill>
-              </a:rPr>
-              <a:t>state-machine section</a:t>
-            </a:r>
-          </a:p>
-        </p:txBody>
-      </p:sp>
-      <p:cxnSp>
-        <p:nvCxnSpPr>
-          <p:cNvPr id="25" name="Gerade Verbindung mit Pfeil 24"/>
-          <p:cNvCxnSpPr/>
-          <p:nvPr/>
-        </p:nvCxnSpPr>
-        <p:spPr>
-          <a:xfrm flipH="1">
-            <a:off x="2483768" y="2204864"/>
-            <a:ext cx="504056" cy="0"/>
-          </a:xfrm>
-          <a:prstGeom prst="straightConnector1">
-            <a:avLst/>
-          </a:prstGeom>
-          <a:ln w="19050">
-            <a:solidFill>
-              <a:srgbClr val="C00000"/>
-            </a:solidFill>
-            <a:tailEnd type="triangle"/>
-          </a:ln>
-        </p:spPr>
-        <p:style>
-          <a:lnRef idx="1">
-            <a:schemeClr val="accent1"/>
-          </a:lnRef>
-          <a:fillRef idx="0">
-            <a:schemeClr val="accent1"/>
-          </a:fillRef>
-          <a:effectRef idx="0">
-            <a:schemeClr val="accent1"/>
-          </a:effectRef>
-          <a:fontRef idx="minor">
-            <a:schemeClr val="tx1"/>
-          </a:fontRef>
-        </p:style>
-      </p:cxnSp>
-    </p:spTree>
-  </p:cSld>
-  <p:clrMapOvr>
-    <a:masterClrMapping/>
-  </p:clrMapOvr>
-  <p:timing>
-    <p:tnLst>
-      <p:par>
-        <p:cTn id="1" dur="indefinite" restart="never" nodeType="tmRoot"/>
-      </p:par>
-    </p:tnLst>
-  </p:timing>
 </p:sld>
 </file>
 

</xml_diff>

<commit_message>
tutorial: updated the source of figures
</commit_message>
<xml_diff>
--- a/code/tutorial/solutions/com.mbeddr.formal.nusmv.users_guide/figures/figures.pptx
+++ b/code/tutorial/solutions/com.mbeddr.formal.nusmv.users_guide/figures/figures.pptx
@@ -6349,7 +6349,7 @@
         </p:nvSpPr>
         <p:spPr>
           <a:xfrm>
-            <a:off x="5004050" y="3788023"/>
+            <a:off x="4932040" y="3932039"/>
             <a:ext cx="3771980" cy="577081"/>
           </a:xfrm>
           <a:prstGeom prst="rect">
@@ -6419,7 +6419,7 @@
         </p:nvCxnSpPr>
         <p:spPr>
           <a:xfrm flipV="1">
-            <a:off x="6660232" y="3427984"/>
+            <a:off x="6588222" y="3572000"/>
             <a:ext cx="72008" cy="347472"/>
           </a:xfrm>
           <a:prstGeom prst="straightConnector1">
@@ -6463,7 +6463,7 @@
         </p:nvCxnSpPr>
         <p:spPr>
           <a:xfrm flipV="1">
-            <a:off x="7452320" y="3429000"/>
+            <a:off x="7380310" y="3573016"/>
             <a:ext cx="72008" cy="347472"/>
           </a:xfrm>
           <a:prstGeom prst="straightConnector1">

</xml_diff>